<commit_message>
Präsentation geändert. Neue Klassen für Highscore eingefügt. Sound Ordner mit Musik eingefügt.
Former-commit-id: a85c5fe541d9b89403a51c01736b03a6b8f08cb2
</commit_message>
<xml_diff>
--- a/documents/Meilensteine/Meilenstein V/Meilenstein_5_Präsentation.pptx
+++ b/documents/Meilensteine/Meilenstein V/Meilenstein_5_Präsentation.pptx
@@ -871,753 +871,6 @@
 </file>
 
 <file path=ppt/diagrams/colors2.xml><?xml version="1.0" encoding="utf-8"?>
-<dgm:colorsDef xmlns:dgm="http://schemas.openxmlformats.org/drawingml/2006/diagram" xmlns:a="http://schemas.openxmlformats.org/drawingml/2006/main" uniqueId="urn:microsoft.com/office/officeart/2005/8/colors/accent1_2">
-  <dgm:title val=""/>
-  <dgm:desc val=""/>
-  <dgm:catLst>
-    <dgm:cat type="accent1" pri="11200"/>
-  </dgm:catLst>
-  <dgm:styleLbl name="node0">
-    <dgm:fillClrLst meth="repeat">
-      <a:schemeClr val="accent1"/>
-    </dgm:fillClrLst>
-    <dgm:linClrLst meth="repeat">
-      <a:schemeClr val="lt1"/>
-    </dgm:linClrLst>
-    <dgm:effectClrLst/>
-    <dgm:txLinClrLst/>
-    <dgm:txFillClrLst/>
-    <dgm:txEffectClrLst/>
-  </dgm:styleLbl>
-  <dgm:styleLbl name="alignNode1">
-    <dgm:fillClrLst meth="repeat">
-      <a:schemeClr val="accent1"/>
-    </dgm:fillClrLst>
-    <dgm:linClrLst meth="repeat">
-      <a:schemeClr val="accent1"/>
-    </dgm:linClrLst>
-    <dgm:effectClrLst/>
-    <dgm:txLinClrLst/>
-    <dgm:txFillClrLst/>
-    <dgm:txEffectClrLst/>
-  </dgm:styleLbl>
-  <dgm:styleLbl name="node1">
-    <dgm:fillClrLst meth="repeat">
-      <a:schemeClr val="accent1"/>
-    </dgm:fillClrLst>
-    <dgm:linClrLst meth="repeat">
-      <a:schemeClr val="lt1"/>
-    </dgm:linClrLst>
-    <dgm:effectClrLst/>
-    <dgm:txLinClrLst/>
-    <dgm:txFillClrLst/>
-    <dgm:txEffectClrLst/>
-  </dgm:styleLbl>
-  <dgm:styleLbl name="lnNode1">
-    <dgm:fillClrLst meth="repeat">
-      <a:schemeClr val="accent1"/>
-    </dgm:fillClrLst>
-    <dgm:linClrLst meth="repeat">
-      <a:schemeClr val="lt1"/>
-    </dgm:linClrLst>
-    <dgm:effectClrLst/>
-    <dgm:txLinClrLst/>
-    <dgm:txFillClrLst/>
-    <dgm:txEffectClrLst/>
-  </dgm:styleLbl>
-  <dgm:styleLbl name="vennNode1">
-    <dgm:fillClrLst meth="repeat">
-      <a:schemeClr val="accent1">
-        <a:alpha val="50000"/>
-      </a:schemeClr>
-    </dgm:fillClrLst>
-    <dgm:linClrLst meth="repeat">
-      <a:schemeClr val="lt1"/>
-    </dgm:linClrLst>
-    <dgm:effectClrLst/>
-    <dgm:txLinClrLst/>
-    <dgm:txFillClrLst/>
-    <dgm:txEffectClrLst/>
-  </dgm:styleLbl>
-  <dgm:styleLbl name="node2">
-    <dgm:fillClrLst meth="repeat">
-      <a:schemeClr val="accent1"/>
-    </dgm:fillClrLst>
-    <dgm:linClrLst meth="repeat">
-      <a:schemeClr val="lt1"/>
-    </dgm:linClrLst>
-    <dgm:effectClrLst/>
-    <dgm:txLinClrLst/>
-    <dgm:txFillClrLst/>
-    <dgm:txEffectClrLst/>
-  </dgm:styleLbl>
-  <dgm:styleLbl name="node3">
-    <dgm:fillClrLst meth="repeat">
-      <a:schemeClr val="accent1"/>
-    </dgm:fillClrLst>
-    <dgm:linClrLst meth="repeat">
-      <a:schemeClr val="lt1"/>
-    </dgm:linClrLst>
-    <dgm:effectClrLst/>
-    <dgm:txLinClrLst/>
-    <dgm:txFillClrLst/>
-    <dgm:txEffectClrLst/>
-  </dgm:styleLbl>
-  <dgm:styleLbl name="node4">
-    <dgm:fillClrLst meth="repeat">
-      <a:schemeClr val="accent1"/>
-    </dgm:fillClrLst>
-    <dgm:linClrLst meth="repeat">
-      <a:schemeClr val="lt1"/>
-    </dgm:linClrLst>
-    <dgm:effectClrLst/>
-    <dgm:txLinClrLst/>
-    <dgm:txFillClrLst/>
-    <dgm:txEffectClrLst/>
-  </dgm:styleLbl>
-  <dgm:styleLbl name="fgImgPlace1">
-    <dgm:fillClrLst meth="repeat">
-      <a:schemeClr val="accent1">
-        <a:tint val="50000"/>
-      </a:schemeClr>
-    </dgm:fillClrLst>
-    <dgm:linClrLst meth="repeat">
-      <a:schemeClr val="lt1"/>
-    </dgm:linClrLst>
-    <dgm:effectClrLst/>
-    <dgm:txLinClrLst/>
-    <dgm:txFillClrLst meth="repeat">
-      <a:schemeClr val="lt1"/>
-    </dgm:txFillClrLst>
-    <dgm:txEffectClrLst/>
-  </dgm:styleLbl>
-  <dgm:styleLbl name="alignImgPlace1">
-    <dgm:fillClrLst meth="repeat">
-      <a:schemeClr val="accent1">
-        <a:tint val="50000"/>
-      </a:schemeClr>
-    </dgm:fillClrLst>
-    <dgm:linClrLst meth="repeat">
-      <a:schemeClr val="lt1"/>
-    </dgm:linClrLst>
-    <dgm:effectClrLst/>
-    <dgm:txLinClrLst/>
-    <dgm:txFillClrLst meth="repeat">
-      <a:schemeClr val="lt1"/>
-    </dgm:txFillClrLst>
-    <dgm:txEffectClrLst/>
-  </dgm:styleLbl>
-  <dgm:styleLbl name="bgImgPlace1">
-    <dgm:fillClrLst meth="repeat">
-      <a:schemeClr val="accent1">
-        <a:tint val="50000"/>
-      </a:schemeClr>
-    </dgm:fillClrLst>
-    <dgm:linClrLst meth="repeat">
-      <a:schemeClr val="lt1"/>
-    </dgm:linClrLst>
-    <dgm:effectClrLst/>
-    <dgm:txLinClrLst/>
-    <dgm:txFillClrLst meth="repeat">
-      <a:schemeClr val="lt1"/>
-    </dgm:txFillClrLst>
-    <dgm:txEffectClrLst/>
-  </dgm:styleLbl>
-  <dgm:styleLbl name="sibTrans2D1">
-    <dgm:fillClrLst meth="repeat">
-      <a:schemeClr val="accent1">
-        <a:tint val="60000"/>
-      </a:schemeClr>
-    </dgm:fillClrLst>
-    <dgm:linClrLst meth="repeat">
-      <a:schemeClr val="accent1">
-        <a:tint val="60000"/>
-      </a:schemeClr>
-    </dgm:linClrLst>
-    <dgm:effectClrLst/>
-    <dgm:txLinClrLst/>
-    <dgm:txFillClrLst/>
-    <dgm:txEffectClrLst/>
-  </dgm:styleLbl>
-  <dgm:styleLbl name="fgSibTrans2D1">
-    <dgm:fillClrLst meth="repeat">
-      <a:schemeClr val="accent1">
-        <a:tint val="60000"/>
-      </a:schemeClr>
-    </dgm:fillClrLst>
-    <dgm:linClrLst meth="repeat">
-      <a:schemeClr val="accent1">
-        <a:tint val="60000"/>
-      </a:schemeClr>
-    </dgm:linClrLst>
-    <dgm:effectClrLst/>
-    <dgm:txLinClrLst/>
-    <dgm:txFillClrLst/>
-    <dgm:txEffectClrLst/>
-  </dgm:styleLbl>
-  <dgm:styleLbl name="bgSibTrans2D1">
-    <dgm:fillClrLst meth="repeat">
-      <a:schemeClr val="accent1">
-        <a:tint val="60000"/>
-      </a:schemeClr>
-    </dgm:fillClrLst>
-    <dgm:linClrLst meth="repeat">
-      <a:schemeClr val="accent1">
-        <a:tint val="60000"/>
-      </a:schemeClr>
-    </dgm:linClrLst>
-    <dgm:effectClrLst/>
-    <dgm:txLinClrLst/>
-    <dgm:txFillClrLst/>
-    <dgm:txEffectClrLst/>
-  </dgm:styleLbl>
-  <dgm:styleLbl name="sibTrans1D1">
-    <dgm:fillClrLst meth="repeat">
-      <a:schemeClr val="accent1"/>
-    </dgm:fillClrLst>
-    <dgm:linClrLst meth="repeat">
-      <a:schemeClr val="accent1"/>
-    </dgm:linClrLst>
-    <dgm:effectClrLst/>
-    <dgm:txLinClrLst/>
-    <dgm:txFillClrLst meth="repeat">
-      <a:schemeClr val="tx1"/>
-    </dgm:txFillClrLst>
-    <dgm:txEffectClrLst/>
-  </dgm:styleLbl>
-  <dgm:styleLbl name="callout">
-    <dgm:fillClrLst meth="repeat">
-      <a:schemeClr val="accent1"/>
-    </dgm:fillClrLst>
-    <dgm:linClrLst meth="repeat">
-      <a:schemeClr val="accent1">
-        <a:tint val="50000"/>
-      </a:schemeClr>
-    </dgm:linClrLst>
-    <dgm:effectClrLst/>
-    <dgm:txLinClrLst/>
-    <dgm:txFillClrLst meth="repeat">
-      <a:schemeClr val="tx1"/>
-    </dgm:txFillClrLst>
-    <dgm:txEffectClrLst/>
-  </dgm:styleLbl>
-  <dgm:styleLbl name="asst0">
-    <dgm:fillClrLst meth="repeat">
-      <a:schemeClr val="accent1"/>
-    </dgm:fillClrLst>
-    <dgm:linClrLst meth="repeat">
-      <a:schemeClr val="lt1"/>
-    </dgm:linClrLst>
-    <dgm:effectClrLst/>
-    <dgm:txLinClrLst/>
-    <dgm:txFillClrLst/>
-    <dgm:txEffectClrLst/>
-  </dgm:styleLbl>
-  <dgm:styleLbl name="asst1">
-    <dgm:fillClrLst meth="repeat">
-      <a:schemeClr val="accent1"/>
-    </dgm:fillClrLst>
-    <dgm:linClrLst meth="repeat">
-      <a:schemeClr val="lt1"/>
-    </dgm:linClrLst>
-    <dgm:effectClrLst/>
-    <dgm:txLinClrLst/>
-    <dgm:txFillClrLst/>
-    <dgm:txEffectClrLst/>
-  </dgm:styleLbl>
-  <dgm:styleLbl name="asst2">
-    <dgm:fillClrLst meth="repeat">
-      <a:schemeClr val="accent1"/>
-    </dgm:fillClrLst>
-    <dgm:linClrLst meth="repeat">
-      <a:schemeClr val="lt1"/>
-    </dgm:linClrLst>
-    <dgm:effectClrLst/>
-    <dgm:txLinClrLst/>
-    <dgm:txFillClrLst/>
-    <dgm:txEffectClrLst/>
-  </dgm:styleLbl>
-  <dgm:styleLbl name="asst3">
-    <dgm:fillClrLst meth="repeat">
-      <a:schemeClr val="accent1"/>
-    </dgm:fillClrLst>
-    <dgm:linClrLst meth="repeat">
-      <a:schemeClr val="lt1"/>
-    </dgm:linClrLst>
-    <dgm:effectClrLst/>
-    <dgm:txLinClrLst/>
-    <dgm:txFillClrLst/>
-    <dgm:txEffectClrLst/>
-  </dgm:styleLbl>
-  <dgm:styleLbl name="asst4">
-    <dgm:fillClrLst meth="repeat">
-      <a:schemeClr val="accent1"/>
-    </dgm:fillClrLst>
-    <dgm:linClrLst meth="repeat">
-      <a:schemeClr val="lt1"/>
-    </dgm:linClrLst>
-    <dgm:effectClrLst/>
-    <dgm:txLinClrLst/>
-    <dgm:txFillClrLst/>
-    <dgm:txEffectClrLst/>
-  </dgm:styleLbl>
-  <dgm:styleLbl name="parChTrans2D1">
-    <dgm:fillClrLst meth="repeat">
-      <a:schemeClr val="accent1">
-        <a:tint val="60000"/>
-      </a:schemeClr>
-    </dgm:fillClrLst>
-    <dgm:linClrLst meth="repeat">
-      <a:schemeClr val="accent1">
-        <a:tint val="60000"/>
-      </a:schemeClr>
-    </dgm:linClrLst>
-    <dgm:effectClrLst/>
-    <dgm:txLinClrLst/>
-    <dgm:txFillClrLst meth="repeat">
-      <a:schemeClr val="lt1"/>
-    </dgm:txFillClrLst>
-    <dgm:txEffectClrLst/>
-  </dgm:styleLbl>
-  <dgm:styleLbl name="parChTrans2D2">
-    <dgm:fillClrLst meth="repeat">
-      <a:schemeClr val="accent1"/>
-    </dgm:fillClrLst>
-    <dgm:linClrLst meth="repeat">
-      <a:schemeClr val="accent1"/>
-    </dgm:linClrLst>
-    <dgm:effectClrLst/>
-    <dgm:txLinClrLst/>
-    <dgm:txFillClrLst meth="repeat">
-      <a:schemeClr val="lt1"/>
-    </dgm:txFillClrLst>
-    <dgm:txEffectClrLst/>
-  </dgm:styleLbl>
-  <dgm:styleLbl name="parChTrans2D3">
-    <dgm:fillClrLst meth="repeat">
-      <a:schemeClr val="accent1"/>
-    </dgm:fillClrLst>
-    <dgm:linClrLst meth="repeat">
-      <a:schemeClr val="accent1"/>
-    </dgm:linClrLst>
-    <dgm:effectClrLst/>
-    <dgm:txLinClrLst/>
-    <dgm:txFillClrLst meth="repeat">
-      <a:schemeClr val="lt1"/>
-    </dgm:txFillClrLst>
-    <dgm:txEffectClrLst/>
-  </dgm:styleLbl>
-  <dgm:styleLbl name="parChTrans2D4">
-    <dgm:fillClrLst meth="repeat">
-      <a:schemeClr val="accent1"/>
-    </dgm:fillClrLst>
-    <dgm:linClrLst meth="repeat">
-      <a:schemeClr val="accent1"/>
-    </dgm:linClrLst>
-    <dgm:effectClrLst/>
-    <dgm:txLinClrLst/>
-    <dgm:txFillClrLst meth="repeat">
-      <a:schemeClr val="lt1"/>
-    </dgm:txFillClrLst>
-    <dgm:txEffectClrLst/>
-  </dgm:styleLbl>
-  <dgm:styleLbl name="parChTrans1D1">
-    <dgm:fillClrLst meth="repeat">
-      <a:schemeClr val="accent1"/>
-    </dgm:fillClrLst>
-    <dgm:linClrLst meth="repeat">
-      <a:schemeClr val="accent1">
-        <a:shade val="60000"/>
-      </a:schemeClr>
-    </dgm:linClrLst>
-    <dgm:effectClrLst/>
-    <dgm:txLinClrLst/>
-    <dgm:txFillClrLst meth="repeat">
-      <a:schemeClr val="tx1"/>
-    </dgm:txFillClrLst>
-    <dgm:txEffectClrLst/>
-  </dgm:styleLbl>
-  <dgm:styleLbl name="parChTrans1D2">
-    <dgm:fillClrLst meth="repeat">
-      <a:schemeClr val="accent1"/>
-    </dgm:fillClrLst>
-    <dgm:linClrLst meth="repeat">
-      <a:schemeClr val="accent1">
-        <a:shade val="60000"/>
-      </a:schemeClr>
-    </dgm:linClrLst>
-    <dgm:effectClrLst/>
-    <dgm:txLinClrLst/>
-    <dgm:txFillClrLst meth="repeat">
-      <a:schemeClr val="tx1"/>
-    </dgm:txFillClrLst>
-    <dgm:txEffectClrLst/>
-  </dgm:styleLbl>
-  <dgm:styleLbl name="parChTrans1D3">
-    <dgm:fillClrLst meth="repeat">
-      <a:schemeClr val="accent1"/>
-    </dgm:fillClrLst>
-    <dgm:linClrLst meth="repeat">
-      <a:schemeClr val="accent1">
-        <a:shade val="80000"/>
-      </a:schemeClr>
-    </dgm:linClrLst>
-    <dgm:effectClrLst/>
-    <dgm:txLinClrLst/>
-    <dgm:txFillClrLst meth="repeat">
-      <a:schemeClr val="tx1"/>
-    </dgm:txFillClrLst>
-    <dgm:txEffectClrLst/>
-  </dgm:styleLbl>
-  <dgm:styleLbl name="parChTrans1D4">
-    <dgm:fillClrLst meth="repeat">
-      <a:schemeClr val="accent1"/>
-    </dgm:fillClrLst>
-    <dgm:linClrLst meth="repeat">
-      <a:schemeClr val="accent1">
-        <a:shade val="80000"/>
-      </a:schemeClr>
-    </dgm:linClrLst>
-    <dgm:effectClrLst/>
-    <dgm:txLinClrLst/>
-    <dgm:txFillClrLst meth="repeat">
-      <a:schemeClr val="tx1"/>
-    </dgm:txFillClrLst>
-    <dgm:txEffectClrLst/>
-  </dgm:styleLbl>
-  <dgm:styleLbl name="fgAcc1">
-    <dgm:fillClrLst meth="repeat">
-      <a:schemeClr val="lt1">
-        <a:alpha val="90000"/>
-      </a:schemeClr>
-    </dgm:fillClrLst>
-    <dgm:linClrLst meth="repeat">
-      <a:schemeClr val="accent1"/>
-    </dgm:linClrLst>
-    <dgm:effectClrLst/>
-    <dgm:txLinClrLst/>
-    <dgm:txFillClrLst meth="repeat">
-      <a:schemeClr val="dk1"/>
-    </dgm:txFillClrLst>
-    <dgm:txEffectClrLst/>
-  </dgm:styleLbl>
-  <dgm:styleLbl name="conFgAcc1">
-    <dgm:fillClrLst meth="repeat">
-      <a:schemeClr val="lt1">
-        <a:alpha val="90000"/>
-      </a:schemeClr>
-    </dgm:fillClrLst>
-    <dgm:linClrLst meth="repeat">
-      <a:schemeClr val="accent1"/>
-    </dgm:linClrLst>
-    <dgm:effectClrLst/>
-    <dgm:txLinClrLst/>
-    <dgm:txFillClrLst meth="repeat">
-      <a:schemeClr val="dk1"/>
-    </dgm:txFillClrLst>
-    <dgm:txEffectClrLst/>
-  </dgm:styleLbl>
-  <dgm:styleLbl name="alignAcc1">
-    <dgm:fillClrLst meth="repeat">
-      <a:schemeClr val="lt1">
-        <a:alpha val="90000"/>
-      </a:schemeClr>
-    </dgm:fillClrLst>
-    <dgm:linClrLst meth="repeat">
-      <a:schemeClr val="accent1"/>
-    </dgm:linClrLst>
-    <dgm:effectClrLst/>
-    <dgm:txLinClrLst/>
-    <dgm:txFillClrLst meth="repeat">
-      <a:schemeClr val="dk1"/>
-    </dgm:txFillClrLst>
-    <dgm:txEffectClrLst/>
-  </dgm:styleLbl>
-  <dgm:styleLbl name="trAlignAcc1">
-    <dgm:fillClrLst meth="repeat">
-      <a:schemeClr val="lt1">
-        <a:alpha val="40000"/>
-      </a:schemeClr>
-    </dgm:fillClrLst>
-    <dgm:linClrLst meth="repeat">
-      <a:schemeClr val="accent1"/>
-    </dgm:linClrLst>
-    <dgm:effectClrLst/>
-    <dgm:txLinClrLst/>
-    <dgm:txFillClrLst meth="repeat">
-      <a:schemeClr val="dk1"/>
-    </dgm:txFillClrLst>
-    <dgm:txEffectClrLst/>
-  </dgm:styleLbl>
-  <dgm:styleLbl name="bgAcc1">
-    <dgm:fillClrLst meth="repeat">
-      <a:schemeClr val="lt1">
-        <a:alpha val="90000"/>
-      </a:schemeClr>
-    </dgm:fillClrLst>
-    <dgm:linClrLst meth="repeat">
-      <a:schemeClr val="accent1"/>
-    </dgm:linClrLst>
-    <dgm:effectClrLst/>
-    <dgm:txLinClrLst/>
-    <dgm:txFillClrLst meth="repeat">
-      <a:schemeClr val="dk1"/>
-    </dgm:txFillClrLst>
-    <dgm:txEffectClrLst/>
-  </dgm:styleLbl>
-  <dgm:styleLbl name="solidFgAcc1">
-    <dgm:fillClrLst meth="repeat">
-      <a:schemeClr val="lt1"/>
-    </dgm:fillClrLst>
-    <dgm:linClrLst meth="repeat">
-      <a:schemeClr val="accent1"/>
-    </dgm:linClrLst>
-    <dgm:effectClrLst/>
-    <dgm:txLinClrLst/>
-    <dgm:txFillClrLst meth="repeat">
-      <a:schemeClr val="dk1"/>
-    </dgm:txFillClrLst>
-    <dgm:txEffectClrLst/>
-  </dgm:styleLbl>
-  <dgm:styleLbl name="solidAlignAcc1">
-    <dgm:fillClrLst meth="repeat">
-      <a:schemeClr val="lt1"/>
-    </dgm:fillClrLst>
-    <dgm:linClrLst meth="repeat">
-      <a:schemeClr val="accent1"/>
-    </dgm:linClrLst>
-    <dgm:effectClrLst/>
-    <dgm:txLinClrLst/>
-    <dgm:txFillClrLst meth="repeat">
-      <a:schemeClr val="dk1"/>
-    </dgm:txFillClrLst>
-    <dgm:txEffectClrLst/>
-  </dgm:styleLbl>
-  <dgm:styleLbl name="solidBgAcc1">
-    <dgm:fillClrLst meth="repeat">
-      <a:schemeClr val="lt1"/>
-    </dgm:fillClrLst>
-    <dgm:linClrLst meth="repeat">
-      <a:schemeClr val="accent1"/>
-    </dgm:linClrLst>
-    <dgm:effectClrLst/>
-    <dgm:txLinClrLst/>
-    <dgm:txFillClrLst meth="repeat">
-      <a:schemeClr val="dk1"/>
-    </dgm:txFillClrLst>
-    <dgm:txEffectClrLst/>
-  </dgm:styleLbl>
-  <dgm:styleLbl name="fgAccFollowNode1">
-    <dgm:fillClrLst meth="repeat">
-      <a:schemeClr val="accent1">
-        <a:alpha val="90000"/>
-        <a:tint val="40000"/>
-      </a:schemeClr>
-    </dgm:fillClrLst>
-    <dgm:linClrLst meth="repeat">
-      <a:schemeClr val="accent1">
-        <a:alpha val="90000"/>
-        <a:tint val="40000"/>
-      </a:schemeClr>
-    </dgm:linClrLst>
-    <dgm:effectClrLst/>
-    <dgm:txLinClrLst/>
-    <dgm:txFillClrLst meth="repeat">
-      <a:schemeClr val="dk1"/>
-    </dgm:txFillClrLst>
-    <dgm:txEffectClrLst/>
-  </dgm:styleLbl>
-  <dgm:styleLbl name="alignAccFollowNode1">
-    <dgm:fillClrLst meth="repeat">
-      <a:schemeClr val="accent1">
-        <a:alpha val="90000"/>
-        <a:tint val="40000"/>
-      </a:schemeClr>
-    </dgm:fillClrLst>
-    <dgm:linClrLst meth="repeat">
-      <a:schemeClr val="accent1">
-        <a:alpha val="90000"/>
-        <a:tint val="40000"/>
-      </a:schemeClr>
-    </dgm:linClrLst>
-    <dgm:effectClrLst/>
-    <dgm:txLinClrLst/>
-    <dgm:txFillClrLst meth="repeat">
-      <a:schemeClr val="dk1"/>
-    </dgm:txFillClrLst>
-    <dgm:txEffectClrLst/>
-  </dgm:styleLbl>
-  <dgm:styleLbl name="bgAccFollowNode1">
-    <dgm:fillClrLst meth="repeat">
-      <a:schemeClr val="accent1">
-        <a:alpha val="90000"/>
-        <a:tint val="40000"/>
-      </a:schemeClr>
-    </dgm:fillClrLst>
-    <dgm:linClrLst meth="repeat">
-      <a:schemeClr val="accent1">
-        <a:alpha val="90000"/>
-        <a:tint val="40000"/>
-      </a:schemeClr>
-    </dgm:linClrLst>
-    <dgm:effectClrLst/>
-    <dgm:txLinClrLst/>
-    <dgm:txFillClrLst meth="repeat">
-      <a:schemeClr val="dk1"/>
-    </dgm:txFillClrLst>
-    <dgm:txEffectClrLst/>
-  </dgm:styleLbl>
-  <dgm:styleLbl name="fgAcc0">
-    <dgm:fillClrLst meth="repeat">
-      <a:schemeClr val="lt1">
-        <a:alpha val="90000"/>
-      </a:schemeClr>
-    </dgm:fillClrLst>
-    <dgm:linClrLst meth="repeat">
-      <a:schemeClr val="accent1"/>
-    </dgm:linClrLst>
-    <dgm:effectClrLst/>
-    <dgm:txLinClrLst/>
-    <dgm:txFillClrLst meth="repeat">
-      <a:schemeClr val="dk1"/>
-    </dgm:txFillClrLst>
-    <dgm:txEffectClrLst/>
-  </dgm:styleLbl>
-  <dgm:styleLbl name="fgAcc2">
-    <dgm:fillClrLst meth="repeat">
-      <a:schemeClr val="lt1">
-        <a:alpha val="90000"/>
-      </a:schemeClr>
-    </dgm:fillClrLst>
-    <dgm:linClrLst meth="repeat">
-      <a:schemeClr val="accent1"/>
-    </dgm:linClrLst>
-    <dgm:effectClrLst/>
-    <dgm:txLinClrLst/>
-    <dgm:txFillClrLst meth="repeat">
-      <a:schemeClr val="dk1"/>
-    </dgm:txFillClrLst>
-    <dgm:txEffectClrLst/>
-  </dgm:styleLbl>
-  <dgm:styleLbl name="fgAcc3">
-    <dgm:fillClrLst meth="repeat">
-      <a:schemeClr val="lt1">
-        <a:alpha val="90000"/>
-      </a:schemeClr>
-    </dgm:fillClrLst>
-    <dgm:linClrLst meth="repeat">
-      <a:schemeClr val="accent1"/>
-    </dgm:linClrLst>
-    <dgm:effectClrLst/>
-    <dgm:txLinClrLst/>
-    <dgm:txFillClrLst meth="repeat">
-      <a:schemeClr val="dk1"/>
-    </dgm:txFillClrLst>
-    <dgm:txEffectClrLst/>
-  </dgm:styleLbl>
-  <dgm:styleLbl name="fgAcc4">
-    <dgm:fillClrLst meth="repeat">
-      <a:schemeClr val="lt1">
-        <a:alpha val="90000"/>
-      </a:schemeClr>
-    </dgm:fillClrLst>
-    <dgm:linClrLst meth="repeat">
-      <a:schemeClr val="accent1"/>
-    </dgm:linClrLst>
-    <dgm:effectClrLst/>
-    <dgm:txLinClrLst/>
-    <dgm:txFillClrLst meth="repeat">
-      <a:schemeClr val="dk1"/>
-    </dgm:txFillClrLst>
-    <dgm:txEffectClrLst/>
-  </dgm:styleLbl>
-  <dgm:styleLbl name="bgShp">
-    <dgm:fillClrLst meth="repeat">
-      <a:schemeClr val="accent1">
-        <a:tint val="40000"/>
-      </a:schemeClr>
-    </dgm:fillClrLst>
-    <dgm:linClrLst meth="repeat">
-      <a:schemeClr val="accent1"/>
-    </dgm:linClrLst>
-    <dgm:effectClrLst/>
-    <dgm:txLinClrLst/>
-    <dgm:txFillClrLst meth="repeat">
-      <a:schemeClr val="dk1"/>
-    </dgm:txFillClrLst>
-    <dgm:txEffectClrLst/>
-  </dgm:styleLbl>
-  <dgm:styleLbl name="dkBgShp">
-    <dgm:fillClrLst meth="repeat">
-      <a:schemeClr val="accent1">
-        <a:shade val="80000"/>
-      </a:schemeClr>
-    </dgm:fillClrLst>
-    <dgm:linClrLst meth="repeat">
-      <a:schemeClr val="accent1"/>
-    </dgm:linClrLst>
-    <dgm:effectClrLst/>
-    <dgm:txLinClrLst/>
-    <dgm:txFillClrLst meth="repeat">
-      <a:schemeClr val="lt1"/>
-    </dgm:txFillClrLst>
-    <dgm:txEffectClrLst/>
-  </dgm:styleLbl>
-  <dgm:styleLbl name="trBgShp">
-    <dgm:fillClrLst meth="repeat">
-      <a:schemeClr val="accent1">
-        <a:tint val="50000"/>
-        <a:alpha val="40000"/>
-      </a:schemeClr>
-    </dgm:fillClrLst>
-    <dgm:linClrLst meth="repeat">
-      <a:schemeClr val="accent1"/>
-    </dgm:linClrLst>
-    <dgm:effectClrLst/>
-    <dgm:txLinClrLst/>
-    <dgm:txFillClrLst meth="repeat">
-      <a:schemeClr val="lt1"/>
-    </dgm:txFillClrLst>
-    <dgm:txEffectClrLst/>
-  </dgm:styleLbl>
-  <dgm:styleLbl name="fgShp">
-    <dgm:fillClrLst meth="repeat">
-      <a:schemeClr val="accent1">
-        <a:tint val="60000"/>
-      </a:schemeClr>
-    </dgm:fillClrLst>
-    <dgm:linClrLst meth="repeat">
-      <a:schemeClr val="lt1"/>
-    </dgm:linClrLst>
-    <dgm:effectClrLst/>
-    <dgm:txLinClrLst/>
-    <dgm:txFillClrLst meth="repeat">
-      <a:schemeClr val="dk1"/>
-    </dgm:txFillClrLst>
-    <dgm:txEffectClrLst/>
-  </dgm:styleLbl>
-  <dgm:styleLbl name="revTx">
-    <dgm:fillClrLst meth="repeat">
-      <a:schemeClr val="lt1">
-        <a:alpha val="0"/>
-      </a:schemeClr>
-    </dgm:fillClrLst>
-    <dgm:linClrLst meth="repeat">
-      <a:schemeClr val="dk1">
-        <a:alpha val="0"/>
-      </a:schemeClr>
-    </dgm:linClrLst>
-    <dgm:effectClrLst/>
-    <dgm:txLinClrLst/>
-    <dgm:txFillClrLst meth="repeat">
-      <a:schemeClr val="tx1"/>
-    </dgm:txFillClrLst>
-    <dgm:txEffectClrLst/>
-  </dgm:styleLbl>
-</dgm:colorsDef>
-</file>
-
-<file path=ppt/diagrams/colors3.xml><?xml version="1.0" encoding="utf-8"?>
 <dgm:colorsDef xmlns:dgm="http://schemas.openxmlformats.org/drawingml/2006/diagram" xmlns:a="http://schemas.openxmlformats.org/drawingml/2006/main" uniqueId="urn:microsoft.com/office/officeart/2005/8/colors/accent2_2">
   <dgm:title val=""/>
   <dgm:desc val=""/>
@@ -2367,203 +1620,6 @@
 <file path=ppt/diagrams/data1.xml><?xml version="1.0" encoding="utf-8"?>
 <dgm:dataModel xmlns:dgm="http://schemas.openxmlformats.org/drawingml/2006/diagram" xmlns:a="http://schemas.openxmlformats.org/drawingml/2006/main">
   <dgm:ptLst>
-    <dgm:pt modelId="{163C54FC-2004-452E-AACE-2AFA12C1A0DE}" type="doc">
-      <dgm:prSet loTypeId="urn:microsoft.com/office/officeart/2005/8/layout/chevron1" loCatId="process" qsTypeId="urn:microsoft.com/office/officeart/2005/8/quickstyle/simple1" qsCatId="simple" csTypeId="urn:microsoft.com/office/officeart/2005/8/colors/accent1_2" csCatId="accent1" phldr="1"/>
-      <dgm:spPr/>
-    </dgm:pt>
-    <dgm:pt modelId="{81A83268-0277-4427-BBAD-1799636E4540}">
-      <dgm:prSet phldrT="[Text]" custT="1"/>
-      <dgm:spPr/>
-      <dgm:t>
-        <a:bodyPr/>
-        <a:lstStyle/>
-        <a:p>
-          <a:r>
-            <a:rPr lang="de-DE" sz="1600" dirty="0">
-              <a:latin typeface="Calibri" panose="020F0502020204030204" pitchFamily="34" charset="0"/>
-              <a:cs typeface="Calibri" panose="020F0502020204030204" pitchFamily="34" charset="0"/>
-            </a:rPr>
-            <a:t>Anfrage d. Clients </a:t>
-          </a:r>
-        </a:p>
-      </dgm:t>
-    </dgm:pt>
-    <dgm:pt modelId="{5066F55F-F6EF-458F-8F66-C9D689061645}" type="parTrans" cxnId="{416349E4-5F8F-490C-9BB6-CA361BFCCAD7}">
-      <dgm:prSet/>
-      <dgm:spPr/>
-      <dgm:t>
-        <a:bodyPr/>
-        <a:lstStyle/>
-        <a:p>
-          <a:endParaRPr lang="de-DE"/>
-        </a:p>
-      </dgm:t>
-    </dgm:pt>
-    <dgm:pt modelId="{32A624AD-1E43-42D9-95D0-DD79079621CD}" type="sibTrans" cxnId="{416349E4-5F8F-490C-9BB6-CA361BFCCAD7}">
-      <dgm:prSet/>
-      <dgm:spPr/>
-      <dgm:t>
-        <a:bodyPr/>
-        <a:lstStyle/>
-        <a:p>
-          <a:endParaRPr lang="de-DE"/>
-        </a:p>
-      </dgm:t>
-    </dgm:pt>
-    <dgm:pt modelId="{5B80A5CB-851F-4675-AEB8-BE555F65E512}">
-      <dgm:prSet phldrT="[Text]" custT="1"/>
-      <dgm:spPr/>
-      <dgm:t>
-        <a:bodyPr/>
-        <a:lstStyle/>
-        <a:p>
-          <a:r>
-            <a:rPr lang="de-DE" sz="1600" dirty="0">
-              <a:latin typeface="Calibri" panose="020F0502020204030204" pitchFamily="34" charset="0"/>
-              <a:cs typeface="Calibri" panose="020F0502020204030204" pitchFamily="34" charset="0"/>
-            </a:rPr>
-            <a:t>Überprüfung</a:t>
-          </a:r>
-        </a:p>
-      </dgm:t>
-    </dgm:pt>
-    <dgm:pt modelId="{5AA421B1-9795-43CC-9387-C240F099FC8E}" type="parTrans" cxnId="{057E0761-715E-48D3-8217-B8D1511D33D8}">
-      <dgm:prSet/>
-      <dgm:spPr/>
-      <dgm:t>
-        <a:bodyPr/>
-        <a:lstStyle/>
-        <a:p>
-          <a:endParaRPr lang="de-DE"/>
-        </a:p>
-      </dgm:t>
-    </dgm:pt>
-    <dgm:pt modelId="{E699881D-1636-4563-8E33-B4990A1930F2}" type="sibTrans" cxnId="{057E0761-715E-48D3-8217-B8D1511D33D8}">
-      <dgm:prSet/>
-      <dgm:spPr/>
-      <dgm:t>
-        <a:bodyPr/>
-        <a:lstStyle/>
-        <a:p>
-          <a:endParaRPr lang="de-DE"/>
-        </a:p>
-      </dgm:t>
-    </dgm:pt>
-    <dgm:pt modelId="{7AE4B5B6-0A53-49BE-8D4C-79F781E4BFEC}">
-      <dgm:prSet phldrT="[Text]" custT="1"/>
-      <dgm:spPr/>
-      <dgm:t>
-        <a:bodyPr/>
-        <a:lstStyle/>
-        <a:p>
-          <a:r>
-            <a:rPr lang="de-DE" sz="1600" dirty="0">
-              <a:latin typeface="Calibri" panose="020F0502020204030204" pitchFamily="34" charset="0"/>
-              <a:cs typeface="Calibri" panose="020F0502020204030204" pitchFamily="34" charset="0"/>
-            </a:rPr>
-            <a:t>Boolean an Server</a:t>
-          </a:r>
-        </a:p>
-      </dgm:t>
-    </dgm:pt>
-    <dgm:pt modelId="{BB871826-50A1-40A4-AB3C-F39FA960FA58}" type="parTrans" cxnId="{DA2A0FB2-9486-44A9-89D0-7CEBBDC579F4}">
-      <dgm:prSet/>
-      <dgm:spPr/>
-      <dgm:t>
-        <a:bodyPr/>
-        <a:lstStyle/>
-        <a:p>
-          <a:endParaRPr lang="de-DE"/>
-        </a:p>
-      </dgm:t>
-    </dgm:pt>
-    <dgm:pt modelId="{744A5731-480E-4DB9-8B40-C881A48B1FE2}" type="sibTrans" cxnId="{DA2A0FB2-9486-44A9-89D0-7CEBBDC579F4}">
-      <dgm:prSet/>
-      <dgm:spPr/>
-      <dgm:t>
-        <a:bodyPr/>
-        <a:lstStyle/>
-        <a:p>
-          <a:endParaRPr lang="de-DE"/>
-        </a:p>
-      </dgm:t>
-    </dgm:pt>
-    <dgm:pt modelId="{A34E47EA-15B0-4F4E-A03C-FE05E2D420FE}" type="pres">
-      <dgm:prSet presAssocID="{163C54FC-2004-452E-AACE-2AFA12C1A0DE}" presName="Name0" presStyleCnt="0">
-        <dgm:presLayoutVars>
-          <dgm:dir/>
-          <dgm:animLvl val="lvl"/>
-          <dgm:resizeHandles val="exact"/>
-        </dgm:presLayoutVars>
-      </dgm:prSet>
-      <dgm:spPr/>
-    </dgm:pt>
-    <dgm:pt modelId="{EE785B4E-5198-431C-BBF7-E2778FCEC3FD}" type="pres">
-      <dgm:prSet presAssocID="{81A83268-0277-4427-BBAD-1799636E4540}" presName="parTxOnly" presStyleLbl="node1" presStyleIdx="0" presStyleCnt="3" custScaleX="31478" custScaleY="11580" custLinFactX="-141" custLinFactNeighborX="-100000" custLinFactNeighborY="7413">
-        <dgm:presLayoutVars>
-          <dgm:chMax val="0"/>
-          <dgm:chPref val="0"/>
-          <dgm:bulletEnabled val="1"/>
-        </dgm:presLayoutVars>
-      </dgm:prSet>
-      <dgm:spPr/>
-    </dgm:pt>
-    <dgm:pt modelId="{4280EFFA-A061-4AC6-9B66-98E6FC92A2AA}" type="pres">
-      <dgm:prSet presAssocID="{32A624AD-1E43-42D9-95D0-DD79079621CD}" presName="parTxOnlySpace" presStyleCnt="0"/>
-      <dgm:spPr/>
-    </dgm:pt>
-    <dgm:pt modelId="{2031F8AD-0DB7-4133-B284-840DA44497C1}" type="pres">
-      <dgm:prSet presAssocID="{5B80A5CB-851F-4675-AEB8-BE555F65E512}" presName="parTxOnly" presStyleLbl="node1" presStyleIdx="1" presStyleCnt="3" custScaleX="31447" custScaleY="11571" custLinFactNeighborX="493" custLinFactNeighborY="7413">
-        <dgm:presLayoutVars>
-          <dgm:chMax val="0"/>
-          <dgm:chPref val="0"/>
-          <dgm:bulletEnabled val="1"/>
-        </dgm:presLayoutVars>
-      </dgm:prSet>
-      <dgm:spPr/>
-    </dgm:pt>
-    <dgm:pt modelId="{C4BDFEB1-6430-4430-ADBF-97DE088201B7}" type="pres">
-      <dgm:prSet presAssocID="{E699881D-1636-4563-8E33-B4990A1930F2}" presName="parTxOnlySpace" presStyleCnt="0"/>
-      <dgm:spPr/>
-    </dgm:pt>
-    <dgm:pt modelId="{640CD273-FB77-45DB-AF7C-637C367FA249}" type="pres">
-      <dgm:prSet presAssocID="{7AE4B5B6-0A53-49BE-8D4C-79F781E4BFEC}" presName="parTxOnly" presStyleLbl="node1" presStyleIdx="2" presStyleCnt="3" custScaleX="31478" custScaleY="11580" custLinFactX="138" custLinFactNeighborX="100000" custLinFactNeighborY="7422">
-        <dgm:presLayoutVars>
-          <dgm:chMax val="0"/>
-          <dgm:chPref val="0"/>
-          <dgm:bulletEnabled val="1"/>
-        </dgm:presLayoutVars>
-      </dgm:prSet>
-      <dgm:spPr/>
-    </dgm:pt>
-  </dgm:ptLst>
-  <dgm:cxnLst>
-    <dgm:cxn modelId="{C6242B03-373F-4E6D-955B-CF4B3A7812E5}" type="presOf" srcId="{7AE4B5B6-0A53-49BE-8D4C-79F781E4BFEC}" destId="{640CD273-FB77-45DB-AF7C-637C367FA249}" srcOrd="0" destOrd="0" presId="urn:microsoft.com/office/officeart/2005/8/layout/chevron1"/>
-    <dgm:cxn modelId="{A0F3C121-852A-41CB-A8A5-BD16311DD824}" type="presOf" srcId="{81A83268-0277-4427-BBAD-1799636E4540}" destId="{EE785B4E-5198-431C-BBF7-E2778FCEC3FD}" srcOrd="0" destOrd="0" presId="urn:microsoft.com/office/officeart/2005/8/layout/chevron1"/>
-    <dgm:cxn modelId="{057E0761-715E-48D3-8217-B8D1511D33D8}" srcId="{163C54FC-2004-452E-AACE-2AFA12C1A0DE}" destId="{5B80A5CB-851F-4675-AEB8-BE555F65E512}" srcOrd="1" destOrd="0" parTransId="{5AA421B1-9795-43CC-9387-C240F099FC8E}" sibTransId="{E699881D-1636-4563-8E33-B4990A1930F2}"/>
-    <dgm:cxn modelId="{E4BFE39C-E517-4D0A-948A-71DCF5EBBBA8}" type="presOf" srcId="{5B80A5CB-851F-4675-AEB8-BE555F65E512}" destId="{2031F8AD-0DB7-4133-B284-840DA44497C1}" srcOrd="0" destOrd="0" presId="urn:microsoft.com/office/officeart/2005/8/layout/chevron1"/>
-    <dgm:cxn modelId="{DA2A0FB2-9486-44A9-89D0-7CEBBDC579F4}" srcId="{163C54FC-2004-452E-AACE-2AFA12C1A0DE}" destId="{7AE4B5B6-0A53-49BE-8D4C-79F781E4BFEC}" srcOrd="2" destOrd="0" parTransId="{BB871826-50A1-40A4-AB3C-F39FA960FA58}" sibTransId="{744A5731-480E-4DB9-8B40-C881A48B1FE2}"/>
-    <dgm:cxn modelId="{416349E4-5F8F-490C-9BB6-CA361BFCCAD7}" srcId="{163C54FC-2004-452E-AACE-2AFA12C1A0DE}" destId="{81A83268-0277-4427-BBAD-1799636E4540}" srcOrd="0" destOrd="0" parTransId="{5066F55F-F6EF-458F-8F66-C9D689061645}" sibTransId="{32A624AD-1E43-42D9-95D0-DD79079621CD}"/>
-    <dgm:cxn modelId="{6A1913F6-290B-47C0-9CAF-F458AEF4088C}" type="presOf" srcId="{163C54FC-2004-452E-AACE-2AFA12C1A0DE}" destId="{A34E47EA-15B0-4F4E-A03C-FE05E2D420FE}" srcOrd="0" destOrd="0" presId="urn:microsoft.com/office/officeart/2005/8/layout/chevron1"/>
-    <dgm:cxn modelId="{3FB86B35-6C61-45E9-A15E-DA760ED5C5C5}" type="presParOf" srcId="{A34E47EA-15B0-4F4E-A03C-FE05E2D420FE}" destId="{EE785B4E-5198-431C-BBF7-E2778FCEC3FD}" srcOrd="0" destOrd="0" presId="urn:microsoft.com/office/officeart/2005/8/layout/chevron1"/>
-    <dgm:cxn modelId="{40EDC0F8-4A00-41D3-B6A1-17814765BBF6}" type="presParOf" srcId="{A34E47EA-15B0-4F4E-A03C-FE05E2D420FE}" destId="{4280EFFA-A061-4AC6-9B66-98E6FC92A2AA}" srcOrd="1" destOrd="0" presId="urn:microsoft.com/office/officeart/2005/8/layout/chevron1"/>
-    <dgm:cxn modelId="{617EDE1A-E4F5-49B6-BF8E-5C3D58B8019A}" type="presParOf" srcId="{A34E47EA-15B0-4F4E-A03C-FE05E2D420FE}" destId="{2031F8AD-0DB7-4133-B284-840DA44497C1}" srcOrd="2" destOrd="0" presId="urn:microsoft.com/office/officeart/2005/8/layout/chevron1"/>
-    <dgm:cxn modelId="{78B75156-C922-4D9F-87F0-1D1C9A727A64}" type="presParOf" srcId="{A34E47EA-15B0-4F4E-A03C-FE05E2D420FE}" destId="{C4BDFEB1-6430-4430-ADBF-97DE088201B7}" srcOrd="3" destOrd="0" presId="urn:microsoft.com/office/officeart/2005/8/layout/chevron1"/>
-    <dgm:cxn modelId="{0D0A302E-45C8-4024-9F6D-6DD802179365}" type="presParOf" srcId="{A34E47EA-15B0-4F4E-A03C-FE05E2D420FE}" destId="{640CD273-FB77-45DB-AF7C-637C367FA249}" srcOrd="4" destOrd="0" presId="urn:microsoft.com/office/officeart/2005/8/layout/chevron1"/>
-  </dgm:cxnLst>
-  <dgm:bg/>
-  <dgm:whole/>
-  <dgm:extLst>
-    <a:ext uri="http://schemas.microsoft.com/office/drawing/2008/diagram">
-      <dsp:dataModelExt xmlns:dsp="http://schemas.microsoft.com/office/drawing/2008/diagram" relId="rId6" minVer="http://schemas.openxmlformats.org/drawingml/2006/diagram"/>
-    </a:ext>
-  </dgm:extLst>
-</dgm:dataModel>
-</file>
-
-<file path=ppt/diagrams/data2.xml><?xml version="1.0" encoding="utf-8"?>
-<dgm:dataModel xmlns:dgm="http://schemas.openxmlformats.org/drawingml/2006/diagram" xmlns:a="http://schemas.openxmlformats.org/drawingml/2006/main">
-  <dgm:ptLst>
     <dgm:pt modelId="{25601DF5-F830-41F9-9ACA-2AA909590390}" type="doc">
       <dgm:prSet loTypeId="urn:microsoft.com/office/officeart/2005/8/layout/hList1" loCatId="list" qsTypeId="urn:microsoft.com/office/officeart/2005/8/quickstyle/simple1" qsCatId="simple" csTypeId="urn:microsoft.com/office/officeart/2005/8/colors/accent1_2" csCatId="accent1" phldr="1"/>
       <dgm:spPr/>
@@ -2900,6 +1956,13 @@
     <dgm:pt modelId="{56B06C7D-B461-464C-9D5D-42AF8623F138}" type="parTrans" cxnId="{69FEFB4C-C5A9-9540-9D62-7547F93F99E0}">
       <dgm:prSet/>
       <dgm:spPr/>
+      <dgm:t>
+        <a:bodyPr/>
+        <a:lstStyle/>
+        <a:p>
+          <a:endParaRPr lang="de-DE"/>
+        </a:p>
+      </dgm:t>
     </dgm:pt>
     <dgm:pt modelId="{D79EB759-8317-3D4C-985E-426224F6370F}" type="sibTrans" cxnId="{69FEFB4C-C5A9-9540-9D62-7547F93F99E0}">
       <dgm:prSet/>
@@ -2936,6 +1999,13 @@
     <dgm:pt modelId="{2AB35F09-0D41-9E49-86D9-27F8CE4852A6}" type="parTrans" cxnId="{68DE05FF-67DE-3A41-B567-BB3A5AA399B5}">
       <dgm:prSet/>
       <dgm:spPr/>
+      <dgm:t>
+        <a:bodyPr/>
+        <a:lstStyle/>
+        <a:p>
+          <a:endParaRPr lang="de-DE"/>
+        </a:p>
+      </dgm:t>
     </dgm:pt>
     <dgm:pt modelId="{D4D05AEB-94EC-3940-87A6-5BD42BFFA73B}" type="sibTrans" cxnId="{68DE05FF-67DE-3A41-B567-BB3A5AA399B5}">
       <dgm:prSet/>
@@ -2956,22 +2026,32 @@
         <a:lstStyle/>
         <a:p>
           <a:r>
-            <a:rPr lang="de-DE" sz="1600">
+            <a:rPr lang="de-DE" sz="1600" dirty="0" err="1">
               <a:latin typeface="Calibri" panose="020F0502020204030204" pitchFamily="34" charset="0"/>
               <a:cs typeface="Calibri" panose="020F0502020204030204" pitchFamily="34" charset="0"/>
             </a:rPr>
-            <a:t>Join(/Create Lobby</a:t>
+            <a:t>Join</a:t>
           </a:r>
-          <a:endParaRPr lang="de-DE" sz="1600" dirty="0">
-            <a:latin typeface="Calibri" panose="020F0502020204030204" pitchFamily="34" charset="0"/>
-            <a:cs typeface="Calibri" panose="020F0502020204030204" pitchFamily="34" charset="0"/>
-          </a:endParaRPr>
+          <a:r>
+            <a:rPr lang="de-DE" sz="1600" dirty="0">
+              <a:latin typeface="Calibri" panose="020F0502020204030204" pitchFamily="34" charset="0"/>
+              <a:cs typeface="Calibri" panose="020F0502020204030204" pitchFamily="34" charset="0"/>
+            </a:rPr>
+            <a:t>/Create Lobby</a:t>
+          </a:r>
         </a:p>
       </dgm:t>
     </dgm:pt>
     <dgm:pt modelId="{4419D846-E8E7-7B43-B2B1-9F9E04A74559}" type="parTrans" cxnId="{F36C37FD-3E81-B34A-9E19-B083D62B9EA9}">
       <dgm:prSet/>
       <dgm:spPr/>
+      <dgm:t>
+        <a:bodyPr/>
+        <a:lstStyle/>
+        <a:p>
+          <a:endParaRPr lang="de-DE"/>
+        </a:p>
+      </dgm:t>
     </dgm:pt>
     <dgm:pt modelId="{90478356-3620-F14B-9264-3791FBF6DF9A}" type="sibTrans" cxnId="{F36C37FD-3E81-B34A-9E19-B083D62B9EA9}">
       <dgm:prSet/>
@@ -3008,6 +2088,13 @@
     <dgm:pt modelId="{65AD42F1-3F49-2041-A7AB-5C7D3B47659B}" type="parTrans" cxnId="{5218AF9A-2EE1-1049-AE3B-C08FDC5EF299}">
       <dgm:prSet/>
       <dgm:spPr/>
+      <dgm:t>
+        <a:bodyPr/>
+        <a:lstStyle/>
+        <a:p>
+          <a:endParaRPr lang="de-DE"/>
+        </a:p>
+      </dgm:t>
     </dgm:pt>
     <dgm:pt modelId="{FC682740-B763-6449-9603-C04F68DA0B69}" type="sibTrans" cxnId="{5218AF9A-2EE1-1049-AE3B-C08FDC5EF299}">
       <dgm:prSet/>
@@ -3044,6 +2131,13 @@
     <dgm:pt modelId="{6DA0B8B0-5AB9-3648-8120-833784F0C866}" type="parTrans" cxnId="{0E30DC37-0D14-4947-AC94-12E3EBFC342A}">
       <dgm:prSet/>
       <dgm:spPr/>
+      <dgm:t>
+        <a:bodyPr/>
+        <a:lstStyle/>
+        <a:p>
+          <a:endParaRPr lang="de-DE"/>
+        </a:p>
+      </dgm:t>
     </dgm:pt>
     <dgm:pt modelId="{067E1DF3-16A8-B747-A7F4-F2CCE53F4D3A}" type="sibTrans" cxnId="{0E30DC37-0D14-4947-AC94-12E3EBFC342A}">
       <dgm:prSet/>
@@ -3080,6 +2174,13 @@
     <dgm:pt modelId="{BA27FE65-60A6-6948-8B1D-61467ECEA299}" type="parTrans" cxnId="{F5D7AC31-B8AB-6641-88D2-49E048941236}">
       <dgm:prSet/>
       <dgm:spPr/>
+      <dgm:t>
+        <a:bodyPr/>
+        <a:lstStyle/>
+        <a:p>
+          <a:endParaRPr lang="de-DE"/>
+        </a:p>
+      </dgm:t>
     </dgm:pt>
     <dgm:pt modelId="{1D996D01-C140-094E-A371-F90F73C1C8DC}" type="sibTrans" cxnId="{F5D7AC31-B8AB-6641-88D2-49E048941236}">
       <dgm:prSet/>
@@ -3116,6 +2217,13 @@
     <dgm:pt modelId="{CA21CFB8-669E-1A4D-AA63-EB7410ACDC0E}" type="parTrans" cxnId="{62DC9CC8-0A0B-B240-9FE3-8AAB7FD6B3CE}">
       <dgm:prSet/>
       <dgm:spPr/>
+      <dgm:t>
+        <a:bodyPr/>
+        <a:lstStyle/>
+        <a:p>
+          <a:endParaRPr lang="de-DE"/>
+        </a:p>
+      </dgm:t>
     </dgm:pt>
     <dgm:pt modelId="{4B78DA50-0369-ED49-9CF5-6AF04AC00E2F}" type="sibTrans" cxnId="{62DC9CC8-0A0B-B240-9FE3-8AAB7FD6B3CE}">
       <dgm:prSet/>
@@ -3152,6 +2260,13 @@
     <dgm:pt modelId="{1B05B335-EFFB-F24B-A304-80D01EB0230F}" type="parTrans" cxnId="{F905F20A-72C1-7C47-83B6-B86CEC6DF9E6}">
       <dgm:prSet/>
       <dgm:spPr/>
+      <dgm:t>
+        <a:bodyPr/>
+        <a:lstStyle/>
+        <a:p>
+          <a:endParaRPr lang="de-DE"/>
+        </a:p>
+      </dgm:t>
     </dgm:pt>
     <dgm:pt modelId="{C34AF51D-BAEA-994F-8246-D36DF92FBA3F}" type="sibTrans" cxnId="{F905F20A-72C1-7C47-83B6-B86CEC6DF9E6}">
       <dgm:prSet/>
@@ -3188,6 +2303,13 @@
     <dgm:pt modelId="{D6C118C8-48EC-534C-83DA-41A0DEA7F365}" type="parTrans" cxnId="{8832CAF9-ADC7-B342-968D-95ECCF12E755}">
       <dgm:prSet/>
       <dgm:spPr/>
+      <dgm:t>
+        <a:bodyPr/>
+        <a:lstStyle/>
+        <a:p>
+          <a:endParaRPr lang="de-DE"/>
+        </a:p>
+      </dgm:t>
     </dgm:pt>
     <dgm:pt modelId="{63B1301C-8C16-514E-8A02-26540747D372}" type="sibTrans" cxnId="{8832CAF9-ADC7-B342-968D-95ECCF12E755}">
       <dgm:prSet/>
@@ -3341,7 +2463,7 @@
 </dgm:dataModel>
 </file>
 
-<file path=ppt/diagrams/data3.xml><?xml version="1.0" encoding="utf-8"?>
+<file path=ppt/diagrams/data2.xml><?xml version="1.0" encoding="utf-8"?>
 <dgm:dataModel xmlns:dgm="http://schemas.openxmlformats.org/drawingml/2006/diagram" xmlns:a="http://schemas.openxmlformats.org/drawingml/2006/main">
   <dgm:ptLst>
     <dgm:pt modelId="{9751AA1E-9926-4921-95AB-98F55E6D516A}" type="doc">
@@ -3847,258 +2969,6 @@
 </file>
 
 <file path=ppt/diagrams/drawing1.xml><?xml version="1.0" encoding="utf-8"?>
-<dsp:drawing xmlns:dgm="http://schemas.openxmlformats.org/drawingml/2006/diagram" xmlns:dsp="http://schemas.microsoft.com/office/drawing/2008/diagram" xmlns:a="http://schemas.openxmlformats.org/drawingml/2006/main">
-  <dsp:spTree>
-    <dsp:nvGrpSpPr>
-      <dsp:cNvPr id="0" name=""/>
-      <dsp:cNvGrpSpPr/>
-    </dsp:nvGrpSpPr>
-    <dsp:grpSpPr/>
-    <dsp:sp modelId="{EE785B4E-5198-431C-BBF7-E2778FCEC3FD}">
-      <dsp:nvSpPr>
-        <dsp:cNvPr id="0" name=""/>
-        <dsp:cNvSpPr/>
-      </dsp:nvSpPr>
-      <dsp:spPr>
-        <a:xfrm>
-          <a:off x="241672" y="683387"/>
-          <a:ext cx="2862599" cy="421232"/>
-        </a:xfrm>
-        <a:prstGeom prst="chevron">
-          <a:avLst/>
-        </a:prstGeom>
-        <a:solidFill>
-          <a:schemeClr val="accent1">
-            <a:hueOff val="0"/>
-            <a:satOff val="0"/>
-            <a:lumOff val="0"/>
-            <a:alphaOff val="0"/>
-          </a:schemeClr>
-        </a:solidFill>
-        <a:ln w="15875" cap="flat" cmpd="sng" algn="ctr">
-          <a:solidFill>
-            <a:schemeClr val="lt1">
-              <a:hueOff val="0"/>
-              <a:satOff val="0"/>
-              <a:lumOff val="0"/>
-              <a:alphaOff val="0"/>
-            </a:schemeClr>
-          </a:solidFill>
-          <a:prstDash val="solid"/>
-        </a:ln>
-        <a:effectLst/>
-      </dsp:spPr>
-      <dsp:style>
-        <a:lnRef idx="2">
-          <a:scrgbClr r="0" g="0" b="0"/>
-        </a:lnRef>
-        <a:fillRef idx="1">
-          <a:scrgbClr r="0" g="0" b="0"/>
-        </a:fillRef>
-        <a:effectRef idx="0">
-          <a:scrgbClr r="0" g="0" b="0"/>
-        </a:effectRef>
-        <a:fontRef idx="minor">
-          <a:schemeClr val="lt1"/>
-        </a:fontRef>
-      </dsp:style>
-      <dsp:txBody>
-        <a:bodyPr spcFirstLastPara="0" vert="horz" wrap="square" lIns="64008" tIns="21336" rIns="21336" bIns="21336" numCol="1" spcCol="1270" anchor="ctr" anchorCtr="0">
-          <a:noAutofit/>
-        </a:bodyPr>
-        <a:lstStyle/>
-        <a:p>
-          <a:pPr marL="0" lvl="0" indent="0" algn="ctr" defTabSz="711200">
-            <a:lnSpc>
-              <a:spcPct val="90000"/>
-            </a:lnSpc>
-            <a:spcBef>
-              <a:spcPct val="0"/>
-            </a:spcBef>
-            <a:spcAft>
-              <a:spcPct val="35000"/>
-            </a:spcAft>
-            <a:buNone/>
-          </a:pPr>
-          <a:r>
-            <a:rPr lang="de-DE" sz="1600" kern="1200" dirty="0">
-              <a:latin typeface="Calibri" panose="020F0502020204030204" pitchFamily="34" charset="0"/>
-              <a:cs typeface="Calibri" panose="020F0502020204030204" pitchFamily="34" charset="0"/>
-            </a:rPr>
-            <a:t>Anfrage d. Clients </a:t>
-          </a:r>
-        </a:p>
-      </dsp:txBody>
-      <dsp:txXfrm>
-        <a:off x="452288" y="683387"/>
-        <a:ext cx="2441367" cy="421232"/>
-      </dsp:txXfrm>
-    </dsp:sp>
-    <dsp:sp modelId="{2031F8AD-0DB7-4133-B284-840DA44497C1}">
-      <dsp:nvSpPr>
-        <dsp:cNvPr id="0" name=""/>
-        <dsp:cNvSpPr/>
-      </dsp:nvSpPr>
-      <dsp:spPr>
-        <a:xfrm>
-          <a:off x="3121577" y="683550"/>
-          <a:ext cx="2859780" cy="420905"/>
-        </a:xfrm>
-        <a:prstGeom prst="chevron">
-          <a:avLst/>
-        </a:prstGeom>
-        <a:solidFill>
-          <a:schemeClr val="accent1">
-            <a:hueOff val="0"/>
-            <a:satOff val="0"/>
-            <a:lumOff val="0"/>
-            <a:alphaOff val="0"/>
-          </a:schemeClr>
-        </a:solidFill>
-        <a:ln w="15875" cap="flat" cmpd="sng" algn="ctr">
-          <a:solidFill>
-            <a:schemeClr val="lt1">
-              <a:hueOff val="0"/>
-              <a:satOff val="0"/>
-              <a:lumOff val="0"/>
-              <a:alphaOff val="0"/>
-            </a:schemeClr>
-          </a:solidFill>
-          <a:prstDash val="solid"/>
-        </a:ln>
-        <a:effectLst/>
-      </dsp:spPr>
-      <dsp:style>
-        <a:lnRef idx="2">
-          <a:scrgbClr r="0" g="0" b="0"/>
-        </a:lnRef>
-        <a:fillRef idx="1">
-          <a:scrgbClr r="0" g="0" b="0"/>
-        </a:fillRef>
-        <a:effectRef idx="0">
-          <a:scrgbClr r="0" g="0" b="0"/>
-        </a:effectRef>
-        <a:fontRef idx="minor">
-          <a:schemeClr val="lt1"/>
-        </a:fontRef>
-      </dsp:style>
-      <dsp:txBody>
-        <a:bodyPr spcFirstLastPara="0" vert="horz" wrap="square" lIns="64008" tIns="21336" rIns="21336" bIns="21336" numCol="1" spcCol="1270" anchor="ctr" anchorCtr="0">
-          <a:noAutofit/>
-        </a:bodyPr>
-        <a:lstStyle/>
-        <a:p>
-          <a:pPr marL="0" lvl="0" indent="0" algn="ctr" defTabSz="711200">
-            <a:lnSpc>
-              <a:spcPct val="90000"/>
-            </a:lnSpc>
-            <a:spcBef>
-              <a:spcPct val="0"/>
-            </a:spcBef>
-            <a:spcAft>
-              <a:spcPct val="35000"/>
-            </a:spcAft>
-            <a:buNone/>
-          </a:pPr>
-          <a:r>
-            <a:rPr lang="de-DE" sz="1600" kern="1200" dirty="0">
-              <a:latin typeface="Calibri" panose="020F0502020204030204" pitchFamily="34" charset="0"/>
-              <a:cs typeface="Calibri" panose="020F0502020204030204" pitchFamily="34" charset="0"/>
-            </a:rPr>
-            <a:t>Überprüfung</a:t>
-          </a:r>
-        </a:p>
-      </dsp:txBody>
-      <dsp:txXfrm>
-        <a:off x="3332030" y="683550"/>
-        <a:ext cx="2438875" cy="420905"/>
-      </dsp:txXfrm>
-    </dsp:sp>
-    <dsp:sp modelId="{640CD273-FB77-45DB-AF7C-637C367FA249}">
-      <dsp:nvSpPr>
-        <dsp:cNvPr id="0" name=""/>
-        <dsp:cNvSpPr/>
-      </dsp:nvSpPr>
-      <dsp:spPr>
-        <a:xfrm>
-          <a:off x="5989424" y="683714"/>
-          <a:ext cx="2862599" cy="421232"/>
-        </a:xfrm>
-        <a:prstGeom prst="chevron">
-          <a:avLst/>
-        </a:prstGeom>
-        <a:solidFill>
-          <a:schemeClr val="accent1">
-            <a:hueOff val="0"/>
-            <a:satOff val="0"/>
-            <a:lumOff val="0"/>
-            <a:alphaOff val="0"/>
-          </a:schemeClr>
-        </a:solidFill>
-        <a:ln w="15875" cap="flat" cmpd="sng" algn="ctr">
-          <a:solidFill>
-            <a:schemeClr val="lt1">
-              <a:hueOff val="0"/>
-              <a:satOff val="0"/>
-              <a:lumOff val="0"/>
-              <a:alphaOff val="0"/>
-            </a:schemeClr>
-          </a:solidFill>
-          <a:prstDash val="solid"/>
-        </a:ln>
-        <a:effectLst/>
-      </dsp:spPr>
-      <dsp:style>
-        <a:lnRef idx="2">
-          <a:scrgbClr r="0" g="0" b="0"/>
-        </a:lnRef>
-        <a:fillRef idx="1">
-          <a:scrgbClr r="0" g="0" b="0"/>
-        </a:fillRef>
-        <a:effectRef idx="0">
-          <a:scrgbClr r="0" g="0" b="0"/>
-        </a:effectRef>
-        <a:fontRef idx="minor">
-          <a:schemeClr val="lt1"/>
-        </a:fontRef>
-      </dsp:style>
-      <dsp:txBody>
-        <a:bodyPr spcFirstLastPara="0" vert="horz" wrap="square" lIns="64008" tIns="21336" rIns="21336" bIns="21336" numCol="1" spcCol="1270" anchor="ctr" anchorCtr="0">
-          <a:noAutofit/>
-        </a:bodyPr>
-        <a:lstStyle/>
-        <a:p>
-          <a:pPr marL="0" lvl="0" indent="0" algn="ctr" defTabSz="711200">
-            <a:lnSpc>
-              <a:spcPct val="90000"/>
-            </a:lnSpc>
-            <a:spcBef>
-              <a:spcPct val="0"/>
-            </a:spcBef>
-            <a:spcAft>
-              <a:spcPct val="35000"/>
-            </a:spcAft>
-            <a:buNone/>
-          </a:pPr>
-          <a:r>
-            <a:rPr lang="de-DE" sz="1600" kern="1200" dirty="0">
-              <a:latin typeface="Calibri" panose="020F0502020204030204" pitchFamily="34" charset="0"/>
-              <a:cs typeface="Calibri" panose="020F0502020204030204" pitchFamily="34" charset="0"/>
-            </a:rPr>
-            <a:t>Boolean an Server</a:t>
-          </a:r>
-        </a:p>
-      </dsp:txBody>
-      <dsp:txXfrm>
-        <a:off x="6200040" y="683714"/>
-        <a:ext cx="2441367" cy="421232"/>
-      </dsp:txXfrm>
-    </dsp:sp>
-  </dsp:spTree>
-</dsp:drawing>
-</file>
-
-<file path=ppt/diagrams/drawing2.xml><?xml version="1.0" encoding="utf-8"?>
 <dsp:drawing xmlns:dgm="http://schemas.openxmlformats.org/drawingml/2006/diagram" xmlns:dsp="http://schemas.microsoft.com/office/drawing/2008/diagram" xmlns:a="http://schemas.openxmlformats.org/drawingml/2006/main">
   <dsp:spTree>
     <dsp:nvGrpSpPr>
@@ -4774,16 +3644,19 @@
             <a:buChar char="•"/>
           </a:pPr>
           <a:r>
-            <a:rPr lang="de-DE" sz="1600" kern="1200">
+            <a:rPr lang="de-DE" sz="1600" kern="1200" dirty="0" err="1">
               <a:latin typeface="Calibri" panose="020F0502020204030204" pitchFamily="34" charset="0"/>
               <a:cs typeface="Calibri" panose="020F0502020204030204" pitchFamily="34" charset="0"/>
             </a:rPr>
-            <a:t>Join(/Create Lobby</a:t>
+            <a:t>Join</a:t>
           </a:r>
-          <a:endParaRPr lang="de-DE" sz="1600" kern="1200" dirty="0">
-            <a:latin typeface="Calibri" panose="020F0502020204030204" pitchFamily="34" charset="0"/>
-            <a:cs typeface="Calibri" panose="020F0502020204030204" pitchFamily="34" charset="0"/>
-          </a:endParaRPr>
+          <a:r>
+            <a:rPr lang="de-DE" sz="1600" kern="1200" dirty="0">
+              <a:latin typeface="Calibri" panose="020F0502020204030204" pitchFamily="34" charset="0"/>
+              <a:cs typeface="Calibri" panose="020F0502020204030204" pitchFamily="34" charset="0"/>
+            </a:rPr>
+            <a:t>/Create Lobby</a:t>
+          </a:r>
         </a:p>
         <a:p>
           <a:pPr marL="171450" lvl="1" indent="-171450" algn="l" defTabSz="711200">
@@ -4870,7 +3743,7 @@
 </dsp:drawing>
 </file>
 
-<file path=ppt/diagrams/drawing3.xml><?xml version="1.0" encoding="utf-8"?>
+<file path=ppt/diagrams/drawing2.xml><?xml version="1.0" encoding="utf-8"?>
 <dsp:drawing xmlns:dgm="http://schemas.openxmlformats.org/drawingml/2006/diagram" xmlns:dsp="http://schemas.microsoft.com/office/drawing/2008/diagram" xmlns:a="http://schemas.openxmlformats.org/drawingml/2006/main">
   <dsp:spTree>
     <dsp:nvGrpSpPr>
@@ -6091,289 +4964,6 @@
 </file>
 
 <file path=ppt/diagrams/layout1.xml><?xml version="1.0" encoding="utf-8"?>
-<dgm:layoutDef xmlns:dgm="http://schemas.openxmlformats.org/drawingml/2006/diagram" xmlns:a="http://schemas.openxmlformats.org/drawingml/2006/main" uniqueId="urn:microsoft.com/office/officeart/2005/8/layout/chevron1">
-  <dgm:title val=""/>
-  <dgm:desc val=""/>
-  <dgm:catLst>
-    <dgm:cat type="process" pri="9000"/>
-  </dgm:catLst>
-  <dgm:sampData useDef="1">
-    <dgm:dataModel>
-      <dgm:ptLst/>
-      <dgm:bg/>
-      <dgm:whole/>
-    </dgm:dataModel>
-  </dgm:sampData>
-  <dgm:styleData>
-    <dgm:dataModel>
-      <dgm:ptLst>
-        <dgm:pt modelId="0" type="doc"/>
-        <dgm:pt modelId="1"/>
-        <dgm:pt modelId="2"/>
-      </dgm:ptLst>
-      <dgm:cxnLst>
-        <dgm:cxn modelId="3" srcId="0" destId="1" srcOrd="0" destOrd="0"/>
-        <dgm:cxn modelId="4" srcId="0" destId="2" srcOrd="1" destOrd="0"/>
-      </dgm:cxnLst>
-      <dgm:bg/>
-      <dgm:whole/>
-    </dgm:dataModel>
-  </dgm:styleData>
-  <dgm:clrData>
-    <dgm:dataModel>
-      <dgm:ptLst>
-        <dgm:pt modelId="0" type="doc"/>
-        <dgm:pt modelId="1"/>
-        <dgm:pt modelId="2"/>
-        <dgm:pt modelId="3"/>
-        <dgm:pt modelId="4"/>
-      </dgm:ptLst>
-      <dgm:cxnLst>
-        <dgm:cxn modelId="5" srcId="0" destId="1" srcOrd="0" destOrd="0"/>
-        <dgm:cxn modelId="6" srcId="0" destId="2" srcOrd="1" destOrd="0"/>
-        <dgm:cxn modelId="7" srcId="0" destId="3" srcOrd="2" destOrd="0"/>
-        <dgm:cxn modelId="8" srcId="0" destId="4" srcOrd="3" destOrd="0"/>
-      </dgm:cxnLst>
-      <dgm:bg/>
-      <dgm:whole/>
-    </dgm:dataModel>
-  </dgm:clrData>
-  <dgm:layoutNode name="Name0">
-    <dgm:varLst>
-      <dgm:dir/>
-      <dgm:animLvl val="lvl"/>
-      <dgm:resizeHandles val="exact"/>
-    </dgm:varLst>
-    <dgm:choose name="Name1">
-      <dgm:if name="Name2" func="var" arg="dir" op="equ" val="norm">
-        <dgm:alg type="lin"/>
-      </dgm:if>
-      <dgm:else name="Name3">
-        <dgm:alg type="lin">
-          <dgm:param type="linDir" val="fromR"/>
-        </dgm:alg>
-      </dgm:else>
-    </dgm:choose>
-    <dgm:shape xmlns:r="http://schemas.openxmlformats.org/officeDocument/2006/relationships" r:blip="">
-      <dgm:adjLst/>
-    </dgm:shape>
-    <dgm:presOf/>
-    <dgm:choose name="Name4">
-      <dgm:if name="Name5" axis="des" func="maxDepth" op="gte" val="2">
-        <dgm:constrLst>
-          <dgm:constr type="h" for="ch" forName="composite" refType="h"/>
-          <dgm:constr type="w" for="ch" forName="composite" refType="w"/>
-          <dgm:constr type="w" for="des" forName="parTx"/>
-          <dgm:constr type="h" for="des" forName="parTx" op="equ"/>
-          <dgm:constr type="w" for="des" forName="desTx"/>
-          <dgm:constr type="h" for="des" forName="desTx" op="equ"/>
-          <dgm:constr type="primFontSz" for="des" forName="parTx" val="65"/>
-          <dgm:constr type="secFontSz" for="des" forName="desTx" refType="primFontSz" refFor="des" refForName="parTx" op="equ"/>
-          <dgm:constr type="h" for="des" forName="parTx" refType="primFontSz" refFor="des" refForName="parTx" fact="1.5"/>
-          <dgm:constr type="h" for="des" forName="desTx" refType="primFontSz" refFor="des" refForName="parTx" fact="0.5"/>
-          <dgm:constr type="w" for="ch" forName="space" op="equ" val="-6"/>
-        </dgm:constrLst>
-        <dgm:ruleLst>
-          <dgm:rule type="w" for="ch" forName="composite" val="0" fact="NaN" max="NaN"/>
-          <dgm:rule type="primFontSz" for="des" forName="parTx" val="5" fact="NaN" max="NaN"/>
-        </dgm:ruleLst>
-        <dgm:forEach name="Name6" axis="ch" ptType="node">
-          <dgm:layoutNode name="composite">
-            <dgm:alg type="composite"/>
-            <dgm:shape xmlns:r="http://schemas.openxmlformats.org/officeDocument/2006/relationships" r:blip="">
-              <dgm:adjLst/>
-            </dgm:shape>
-            <dgm:presOf/>
-            <dgm:choose name="Name7">
-              <dgm:if name="Name8" func="var" arg="dir" op="equ" val="norm">
-                <dgm:constrLst>
-                  <dgm:constr type="l" for="ch" forName="parTx"/>
-                  <dgm:constr type="w" for="ch" forName="parTx" refType="w"/>
-                  <dgm:constr type="t" for="ch" forName="parTx"/>
-                  <dgm:constr type="l" for="ch" forName="desTx"/>
-                  <dgm:constr type="w" for="ch" forName="desTx" refType="w" refFor="ch" refForName="parTx" fact="0.8"/>
-                  <dgm:constr type="t" for="ch" forName="desTx" refType="h" refFor="ch" refForName="parTx" fact="1.125"/>
-                </dgm:constrLst>
-              </dgm:if>
-              <dgm:else name="Name9">
-                <dgm:constrLst>
-                  <dgm:constr type="l" for="ch" forName="parTx"/>
-                  <dgm:constr type="w" for="ch" forName="parTx" refType="w"/>
-                  <dgm:constr type="t" for="ch" forName="parTx"/>
-                  <dgm:constr type="l" for="ch" forName="desTx" refType="w" fact="0.2"/>
-                  <dgm:constr type="w" for="ch" forName="desTx" refType="w" refFor="ch" refForName="parTx" fact="0.8"/>
-                  <dgm:constr type="t" for="ch" forName="desTx" refType="h" refFor="ch" refForName="parTx" fact="1.125"/>
-                </dgm:constrLst>
-              </dgm:else>
-            </dgm:choose>
-            <dgm:ruleLst>
-              <dgm:rule type="h" val="INF" fact="NaN" max="NaN"/>
-            </dgm:ruleLst>
-            <dgm:layoutNode name="parTx">
-              <dgm:varLst>
-                <dgm:chMax val="0"/>
-                <dgm:chPref val="0"/>
-                <dgm:bulletEnabled val="1"/>
-              </dgm:varLst>
-              <dgm:alg type="tx"/>
-              <dgm:choose name="Name10">
-                <dgm:if name="Name11" func="var" arg="dir" op="equ" val="norm">
-                  <dgm:shape xmlns:r="http://schemas.openxmlformats.org/officeDocument/2006/relationships" type="chevron" r:blip="">
-                    <dgm:adjLst/>
-                  </dgm:shape>
-                </dgm:if>
-                <dgm:else name="Name12">
-                  <dgm:shape xmlns:r="http://schemas.openxmlformats.org/officeDocument/2006/relationships" rot="180" type="chevron" r:blip="">
-                    <dgm:adjLst/>
-                  </dgm:shape>
-                </dgm:else>
-              </dgm:choose>
-              <dgm:presOf axis="self" ptType="node"/>
-              <dgm:choose name="Name13">
-                <dgm:if name="Name14" func="var" arg="dir" op="equ" val="norm">
-                  <dgm:constrLst>
-                    <dgm:constr type="h" refType="w" op="lte" fact="0.4"/>
-                    <dgm:constr type="h"/>
-                    <dgm:constr type="tMarg" refType="primFontSz" fact="0.105"/>
-                    <dgm:constr type="bMarg" refType="primFontSz" fact="0.105"/>
-                    <dgm:constr type="lMarg" refType="primFontSz" fact="0.315"/>
-                    <dgm:constr type="rMarg" refType="primFontSz" fact="0.105"/>
-                  </dgm:constrLst>
-                </dgm:if>
-                <dgm:else name="Name15">
-                  <dgm:constrLst>
-                    <dgm:constr type="h" refType="w" op="lte" fact="0.4"/>
-                    <dgm:constr type="h"/>
-                    <dgm:constr type="tMarg" refType="primFontSz" fact="0.105"/>
-                    <dgm:constr type="bMarg" refType="primFontSz" fact="0.105"/>
-                    <dgm:constr type="lMarg" refType="primFontSz" fact="0.105"/>
-                    <dgm:constr type="rMarg" refType="primFontSz" fact="0.315"/>
-                  </dgm:constrLst>
-                </dgm:else>
-              </dgm:choose>
-              <dgm:ruleLst>
-                <dgm:rule type="h" val="INF" fact="NaN" max="NaN"/>
-              </dgm:ruleLst>
-            </dgm:layoutNode>
-            <dgm:layoutNode name="desTx" styleLbl="revTx">
-              <dgm:varLst>
-                <dgm:bulletEnabled val="1"/>
-              </dgm:varLst>
-              <dgm:alg type="tx">
-                <dgm:param type="stBulletLvl" val="1"/>
-              </dgm:alg>
-              <dgm:choose name="Name16">
-                <dgm:if name="Name17" axis="ch" ptType="node" func="cnt" op="gte" val="1">
-                  <dgm:shape xmlns:r="http://schemas.openxmlformats.org/officeDocument/2006/relationships" type="rect" r:blip="">
-                    <dgm:adjLst/>
-                  </dgm:shape>
-                </dgm:if>
-                <dgm:else name="Name18">
-                  <dgm:shape xmlns:r="http://schemas.openxmlformats.org/officeDocument/2006/relationships" type="rect" r:blip="" hideGeom="1">
-                    <dgm:adjLst/>
-                  </dgm:shape>
-                </dgm:else>
-              </dgm:choose>
-              <dgm:presOf axis="des" ptType="node"/>
-              <dgm:constrLst>
-                <dgm:constr type="secFontSz" val="65"/>
-                <dgm:constr type="primFontSz" refType="secFontSz"/>
-                <dgm:constr type="h"/>
-                <dgm:constr type="tMarg"/>
-                <dgm:constr type="bMarg"/>
-                <dgm:constr type="rMarg"/>
-                <dgm:constr type="lMarg"/>
-              </dgm:constrLst>
-              <dgm:ruleLst>
-                <dgm:rule type="h" val="INF" fact="NaN" max="NaN"/>
-              </dgm:ruleLst>
-            </dgm:layoutNode>
-          </dgm:layoutNode>
-          <dgm:forEach name="Name19" axis="followSib" ptType="sibTrans" cnt="1">
-            <dgm:layoutNode name="space">
-              <dgm:alg type="sp"/>
-              <dgm:shape xmlns:r="http://schemas.openxmlformats.org/officeDocument/2006/relationships" r:blip="">
-                <dgm:adjLst/>
-              </dgm:shape>
-              <dgm:presOf/>
-              <dgm:constrLst/>
-              <dgm:ruleLst/>
-            </dgm:layoutNode>
-          </dgm:forEach>
-        </dgm:forEach>
-      </dgm:if>
-      <dgm:else name="Name20">
-        <dgm:constrLst>
-          <dgm:constr type="w" for="ch" forName="parTxOnly" refType="w"/>
-          <dgm:constr type="h" for="des" forName="parTxOnly" op="equ"/>
-          <dgm:constr type="primFontSz" for="des" forName="parTxOnly" op="equ" val="65"/>
-          <dgm:constr type="w" for="ch" forName="parTxOnlySpace" refType="w" refFor="ch" refForName="parTxOnly" fact="-0.1"/>
-        </dgm:constrLst>
-        <dgm:ruleLst/>
-        <dgm:forEach name="Name21" axis="ch" ptType="node">
-          <dgm:layoutNode name="parTxOnly">
-            <dgm:varLst>
-              <dgm:chMax val="0"/>
-              <dgm:chPref val="0"/>
-              <dgm:bulletEnabled val="1"/>
-            </dgm:varLst>
-            <dgm:alg type="tx"/>
-            <dgm:choose name="Name22">
-              <dgm:if name="Name23" func="var" arg="dir" op="equ" val="norm">
-                <dgm:shape xmlns:r="http://schemas.openxmlformats.org/officeDocument/2006/relationships" type="chevron" r:blip="">
-                  <dgm:adjLst/>
-                </dgm:shape>
-              </dgm:if>
-              <dgm:else name="Name24">
-                <dgm:shape xmlns:r="http://schemas.openxmlformats.org/officeDocument/2006/relationships" rot="180" type="chevron" r:blip="">
-                  <dgm:adjLst/>
-                </dgm:shape>
-              </dgm:else>
-            </dgm:choose>
-            <dgm:presOf axis="self" ptType="node"/>
-            <dgm:choose name="Name25">
-              <dgm:if name="Name26" func="var" arg="dir" op="equ" val="norm">
-                <dgm:constrLst>
-                  <dgm:constr type="h" refType="w" op="equ" fact="0.4"/>
-                  <dgm:constr type="tMarg" refType="primFontSz" fact="0.105"/>
-                  <dgm:constr type="bMarg" refType="primFontSz" fact="0.105"/>
-                  <dgm:constr type="lMarg" refType="primFontSz" fact="0.315"/>
-                  <dgm:constr type="rMarg" refType="primFontSz" fact="0.105"/>
-                </dgm:constrLst>
-              </dgm:if>
-              <dgm:else name="Name27">
-                <dgm:constrLst>
-                  <dgm:constr type="h" refType="w" op="equ" fact="0.4"/>
-                  <dgm:constr type="tMarg" refType="primFontSz" fact="0.105"/>
-                  <dgm:constr type="bMarg" refType="primFontSz" fact="0.105"/>
-                  <dgm:constr type="lMarg" refType="primFontSz" fact="0.105"/>
-                  <dgm:constr type="rMarg" refType="primFontSz" fact="0.315"/>
-                </dgm:constrLst>
-              </dgm:else>
-            </dgm:choose>
-            <dgm:ruleLst>
-              <dgm:rule type="primFontSz" val="5" fact="NaN" max="NaN"/>
-            </dgm:ruleLst>
-          </dgm:layoutNode>
-          <dgm:forEach name="Name28" axis="followSib" ptType="sibTrans" cnt="1">
-            <dgm:layoutNode name="parTxOnlySpace">
-              <dgm:alg type="sp"/>
-              <dgm:shape xmlns:r="http://schemas.openxmlformats.org/officeDocument/2006/relationships" r:blip="">
-                <dgm:adjLst/>
-              </dgm:shape>
-              <dgm:presOf/>
-              <dgm:constrLst/>
-              <dgm:ruleLst/>
-            </dgm:layoutNode>
-          </dgm:forEach>
-        </dgm:forEach>
-      </dgm:else>
-    </dgm:choose>
-  </dgm:layoutNode>
-</dgm:layoutDef>
-</file>
-
-<file path=ppt/diagrams/layout2.xml><?xml version="1.0" encoding="utf-8"?>
 <dgm:layoutDef xmlns:dgm="http://schemas.openxmlformats.org/drawingml/2006/diagram" xmlns:a="http://schemas.openxmlformats.org/drawingml/2006/main" uniqueId="urn:microsoft.com/office/officeart/2005/8/layout/hList1">
   <dgm:title val=""/>
   <dgm:desc val=""/>
@@ -6590,7 +5180,7 @@
 </dgm:layoutDef>
 </file>
 
-<file path=ppt/diagrams/layout3.xml><?xml version="1.0" encoding="utf-8"?>
+<file path=ppt/diagrams/layout2.xml><?xml version="1.0" encoding="utf-8"?>
 <dgm:layoutDef xmlns:dgm="http://schemas.openxmlformats.org/drawingml/2006/diagram" xmlns:a="http://schemas.openxmlformats.org/drawingml/2006/main" uniqueId="urn:microsoft.com/office/officeart/2016/7/layout/RepeatingBendingProcessNew">
   <dgm:title val="Repeating Bending Process New"/>
   <dgm:desc val=""/>
@@ -7817,1040 +6407,6 @@
 </file>
 
 <file path=ppt/diagrams/quickStyle2.xml><?xml version="1.0" encoding="utf-8"?>
-<dgm:styleDef xmlns:dgm="http://schemas.openxmlformats.org/drawingml/2006/diagram" xmlns:a="http://schemas.openxmlformats.org/drawingml/2006/main" uniqueId="urn:microsoft.com/office/officeart/2005/8/quickstyle/simple1">
-  <dgm:title val=""/>
-  <dgm:desc val=""/>
-  <dgm:catLst>
-    <dgm:cat type="simple" pri="10100"/>
-  </dgm:catLst>
-  <dgm:scene3d>
-    <a:camera prst="orthographicFront"/>
-    <a:lightRig rig="threePt" dir="t"/>
-  </dgm:scene3d>
-  <dgm:styleLbl name="node0">
-    <dgm:scene3d>
-      <a:camera prst="orthographicFront"/>
-      <a:lightRig rig="threePt" dir="t"/>
-    </dgm:scene3d>
-    <dgm:sp3d/>
-    <dgm:txPr/>
-    <dgm:style>
-      <a:lnRef idx="2">
-        <a:scrgbClr r="0" g="0" b="0"/>
-      </a:lnRef>
-      <a:fillRef idx="1">
-        <a:scrgbClr r="0" g="0" b="0"/>
-      </a:fillRef>
-      <a:effectRef idx="0">
-        <a:scrgbClr r="0" g="0" b="0"/>
-      </a:effectRef>
-      <a:fontRef idx="minor">
-        <a:schemeClr val="lt1"/>
-      </a:fontRef>
-    </dgm:style>
-  </dgm:styleLbl>
-  <dgm:styleLbl name="lnNode1">
-    <dgm:scene3d>
-      <a:camera prst="orthographicFront"/>
-      <a:lightRig rig="threePt" dir="t"/>
-    </dgm:scene3d>
-    <dgm:sp3d/>
-    <dgm:txPr/>
-    <dgm:style>
-      <a:lnRef idx="2">
-        <a:scrgbClr r="0" g="0" b="0"/>
-      </a:lnRef>
-      <a:fillRef idx="1">
-        <a:scrgbClr r="0" g="0" b="0"/>
-      </a:fillRef>
-      <a:effectRef idx="0">
-        <a:scrgbClr r="0" g="0" b="0"/>
-      </a:effectRef>
-      <a:fontRef idx="minor">
-        <a:schemeClr val="lt1"/>
-      </a:fontRef>
-    </dgm:style>
-  </dgm:styleLbl>
-  <dgm:styleLbl name="vennNode1">
-    <dgm:scene3d>
-      <a:camera prst="orthographicFront"/>
-      <a:lightRig rig="threePt" dir="t"/>
-    </dgm:scene3d>
-    <dgm:sp3d/>
-    <dgm:txPr/>
-    <dgm:style>
-      <a:lnRef idx="2">
-        <a:scrgbClr r="0" g="0" b="0"/>
-      </a:lnRef>
-      <a:fillRef idx="1">
-        <a:scrgbClr r="0" g="0" b="0"/>
-      </a:fillRef>
-      <a:effectRef idx="0">
-        <a:scrgbClr r="0" g="0" b="0"/>
-      </a:effectRef>
-      <a:fontRef idx="minor">
-        <a:schemeClr val="tx1"/>
-      </a:fontRef>
-    </dgm:style>
-  </dgm:styleLbl>
-  <dgm:styleLbl name="alignNode1">
-    <dgm:scene3d>
-      <a:camera prst="orthographicFront"/>
-      <a:lightRig rig="threePt" dir="t"/>
-    </dgm:scene3d>
-    <dgm:sp3d/>
-    <dgm:txPr/>
-    <dgm:style>
-      <a:lnRef idx="2">
-        <a:scrgbClr r="0" g="0" b="0"/>
-      </a:lnRef>
-      <a:fillRef idx="1">
-        <a:scrgbClr r="0" g="0" b="0"/>
-      </a:fillRef>
-      <a:effectRef idx="0">
-        <a:scrgbClr r="0" g="0" b="0"/>
-      </a:effectRef>
-      <a:fontRef idx="minor">
-        <a:schemeClr val="lt1"/>
-      </a:fontRef>
-    </dgm:style>
-  </dgm:styleLbl>
-  <dgm:styleLbl name="node1">
-    <dgm:scene3d>
-      <a:camera prst="orthographicFront"/>
-      <a:lightRig rig="threePt" dir="t"/>
-    </dgm:scene3d>
-    <dgm:sp3d/>
-    <dgm:txPr/>
-    <dgm:style>
-      <a:lnRef idx="2">
-        <a:scrgbClr r="0" g="0" b="0"/>
-      </a:lnRef>
-      <a:fillRef idx="1">
-        <a:scrgbClr r="0" g="0" b="0"/>
-      </a:fillRef>
-      <a:effectRef idx="0">
-        <a:scrgbClr r="0" g="0" b="0"/>
-      </a:effectRef>
-      <a:fontRef idx="minor">
-        <a:schemeClr val="lt1"/>
-      </a:fontRef>
-    </dgm:style>
-  </dgm:styleLbl>
-  <dgm:styleLbl name="node2">
-    <dgm:scene3d>
-      <a:camera prst="orthographicFront"/>
-      <a:lightRig rig="threePt" dir="t"/>
-    </dgm:scene3d>
-    <dgm:sp3d/>
-    <dgm:txPr/>
-    <dgm:style>
-      <a:lnRef idx="2">
-        <a:scrgbClr r="0" g="0" b="0"/>
-      </a:lnRef>
-      <a:fillRef idx="1">
-        <a:scrgbClr r="0" g="0" b="0"/>
-      </a:fillRef>
-      <a:effectRef idx="0">
-        <a:scrgbClr r="0" g="0" b="0"/>
-      </a:effectRef>
-      <a:fontRef idx="minor">
-        <a:schemeClr val="lt1"/>
-      </a:fontRef>
-    </dgm:style>
-  </dgm:styleLbl>
-  <dgm:styleLbl name="node3">
-    <dgm:scene3d>
-      <a:camera prst="orthographicFront"/>
-      <a:lightRig rig="threePt" dir="t"/>
-    </dgm:scene3d>
-    <dgm:sp3d/>
-    <dgm:txPr/>
-    <dgm:style>
-      <a:lnRef idx="2">
-        <a:scrgbClr r="0" g="0" b="0"/>
-      </a:lnRef>
-      <a:fillRef idx="1">
-        <a:scrgbClr r="0" g="0" b="0"/>
-      </a:fillRef>
-      <a:effectRef idx="0">
-        <a:scrgbClr r="0" g="0" b="0"/>
-      </a:effectRef>
-      <a:fontRef idx="minor">
-        <a:schemeClr val="lt1"/>
-      </a:fontRef>
-    </dgm:style>
-  </dgm:styleLbl>
-  <dgm:styleLbl name="node4">
-    <dgm:scene3d>
-      <a:camera prst="orthographicFront"/>
-      <a:lightRig rig="threePt" dir="t"/>
-    </dgm:scene3d>
-    <dgm:sp3d/>
-    <dgm:txPr/>
-    <dgm:style>
-      <a:lnRef idx="2">
-        <a:scrgbClr r="0" g="0" b="0"/>
-      </a:lnRef>
-      <a:fillRef idx="1">
-        <a:scrgbClr r="0" g="0" b="0"/>
-      </a:fillRef>
-      <a:effectRef idx="0">
-        <a:scrgbClr r="0" g="0" b="0"/>
-      </a:effectRef>
-      <a:fontRef idx="minor">
-        <a:schemeClr val="lt1"/>
-      </a:fontRef>
-    </dgm:style>
-  </dgm:styleLbl>
-  <dgm:styleLbl name="fgImgPlace1">
-    <dgm:scene3d>
-      <a:camera prst="orthographicFront"/>
-      <a:lightRig rig="threePt" dir="t"/>
-    </dgm:scene3d>
-    <dgm:sp3d/>
-    <dgm:txPr/>
-    <dgm:style>
-      <a:lnRef idx="2">
-        <a:scrgbClr r="0" g="0" b="0"/>
-      </a:lnRef>
-      <a:fillRef idx="1">
-        <a:scrgbClr r="0" g="0" b="0"/>
-      </a:fillRef>
-      <a:effectRef idx="0">
-        <a:scrgbClr r="0" g="0" b="0"/>
-      </a:effectRef>
-      <a:fontRef idx="minor"/>
-    </dgm:style>
-  </dgm:styleLbl>
-  <dgm:styleLbl name="alignImgPlace1">
-    <dgm:scene3d>
-      <a:camera prst="orthographicFront"/>
-      <a:lightRig rig="threePt" dir="t"/>
-    </dgm:scene3d>
-    <dgm:sp3d/>
-    <dgm:txPr/>
-    <dgm:style>
-      <a:lnRef idx="2">
-        <a:scrgbClr r="0" g="0" b="0"/>
-      </a:lnRef>
-      <a:fillRef idx="1">
-        <a:scrgbClr r="0" g="0" b="0"/>
-      </a:fillRef>
-      <a:effectRef idx="0">
-        <a:scrgbClr r="0" g="0" b="0"/>
-      </a:effectRef>
-      <a:fontRef idx="minor"/>
-    </dgm:style>
-  </dgm:styleLbl>
-  <dgm:styleLbl name="bgImgPlace1">
-    <dgm:scene3d>
-      <a:camera prst="orthographicFront"/>
-      <a:lightRig rig="threePt" dir="t"/>
-    </dgm:scene3d>
-    <dgm:sp3d/>
-    <dgm:txPr/>
-    <dgm:style>
-      <a:lnRef idx="2">
-        <a:scrgbClr r="0" g="0" b="0"/>
-      </a:lnRef>
-      <a:fillRef idx="1">
-        <a:scrgbClr r="0" g="0" b="0"/>
-      </a:fillRef>
-      <a:effectRef idx="0">
-        <a:scrgbClr r="0" g="0" b="0"/>
-      </a:effectRef>
-      <a:fontRef idx="minor"/>
-    </dgm:style>
-  </dgm:styleLbl>
-  <dgm:styleLbl name="sibTrans2D1">
-    <dgm:scene3d>
-      <a:camera prst="orthographicFront"/>
-      <a:lightRig rig="threePt" dir="t"/>
-    </dgm:scene3d>
-    <dgm:sp3d/>
-    <dgm:txPr/>
-    <dgm:style>
-      <a:lnRef idx="0">
-        <a:scrgbClr r="0" g="0" b="0"/>
-      </a:lnRef>
-      <a:fillRef idx="1">
-        <a:scrgbClr r="0" g="0" b="0"/>
-      </a:fillRef>
-      <a:effectRef idx="0">
-        <a:scrgbClr r="0" g="0" b="0"/>
-      </a:effectRef>
-      <a:fontRef idx="minor">
-        <a:schemeClr val="lt1"/>
-      </a:fontRef>
-    </dgm:style>
-  </dgm:styleLbl>
-  <dgm:styleLbl name="fgSibTrans2D1">
-    <dgm:scene3d>
-      <a:camera prst="orthographicFront"/>
-      <a:lightRig rig="threePt" dir="t"/>
-    </dgm:scene3d>
-    <dgm:sp3d/>
-    <dgm:txPr/>
-    <dgm:style>
-      <a:lnRef idx="0">
-        <a:scrgbClr r="0" g="0" b="0"/>
-      </a:lnRef>
-      <a:fillRef idx="1">
-        <a:scrgbClr r="0" g="0" b="0"/>
-      </a:fillRef>
-      <a:effectRef idx="0">
-        <a:scrgbClr r="0" g="0" b="0"/>
-      </a:effectRef>
-      <a:fontRef idx="minor">
-        <a:schemeClr val="lt1"/>
-      </a:fontRef>
-    </dgm:style>
-  </dgm:styleLbl>
-  <dgm:styleLbl name="bgSibTrans2D1">
-    <dgm:scene3d>
-      <a:camera prst="orthographicFront"/>
-      <a:lightRig rig="threePt" dir="t"/>
-    </dgm:scene3d>
-    <dgm:sp3d/>
-    <dgm:txPr/>
-    <dgm:style>
-      <a:lnRef idx="0">
-        <a:scrgbClr r="0" g="0" b="0"/>
-      </a:lnRef>
-      <a:fillRef idx="1">
-        <a:scrgbClr r="0" g="0" b="0"/>
-      </a:fillRef>
-      <a:effectRef idx="0">
-        <a:scrgbClr r="0" g="0" b="0"/>
-      </a:effectRef>
-      <a:fontRef idx="minor">
-        <a:schemeClr val="lt1"/>
-      </a:fontRef>
-    </dgm:style>
-  </dgm:styleLbl>
-  <dgm:styleLbl name="sibTrans1D1">
-    <dgm:scene3d>
-      <a:camera prst="orthographicFront"/>
-      <a:lightRig rig="threePt" dir="t"/>
-    </dgm:scene3d>
-    <dgm:sp3d/>
-    <dgm:txPr/>
-    <dgm:style>
-      <a:lnRef idx="1">
-        <a:scrgbClr r="0" g="0" b="0"/>
-      </a:lnRef>
-      <a:fillRef idx="0">
-        <a:scrgbClr r="0" g="0" b="0"/>
-      </a:fillRef>
-      <a:effectRef idx="0">
-        <a:scrgbClr r="0" g="0" b="0"/>
-      </a:effectRef>
-      <a:fontRef idx="minor"/>
-    </dgm:style>
-  </dgm:styleLbl>
-  <dgm:styleLbl name="callout">
-    <dgm:scene3d>
-      <a:camera prst="orthographicFront"/>
-      <a:lightRig rig="threePt" dir="t"/>
-    </dgm:scene3d>
-    <dgm:sp3d/>
-    <dgm:txPr/>
-    <dgm:style>
-      <a:lnRef idx="2">
-        <a:scrgbClr r="0" g="0" b="0"/>
-      </a:lnRef>
-      <a:fillRef idx="1">
-        <a:scrgbClr r="0" g="0" b="0"/>
-      </a:fillRef>
-      <a:effectRef idx="0">
-        <a:scrgbClr r="0" g="0" b="0"/>
-      </a:effectRef>
-      <a:fontRef idx="minor"/>
-    </dgm:style>
-  </dgm:styleLbl>
-  <dgm:styleLbl name="asst0">
-    <dgm:scene3d>
-      <a:camera prst="orthographicFront"/>
-      <a:lightRig rig="threePt" dir="t"/>
-    </dgm:scene3d>
-    <dgm:sp3d/>
-    <dgm:txPr/>
-    <dgm:style>
-      <a:lnRef idx="2">
-        <a:scrgbClr r="0" g="0" b="0"/>
-      </a:lnRef>
-      <a:fillRef idx="1">
-        <a:scrgbClr r="0" g="0" b="0"/>
-      </a:fillRef>
-      <a:effectRef idx="0">
-        <a:scrgbClr r="0" g="0" b="0"/>
-      </a:effectRef>
-      <a:fontRef idx="minor">
-        <a:schemeClr val="lt1"/>
-      </a:fontRef>
-    </dgm:style>
-  </dgm:styleLbl>
-  <dgm:styleLbl name="asst1">
-    <dgm:scene3d>
-      <a:camera prst="orthographicFront"/>
-      <a:lightRig rig="threePt" dir="t"/>
-    </dgm:scene3d>
-    <dgm:sp3d/>
-    <dgm:txPr/>
-    <dgm:style>
-      <a:lnRef idx="2">
-        <a:scrgbClr r="0" g="0" b="0"/>
-      </a:lnRef>
-      <a:fillRef idx="1">
-        <a:scrgbClr r="0" g="0" b="0"/>
-      </a:fillRef>
-      <a:effectRef idx="0">
-        <a:scrgbClr r="0" g="0" b="0"/>
-      </a:effectRef>
-      <a:fontRef idx="minor">
-        <a:schemeClr val="lt1"/>
-      </a:fontRef>
-    </dgm:style>
-  </dgm:styleLbl>
-  <dgm:styleLbl name="asst2">
-    <dgm:scene3d>
-      <a:camera prst="orthographicFront"/>
-      <a:lightRig rig="threePt" dir="t"/>
-    </dgm:scene3d>
-    <dgm:sp3d/>
-    <dgm:txPr/>
-    <dgm:style>
-      <a:lnRef idx="2">
-        <a:scrgbClr r="0" g="0" b="0"/>
-      </a:lnRef>
-      <a:fillRef idx="1">
-        <a:scrgbClr r="0" g="0" b="0"/>
-      </a:fillRef>
-      <a:effectRef idx="0">
-        <a:scrgbClr r="0" g="0" b="0"/>
-      </a:effectRef>
-      <a:fontRef idx="minor">
-        <a:schemeClr val="lt1"/>
-      </a:fontRef>
-    </dgm:style>
-  </dgm:styleLbl>
-  <dgm:styleLbl name="asst3">
-    <dgm:scene3d>
-      <a:camera prst="orthographicFront"/>
-      <a:lightRig rig="threePt" dir="t"/>
-    </dgm:scene3d>
-    <dgm:sp3d/>
-    <dgm:txPr/>
-    <dgm:style>
-      <a:lnRef idx="2">
-        <a:scrgbClr r="0" g="0" b="0"/>
-      </a:lnRef>
-      <a:fillRef idx="1">
-        <a:scrgbClr r="0" g="0" b="0"/>
-      </a:fillRef>
-      <a:effectRef idx="0">
-        <a:scrgbClr r="0" g="0" b="0"/>
-      </a:effectRef>
-      <a:fontRef idx="minor">
-        <a:schemeClr val="lt1"/>
-      </a:fontRef>
-    </dgm:style>
-  </dgm:styleLbl>
-  <dgm:styleLbl name="asst4">
-    <dgm:scene3d>
-      <a:camera prst="orthographicFront"/>
-      <a:lightRig rig="threePt" dir="t"/>
-    </dgm:scene3d>
-    <dgm:sp3d/>
-    <dgm:txPr/>
-    <dgm:style>
-      <a:lnRef idx="2">
-        <a:scrgbClr r="0" g="0" b="0"/>
-      </a:lnRef>
-      <a:fillRef idx="1">
-        <a:scrgbClr r="0" g="0" b="0"/>
-      </a:fillRef>
-      <a:effectRef idx="0">
-        <a:scrgbClr r="0" g="0" b="0"/>
-      </a:effectRef>
-      <a:fontRef idx="minor">
-        <a:schemeClr val="lt1"/>
-      </a:fontRef>
-    </dgm:style>
-  </dgm:styleLbl>
-  <dgm:styleLbl name="parChTrans2D1">
-    <dgm:scene3d>
-      <a:camera prst="orthographicFront"/>
-      <a:lightRig rig="threePt" dir="t"/>
-    </dgm:scene3d>
-    <dgm:sp3d/>
-    <dgm:txPr/>
-    <dgm:style>
-      <a:lnRef idx="2">
-        <a:scrgbClr r="0" g="0" b="0"/>
-      </a:lnRef>
-      <a:fillRef idx="1">
-        <a:scrgbClr r="0" g="0" b="0"/>
-      </a:fillRef>
-      <a:effectRef idx="0">
-        <a:scrgbClr r="0" g="0" b="0"/>
-      </a:effectRef>
-      <a:fontRef idx="minor">
-        <a:schemeClr val="lt1"/>
-      </a:fontRef>
-    </dgm:style>
-  </dgm:styleLbl>
-  <dgm:styleLbl name="parChTrans2D2">
-    <dgm:scene3d>
-      <a:camera prst="orthographicFront"/>
-      <a:lightRig rig="threePt" dir="t"/>
-    </dgm:scene3d>
-    <dgm:sp3d/>
-    <dgm:txPr/>
-    <dgm:style>
-      <a:lnRef idx="2">
-        <a:scrgbClr r="0" g="0" b="0"/>
-      </a:lnRef>
-      <a:fillRef idx="1">
-        <a:scrgbClr r="0" g="0" b="0"/>
-      </a:fillRef>
-      <a:effectRef idx="0">
-        <a:scrgbClr r="0" g="0" b="0"/>
-      </a:effectRef>
-      <a:fontRef idx="minor">
-        <a:schemeClr val="lt1"/>
-      </a:fontRef>
-    </dgm:style>
-  </dgm:styleLbl>
-  <dgm:styleLbl name="parChTrans2D3">
-    <dgm:scene3d>
-      <a:camera prst="orthographicFront"/>
-      <a:lightRig rig="threePt" dir="t"/>
-    </dgm:scene3d>
-    <dgm:sp3d/>
-    <dgm:txPr/>
-    <dgm:style>
-      <a:lnRef idx="2">
-        <a:scrgbClr r="0" g="0" b="0"/>
-      </a:lnRef>
-      <a:fillRef idx="1">
-        <a:scrgbClr r="0" g="0" b="0"/>
-      </a:fillRef>
-      <a:effectRef idx="0">
-        <a:scrgbClr r="0" g="0" b="0"/>
-      </a:effectRef>
-      <a:fontRef idx="minor">
-        <a:schemeClr val="lt1"/>
-      </a:fontRef>
-    </dgm:style>
-  </dgm:styleLbl>
-  <dgm:styleLbl name="parChTrans2D4">
-    <dgm:scene3d>
-      <a:camera prst="orthographicFront"/>
-      <a:lightRig rig="threePt" dir="t"/>
-    </dgm:scene3d>
-    <dgm:sp3d/>
-    <dgm:txPr/>
-    <dgm:style>
-      <a:lnRef idx="2">
-        <a:scrgbClr r="0" g="0" b="0"/>
-      </a:lnRef>
-      <a:fillRef idx="1">
-        <a:scrgbClr r="0" g="0" b="0"/>
-      </a:fillRef>
-      <a:effectRef idx="0">
-        <a:scrgbClr r="0" g="0" b="0"/>
-      </a:effectRef>
-      <a:fontRef idx="minor">
-        <a:schemeClr val="lt1"/>
-      </a:fontRef>
-    </dgm:style>
-  </dgm:styleLbl>
-  <dgm:styleLbl name="parChTrans1D1">
-    <dgm:scene3d>
-      <a:camera prst="orthographicFront"/>
-      <a:lightRig rig="threePt" dir="t"/>
-    </dgm:scene3d>
-    <dgm:sp3d/>
-    <dgm:txPr/>
-    <dgm:style>
-      <a:lnRef idx="2">
-        <a:scrgbClr r="0" g="0" b="0"/>
-      </a:lnRef>
-      <a:fillRef idx="0">
-        <a:scrgbClr r="0" g="0" b="0"/>
-      </a:fillRef>
-      <a:effectRef idx="0">
-        <a:scrgbClr r="0" g="0" b="0"/>
-      </a:effectRef>
-      <a:fontRef idx="minor"/>
-    </dgm:style>
-  </dgm:styleLbl>
-  <dgm:styleLbl name="parChTrans1D2">
-    <dgm:scene3d>
-      <a:camera prst="orthographicFront"/>
-      <a:lightRig rig="threePt" dir="t"/>
-    </dgm:scene3d>
-    <dgm:sp3d/>
-    <dgm:txPr/>
-    <dgm:style>
-      <a:lnRef idx="2">
-        <a:scrgbClr r="0" g="0" b="0"/>
-      </a:lnRef>
-      <a:fillRef idx="0">
-        <a:scrgbClr r="0" g="0" b="0"/>
-      </a:fillRef>
-      <a:effectRef idx="0">
-        <a:scrgbClr r="0" g="0" b="0"/>
-      </a:effectRef>
-      <a:fontRef idx="minor"/>
-    </dgm:style>
-  </dgm:styleLbl>
-  <dgm:styleLbl name="parChTrans1D3">
-    <dgm:scene3d>
-      <a:camera prst="orthographicFront"/>
-      <a:lightRig rig="threePt" dir="t"/>
-    </dgm:scene3d>
-    <dgm:sp3d/>
-    <dgm:txPr/>
-    <dgm:style>
-      <a:lnRef idx="2">
-        <a:scrgbClr r="0" g="0" b="0"/>
-      </a:lnRef>
-      <a:fillRef idx="0">
-        <a:scrgbClr r="0" g="0" b="0"/>
-      </a:fillRef>
-      <a:effectRef idx="0">
-        <a:scrgbClr r="0" g="0" b="0"/>
-      </a:effectRef>
-      <a:fontRef idx="minor"/>
-    </dgm:style>
-  </dgm:styleLbl>
-  <dgm:styleLbl name="parChTrans1D4">
-    <dgm:scene3d>
-      <a:camera prst="orthographicFront"/>
-      <a:lightRig rig="threePt" dir="t"/>
-    </dgm:scene3d>
-    <dgm:sp3d/>
-    <dgm:txPr/>
-    <dgm:style>
-      <a:lnRef idx="2">
-        <a:scrgbClr r="0" g="0" b="0"/>
-      </a:lnRef>
-      <a:fillRef idx="0">
-        <a:scrgbClr r="0" g="0" b="0"/>
-      </a:fillRef>
-      <a:effectRef idx="0">
-        <a:scrgbClr r="0" g="0" b="0"/>
-      </a:effectRef>
-      <a:fontRef idx="minor"/>
-    </dgm:style>
-  </dgm:styleLbl>
-  <dgm:styleLbl name="fgAcc1">
-    <dgm:scene3d>
-      <a:camera prst="orthographicFront"/>
-      <a:lightRig rig="threePt" dir="t"/>
-    </dgm:scene3d>
-    <dgm:sp3d/>
-    <dgm:txPr/>
-    <dgm:style>
-      <a:lnRef idx="2">
-        <a:scrgbClr r="0" g="0" b="0"/>
-      </a:lnRef>
-      <a:fillRef idx="1">
-        <a:scrgbClr r="0" g="0" b="0"/>
-      </a:fillRef>
-      <a:effectRef idx="0">
-        <a:scrgbClr r="0" g="0" b="0"/>
-      </a:effectRef>
-      <a:fontRef idx="minor"/>
-    </dgm:style>
-  </dgm:styleLbl>
-  <dgm:styleLbl name="conFgAcc1">
-    <dgm:scene3d>
-      <a:camera prst="orthographicFront"/>
-      <a:lightRig rig="threePt" dir="t"/>
-    </dgm:scene3d>
-    <dgm:sp3d/>
-    <dgm:txPr/>
-    <dgm:style>
-      <a:lnRef idx="2">
-        <a:scrgbClr r="0" g="0" b="0"/>
-      </a:lnRef>
-      <a:fillRef idx="1">
-        <a:scrgbClr r="0" g="0" b="0"/>
-      </a:fillRef>
-      <a:effectRef idx="0">
-        <a:scrgbClr r="0" g="0" b="0"/>
-      </a:effectRef>
-      <a:fontRef idx="minor"/>
-    </dgm:style>
-  </dgm:styleLbl>
-  <dgm:styleLbl name="alignAcc1">
-    <dgm:scene3d>
-      <a:camera prst="orthographicFront"/>
-      <a:lightRig rig="threePt" dir="t"/>
-    </dgm:scene3d>
-    <dgm:sp3d/>
-    <dgm:txPr/>
-    <dgm:style>
-      <a:lnRef idx="2">
-        <a:scrgbClr r="0" g="0" b="0"/>
-      </a:lnRef>
-      <a:fillRef idx="1">
-        <a:scrgbClr r="0" g="0" b="0"/>
-      </a:fillRef>
-      <a:effectRef idx="0">
-        <a:scrgbClr r="0" g="0" b="0"/>
-      </a:effectRef>
-      <a:fontRef idx="minor"/>
-    </dgm:style>
-  </dgm:styleLbl>
-  <dgm:styleLbl name="trAlignAcc1">
-    <dgm:scene3d>
-      <a:camera prst="orthographicFront"/>
-      <a:lightRig rig="threePt" dir="t"/>
-    </dgm:scene3d>
-    <dgm:sp3d/>
-    <dgm:txPr/>
-    <dgm:style>
-      <a:lnRef idx="1">
-        <a:scrgbClr r="0" g="0" b="0"/>
-      </a:lnRef>
-      <a:fillRef idx="1">
-        <a:scrgbClr r="0" g="0" b="0"/>
-      </a:fillRef>
-      <a:effectRef idx="0">
-        <a:scrgbClr r="0" g="0" b="0"/>
-      </a:effectRef>
-      <a:fontRef idx="minor"/>
-    </dgm:style>
-  </dgm:styleLbl>
-  <dgm:styleLbl name="bgAcc1">
-    <dgm:scene3d>
-      <a:camera prst="orthographicFront"/>
-      <a:lightRig rig="threePt" dir="t"/>
-    </dgm:scene3d>
-    <dgm:sp3d/>
-    <dgm:txPr/>
-    <dgm:style>
-      <a:lnRef idx="2">
-        <a:scrgbClr r="0" g="0" b="0"/>
-      </a:lnRef>
-      <a:fillRef idx="1">
-        <a:scrgbClr r="0" g="0" b="0"/>
-      </a:fillRef>
-      <a:effectRef idx="0">
-        <a:scrgbClr r="0" g="0" b="0"/>
-      </a:effectRef>
-      <a:fontRef idx="minor"/>
-    </dgm:style>
-  </dgm:styleLbl>
-  <dgm:styleLbl name="solidFgAcc1">
-    <dgm:scene3d>
-      <a:camera prst="orthographicFront"/>
-      <a:lightRig rig="threePt" dir="t"/>
-    </dgm:scene3d>
-    <dgm:sp3d/>
-    <dgm:txPr/>
-    <dgm:style>
-      <a:lnRef idx="2">
-        <a:scrgbClr r="0" g="0" b="0"/>
-      </a:lnRef>
-      <a:fillRef idx="1">
-        <a:scrgbClr r="0" g="0" b="0"/>
-      </a:fillRef>
-      <a:effectRef idx="0">
-        <a:scrgbClr r="0" g="0" b="0"/>
-      </a:effectRef>
-      <a:fontRef idx="minor"/>
-    </dgm:style>
-  </dgm:styleLbl>
-  <dgm:styleLbl name="solidAlignAcc1">
-    <dgm:scene3d>
-      <a:camera prst="orthographicFront"/>
-      <a:lightRig rig="threePt" dir="t"/>
-    </dgm:scene3d>
-    <dgm:sp3d/>
-    <dgm:txPr/>
-    <dgm:style>
-      <a:lnRef idx="2">
-        <a:scrgbClr r="0" g="0" b="0"/>
-      </a:lnRef>
-      <a:fillRef idx="1">
-        <a:scrgbClr r="0" g="0" b="0"/>
-      </a:fillRef>
-      <a:effectRef idx="0">
-        <a:scrgbClr r="0" g="0" b="0"/>
-      </a:effectRef>
-      <a:fontRef idx="minor"/>
-    </dgm:style>
-  </dgm:styleLbl>
-  <dgm:styleLbl name="solidBgAcc1">
-    <dgm:scene3d>
-      <a:camera prst="orthographicFront"/>
-      <a:lightRig rig="threePt" dir="t"/>
-    </dgm:scene3d>
-    <dgm:sp3d/>
-    <dgm:txPr/>
-    <dgm:style>
-      <a:lnRef idx="2">
-        <a:scrgbClr r="0" g="0" b="0"/>
-      </a:lnRef>
-      <a:fillRef idx="1">
-        <a:scrgbClr r="0" g="0" b="0"/>
-      </a:fillRef>
-      <a:effectRef idx="0">
-        <a:scrgbClr r="0" g="0" b="0"/>
-      </a:effectRef>
-      <a:fontRef idx="minor"/>
-    </dgm:style>
-  </dgm:styleLbl>
-  <dgm:styleLbl name="fgAccFollowNode1">
-    <dgm:scene3d>
-      <a:camera prst="orthographicFront"/>
-      <a:lightRig rig="threePt" dir="t"/>
-    </dgm:scene3d>
-    <dgm:sp3d/>
-    <dgm:txPr/>
-    <dgm:style>
-      <a:lnRef idx="2">
-        <a:scrgbClr r="0" g="0" b="0"/>
-      </a:lnRef>
-      <a:fillRef idx="1">
-        <a:scrgbClr r="0" g="0" b="0"/>
-      </a:fillRef>
-      <a:effectRef idx="0">
-        <a:scrgbClr r="0" g="0" b="0"/>
-      </a:effectRef>
-      <a:fontRef idx="minor"/>
-    </dgm:style>
-  </dgm:styleLbl>
-  <dgm:styleLbl name="alignAccFollowNode1">
-    <dgm:scene3d>
-      <a:camera prst="orthographicFront"/>
-      <a:lightRig rig="threePt" dir="t"/>
-    </dgm:scene3d>
-    <dgm:sp3d/>
-    <dgm:txPr/>
-    <dgm:style>
-      <a:lnRef idx="2">
-        <a:scrgbClr r="0" g="0" b="0"/>
-      </a:lnRef>
-      <a:fillRef idx="1">
-        <a:scrgbClr r="0" g="0" b="0"/>
-      </a:fillRef>
-      <a:effectRef idx="0">
-        <a:scrgbClr r="0" g="0" b="0"/>
-      </a:effectRef>
-      <a:fontRef idx="minor"/>
-    </dgm:style>
-  </dgm:styleLbl>
-  <dgm:styleLbl name="bgAccFollowNode1">
-    <dgm:scene3d>
-      <a:camera prst="orthographicFront"/>
-      <a:lightRig rig="threePt" dir="t"/>
-    </dgm:scene3d>
-    <dgm:sp3d/>
-    <dgm:txPr/>
-    <dgm:style>
-      <a:lnRef idx="2">
-        <a:scrgbClr r="0" g="0" b="0"/>
-      </a:lnRef>
-      <a:fillRef idx="1">
-        <a:scrgbClr r="0" g="0" b="0"/>
-      </a:fillRef>
-      <a:effectRef idx="0">
-        <a:scrgbClr r="0" g="0" b="0"/>
-      </a:effectRef>
-      <a:fontRef idx="minor"/>
-    </dgm:style>
-  </dgm:styleLbl>
-  <dgm:styleLbl name="fgAcc0">
-    <dgm:scene3d>
-      <a:camera prst="orthographicFront"/>
-      <a:lightRig rig="threePt" dir="t"/>
-    </dgm:scene3d>
-    <dgm:sp3d/>
-    <dgm:txPr/>
-    <dgm:style>
-      <a:lnRef idx="2">
-        <a:scrgbClr r="0" g="0" b="0"/>
-      </a:lnRef>
-      <a:fillRef idx="1">
-        <a:scrgbClr r="0" g="0" b="0"/>
-      </a:fillRef>
-      <a:effectRef idx="0">
-        <a:scrgbClr r="0" g="0" b="0"/>
-      </a:effectRef>
-      <a:fontRef idx="minor"/>
-    </dgm:style>
-  </dgm:styleLbl>
-  <dgm:styleLbl name="fgAcc2">
-    <dgm:scene3d>
-      <a:camera prst="orthographicFront"/>
-      <a:lightRig rig="threePt" dir="t"/>
-    </dgm:scene3d>
-    <dgm:sp3d/>
-    <dgm:txPr/>
-    <dgm:style>
-      <a:lnRef idx="2">
-        <a:scrgbClr r="0" g="0" b="0"/>
-      </a:lnRef>
-      <a:fillRef idx="1">
-        <a:scrgbClr r="0" g="0" b="0"/>
-      </a:fillRef>
-      <a:effectRef idx="0">
-        <a:scrgbClr r="0" g="0" b="0"/>
-      </a:effectRef>
-      <a:fontRef idx="minor"/>
-    </dgm:style>
-  </dgm:styleLbl>
-  <dgm:styleLbl name="fgAcc3">
-    <dgm:scene3d>
-      <a:camera prst="orthographicFront"/>
-      <a:lightRig rig="threePt" dir="t"/>
-    </dgm:scene3d>
-    <dgm:sp3d/>
-    <dgm:txPr/>
-    <dgm:style>
-      <a:lnRef idx="2">
-        <a:scrgbClr r="0" g="0" b="0"/>
-      </a:lnRef>
-      <a:fillRef idx="1">
-        <a:scrgbClr r="0" g="0" b="0"/>
-      </a:fillRef>
-      <a:effectRef idx="0">
-        <a:scrgbClr r="0" g="0" b="0"/>
-      </a:effectRef>
-      <a:fontRef idx="minor"/>
-    </dgm:style>
-  </dgm:styleLbl>
-  <dgm:styleLbl name="fgAcc4">
-    <dgm:scene3d>
-      <a:camera prst="orthographicFront"/>
-      <a:lightRig rig="threePt" dir="t"/>
-    </dgm:scene3d>
-    <dgm:sp3d/>
-    <dgm:txPr/>
-    <dgm:style>
-      <a:lnRef idx="2">
-        <a:scrgbClr r="0" g="0" b="0"/>
-      </a:lnRef>
-      <a:fillRef idx="1">
-        <a:scrgbClr r="0" g="0" b="0"/>
-      </a:fillRef>
-      <a:effectRef idx="0">
-        <a:scrgbClr r="0" g="0" b="0"/>
-      </a:effectRef>
-      <a:fontRef idx="minor"/>
-    </dgm:style>
-  </dgm:styleLbl>
-  <dgm:styleLbl name="bgShp">
-    <dgm:scene3d>
-      <a:camera prst="orthographicFront"/>
-      <a:lightRig rig="threePt" dir="t"/>
-    </dgm:scene3d>
-    <dgm:sp3d/>
-    <dgm:txPr/>
-    <dgm:style>
-      <a:lnRef idx="0">
-        <a:scrgbClr r="0" g="0" b="0"/>
-      </a:lnRef>
-      <a:fillRef idx="1">
-        <a:scrgbClr r="0" g="0" b="0"/>
-      </a:fillRef>
-      <a:effectRef idx="0">
-        <a:scrgbClr r="0" g="0" b="0"/>
-      </a:effectRef>
-      <a:fontRef idx="minor"/>
-    </dgm:style>
-  </dgm:styleLbl>
-  <dgm:styleLbl name="dkBgShp">
-    <dgm:scene3d>
-      <a:camera prst="orthographicFront"/>
-      <a:lightRig rig="threePt" dir="t"/>
-    </dgm:scene3d>
-    <dgm:sp3d/>
-    <dgm:txPr/>
-    <dgm:style>
-      <a:lnRef idx="0">
-        <a:scrgbClr r="0" g="0" b="0"/>
-      </a:lnRef>
-      <a:fillRef idx="1">
-        <a:scrgbClr r="0" g="0" b="0"/>
-      </a:fillRef>
-      <a:effectRef idx="0">
-        <a:scrgbClr r="0" g="0" b="0"/>
-      </a:effectRef>
-      <a:fontRef idx="minor"/>
-    </dgm:style>
-  </dgm:styleLbl>
-  <dgm:styleLbl name="trBgShp">
-    <dgm:scene3d>
-      <a:camera prst="orthographicFront"/>
-      <a:lightRig rig="threePt" dir="t"/>
-    </dgm:scene3d>
-    <dgm:sp3d/>
-    <dgm:txPr/>
-    <dgm:style>
-      <a:lnRef idx="0">
-        <a:scrgbClr r="0" g="0" b="0"/>
-      </a:lnRef>
-      <a:fillRef idx="1">
-        <a:scrgbClr r="0" g="0" b="0"/>
-      </a:fillRef>
-      <a:effectRef idx="0">
-        <a:scrgbClr r="0" g="0" b="0"/>
-      </a:effectRef>
-      <a:fontRef idx="minor"/>
-    </dgm:style>
-  </dgm:styleLbl>
-  <dgm:styleLbl name="fgShp">
-    <dgm:scene3d>
-      <a:camera prst="orthographicFront"/>
-      <a:lightRig rig="threePt" dir="t"/>
-    </dgm:scene3d>
-    <dgm:sp3d/>
-    <dgm:txPr/>
-    <dgm:style>
-      <a:lnRef idx="2">
-        <a:scrgbClr r="0" g="0" b="0"/>
-      </a:lnRef>
-      <a:fillRef idx="1">
-        <a:scrgbClr r="0" g="0" b="0"/>
-      </a:fillRef>
-      <a:effectRef idx="0">
-        <a:scrgbClr r="0" g="0" b="0"/>
-      </a:effectRef>
-      <a:fontRef idx="minor"/>
-    </dgm:style>
-  </dgm:styleLbl>
-  <dgm:styleLbl name="revTx">
-    <dgm:scene3d>
-      <a:camera prst="orthographicFront"/>
-      <a:lightRig rig="threePt" dir="t"/>
-    </dgm:scene3d>
-    <dgm:sp3d/>
-    <dgm:txPr/>
-    <dgm:style>
-      <a:lnRef idx="0">
-        <a:scrgbClr r="0" g="0" b="0"/>
-      </a:lnRef>
-      <a:fillRef idx="0">
-        <a:scrgbClr r="0" g="0" b="0"/>
-      </a:fillRef>
-      <a:effectRef idx="0">
-        <a:scrgbClr r="0" g="0" b="0"/>
-      </a:effectRef>
-      <a:fontRef idx="minor"/>
-    </dgm:style>
-  </dgm:styleLbl>
-</dgm:styleDef>
-</file>
-
-<file path=ppt/diagrams/quickStyle3.xml><?xml version="1.0" encoding="utf-8"?>
 <dgm:styleDef xmlns:dgm="http://schemas.openxmlformats.org/drawingml/2006/diagram" xmlns:a="http://schemas.openxmlformats.org/drawingml/2006/main" uniqueId="urn:microsoft.com/office/officeart/2005/8/quickstyle/simple5">
   <dgm:title val=""/>
   <dgm:desc val=""/>
@@ -9934,7 +7490,7 @@
           <a:noFill/>
           <a:extLst>
             <a:ext uri="{909E8E84-426E-40dd-AFC4-6F175D3DCCD1}">
-              <a14:hiddenFill xmlns:a14="http://schemas.microsoft.com/office/drawing/2010/main" xmlns="">
+              <a14:hiddenFill xmlns="" xmlns:a14="http://schemas.microsoft.com/office/drawing/2010/main">
                 <a:solidFill>
                   <a:srgbClr val="FFFFFF"/>
                 </a:solidFill>
@@ -9994,7 +7550,7 @@
             </a:ln>
             <a:extLst>
               <a:ext uri="{91240B29-F687-4f45-9708-019B960494DF}">
-                <a14:hiddenLine xmlns:a14="http://schemas.microsoft.com/office/drawing/2010/main" xmlns="" w="9525">
+                <a14:hiddenLine xmlns="" xmlns:a14="http://schemas.microsoft.com/office/drawing/2010/main" w="9525">
                   <a:solidFill>
                     <a:srgbClr val="000000"/>
                   </a:solidFill>
@@ -10084,7 +7640,7 @@
             </a:ln>
             <a:extLst>
               <a:ext uri="{91240B29-F687-4f45-9708-019B960494DF}">
-                <a14:hiddenLine xmlns:a14="http://schemas.microsoft.com/office/drawing/2010/main" xmlns="" w="9525">
+                <a14:hiddenLine xmlns="" xmlns:a14="http://schemas.microsoft.com/office/drawing/2010/main" w="9525">
                   <a:solidFill>
                     <a:srgbClr val="000000"/>
                   </a:solidFill>
@@ -10174,7 +7730,7 @@
             </a:ln>
             <a:extLst>
               <a:ext uri="{91240B29-F687-4f45-9708-019B960494DF}">
-                <a14:hiddenLine xmlns:a14="http://schemas.microsoft.com/office/drawing/2010/main" xmlns="" w="9525">
+                <a14:hiddenLine xmlns="" xmlns:a14="http://schemas.microsoft.com/office/drawing/2010/main" w="9525">
                   <a:solidFill>
                     <a:srgbClr val="000000"/>
                   </a:solidFill>
@@ -10208,7 +7764,7 @@
             </a:ln>
             <a:extLst>
               <a:ext uri="{91240B29-F687-4f45-9708-019B960494DF}">
-                <a14:hiddenLine xmlns:a14="http://schemas.microsoft.com/office/drawing/2010/main" xmlns="" w="9525">
+                <a14:hiddenLine xmlns="" xmlns:a14="http://schemas.microsoft.com/office/drawing/2010/main" w="9525">
                   <a:solidFill>
                     <a:srgbClr val="000000"/>
                   </a:solidFill>
@@ -10298,7 +7854,7 @@
             </a:ln>
             <a:extLst>
               <a:ext uri="{91240B29-F687-4f45-9708-019B960494DF}">
-                <a14:hiddenLine xmlns:a14="http://schemas.microsoft.com/office/drawing/2010/main" xmlns="" w="9525">
+                <a14:hiddenLine xmlns="" xmlns:a14="http://schemas.microsoft.com/office/drawing/2010/main" w="9525">
                   <a:solidFill>
                     <a:srgbClr val="000000"/>
                   </a:solidFill>
@@ -10360,7 +7916,7 @@
             </a:ln>
             <a:extLst>
               <a:ext uri="{91240B29-F687-4f45-9708-019B960494DF}">
-                <a14:hiddenLine xmlns:a14="http://schemas.microsoft.com/office/drawing/2010/main" xmlns="" w="9525">
+                <a14:hiddenLine xmlns="" xmlns:a14="http://schemas.microsoft.com/office/drawing/2010/main" w="9525">
                   <a:solidFill>
                     <a:srgbClr val="000000"/>
                   </a:solidFill>
@@ -10422,7 +7978,7 @@
             </a:ln>
             <a:extLst>
               <a:ext uri="{91240B29-F687-4f45-9708-019B960494DF}">
-                <a14:hiddenLine xmlns:a14="http://schemas.microsoft.com/office/drawing/2010/main" xmlns="" w="9525">
+                <a14:hiddenLine xmlns="" xmlns:a14="http://schemas.microsoft.com/office/drawing/2010/main" w="9525">
                   <a:solidFill>
                     <a:srgbClr val="000000"/>
                   </a:solidFill>
@@ -10512,7 +8068,7 @@
             </a:ln>
             <a:extLst>
               <a:ext uri="{91240B29-F687-4f45-9708-019B960494DF}">
-                <a14:hiddenLine xmlns:a14="http://schemas.microsoft.com/office/drawing/2010/main" xmlns="" w="9525">
+                <a14:hiddenLine xmlns="" xmlns:a14="http://schemas.microsoft.com/office/drawing/2010/main" w="9525">
                   <a:solidFill>
                     <a:srgbClr val="000000"/>
                   </a:solidFill>
@@ -10574,7 +8130,7 @@
             </a:ln>
             <a:extLst>
               <a:ext uri="{91240B29-F687-4f45-9708-019B960494DF}">
-                <a14:hiddenLine xmlns:a14="http://schemas.microsoft.com/office/drawing/2010/main" xmlns="" w="9525">
+                <a14:hiddenLine xmlns="" xmlns:a14="http://schemas.microsoft.com/office/drawing/2010/main" w="9525">
                   <a:solidFill>
                     <a:srgbClr val="000000"/>
                   </a:solidFill>
@@ -10636,7 +8192,7 @@
             </a:ln>
             <a:extLst>
               <a:ext uri="{91240B29-F687-4f45-9708-019B960494DF}">
-                <a14:hiddenLine xmlns:a14="http://schemas.microsoft.com/office/drawing/2010/main" xmlns="" w="9525">
+                <a14:hiddenLine xmlns="" xmlns:a14="http://schemas.microsoft.com/office/drawing/2010/main" w="9525">
                   <a:solidFill>
                     <a:srgbClr val="000000"/>
                   </a:solidFill>
@@ -10726,7 +8282,7 @@
             </a:ln>
             <a:extLst>
               <a:ext uri="{91240B29-F687-4f45-9708-019B960494DF}">
-                <a14:hiddenLine xmlns:a14="http://schemas.microsoft.com/office/drawing/2010/main" xmlns="" w="9525">
+                <a14:hiddenLine xmlns="" xmlns:a14="http://schemas.microsoft.com/office/drawing/2010/main" w="9525">
                   <a:solidFill>
                     <a:srgbClr val="000000"/>
                   </a:solidFill>
@@ -10816,7 +8372,7 @@
             </a:ln>
             <a:extLst>
               <a:ext uri="{91240B29-F687-4f45-9708-019B960494DF}">
-                <a14:hiddenLine xmlns:a14="http://schemas.microsoft.com/office/drawing/2010/main" xmlns="" w="9525">
+                <a14:hiddenLine xmlns="" xmlns:a14="http://schemas.microsoft.com/office/drawing/2010/main" w="9525">
                   <a:solidFill>
                     <a:srgbClr val="000000"/>
                   </a:solidFill>
@@ -10878,7 +8434,7 @@
             </a:ln>
             <a:extLst>
               <a:ext uri="{91240B29-F687-4f45-9708-019B960494DF}">
-                <a14:hiddenLine xmlns:a14="http://schemas.microsoft.com/office/drawing/2010/main" xmlns="" w="9525">
+                <a14:hiddenLine xmlns="" xmlns:a14="http://schemas.microsoft.com/office/drawing/2010/main" w="9525">
                   <a:solidFill>
                     <a:srgbClr val="000000"/>
                   </a:solidFill>
@@ -10988,7 +8544,7 @@
             </a:ln>
             <a:extLst>
               <a:ext uri="{91240B29-F687-4f45-9708-019B960494DF}">
-                <a14:hiddenLine xmlns:a14="http://schemas.microsoft.com/office/drawing/2010/main" xmlns="" w="9525">
+                <a14:hiddenLine xmlns="" xmlns:a14="http://schemas.microsoft.com/office/drawing/2010/main" w="9525">
                   <a:solidFill>
                     <a:srgbClr val="000000"/>
                   </a:solidFill>
@@ -11050,7 +8606,7 @@
             </a:ln>
             <a:extLst>
               <a:ext uri="{91240B29-F687-4f45-9708-019B960494DF}">
-                <a14:hiddenLine xmlns:a14="http://schemas.microsoft.com/office/drawing/2010/main" xmlns="" w="9525">
+                <a14:hiddenLine xmlns="" xmlns:a14="http://schemas.microsoft.com/office/drawing/2010/main" w="9525">
                   <a:solidFill>
                     <a:srgbClr val="000000"/>
                   </a:solidFill>
@@ -11140,7 +8696,7 @@
             </a:ln>
             <a:extLst>
               <a:ext uri="{91240B29-F687-4f45-9708-019B960494DF}">
-                <a14:hiddenLine xmlns:a14="http://schemas.microsoft.com/office/drawing/2010/main" xmlns="" w="9525">
+                <a14:hiddenLine xmlns="" xmlns:a14="http://schemas.microsoft.com/office/drawing/2010/main" w="9525">
                   <a:solidFill>
                     <a:srgbClr val="000000"/>
                   </a:solidFill>
@@ -11230,7 +8786,7 @@
             </a:ln>
             <a:extLst>
               <a:ext uri="{91240B29-F687-4f45-9708-019B960494DF}">
-                <a14:hiddenLine xmlns:a14="http://schemas.microsoft.com/office/drawing/2010/main" xmlns="" w="9525">
+                <a14:hiddenLine xmlns="" xmlns:a14="http://schemas.microsoft.com/office/drawing/2010/main" w="9525">
                   <a:solidFill>
                     <a:srgbClr val="000000"/>
                   </a:solidFill>
@@ -11292,7 +8848,7 @@
             </a:ln>
             <a:extLst>
               <a:ext uri="{91240B29-F687-4f45-9708-019B960494DF}">
-                <a14:hiddenLine xmlns:a14="http://schemas.microsoft.com/office/drawing/2010/main" xmlns="" w="9525">
+                <a14:hiddenLine xmlns="" xmlns:a14="http://schemas.microsoft.com/office/drawing/2010/main" w="9525">
                   <a:solidFill>
                     <a:srgbClr val="000000"/>
                   </a:solidFill>
@@ -11382,7 +8938,7 @@
             </a:ln>
             <a:extLst>
               <a:ext uri="{91240B29-F687-4f45-9708-019B960494DF}">
-                <a14:hiddenLine xmlns:a14="http://schemas.microsoft.com/office/drawing/2010/main" xmlns="" w="9525">
+                <a14:hiddenLine xmlns="" xmlns:a14="http://schemas.microsoft.com/office/drawing/2010/main" w="9525">
                   <a:solidFill>
                     <a:srgbClr val="000000"/>
                   </a:solidFill>
@@ -11472,7 +9028,7 @@
             </a:ln>
             <a:extLst>
               <a:ext uri="{91240B29-F687-4f45-9708-019B960494DF}">
-                <a14:hiddenLine xmlns:a14="http://schemas.microsoft.com/office/drawing/2010/main" xmlns="" w="9525">
+                <a14:hiddenLine xmlns="" xmlns:a14="http://schemas.microsoft.com/office/drawing/2010/main" w="9525">
                   <a:solidFill>
                     <a:srgbClr val="000000"/>
                   </a:solidFill>
@@ -11528,7 +9084,7 @@
             </a:ln>
             <a:extLst>
               <a:ext uri="{91240B29-F687-4f45-9708-019B960494DF}">
-                <a14:hiddenLine xmlns:a14="http://schemas.microsoft.com/office/drawing/2010/main" xmlns="" w="9525">
+                <a14:hiddenLine xmlns="" xmlns:a14="http://schemas.microsoft.com/office/drawing/2010/main" w="9525">
                   <a:solidFill>
                     <a:srgbClr val="000000"/>
                   </a:solidFill>
@@ -11618,7 +9174,7 @@
             </a:ln>
             <a:extLst>
               <a:ext uri="{91240B29-F687-4f45-9708-019B960494DF}">
-                <a14:hiddenLine xmlns:a14="http://schemas.microsoft.com/office/drawing/2010/main" xmlns="" w="9525">
+                <a14:hiddenLine xmlns="" xmlns:a14="http://schemas.microsoft.com/office/drawing/2010/main" w="9525">
                   <a:solidFill>
                     <a:srgbClr val="000000"/>
                   </a:solidFill>
@@ -11674,7 +9230,7 @@
             </a:ln>
             <a:extLst>
               <a:ext uri="{91240B29-F687-4f45-9708-019B960494DF}">
-                <a14:hiddenLine xmlns:a14="http://schemas.microsoft.com/office/drawing/2010/main" xmlns="" w="9525">
+                <a14:hiddenLine xmlns="" xmlns:a14="http://schemas.microsoft.com/office/drawing/2010/main" w="9525">
                   <a:solidFill>
                     <a:srgbClr val="000000"/>
                   </a:solidFill>
@@ -11764,7 +9320,7 @@
             </a:ln>
             <a:extLst>
               <a:ext uri="{91240B29-F687-4f45-9708-019B960494DF}">
-                <a14:hiddenLine xmlns:a14="http://schemas.microsoft.com/office/drawing/2010/main" xmlns="" w="9525">
+                <a14:hiddenLine xmlns="" xmlns:a14="http://schemas.microsoft.com/office/drawing/2010/main" w="9525">
                   <a:solidFill>
                     <a:srgbClr val="000000"/>
                   </a:solidFill>
@@ -11832,7 +9388,7 @@
             </a:ln>
             <a:extLst>
               <a:ext uri="{91240B29-F687-4f45-9708-019B960494DF}">
-                <a14:hiddenLine xmlns:a14="http://schemas.microsoft.com/office/drawing/2010/main" xmlns="" w="9525">
+                <a14:hiddenLine xmlns="" xmlns:a14="http://schemas.microsoft.com/office/drawing/2010/main" w="9525">
                   <a:solidFill>
                     <a:srgbClr val="000000"/>
                   </a:solidFill>
@@ -11922,7 +9478,7 @@
             </a:ln>
             <a:extLst>
               <a:ext uri="{91240B29-F687-4f45-9708-019B960494DF}">
-                <a14:hiddenLine xmlns:a14="http://schemas.microsoft.com/office/drawing/2010/main" xmlns="" w="9525">
+                <a14:hiddenLine xmlns="" xmlns:a14="http://schemas.microsoft.com/office/drawing/2010/main" w="9525">
                   <a:solidFill>
                     <a:srgbClr val="000000"/>
                   </a:solidFill>
@@ -11990,7 +9546,7 @@
             </a:ln>
             <a:extLst>
               <a:ext uri="{91240B29-F687-4f45-9708-019B960494DF}">
-                <a14:hiddenLine xmlns:a14="http://schemas.microsoft.com/office/drawing/2010/main" xmlns="" w="9525">
+                <a14:hiddenLine xmlns="" xmlns:a14="http://schemas.microsoft.com/office/drawing/2010/main" w="9525">
                   <a:solidFill>
                     <a:srgbClr val="000000"/>
                   </a:solidFill>
@@ -12080,7 +9636,7 @@
             </a:ln>
             <a:extLst>
               <a:ext uri="{91240B29-F687-4f45-9708-019B960494DF}">
-                <a14:hiddenLine xmlns:a14="http://schemas.microsoft.com/office/drawing/2010/main" xmlns="" w="9525">
+                <a14:hiddenLine xmlns="" xmlns:a14="http://schemas.microsoft.com/office/drawing/2010/main" w="9525">
                   <a:solidFill>
                     <a:srgbClr val="000000"/>
                   </a:solidFill>
@@ -12114,7 +9670,7 @@
             </a:ln>
             <a:extLst>
               <a:ext uri="{91240B29-F687-4f45-9708-019B960494DF}">
-                <a14:hiddenLine xmlns:a14="http://schemas.microsoft.com/office/drawing/2010/main" xmlns="" w="9525">
+                <a14:hiddenLine xmlns="" xmlns:a14="http://schemas.microsoft.com/office/drawing/2010/main" w="9525">
                   <a:solidFill>
                     <a:srgbClr val="000000"/>
                   </a:solidFill>
@@ -12204,7 +9760,7 @@
             </a:ln>
             <a:extLst>
               <a:ext uri="{91240B29-F687-4f45-9708-019B960494DF}">
-                <a14:hiddenLine xmlns:a14="http://schemas.microsoft.com/office/drawing/2010/main" xmlns="" w="9525">
+                <a14:hiddenLine xmlns="" xmlns:a14="http://schemas.microsoft.com/office/drawing/2010/main" w="9525">
                   <a:solidFill>
                     <a:srgbClr val="000000"/>
                   </a:solidFill>
@@ -12266,7 +9822,7 @@
             </a:ln>
             <a:extLst>
               <a:ext uri="{91240B29-F687-4f45-9708-019B960494DF}">
-                <a14:hiddenLine xmlns:a14="http://schemas.microsoft.com/office/drawing/2010/main" xmlns="" w="9525">
+                <a14:hiddenLine xmlns="" xmlns:a14="http://schemas.microsoft.com/office/drawing/2010/main" w="9525">
                   <a:solidFill>
                     <a:srgbClr val="000000"/>
                   </a:solidFill>
@@ -12328,7 +9884,7 @@
             </a:ln>
             <a:extLst>
               <a:ext uri="{91240B29-F687-4f45-9708-019B960494DF}">
-                <a14:hiddenLine xmlns:a14="http://schemas.microsoft.com/office/drawing/2010/main" xmlns="" w="9525">
+                <a14:hiddenLine xmlns="" xmlns:a14="http://schemas.microsoft.com/office/drawing/2010/main" w="9525">
                   <a:solidFill>
                     <a:srgbClr val="000000"/>
                   </a:solidFill>
@@ -12418,7 +9974,7 @@
             </a:ln>
             <a:extLst>
               <a:ext uri="{91240B29-F687-4f45-9708-019B960494DF}">
-                <a14:hiddenLine xmlns:a14="http://schemas.microsoft.com/office/drawing/2010/main" xmlns="" w="9525">
+                <a14:hiddenLine xmlns="" xmlns:a14="http://schemas.microsoft.com/office/drawing/2010/main" w="9525">
                   <a:solidFill>
                     <a:srgbClr val="000000"/>
                   </a:solidFill>
@@ -12486,7 +10042,7 @@
             </a:ln>
             <a:extLst>
               <a:ext uri="{91240B29-F687-4f45-9708-019B960494DF}">
-                <a14:hiddenLine xmlns:a14="http://schemas.microsoft.com/office/drawing/2010/main" xmlns="" w="9525">
+                <a14:hiddenLine xmlns="" xmlns:a14="http://schemas.microsoft.com/office/drawing/2010/main" w="9525">
                   <a:solidFill>
                     <a:srgbClr val="000000"/>
                   </a:solidFill>
@@ -12548,7 +10104,7 @@
             </a:ln>
             <a:extLst>
               <a:ext uri="{91240B29-F687-4f45-9708-019B960494DF}">
-                <a14:hiddenLine xmlns:a14="http://schemas.microsoft.com/office/drawing/2010/main" xmlns="" w="9525">
+                <a14:hiddenLine xmlns="" xmlns:a14="http://schemas.microsoft.com/office/drawing/2010/main" w="9525">
                   <a:solidFill>
                     <a:srgbClr val="000000"/>
                   </a:solidFill>
@@ -12638,7 +10194,7 @@
             </a:ln>
             <a:extLst>
               <a:ext uri="{91240B29-F687-4f45-9708-019B960494DF}">
-                <a14:hiddenLine xmlns:a14="http://schemas.microsoft.com/office/drawing/2010/main" xmlns="" w="9525">
+                <a14:hiddenLine xmlns="" xmlns:a14="http://schemas.microsoft.com/office/drawing/2010/main" w="9525">
                   <a:solidFill>
                     <a:srgbClr val="000000"/>
                   </a:solidFill>
@@ -12700,7 +10256,7 @@
             </a:ln>
             <a:extLst>
               <a:ext uri="{91240B29-F687-4f45-9708-019B960494DF}">
-                <a14:hiddenLine xmlns:a14="http://schemas.microsoft.com/office/drawing/2010/main" xmlns="" w="9525">
+                <a14:hiddenLine xmlns="" xmlns:a14="http://schemas.microsoft.com/office/drawing/2010/main" w="9525">
                   <a:solidFill>
                     <a:srgbClr val="000000"/>
                   </a:solidFill>
@@ -12790,7 +10346,7 @@
             </a:ln>
             <a:extLst>
               <a:ext uri="{91240B29-F687-4f45-9708-019B960494DF}">
-                <a14:hiddenLine xmlns:a14="http://schemas.microsoft.com/office/drawing/2010/main" xmlns="" w="9525">
+                <a14:hiddenLine xmlns="" xmlns:a14="http://schemas.microsoft.com/office/drawing/2010/main" w="9525">
                   <a:solidFill>
                     <a:srgbClr val="000000"/>
                   </a:solidFill>
@@ -12852,7 +10408,7 @@
             </a:ln>
             <a:extLst>
               <a:ext uri="{91240B29-F687-4f45-9708-019B960494DF}">
-                <a14:hiddenLine xmlns:a14="http://schemas.microsoft.com/office/drawing/2010/main" xmlns="" w="9525">
+                <a14:hiddenLine xmlns="" xmlns:a14="http://schemas.microsoft.com/office/drawing/2010/main" w="9525">
                   <a:solidFill>
                     <a:srgbClr val="000000"/>
                   </a:solidFill>
@@ -12942,7 +10498,7 @@
             </a:ln>
             <a:extLst>
               <a:ext uri="{91240B29-F687-4f45-9708-019B960494DF}">
-                <a14:hiddenLine xmlns:a14="http://schemas.microsoft.com/office/drawing/2010/main" xmlns="" w="9525">
+                <a14:hiddenLine xmlns="" xmlns:a14="http://schemas.microsoft.com/office/drawing/2010/main" w="9525">
                   <a:solidFill>
                     <a:srgbClr val="000000"/>
                   </a:solidFill>
@@ -12976,7 +10532,7 @@
             </a:ln>
             <a:extLst>
               <a:ext uri="{91240B29-F687-4f45-9708-019B960494DF}">
-                <a14:hiddenLine xmlns:a14="http://schemas.microsoft.com/office/drawing/2010/main" xmlns="" w="9525">
+                <a14:hiddenLine xmlns="" xmlns:a14="http://schemas.microsoft.com/office/drawing/2010/main" w="9525">
                   <a:solidFill>
                     <a:srgbClr val="000000"/>
                   </a:solidFill>
@@ -13041,7 +10597,7 @@
             </a:ln>
             <a:extLst>
               <a:ext uri="{91240B29-F687-4f45-9708-019B960494DF}">
-                <a14:hiddenLine xmlns:a14="http://schemas.microsoft.com/office/drawing/2010/main" xmlns="" w="9525">
+                <a14:hiddenLine xmlns="" xmlns:a14="http://schemas.microsoft.com/office/drawing/2010/main" w="9525">
                   <a:solidFill>
                     <a:srgbClr val="000000"/>
                   </a:solidFill>
@@ -13131,7 +10687,7 @@
             </a:ln>
             <a:extLst>
               <a:ext uri="{91240B29-F687-4f45-9708-019B960494DF}">
-                <a14:hiddenLine xmlns:a14="http://schemas.microsoft.com/office/drawing/2010/main" xmlns="" w="9525">
+                <a14:hiddenLine xmlns="" xmlns:a14="http://schemas.microsoft.com/office/drawing/2010/main" w="9525">
                   <a:solidFill>
                     <a:srgbClr val="000000"/>
                   </a:solidFill>
@@ -13193,7 +10749,7 @@
             </a:ln>
             <a:extLst>
               <a:ext uri="{91240B29-F687-4f45-9708-019B960494DF}">
-                <a14:hiddenLine xmlns:a14="http://schemas.microsoft.com/office/drawing/2010/main" xmlns="" w="9525">
+                <a14:hiddenLine xmlns="" xmlns:a14="http://schemas.microsoft.com/office/drawing/2010/main" w="9525">
                   <a:solidFill>
                     <a:srgbClr val="000000"/>
                   </a:solidFill>
@@ -13283,7 +10839,7 @@
             </a:ln>
             <a:extLst>
               <a:ext uri="{91240B29-F687-4f45-9708-019B960494DF}">
-                <a14:hiddenLine xmlns:a14="http://schemas.microsoft.com/office/drawing/2010/main" xmlns="" w="9525">
+                <a14:hiddenLine xmlns="" xmlns:a14="http://schemas.microsoft.com/office/drawing/2010/main" w="9525">
                   <a:solidFill>
                     <a:srgbClr val="000000"/>
                   </a:solidFill>
@@ -13373,7 +10929,7 @@
             </a:ln>
             <a:extLst>
               <a:ext uri="{91240B29-F687-4f45-9708-019B960494DF}">
-                <a14:hiddenLine xmlns:a14="http://schemas.microsoft.com/office/drawing/2010/main" xmlns="" w="9525">
+                <a14:hiddenLine xmlns="" xmlns:a14="http://schemas.microsoft.com/office/drawing/2010/main" w="9525">
                   <a:solidFill>
                     <a:srgbClr val="000000"/>
                   </a:solidFill>
@@ -13438,7 +10994,7 @@
             </a:ln>
             <a:extLst>
               <a:ext uri="{91240B29-F687-4f45-9708-019B960494DF}">
-                <a14:hiddenLine xmlns:a14="http://schemas.microsoft.com/office/drawing/2010/main" xmlns="" w="9525">
+                <a14:hiddenLine xmlns="" xmlns:a14="http://schemas.microsoft.com/office/drawing/2010/main" w="9525">
                   <a:solidFill>
                     <a:srgbClr val="000000"/>
                   </a:solidFill>
@@ -13500,7 +11056,7 @@
             </a:ln>
             <a:extLst>
               <a:ext uri="{91240B29-F687-4f45-9708-019B960494DF}">
-                <a14:hiddenLine xmlns:a14="http://schemas.microsoft.com/office/drawing/2010/main" xmlns="" w="9525">
+                <a14:hiddenLine xmlns="" xmlns:a14="http://schemas.microsoft.com/office/drawing/2010/main" w="9525">
                   <a:solidFill>
                     <a:srgbClr val="000000"/>
                   </a:solidFill>
@@ -13590,7 +11146,7 @@
             </a:ln>
             <a:extLst>
               <a:ext uri="{91240B29-F687-4f45-9708-019B960494DF}">
-                <a14:hiddenLine xmlns:a14="http://schemas.microsoft.com/office/drawing/2010/main" xmlns="" w="9525">
+                <a14:hiddenLine xmlns="" xmlns:a14="http://schemas.microsoft.com/office/drawing/2010/main" w="9525">
                   <a:solidFill>
                     <a:srgbClr val="000000"/>
                   </a:solidFill>
@@ -13680,7 +11236,7 @@
             </a:ln>
             <a:extLst>
               <a:ext uri="{91240B29-F687-4f45-9708-019B960494DF}">
-                <a14:hiddenLine xmlns:a14="http://schemas.microsoft.com/office/drawing/2010/main" xmlns="" w="9525">
+                <a14:hiddenLine xmlns="" xmlns:a14="http://schemas.microsoft.com/office/drawing/2010/main" w="9525">
                   <a:solidFill>
                     <a:srgbClr val="000000"/>
                   </a:solidFill>
@@ -13742,7 +11298,7 @@
             </a:ln>
             <a:extLst>
               <a:ext uri="{91240B29-F687-4f45-9708-019B960494DF}">
-                <a14:hiddenLine xmlns:a14="http://schemas.microsoft.com/office/drawing/2010/main" xmlns="" w="9525">
+                <a14:hiddenLine xmlns="" xmlns:a14="http://schemas.microsoft.com/office/drawing/2010/main" w="9525">
                   <a:solidFill>
                     <a:srgbClr val="000000"/>
                   </a:solidFill>
@@ -13862,7 +11418,7 @@
             </a:ln>
             <a:extLst>
               <a:ext uri="{91240B29-F687-4f45-9708-019B960494DF}">
-                <a14:hiddenLine xmlns:a14="http://schemas.microsoft.com/office/drawing/2010/main" xmlns="" w="9525">
+                <a14:hiddenLine xmlns="" xmlns:a14="http://schemas.microsoft.com/office/drawing/2010/main" w="9525">
                   <a:solidFill>
                     <a:srgbClr val="000000"/>
                   </a:solidFill>
@@ -13930,7 +11486,7 @@
             </a:ln>
             <a:extLst>
               <a:ext uri="{91240B29-F687-4f45-9708-019B960494DF}">
-                <a14:hiddenLine xmlns:a14="http://schemas.microsoft.com/office/drawing/2010/main" xmlns="" w="9525">
+                <a14:hiddenLine xmlns="" xmlns:a14="http://schemas.microsoft.com/office/drawing/2010/main" w="9525">
                   <a:solidFill>
                     <a:srgbClr val="000000"/>
                   </a:solidFill>
@@ -14020,7 +11576,7 @@
             </a:ln>
             <a:extLst>
               <a:ext uri="{91240B29-F687-4f45-9708-019B960494DF}">
-                <a14:hiddenLine xmlns:a14="http://schemas.microsoft.com/office/drawing/2010/main" xmlns="" w="9525">
+                <a14:hiddenLine xmlns="" xmlns:a14="http://schemas.microsoft.com/office/drawing/2010/main" w="9525">
                   <a:solidFill>
                     <a:srgbClr val="000000"/>
                   </a:solidFill>
@@ -14160,7 +11716,7 @@
           <a:p>
             <a:fld id="{9AB3A824-1A51-4B26-AD58-A6D8E14F6C04}" type="datetimeFigureOut">
               <a:rPr lang="en-US" smtClean="0"/>
-              <a:t>4/30/20</a:t>
+              <a:t>5/2/20</a:t>
             </a:fld>
             <a:endParaRPr lang="en-US" dirty="0"/>
           </a:p>
@@ -14432,7 +11988,7 @@
           <a:p>
             <a:fld id="{3CBC1C18-307B-4F68-A007-B5B542270E8D}" type="datetimeFigureOut">
               <a:rPr lang="en-US" smtClean="0"/>
-              <a:t>4/30/20</a:t>
+              <a:t>5/2/20</a:t>
             </a:fld>
             <a:endParaRPr lang="en-US" dirty="0"/>
           </a:p>
@@ -14635,7 +12191,7 @@
           <a:p>
             <a:fld id="{3CBC1C18-307B-4F68-A007-B5B542270E8D}" type="datetimeFigureOut">
               <a:rPr lang="en-US" smtClean="0"/>
-              <a:t>4/30/20</a:t>
+              <a:t>5/2/20</a:t>
             </a:fld>
             <a:endParaRPr lang="en-US" dirty="0"/>
           </a:p>
@@ -14905,7 +12461,7 @@
           <a:p>
             <a:fld id="{3CBC1C18-307B-4F68-A007-B5B542270E8D}" type="datetimeFigureOut">
               <a:rPr lang="en-US" smtClean="0"/>
-              <a:t>4/30/20</a:t>
+              <a:t>5/2/20</a:t>
             </a:fld>
             <a:endParaRPr lang="en-US" dirty="0"/>
           </a:p>
@@ -15346,7 +12902,7 @@
           <a:p>
             <a:fld id="{3CBC1C18-307B-4F68-A007-B5B542270E8D}" type="datetimeFigureOut">
               <a:rPr lang="en-US" smtClean="0"/>
-              <a:t>4/30/20</a:t>
+              <a:t>5/2/20</a:t>
             </a:fld>
             <a:endParaRPr lang="en-US" dirty="0"/>
           </a:p>
@@ -15899,7 +13455,7 @@
           <a:p>
             <a:fld id="{3CBC1C18-307B-4F68-A007-B5B542270E8D}" type="datetimeFigureOut">
               <a:rPr lang="en-US" smtClean="0"/>
-              <a:t>4/30/20</a:t>
+              <a:t>5/2/20</a:t>
             </a:fld>
             <a:endParaRPr lang="en-US" dirty="0"/>
           </a:p>
@@ -16626,7 +14182,7 @@
           <a:p>
             <a:fld id="{3CBC1C18-307B-4F68-A007-B5B542270E8D}" type="datetimeFigureOut">
               <a:rPr lang="en-US" smtClean="0"/>
-              <a:t>4/30/20</a:t>
+              <a:t>5/2/20</a:t>
             </a:fld>
             <a:endParaRPr lang="en-US" dirty="0"/>
           </a:p>
@@ -16803,7 +14359,7 @@
           <a:p>
             <a:fld id="{D857E33E-8B18-4087-B112-809917729534}" type="datetimeFigureOut">
               <a:rPr lang="en-US" smtClean="0"/>
-              <a:t>4/30/20</a:t>
+              <a:t>5/2/20</a:t>
             </a:fld>
             <a:endParaRPr lang="en-US" dirty="0"/>
           </a:p>
@@ -16988,7 +14544,7 @@
           <a:p>
             <a:fld id="{D3FFE419-2371-464F-8239-3959401C3561}" type="datetimeFigureOut">
               <a:rPr lang="en-US" smtClean="0"/>
-              <a:t>4/30/20</a:t>
+              <a:t>5/2/20</a:t>
             </a:fld>
             <a:endParaRPr lang="en-US" dirty="0"/>
           </a:p>
@@ -17198,7 +14754,7 @@
           <a:p>
             <a:fld id="{B8F4533B-A850-4A2F-8185-7CB3D8266C51}" type="datetime1">
               <a:rPr lang="en-US" smtClean="0"/>
-              <a:t>4/30/20</a:t>
+              <a:t>5/2/20</a:t>
             </a:fld>
             <a:endParaRPr lang="en-US" dirty="0"/>
           </a:p>
@@ -17372,7 +14928,7 @@
           <a:p>
             <a:fld id="{97D162C4-EDD9-4389-A98B-B87ECEA2A816}" type="datetimeFigureOut">
               <a:rPr lang="en-US" smtClean="0"/>
-              <a:t>4/30/20</a:t>
+              <a:t>5/2/20</a:t>
             </a:fld>
             <a:endParaRPr lang="en-US" dirty="0"/>
           </a:p>
@@ -17627,7 +15183,7 @@
           <a:p>
             <a:fld id="{3E5059C3-6A89-4494-99FF-5A4D6FFD50EB}" type="datetimeFigureOut">
               <a:rPr lang="en-US" smtClean="0"/>
-              <a:t>4/30/20</a:t>
+              <a:t>5/2/20</a:t>
             </a:fld>
             <a:endParaRPr lang="en-US" dirty="0"/>
           </a:p>
@@ -17864,7 +15420,7 @@
           <a:p>
             <a:fld id="{CA954B2F-12DE-47F5-8894-472B206D2E1E}" type="datetimeFigureOut">
               <a:rPr lang="en-US" smtClean="0"/>
-              <a:t>4/30/20</a:t>
+              <a:t>5/2/20</a:t>
             </a:fld>
             <a:endParaRPr lang="en-US" dirty="0"/>
           </a:p>
@@ -18250,7 +15806,7 @@
           <a:p>
             <a:fld id="{3CBC1C18-307B-4F68-A007-B5B542270E8D}" type="datetimeFigureOut">
               <a:rPr lang="en-US" smtClean="0"/>
-              <a:t>4/30/20</a:t>
+              <a:t>5/2/20</a:t>
             </a:fld>
             <a:endParaRPr lang="en-US" dirty="0"/>
           </a:p>
@@ -18375,7 +15931,7 @@
           <a:p>
             <a:fld id="{1FAF3416-4057-4DAA-829D-4CA07428D088}" type="datetimeFigureOut">
               <a:rPr lang="en-US" smtClean="0"/>
-              <a:t>4/30/20</a:t>
+              <a:t>5/2/20</a:t>
             </a:fld>
             <a:endParaRPr lang="en-US" dirty="0"/>
           </a:p>
@@ -18475,7 +16031,7 @@
           <a:p>
             <a:fld id="{921D9284-D300-4297-87F7-E791DCC15DB1}" type="datetimeFigureOut">
               <a:rPr lang="en-US" smtClean="0"/>
-              <a:t>4/30/20</a:t>
+              <a:t>5/2/20</a:t>
             </a:fld>
             <a:endParaRPr lang="en-US" dirty="0"/>
           </a:p>
@@ -18729,7 +16285,7 @@
           <a:p>
             <a:fld id="{37D525BB-DA17-4BA0-B3C8-3AC3ABC827E6}" type="datetimeFigureOut">
               <a:rPr lang="en-US" smtClean="0"/>
-              <a:t>4/30/20</a:t>
+              <a:t>5/2/20</a:t>
             </a:fld>
             <a:endParaRPr lang="en-US" dirty="0"/>
           </a:p>
@@ -19014,7 +16570,7 @@
           <a:p>
             <a:fld id="{B16C4C9A-3960-41CF-A4E9-2A8FB932454B}" type="datetimeFigureOut">
               <a:rPr lang="en-US" smtClean="0"/>
-              <a:t>4/30/20</a:t>
+              <a:t>5/2/20</a:t>
             </a:fld>
             <a:endParaRPr lang="en-US" dirty="0"/>
           </a:p>
@@ -19135,7 +16691,7 @@
           <a:noFill/>
           <a:extLst>
             <a:ext uri="{909E8E84-426E-40dd-AFC4-6F175D3DCCD1}">
-              <a14:hiddenFill xmlns:a14="http://schemas.microsoft.com/office/drawing/2010/main" xmlns="">
+              <a14:hiddenFill xmlns="" xmlns:a14="http://schemas.microsoft.com/office/drawing/2010/main">
                 <a:solidFill>
                   <a:srgbClr val="FFFFFF"/>
                 </a:solidFill>
@@ -19209,7 +16765,7 @@
               </a:ln>
               <a:extLst>
                 <a:ext uri="{91240B29-F687-4f45-9708-019B960494DF}">
-                  <a14:hiddenLine xmlns:a14="http://schemas.microsoft.com/office/drawing/2010/main" xmlns="" w="9525">
+                  <a14:hiddenLine xmlns="" xmlns:a14="http://schemas.microsoft.com/office/drawing/2010/main" w="9525">
                     <a:solidFill>
                       <a:srgbClr val="000000"/>
                     </a:solidFill>
@@ -19299,7 +16855,7 @@
               </a:ln>
               <a:extLst>
                 <a:ext uri="{91240B29-F687-4f45-9708-019B960494DF}">
-                  <a14:hiddenLine xmlns:a14="http://schemas.microsoft.com/office/drawing/2010/main" xmlns="" w="9525">
+                  <a14:hiddenLine xmlns="" xmlns:a14="http://schemas.microsoft.com/office/drawing/2010/main" w="9525">
                     <a:solidFill>
                       <a:srgbClr val="000000"/>
                     </a:solidFill>
@@ -19389,7 +16945,7 @@
               </a:ln>
               <a:extLst>
                 <a:ext uri="{91240B29-F687-4f45-9708-019B960494DF}">
-                  <a14:hiddenLine xmlns:a14="http://schemas.microsoft.com/office/drawing/2010/main" xmlns="" w="9525">
+                  <a14:hiddenLine xmlns="" xmlns:a14="http://schemas.microsoft.com/office/drawing/2010/main" w="9525">
                     <a:solidFill>
                       <a:srgbClr val="000000"/>
                     </a:solidFill>
@@ -19451,7 +17007,7 @@
               </a:ln>
               <a:extLst>
                 <a:ext uri="{91240B29-F687-4f45-9708-019B960494DF}">
-                  <a14:hiddenLine xmlns:a14="http://schemas.microsoft.com/office/drawing/2010/main" xmlns="" w="9525">
+                  <a14:hiddenLine xmlns="" xmlns:a14="http://schemas.microsoft.com/office/drawing/2010/main" w="9525">
                     <a:solidFill>
                       <a:srgbClr val="000000"/>
                     </a:solidFill>
@@ -19541,7 +17097,7 @@
               </a:ln>
               <a:extLst>
                 <a:ext uri="{91240B29-F687-4f45-9708-019B960494DF}">
-                  <a14:hiddenLine xmlns:a14="http://schemas.microsoft.com/office/drawing/2010/main" xmlns="" w="9525">
+                  <a14:hiddenLine xmlns="" xmlns:a14="http://schemas.microsoft.com/office/drawing/2010/main" w="9525">
                     <a:solidFill>
                       <a:srgbClr val="000000"/>
                     </a:solidFill>
@@ -19603,7 +17159,7 @@
               </a:ln>
               <a:extLst>
                 <a:ext uri="{91240B29-F687-4f45-9708-019B960494DF}">
-                  <a14:hiddenLine xmlns:a14="http://schemas.microsoft.com/office/drawing/2010/main" xmlns="" w="9525">
+                  <a14:hiddenLine xmlns="" xmlns:a14="http://schemas.microsoft.com/office/drawing/2010/main" w="9525">
                     <a:solidFill>
                       <a:srgbClr val="000000"/>
                     </a:solidFill>
@@ -19665,7 +17221,7 @@
               </a:ln>
               <a:extLst>
                 <a:ext uri="{91240B29-F687-4f45-9708-019B960494DF}">
-                  <a14:hiddenLine xmlns:a14="http://schemas.microsoft.com/office/drawing/2010/main" xmlns="" w="9525">
+                  <a14:hiddenLine xmlns="" xmlns:a14="http://schemas.microsoft.com/office/drawing/2010/main" w="9525">
                     <a:solidFill>
                       <a:srgbClr val="000000"/>
                     </a:solidFill>
@@ -19755,7 +17311,7 @@
               </a:ln>
               <a:extLst>
                 <a:ext uri="{91240B29-F687-4f45-9708-019B960494DF}">
-                  <a14:hiddenLine xmlns:a14="http://schemas.microsoft.com/office/drawing/2010/main" xmlns="" w="9525">
+                  <a14:hiddenLine xmlns="" xmlns:a14="http://schemas.microsoft.com/office/drawing/2010/main" w="9525">
                     <a:solidFill>
                       <a:srgbClr val="000000"/>
                     </a:solidFill>
@@ -19845,7 +17401,7 @@
               </a:ln>
               <a:extLst>
                 <a:ext uri="{91240B29-F687-4f45-9708-019B960494DF}">
-                  <a14:hiddenLine xmlns:a14="http://schemas.microsoft.com/office/drawing/2010/main" xmlns="" w="9525">
+                  <a14:hiddenLine xmlns="" xmlns:a14="http://schemas.microsoft.com/office/drawing/2010/main" w="9525">
                     <a:solidFill>
                       <a:srgbClr val="000000"/>
                     </a:solidFill>
@@ -19907,7 +17463,7 @@
               </a:ln>
               <a:extLst>
                 <a:ext uri="{91240B29-F687-4f45-9708-019B960494DF}">
-                  <a14:hiddenLine xmlns:a14="http://schemas.microsoft.com/office/drawing/2010/main" xmlns="" w="9525">
+                  <a14:hiddenLine xmlns="" xmlns:a14="http://schemas.microsoft.com/office/drawing/2010/main" w="9525">
                     <a:solidFill>
                       <a:srgbClr val="000000"/>
                     </a:solidFill>
@@ -20017,7 +17573,7 @@
               </a:ln>
               <a:extLst>
                 <a:ext uri="{91240B29-F687-4f45-9708-019B960494DF}">
-                  <a14:hiddenLine xmlns:a14="http://schemas.microsoft.com/office/drawing/2010/main" xmlns="" w="9525">
+                  <a14:hiddenLine xmlns="" xmlns:a14="http://schemas.microsoft.com/office/drawing/2010/main" w="9525">
                     <a:solidFill>
                       <a:srgbClr val="000000"/>
                     </a:solidFill>
@@ -20101,7 +17657,7 @@
               </a:ln>
               <a:extLst>
                 <a:ext uri="{91240B29-F687-4f45-9708-019B960494DF}">
-                  <a14:hiddenLine xmlns:a14="http://schemas.microsoft.com/office/drawing/2010/main" xmlns="" w="9525">
+                  <a14:hiddenLine xmlns="" xmlns:a14="http://schemas.microsoft.com/office/drawing/2010/main" w="9525">
                     <a:solidFill>
                       <a:srgbClr val="000000"/>
                     </a:solidFill>
@@ -20163,7 +17719,7 @@
               </a:ln>
               <a:extLst>
                 <a:ext uri="{91240B29-F687-4f45-9708-019B960494DF}">
-                  <a14:hiddenLine xmlns:a14="http://schemas.microsoft.com/office/drawing/2010/main" xmlns="" w="9525">
+                  <a14:hiddenLine xmlns="" xmlns:a14="http://schemas.microsoft.com/office/drawing/2010/main" w="9525">
                     <a:solidFill>
                       <a:srgbClr val="000000"/>
                     </a:solidFill>
@@ -20225,7 +17781,7 @@
               </a:ln>
               <a:extLst>
                 <a:ext uri="{91240B29-F687-4f45-9708-019B960494DF}">
-                  <a14:hiddenLine xmlns:a14="http://schemas.microsoft.com/office/drawing/2010/main" xmlns="" w="9525">
+                  <a14:hiddenLine xmlns="" xmlns:a14="http://schemas.microsoft.com/office/drawing/2010/main" w="9525">
                     <a:solidFill>
                       <a:srgbClr val="000000"/>
                     </a:solidFill>
@@ -20315,7 +17871,7 @@
               </a:ln>
               <a:extLst>
                 <a:ext uri="{91240B29-F687-4f45-9708-019B960494DF}">
-                  <a14:hiddenLine xmlns:a14="http://schemas.microsoft.com/office/drawing/2010/main" xmlns="" w="9525">
+                  <a14:hiddenLine xmlns="" xmlns:a14="http://schemas.microsoft.com/office/drawing/2010/main" w="9525">
                     <a:solidFill>
                       <a:srgbClr val="000000"/>
                     </a:solidFill>
@@ -20349,7 +17905,7 @@
               </a:ln>
               <a:extLst>
                 <a:ext uri="{91240B29-F687-4f45-9708-019B960494DF}">
-                  <a14:hiddenLine xmlns:a14="http://schemas.microsoft.com/office/drawing/2010/main" xmlns="" w="9525">
+                  <a14:hiddenLine xmlns="" xmlns:a14="http://schemas.microsoft.com/office/drawing/2010/main" w="9525">
                     <a:solidFill>
                       <a:srgbClr val="000000"/>
                     </a:solidFill>
@@ -20414,7 +17970,7 @@
               </a:ln>
               <a:extLst>
                 <a:ext uri="{91240B29-F687-4f45-9708-019B960494DF}">
-                  <a14:hiddenLine xmlns:a14="http://schemas.microsoft.com/office/drawing/2010/main" xmlns="" w="9525">
+                  <a14:hiddenLine xmlns="" xmlns:a14="http://schemas.microsoft.com/office/drawing/2010/main" w="9525">
                     <a:solidFill>
                       <a:srgbClr val="000000"/>
                     </a:solidFill>
@@ -20504,7 +18060,7 @@
               </a:ln>
               <a:extLst>
                 <a:ext uri="{91240B29-F687-4f45-9708-019B960494DF}">
-                  <a14:hiddenLine xmlns:a14="http://schemas.microsoft.com/office/drawing/2010/main" xmlns="" w="9525">
+                  <a14:hiddenLine xmlns="" xmlns:a14="http://schemas.microsoft.com/office/drawing/2010/main" w="9525">
                     <a:solidFill>
                       <a:srgbClr val="000000"/>
                     </a:solidFill>
@@ -20566,7 +18122,7 @@
               </a:ln>
               <a:extLst>
                 <a:ext uri="{91240B29-F687-4f45-9708-019B960494DF}">
-                  <a14:hiddenLine xmlns:a14="http://schemas.microsoft.com/office/drawing/2010/main" xmlns="" w="9525">
+                  <a14:hiddenLine xmlns="" xmlns:a14="http://schemas.microsoft.com/office/drawing/2010/main" w="9525">
                     <a:solidFill>
                       <a:srgbClr val="000000"/>
                     </a:solidFill>
@@ -20656,7 +18212,7 @@
               </a:ln>
               <a:extLst>
                 <a:ext uri="{91240B29-F687-4f45-9708-019B960494DF}">
-                  <a14:hiddenLine xmlns:a14="http://schemas.microsoft.com/office/drawing/2010/main" xmlns="" w="9525">
+                  <a14:hiddenLine xmlns="" xmlns:a14="http://schemas.microsoft.com/office/drawing/2010/main" w="9525">
                     <a:solidFill>
                       <a:srgbClr val="000000"/>
                     </a:solidFill>
@@ -20721,7 +18277,7 @@
               </a:ln>
               <a:extLst>
                 <a:ext uri="{91240B29-F687-4f45-9708-019B960494DF}">
-                  <a14:hiddenLine xmlns:a14="http://schemas.microsoft.com/office/drawing/2010/main" xmlns="" w="9525">
+                  <a14:hiddenLine xmlns="" xmlns:a14="http://schemas.microsoft.com/office/drawing/2010/main" w="9525">
                     <a:solidFill>
                       <a:srgbClr val="000000"/>
                     </a:solidFill>
@@ -20783,7 +18339,7 @@
               </a:ln>
               <a:extLst>
                 <a:ext uri="{91240B29-F687-4f45-9708-019B960494DF}">
-                  <a14:hiddenLine xmlns:a14="http://schemas.microsoft.com/office/drawing/2010/main" xmlns="" w="9525">
+                  <a14:hiddenLine xmlns="" xmlns:a14="http://schemas.microsoft.com/office/drawing/2010/main" w="9525">
                     <a:solidFill>
                       <a:srgbClr val="000000"/>
                     </a:solidFill>
@@ -20873,7 +18429,7 @@
               </a:ln>
               <a:extLst>
                 <a:ext uri="{91240B29-F687-4f45-9708-019B960494DF}">
-                  <a14:hiddenLine xmlns:a14="http://schemas.microsoft.com/office/drawing/2010/main" xmlns="" w="9525">
+                  <a14:hiddenLine xmlns="" xmlns:a14="http://schemas.microsoft.com/office/drawing/2010/main" w="9525">
                     <a:solidFill>
                       <a:srgbClr val="000000"/>
                     </a:solidFill>
@@ -20963,7 +18519,7 @@
               </a:ln>
               <a:extLst>
                 <a:ext uri="{91240B29-F687-4f45-9708-019B960494DF}">
-                  <a14:hiddenLine xmlns:a14="http://schemas.microsoft.com/office/drawing/2010/main" xmlns="" w="9525">
+                  <a14:hiddenLine xmlns="" xmlns:a14="http://schemas.microsoft.com/office/drawing/2010/main" w="9525">
                     <a:solidFill>
                       <a:srgbClr val="000000"/>
                     </a:solidFill>
@@ -21028,7 +18584,7 @@
               </a:ln>
               <a:extLst>
                 <a:ext uri="{91240B29-F687-4f45-9708-019B960494DF}">
-                  <a14:hiddenLine xmlns:a14="http://schemas.microsoft.com/office/drawing/2010/main" xmlns="" w="9525">
+                  <a14:hiddenLine xmlns="" xmlns:a14="http://schemas.microsoft.com/office/drawing/2010/main" w="9525">
                     <a:solidFill>
                       <a:srgbClr val="000000"/>
                     </a:solidFill>
@@ -21148,7 +18704,7 @@
               </a:ln>
               <a:extLst>
                 <a:ext uri="{91240B29-F687-4f45-9708-019B960494DF}">
-                  <a14:hiddenLine xmlns:a14="http://schemas.microsoft.com/office/drawing/2010/main" xmlns="" w="9525">
+                  <a14:hiddenLine xmlns="" xmlns:a14="http://schemas.microsoft.com/office/drawing/2010/main" w="9525">
                     <a:solidFill>
                       <a:srgbClr val="000000"/>
                     </a:solidFill>
@@ -21246,7 +18802,7 @@
               </a:ln>
               <a:extLst>
                 <a:ext uri="{91240B29-F687-4f45-9708-019B960494DF}">
-                  <a14:hiddenLine xmlns:a14="http://schemas.microsoft.com/office/drawing/2010/main" xmlns="" w="9525">
+                  <a14:hiddenLine xmlns="" xmlns:a14="http://schemas.microsoft.com/office/drawing/2010/main" w="9525">
                     <a:solidFill>
                       <a:srgbClr val="000000"/>
                     </a:solidFill>
@@ -21361,7 +18917,7 @@
               </a:ln>
               <a:extLst>
                 <a:ext uri="{91240B29-F687-4f45-9708-019B960494DF}">
-                  <a14:hiddenLine xmlns:a14="http://schemas.microsoft.com/office/drawing/2010/main" xmlns="" w="9525">
+                  <a14:hiddenLine xmlns="" xmlns:a14="http://schemas.microsoft.com/office/drawing/2010/main" w="9525">
                     <a:solidFill>
                       <a:srgbClr val="000000"/>
                     </a:solidFill>
@@ -21451,7 +19007,7 @@
               </a:ln>
               <a:extLst>
                 <a:ext uri="{91240B29-F687-4f45-9708-019B960494DF}">
-                  <a14:hiddenLine xmlns:a14="http://schemas.microsoft.com/office/drawing/2010/main" xmlns="" w="9525">
+                  <a14:hiddenLine xmlns="" xmlns:a14="http://schemas.microsoft.com/office/drawing/2010/main" w="9525">
                     <a:solidFill>
                       <a:srgbClr val="000000"/>
                     </a:solidFill>
@@ -21516,7 +19072,7 @@
               </a:ln>
               <a:extLst>
                 <a:ext uri="{91240B29-F687-4f45-9708-019B960494DF}">
-                  <a14:hiddenLine xmlns:a14="http://schemas.microsoft.com/office/drawing/2010/main" xmlns="" w="9525">
+                  <a14:hiddenLine xmlns="" xmlns:a14="http://schemas.microsoft.com/office/drawing/2010/main" w="9525">
                     <a:solidFill>
                       <a:srgbClr val="000000"/>
                     </a:solidFill>
@@ -21606,7 +19162,7 @@
               </a:ln>
               <a:extLst>
                 <a:ext uri="{91240B29-F687-4f45-9708-019B960494DF}">
-                  <a14:hiddenLine xmlns:a14="http://schemas.microsoft.com/office/drawing/2010/main" xmlns="" w="9525">
+                  <a14:hiddenLine xmlns="" xmlns:a14="http://schemas.microsoft.com/office/drawing/2010/main" w="9525">
                     <a:solidFill>
                       <a:srgbClr val="000000"/>
                     </a:solidFill>
@@ -21674,7 +19230,7 @@
               </a:ln>
               <a:extLst>
                 <a:ext uri="{91240B29-F687-4f45-9708-019B960494DF}">
-                  <a14:hiddenLine xmlns:a14="http://schemas.microsoft.com/office/drawing/2010/main" xmlns="" w="9525">
+                  <a14:hiddenLine xmlns="" xmlns:a14="http://schemas.microsoft.com/office/drawing/2010/main" w="9525">
                     <a:solidFill>
                       <a:srgbClr val="000000"/>
                     </a:solidFill>
@@ -21764,7 +19320,7 @@
               </a:ln>
               <a:extLst>
                 <a:ext uri="{91240B29-F687-4f45-9708-019B960494DF}">
-                  <a14:hiddenLine xmlns:a14="http://schemas.microsoft.com/office/drawing/2010/main" xmlns="" w="9525">
+                  <a14:hiddenLine xmlns="" xmlns:a14="http://schemas.microsoft.com/office/drawing/2010/main" w="9525">
                     <a:solidFill>
                       <a:srgbClr val="000000"/>
                     </a:solidFill>
@@ -21832,7 +19388,7 @@
               </a:ln>
               <a:extLst>
                 <a:ext uri="{91240B29-F687-4f45-9708-019B960494DF}">
-                  <a14:hiddenLine xmlns:a14="http://schemas.microsoft.com/office/drawing/2010/main" xmlns="" w="9525">
+                  <a14:hiddenLine xmlns="" xmlns:a14="http://schemas.microsoft.com/office/drawing/2010/main" w="9525">
                     <a:solidFill>
                       <a:srgbClr val="000000"/>
                     </a:solidFill>
@@ -21922,7 +19478,7 @@
               </a:ln>
               <a:extLst>
                 <a:ext uri="{91240B29-F687-4f45-9708-019B960494DF}">
-                  <a14:hiddenLine xmlns:a14="http://schemas.microsoft.com/office/drawing/2010/main" xmlns="" w="9525">
+                  <a14:hiddenLine xmlns="" xmlns:a14="http://schemas.microsoft.com/office/drawing/2010/main" w="9525">
                     <a:solidFill>
                       <a:srgbClr val="000000"/>
                     </a:solidFill>
@@ -21956,7 +19512,7 @@
               </a:ln>
               <a:extLst>
                 <a:ext uri="{91240B29-F687-4f45-9708-019B960494DF}">
-                  <a14:hiddenLine xmlns:a14="http://schemas.microsoft.com/office/drawing/2010/main" xmlns="" w="9525">
+                  <a14:hiddenLine xmlns="" xmlns:a14="http://schemas.microsoft.com/office/drawing/2010/main" w="9525">
                     <a:solidFill>
                       <a:srgbClr val="000000"/>
                     </a:solidFill>
@@ -22096,7 +19652,7 @@
           <a:p>
             <a:fld id="{3CBC1C18-307B-4F68-A007-B5B542270E8D}" type="datetimeFigureOut">
               <a:rPr lang="en-US" smtClean="0"/>
-              <a:t>4/30/20</a:t>
+              <a:t>5/2/20</a:t>
             </a:fld>
             <a:endParaRPr lang="en-US" dirty="0"/>
           </a:p>
@@ -22931,7 +20487,7 @@
           <a:noFill/>
           <a:extLst>
             <a:ext uri="{909E8E84-426E-40dd-AFC4-6F175D3DCCD1}">
-              <a14:hiddenFill xmlns="" xmlns:a16="http://schemas.microsoft.com/office/drawing/2014/main" xmlns:p14="http://schemas.microsoft.com/office/powerpoint/2010/main" xmlns:a14="http://schemas.microsoft.com/office/drawing/2010/main">
+              <a14:hiddenFill xmlns:a14="http://schemas.microsoft.com/office/drawing/2010/main" xmlns:p14="http://schemas.microsoft.com/office/powerpoint/2010/main" xmlns:a16="http://schemas.microsoft.com/office/drawing/2014/main" xmlns="">
                 <a:solidFill>
                   <a:srgbClr val="FFFFFF"/>
                 </a:solidFill>
@@ -23163,7 +20719,7 @@
             </a:ln>
             <a:extLst>
               <a:ext uri="{91240B29-F687-4f45-9708-019B960494DF}">
-                <a14:hiddenLine xmlns="" xmlns:a16="http://schemas.microsoft.com/office/drawing/2014/main" xmlns:p14="http://schemas.microsoft.com/office/powerpoint/2010/main" xmlns:a14="http://schemas.microsoft.com/office/drawing/2010/main" w="9525">
+                <a14:hiddenLine xmlns:a14="http://schemas.microsoft.com/office/drawing/2010/main" xmlns:p14="http://schemas.microsoft.com/office/powerpoint/2010/main" xmlns:a16="http://schemas.microsoft.com/office/drawing/2014/main" xmlns="" w="9525">
                   <a:solidFill>
                     <a:srgbClr val="000000"/>
                   </a:solidFill>
@@ -23268,7 +20824,7 @@
             </a:ln>
             <a:extLst>
               <a:ext uri="{91240B29-F687-4f45-9708-019B960494DF}">
-                <a14:hiddenLine xmlns="" xmlns:a16="http://schemas.microsoft.com/office/drawing/2014/main" xmlns:p14="http://schemas.microsoft.com/office/powerpoint/2010/main" xmlns:a14="http://schemas.microsoft.com/office/drawing/2010/main" w="9525">
+                <a14:hiddenLine xmlns:a14="http://schemas.microsoft.com/office/drawing/2010/main" xmlns:p14="http://schemas.microsoft.com/office/powerpoint/2010/main" xmlns:a16="http://schemas.microsoft.com/office/drawing/2014/main" xmlns="" w="9525">
                   <a:solidFill>
                     <a:srgbClr val="000000"/>
                   </a:solidFill>
@@ -23373,7 +20929,7 @@
             </a:ln>
             <a:extLst>
               <a:ext uri="{91240B29-F687-4f45-9708-019B960494DF}">
-                <a14:hiddenLine xmlns="" xmlns:a16="http://schemas.microsoft.com/office/drawing/2014/main" xmlns:p14="http://schemas.microsoft.com/office/powerpoint/2010/main" xmlns:a14="http://schemas.microsoft.com/office/drawing/2010/main" w="9525">
+                <a14:hiddenLine xmlns:a14="http://schemas.microsoft.com/office/drawing/2010/main" xmlns:p14="http://schemas.microsoft.com/office/powerpoint/2010/main" xmlns:a16="http://schemas.microsoft.com/office/drawing/2014/main" xmlns="" w="9525">
                   <a:solidFill>
                     <a:srgbClr val="000000"/>
                   </a:solidFill>
@@ -23450,7 +21006,7 @@
             </a:ln>
             <a:extLst>
               <a:ext uri="{91240B29-F687-4f45-9708-019B960494DF}">
-                <a14:hiddenLine xmlns="" xmlns:a16="http://schemas.microsoft.com/office/drawing/2014/main" xmlns:p14="http://schemas.microsoft.com/office/powerpoint/2010/main" xmlns:a14="http://schemas.microsoft.com/office/drawing/2010/main" w="9525">
+                <a14:hiddenLine xmlns:a14="http://schemas.microsoft.com/office/drawing/2010/main" xmlns:p14="http://schemas.microsoft.com/office/powerpoint/2010/main" xmlns:a16="http://schemas.microsoft.com/office/drawing/2014/main" xmlns="" w="9525">
                   <a:solidFill>
                     <a:srgbClr val="000000"/>
                   </a:solidFill>
@@ -23555,7 +21111,7 @@
             </a:ln>
             <a:extLst>
               <a:ext uri="{91240B29-F687-4f45-9708-019B960494DF}">
-                <a14:hiddenLine xmlns="" xmlns:a16="http://schemas.microsoft.com/office/drawing/2014/main" xmlns:p14="http://schemas.microsoft.com/office/powerpoint/2010/main" xmlns:a14="http://schemas.microsoft.com/office/drawing/2010/main" w="9525">
+                <a14:hiddenLine xmlns:a14="http://schemas.microsoft.com/office/drawing/2010/main" xmlns:p14="http://schemas.microsoft.com/office/powerpoint/2010/main" xmlns:a16="http://schemas.microsoft.com/office/drawing/2014/main" xmlns="" w="9525">
                   <a:solidFill>
                     <a:srgbClr val="000000"/>
                   </a:solidFill>
@@ -23632,7 +21188,7 @@
             </a:ln>
             <a:extLst>
               <a:ext uri="{91240B29-F687-4f45-9708-019B960494DF}">
-                <a14:hiddenLine xmlns="" xmlns:a16="http://schemas.microsoft.com/office/drawing/2014/main" xmlns:p14="http://schemas.microsoft.com/office/powerpoint/2010/main" xmlns:a14="http://schemas.microsoft.com/office/drawing/2010/main" w="9525">
+                <a14:hiddenLine xmlns:a14="http://schemas.microsoft.com/office/drawing/2010/main" xmlns:p14="http://schemas.microsoft.com/office/powerpoint/2010/main" xmlns:a16="http://schemas.microsoft.com/office/drawing/2014/main" xmlns="" w="9525">
                   <a:solidFill>
                     <a:srgbClr val="000000"/>
                   </a:solidFill>
@@ -23709,7 +21265,7 @@
             </a:ln>
             <a:extLst>
               <a:ext uri="{91240B29-F687-4f45-9708-019B960494DF}">
-                <a14:hiddenLine xmlns="" xmlns:a16="http://schemas.microsoft.com/office/drawing/2014/main" xmlns:p14="http://schemas.microsoft.com/office/powerpoint/2010/main" xmlns:a14="http://schemas.microsoft.com/office/drawing/2010/main" w="9525">
+                <a14:hiddenLine xmlns:a14="http://schemas.microsoft.com/office/drawing/2010/main" xmlns:p14="http://schemas.microsoft.com/office/powerpoint/2010/main" xmlns:a16="http://schemas.microsoft.com/office/drawing/2014/main" xmlns="" w="9525">
                   <a:solidFill>
                     <a:srgbClr val="000000"/>
                   </a:solidFill>
@@ -23814,7 +21370,7 @@
             </a:ln>
             <a:extLst>
               <a:ext uri="{91240B29-F687-4f45-9708-019B960494DF}">
-                <a14:hiddenLine xmlns="" xmlns:a16="http://schemas.microsoft.com/office/drawing/2014/main" xmlns:p14="http://schemas.microsoft.com/office/powerpoint/2010/main" xmlns:a14="http://schemas.microsoft.com/office/drawing/2010/main" w="9525">
+                <a14:hiddenLine xmlns:a14="http://schemas.microsoft.com/office/drawing/2010/main" xmlns:p14="http://schemas.microsoft.com/office/powerpoint/2010/main" xmlns:a16="http://schemas.microsoft.com/office/drawing/2014/main" xmlns="" w="9525">
                   <a:solidFill>
                     <a:srgbClr val="000000"/>
                   </a:solidFill>
@@ -23919,7 +21475,7 @@
             </a:ln>
             <a:extLst>
               <a:ext uri="{91240B29-F687-4f45-9708-019B960494DF}">
-                <a14:hiddenLine xmlns="" xmlns:a16="http://schemas.microsoft.com/office/drawing/2014/main" xmlns:p14="http://schemas.microsoft.com/office/powerpoint/2010/main" xmlns:a14="http://schemas.microsoft.com/office/drawing/2010/main" w="9525">
+                <a14:hiddenLine xmlns:a14="http://schemas.microsoft.com/office/drawing/2010/main" xmlns:p14="http://schemas.microsoft.com/office/powerpoint/2010/main" xmlns:a16="http://schemas.microsoft.com/office/drawing/2014/main" xmlns="" w="9525">
                   <a:solidFill>
                     <a:srgbClr val="000000"/>
                   </a:solidFill>
@@ -23996,7 +21552,7 @@
             </a:ln>
             <a:extLst>
               <a:ext uri="{91240B29-F687-4f45-9708-019B960494DF}">
-                <a14:hiddenLine xmlns="" xmlns:a16="http://schemas.microsoft.com/office/drawing/2014/main" xmlns:p14="http://schemas.microsoft.com/office/powerpoint/2010/main" xmlns:a14="http://schemas.microsoft.com/office/drawing/2010/main" w="9525">
+                <a14:hiddenLine xmlns:a14="http://schemas.microsoft.com/office/drawing/2010/main" xmlns:p14="http://schemas.microsoft.com/office/powerpoint/2010/main" xmlns:a16="http://schemas.microsoft.com/office/drawing/2014/main" xmlns="" w="9525">
                   <a:solidFill>
                     <a:srgbClr val="000000"/>
                   </a:solidFill>
@@ -24121,7 +21677,7 @@
             </a:ln>
             <a:extLst>
               <a:ext uri="{91240B29-F687-4f45-9708-019B960494DF}">
-                <a14:hiddenLine xmlns="" xmlns:a16="http://schemas.microsoft.com/office/drawing/2014/main" xmlns:p14="http://schemas.microsoft.com/office/powerpoint/2010/main" xmlns:a14="http://schemas.microsoft.com/office/drawing/2010/main" w="9525">
+                <a14:hiddenLine xmlns:a14="http://schemas.microsoft.com/office/drawing/2010/main" xmlns:p14="http://schemas.microsoft.com/office/powerpoint/2010/main" xmlns:a16="http://schemas.microsoft.com/office/drawing/2014/main" xmlns="" w="9525">
                   <a:solidFill>
                     <a:srgbClr val="000000"/>
                   </a:solidFill>
@@ -24235,7 +21791,7 @@
             </a:ln>
             <a:extLst>
               <a:ext uri="{91240B29-F687-4f45-9708-019B960494DF}">
-                <a14:hiddenLine xmlns="" xmlns:a16="http://schemas.microsoft.com/office/drawing/2014/main" xmlns:p14="http://schemas.microsoft.com/office/powerpoint/2010/main" xmlns:a14="http://schemas.microsoft.com/office/drawing/2010/main" w="9525">
+                <a14:hiddenLine xmlns:a14="http://schemas.microsoft.com/office/drawing/2010/main" xmlns:p14="http://schemas.microsoft.com/office/powerpoint/2010/main" xmlns:a16="http://schemas.microsoft.com/office/drawing/2014/main" xmlns="" w="9525">
                   <a:solidFill>
                     <a:srgbClr val="000000"/>
                   </a:solidFill>
@@ -24312,7 +21868,7 @@
             </a:ln>
             <a:extLst>
               <a:ext uri="{91240B29-F687-4f45-9708-019B960494DF}">
-                <a14:hiddenLine xmlns="" xmlns:a16="http://schemas.microsoft.com/office/drawing/2014/main" xmlns:p14="http://schemas.microsoft.com/office/powerpoint/2010/main" xmlns:a14="http://schemas.microsoft.com/office/drawing/2010/main" w="9525">
+                <a14:hiddenLine xmlns:a14="http://schemas.microsoft.com/office/drawing/2010/main" xmlns:p14="http://schemas.microsoft.com/office/powerpoint/2010/main" xmlns:a16="http://schemas.microsoft.com/office/drawing/2014/main" xmlns="" w="9525">
                   <a:solidFill>
                     <a:srgbClr val="000000"/>
                   </a:solidFill>
@@ -24389,7 +21945,7 @@
             </a:ln>
             <a:extLst>
               <a:ext uri="{91240B29-F687-4f45-9708-019B960494DF}">
-                <a14:hiddenLine xmlns="" xmlns:a16="http://schemas.microsoft.com/office/drawing/2014/main" xmlns:p14="http://schemas.microsoft.com/office/powerpoint/2010/main" xmlns:a14="http://schemas.microsoft.com/office/drawing/2010/main" w="9525">
+                <a14:hiddenLine xmlns:a14="http://schemas.microsoft.com/office/drawing/2010/main" xmlns:p14="http://schemas.microsoft.com/office/powerpoint/2010/main" xmlns:a16="http://schemas.microsoft.com/office/drawing/2014/main" xmlns="" w="9525">
                   <a:solidFill>
                     <a:srgbClr val="000000"/>
                   </a:solidFill>
@@ -24494,7 +22050,7 @@
             </a:ln>
             <a:extLst>
               <a:ext uri="{91240B29-F687-4f45-9708-019B960494DF}">
-                <a14:hiddenLine xmlns="" xmlns:a16="http://schemas.microsoft.com/office/drawing/2014/main" xmlns:p14="http://schemas.microsoft.com/office/powerpoint/2010/main" xmlns:a14="http://schemas.microsoft.com/office/drawing/2010/main" w="9525">
+                <a14:hiddenLine xmlns:a14="http://schemas.microsoft.com/office/drawing/2010/main" xmlns:p14="http://schemas.microsoft.com/office/powerpoint/2010/main" xmlns:a16="http://schemas.microsoft.com/office/drawing/2014/main" xmlns="" w="9525">
                   <a:solidFill>
                     <a:srgbClr val="000000"/>
                   </a:solidFill>
@@ -24543,7 +22099,7 @@
             </a:ln>
             <a:extLst>
               <a:ext uri="{91240B29-F687-4f45-9708-019B960494DF}">
-                <a14:hiddenLine xmlns="" xmlns:a16="http://schemas.microsoft.com/office/drawing/2014/main" xmlns:p14="http://schemas.microsoft.com/office/powerpoint/2010/main" xmlns:a14="http://schemas.microsoft.com/office/drawing/2010/main" w="9525">
+                <a14:hiddenLine xmlns:a14="http://schemas.microsoft.com/office/drawing/2010/main" xmlns:p14="http://schemas.microsoft.com/office/powerpoint/2010/main" xmlns:a16="http://schemas.microsoft.com/office/drawing/2014/main" xmlns="" w="9525">
                   <a:solidFill>
                     <a:srgbClr val="000000"/>
                   </a:solidFill>
@@ -24623,7 +22179,7 @@
             </a:ln>
             <a:extLst>
               <a:ext uri="{91240B29-F687-4f45-9708-019B960494DF}">
-                <a14:hiddenLine xmlns="" xmlns:a16="http://schemas.microsoft.com/office/drawing/2014/main" xmlns:p14="http://schemas.microsoft.com/office/powerpoint/2010/main" xmlns:a14="http://schemas.microsoft.com/office/drawing/2010/main" w="9525">
+                <a14:hiddenLine xmlns:a14="http://schemas.microsoft.com/office/drawing/2010/main" xmlns:p14="http://schemas.microsoft.com/office/powerpoint/2010/main" xmlns:a16="http://schemas.microsoft.com/office/drawing/2014/main" xmlns="" w="9525">
                   <a:solidFill>
                     <a:srgbClr val="000000"/>
                   </a:solidFill>
@@ -24728,7 +22284,7 @@
             </a:ln>
             <a:extLst>
               <a:ext uri="{91240B29-F687-4f45-9708-019B960494DF}">
-                <a14:hiddenLine xmlns="" xmlns:a16="http://schemas.microsoft.com/office/drawing/2014/main" xmlns:p14="http://schemas.microsoft.com/office/powerpoint/2010/main" xmlns:a14="http://schemas.microsoft.com/office/drawing/2010/main" w="9525">
+                <a14:hiddenLine xmlns:a14="http://schemas.microsoft.com/office/drawing/2010/main" xmlns:p14="http://schemas.microsoft.com/office/powerpoint/2010/main" xmlns:a16="http://schemas.microsoft.com/office/drawing/2014/main" xmlns="" w="9525">
                   <a:solidFill>
                     <a:srgbClr val="000000"/>
                   </a:solidFill>
@@ -24805,7 +22361,7 @@
             </a:ln>
             <a:extLst>
               <a:ext uri="{91240B29-F687-4f45-9708-019B960494DF}">
-                <a14:hiddenLine xmlns="" xmlns:a16="http://schemas.microsoft.com/office/drawing/2014/main" xmlns:p14="http://schemas.microsoft.com/office/powerpoint/2010/main" xmlns:a14="http://schemas.microsoft.com/office/drawing/2010/main" w="9525">
+                <a14:hiddenLine xmlns:a14="http://schemas.microsoft.com/office/drawing/2010/main" xmlns:p14="http://schemas.microsoft.com/office/powerpoint/2010/main" xmlns:a16="http://schemas.microsoft.com/office/drawing/2014/main" xmlns="" w="9525">
                   <a:solidFill>
                     <a:srgbClr val="000000"/>
                   </a:solidFill>
@@ -24910,7 +22466,7 @@
             </a:ln>
             <a:extLst>
               <a:ext uri="{91240B29-F687-4f45-9708-019B960494DF}">
-                <a14:hiddenLine xmlns="" xmlns:a16="http://schemas.microsoft.com/office/drawing/2014/main" xmlns:p14="http://schemas.microsoft.com/office/powerpoint/2010/main" xmlns:a14="http://schemas.microsoft.com/office/drawing/2010/main" w="9525">
+                <a14:hiddenLine xmlns:a14="http://schemas.microsoft.com/office/drawing/2010/main" xmlns:p14="http://schemas.microsoft.com/office/powerpoint/2010/main" xmlns:a16="http://schemas.microsoft.com/office/drawing/2014/main" xmlns="" w="9525">
                   <a:solidFill>
                     <a:srgbClr val="000000"/>
                   </a:solidFill>
@@ -24990,7 +22546,7 @@
             </a:ln>
             <a:extLst>
               <a:ext uri="{91240B29-F687-4f45-9708-019B960494DF}">
-                <a14:hiddenLine xmlns="" xmlns:a16="http://schemas.microsoft.com/office/drawing/2014/main" xmlns:p14="http://schemas.microsoft.com/office/powerpoint/2010/main" xmlns:a14="http://schemas.microsoft.com/office/drawing/2010/main" w="9525">
+                <a14:hiddenLine xmlns:a14="http://schemas.microsoft.com/office/drawing/2010/main" xmlns:p14="http://schemas.microsoft.com/office/powerpoint/2010/main" xmlns:a16="http://schemas.microsoft.com/office/drawing/2014/main" xmlns="" w="9525">
                   <a:solidFill>
                     <a:srgbClr val="000000"/>
                   </a:solidFill>
@@ -25067,7 +22623,7 @@
             </a:ln>
             <a:extLst>
               <a:ext uri="{91240B29-F687-4f45-9708-019B960494DF}">
-                <a14:hiddenLine xmlns="" xmlns:a16="http://schemas.microsoft.com/office/drawing/2014/main" xmlns:p14="http://schemas.microsoft.com/office/powerpoint/2010/main" xmlns:a14="http://schemas.microsoft.com/office/drawing/2010/main" w="9525">
+                <a14:hiddenLine xmlns:a14="http://schemas.microsoft.com/office/drawing/2010/main" xmlns:p14="http://schemas.microsoft.com/office/powerpoint/2010/main" xmlns:a16="http://schemas.microsoft.com/office/drawing/2014/main" xmlns="" w="9525">
                   <a:solidFill>
                     <a:srgbClr val="000000"/>
                   </a:solidFill>
@@ -25172,7 +22728,7 @@
             </a:ln>
             <a:extLst>
               <a:ext uri="{91240B29-F687-4f45-9708-019B960494DF}">
-                <a14:hiddenLine xmlns="" xmlns:a16="http://schemas.microsoft.com/office/drawing/2014/main" xmlns:p14="http://schemas.microsoft.com/office/powerpoint/2010/main" xmlns:a14="http://schemas.microsoft.com/office/drawing/2010/main" w="9525">
+                <a14:hiddenLine xmlns:a14="http://schemas.microsoft.com/office/drawing/2010/main" xmlns:p14="http://schemas.microsoft.com/office/powerpoint/2010/main" xmlns:a16="http://schemas.microsoft.com/office/drawing/2014/main" xmlns="" w="9525">
                   <a:solidFill>
                     <a:srgbClr val="000000"/>
                   </a:solidFill>
@@ -25277,7 +22833,7 @@
             </a:ln>
             <a:extLst>
               <a:ext uri="{91240B29-F687-4f45-9708-019B960494DF}">
-                <a14:hiddenLine xmlns="" xmlns:a16="http://schemas.microsoft.com/office/drawing/2014/main" xmlns:p14="http://schemas.microsoft.com/office/powerpoint/2010/main" xmlns:a14="http://schemas.microsoft.com/office/drawing/2010/main" w="9525">
+                <a14:hiddenLine xmlns:a14="http://schemas.microsoft.com/office/drawing/2010/main" xmlns:p14="http://schemas.microsoft.com/office/powerpoint/2010/main" xmlns:a16="http://schemas.microsoft.com/office/drawing/2014/main" xmlns="" w="9525">
                   <a:solidFill>
                     <a:srgbClr val="000000"/>
                   </a:solidFill>
@@ -25357,7 +22913,7 @@
             </a:ln>
             <a:extLst>
               <a:ext uri="{91240B29-F687-4f45-9708-019B960494DF}">
-                <a14:hiddenLine xmlns="" xmlns:a16="http://schemas.microsoft.com/office/drawing/2014/main" xmlns:p14="http://schemas.microsoft.com/office/powerpoint/2010/main" xmlns:a14="http://schemas.microsoft.com/office/drawing/2010/main" w="9525">
+                <a14:hiddenLine xmlns:a14="http://schemas.microsoft.com/office/drawing/2010/main" xmlns:p14="http://schemas.microsoft.com/office/powerpoint/2010/main" xmlns:a16="http://schemas.microsoft.com/office/drawing/2014/main" xmlns="" w="9525">
                   <a:solidFill>
                     <a:srgbClr val="000000"/>
                   </a:solidFill>
@@ -25492,7 +23048,7 @@
             </a:ln>
             <a:extLst>
               <a:ext uri="{91240B29-F687-4f45-9708-019B960494DF}">
-                <a14:hiddenLine xmlns="" xmlns:a16="http://schemas.microsoft.com/office/drawing/2014/main" xmlns:p14="http://schemas.microsoft.com/office/powerpoint/2010/main" xmlns:a14="http://schemas.microsoft.com/office/drawing/2010/main" w="9525">
+                <a14:hiddenLine xmlns:a14="http://schemas.microsoft.com/office/drawing/2010/main" xmlns:p14="http://schemas.microsoft.com/office/powerpoint/2010/main" xmlns:a16="http://schemas.microsoft.com/office/drawing/2014/main" xmlns="" w="9525">
                   <a:solidFill>
                     <a:srgbClr val="000000"/>
                   </a:solidFill>
@@ -26421,7 +23977,7 @@
           <a:p>
             <a:r>
               <a:rPr lang="de-CH" dirty="0"/>
-              <a:t>Ziel: Derjenige, der zuerst die Zahl 180 hat, bekommt z.B. 360 </a:t>
+              <a:t>Ziel: Derjenige, der zuerst die Zahl 180 hat, bekommt 360 </a:t>
             </a:r>
             <a:r>
               <a:rPr lang="de-CH" dirty="0" err="1"/>
@@ -26453,34 +24009,6 @@
           </a:p>
         </p:txBody>
       </p:sp>
-      <p:graphicFrame>
-        <p:nvGraphicFramePr>
-          <p:cNvPr id="6" name="Diagramm 5">
-            <a:extLst>
-              <a:ext uri="{FF2B5EF4-FFF2-40B4-BE49-F238E27FC236}">
-                <a16:creationId xmlns:a16="http://schemas.microsoft.com/office/drawing/2014/main" id="{41C40474-DF0D-924B-AFA9-F336095DF222}"/>
-              </a:ext>
-            </a:extLst>
-          </p:cNvPr>
-          <p:cNvGraphicFramePr/>
-          <p:nvPr>
-            <p:extLst>
-              <p:ext uri="{D42A27DB-BD31-4B8C-83A1-F6EECF244321}">
-                <p14:modId xmlns:p14="http://schemas.microsoft.com/office/powerpoint/2010/main" val="2763812256"/>
-              </p:ext>
-            </p:extLst>
-          </p:nvPr>
-        </p:nvGraphicFramePr>
-        <p:xfrm>
-          <a:off x="1141411" y="4542503"/>
-          <a:ext cx="9093969" cy="1248698"/>
-        </p:xfrm>
-        <a:graphic>
-          <a:graphicData uri="http://schemas.openxmlformats.org/drawingml/2006/diagram">
-            <dgm:relIds xmlns:dgm="http://schemas.openxmlformats.org/drawingml/2006/diagram" xmlns:r="http://schemas.openxmlformats.org/officeDocument/2006/relationships" r:dm="rId2" r:lo="rId3" r:qs="rId4" r:cs="rId5"/>
-          </a:graphicData>
-        </a:graphic>
-      </p:graphicFrame>
       <p:sp>
         <p:nvSpPr>
           <p:cNvPr id="7" name="Fußzeilenplatzhalter 7">
@@ -26925,7 +24453,7 @@
           <p:nvPr>
             <p:extLst>
               <p:ext uri="{D42A27DB-BD31-4B8C-83A1-F6EECF244321}">
-                <p14:modId xmlns:p14="http://schemas.microsoft.com/office/powerpoint/2010/main" val="3333078167"/>
+                <p14:modId xmlns:p14="http://schemas.microsoft.com/office/powerpoint/2010/main" val="442917513"/>
               </p:ext>
             </p:extLst>
           </p:nvPr>
@@ -26997,8 +24525,8 @@
         </p:blipFill>
         <p:spPr>
           <a:xfrm>
-            <a:off x="8289720" y="108325"/>
-            <a:ext cx="2575611" cy="3876557"/>
+            <a:off x="8293475" y="108326"/>
+            <a:ext cx="2575611" cy="4010232"/>
           </a:xfrm>
           <a:prstGeom prst="rect">
             <a:avLst/>
@@ -27027,7 +24555,7 @@
         </p:blipFill>
         <p:spPr>
           <a:xfrm>
-            <a:off x="1257086" y="108325"/>
+            <a:off x="1257086" y="108326"/>
             <a:ext cx="5454999" cy="4079007"/>
           </a:xfrm>
           <a:prstGeom prst="rect">
@@ -27145,7 +24673,7 @@
           <a:p>
             <a:r>
               <a:rPr lang="de-DE" dirty="0"/>
-              <a:t>Externe Bibliotheken?</a:t>
+              <a:t>Externe Bibliotheken</a:t>
             </a:r>
           </a:p>
           <a:p>

</xml_diff>

<commit_message>
PowerPoint in Teamwork überarbeitet
Former-commit-id: ba10d5e0954edd4b60a8bd968c4fa3e25ef4c13e
</commit_message>
<xml_diff>
--- a/documents/Meilensteine/Meilenstein V/Meilenstein_5_Präsentation.pptx
+++ b/documents/Meilensteine/Meilenstein V/Meilenstein_5_Präsentation.pptx
@@ -14,9 +14,10 @@
     <p:sldId id="281" r:id="rId8"/>
     <p:sldId id="284" r:id="rId9"/>
     <p:sldId id="285" r:id="rId10"/>
-    <p:sldId id="270" r:id="rId11"/>
-    <p:sldId id="273" r:id="rId12"/>
-    <p:sldId id="265" r:id="rId13"/>
+    <p:sldId id="286" r:id="rId11"/>
+    <p:sldId id="270" r:id="rId12"/>
+    <p:sldId id="273" r:id="rId13"/>
+    <p:sldId id="265" r:id="rId14"/>
   </p:sldIdLst>
   <p:sldSz cx="12192000" cy="6858000"/>
   <p:notesSz cx="6858000" cy="9144000"/>
@@ -1639,16 +1640,12 @@
         <a:lstStyle/>
         <a:p>
           <a:r>
-            <a:rPr lang="de-DE" sz="1800">
+            <a:rPr lang="de-DE" sz="1800" dirty="0">
               <a:latin typeface="Calibri" panose="020F0502020204030204" pitchFamily="34" charset="0"/>
               <a:cs typeface="Calibri" panose="020F0502020204030204" pitchFamily="34" charset="0"/>
             </a:rPr>
-            <a:t>Per Button</a:t>
+            <a:t>Steuerung per Button</a:t>
           </a:r>
-          <a:endParaRPr lang="de-DE" sz="1800" dirty="0">
-            <a:latin typeface="Calibri" panose="020F0502020204030204" pitchFamily="34" charset="0"/>
-            <a:cs typeface="Calibri" panose="020F0502020204030204" pitchFamily="34" charset="0"/>
-          </a:endParaRPr>
         </a:p>
       </dgm:t>
     </dgm:pt>
@@ -1725,16 +1722,12 @@
         <a:lstStyle/>
         <a:p>
           <a:r>
-            <a:rPr lang="de-DE" sz="1800">
+            <a:rPr lang="de-DE" sz="1800" dirty="0">
               <a:latin typeface="Calibri" panose="020F0502020204030204" pitchFamily="34" charset="0"/>
               <a:cs typeface="Calibri" panose="020F0502020204030204" pitchFamily="34" charset="0"/>
             </a:rPr>
-            <a:t>Visuell</a:t>
+            <a:t>GUI</a:t>
           </a:r>
-          <a:endParaRPr lang="de-DE" sz="1800" dirty="0">
-            <a:latin typeface="Calibri" panose="020F0502020204030204" pitchFamily="34" charset="0"/>
-            <a:cs typeface="Calibri" panose="020F0502020204030204" pitchFamily="34" charset="0"/>
-          </a:endParaRPr>
         </a:p>
       </dgm:t>
     </dgm:pt>
@@ -1768,16 +1761,12 @@
         <a:lstStyle/>
         <a:p>
           <a:r>
-            <a:rPr lang="de-DE" sz="1800">
+            <a:rPr lang="de-DE" sz="1800" dirty="0">
               <a:latin typeface="Calibri" panose="020F0502020204030204" pitchFamily="34" charset="0"/>
               <a:cs typeface="Calibri" panose="020F0502020204030204" pitchFamily="34" charset="0"/>
             </a:rPr>
-            <a:t>Tastatur</a:t>
+            <a:t> Steuerung per Tastatur</a:t>
           </a:r>
-          <a:endParaRPr lang="de-DE" sz="1800" dirty="0">
-            <a:latin typeface="Calibri" panose="020F0502020204030204" pitchFamily="34" charset="0"/>
-            <a:cs typeface="Calibri" panose="020F0502020204030204" pitchFamily="34" charset="0"/>
-          </a:endParaRPr>
         </a:p>
       </dgm:t>
     </dgm:pt>
@@ -1897,16 +1886,12 @@
         <a:lstStyle/>
         <a:p>
           <a:r>
-            <a:rPr lang="de-DE" sz="1600">
+            <a:rPr lang="de-DE" sz="1600" dirty="0">
               <a:latin typeface="Calibri" panose="020F0502020204030204" pitchFamily="34" charset="0"/>
               <a:cs typeface="Calibri" panose="020F0502020204030204" pitchFamily="34" charset="0"/>
             </a:rPr>
             <a:t>Change Username</a:t>
           </a:r>
-          <a:endParaRPr lang="de-DE" sz="1600" dirty="0">
-            <a:latin typeface="Calibri" panose="020F0502020204030204" pitchFamily="34" charset="0"/>
-            <a:cs typeface="Calibri" panose="020F0502020204030204" pitchFamily="34" charset="0"/>
-          </a:endParaRPr>
         </a:p>
       </dgm:t>
     </dgm:pt>
@@ -2072,16 +2057,19 @@
         <a:lstStyle/>
         <a:p>
           <a:r>
-            <a:rPr lang="de-DE" sz="1600">
+            <a:rPr lang="de-DE" sz="1600" dirty="0" err="1">
               <a:latin typeface="Calibri" panose="020F0502020204030204" pitchFamily="34" charset="0"/>
               <a:cs typeface="Calibri" panose="020F0502020204030204" pitchFamily="34" charset="0"/>
             </a:rPr>
-            <a:t>Throw a Card</a:t>
+            <a:t>Throw</a:t>
           </a:r>
-          <a:endParaRPr lang="de-DE" sz="1600" dirty="0">
-            <a:latin typeface="Calibri" panose="020F0502020204030204" pitchFamily="34" charset="0"/>
-            <a:cs typeface="Calibri" panose="020F0502020204030204" pitchFamily="34" charset="0"/>
-          </a:endParaRPr>
+          <a:r>
+            <a:rPr lang="de-DE" sz="1600" dirty="0">
+              <a:latin typeface="Calibri" panose="020F0502020204030204" pitchFamily="34" charset="0"/>
+              <a:cs typeface="Calibri" panose="020F0502020204030204" pitchFamily="34" charset="0"/>
+            </a:rPr>
+            <a:t> a Card</a:t>
+          </a:r>
         </a:p>
       </dgm:t>
     </dgm:pt>
@@ -2115,16 +2103,12 @@
         <a:lstStyle/>
         <a:p>
           <a:r>
-            <a:rPr lang="de-DE" sz="1600">
+            <a:rPr lang="de-DE" sz="1600" dirty="0">
               <a:latin typeface="Calibri" panose="020F0502020204030204" pitchFamily="34" charset="0"/>
               <a:cs typeface="Calibri" panose="020F0502020204030204" pitchFamily="34" charset="0"/>
             </a:rPr>
             <a:t>Chat</a:t>
           </a:r>
-          <a:endParaRPr lang="de-DE" sz="1600" dirty="0">
-            <a:latin typeface="Calibri" panose="020F0502020204030204" pitchFamily="34" charset="0"/>
-            <a:cs typeface="Calibri" panose="020F0502020204030204" pitchFamily="34" charset="0"/>
-          </a:endParaRPr>
         </a:p>
       </dgm:t>
     </dgm:pt>
@@ -2158,16 +2142,12 @@
         <a:lstStyle/>
         <a:p>
           <a:r>
-            <a:rPr lang="de-DE" sz="1600">
+            <a:rPr lang="de-DE" sz="1600" dirty="0">
               <a:latin typeface="Calibri" panose="020F0502020204030204" pitchFamily="34" charset="0"/>
               <a:cs typeface="Calibri" panose="020F0502020204030204" pitchFamily="34" charset="0"/>
             </a:rPr>
             <a:t>Highscore</a:t>
           </a:r>
-          <a:endParaRPr lang="de-DE" sz="1600" dirty="0">
-            <a:latin typeface="Calibri" panose="020F0502020204030204" pitchFamily="34" charset="0"/>
-            <a:cs typeface="Calibri" panose="020F0502020204030204" pitchFamily="34" charset="0"/>
-          </a:endParaRPr>
         </a:p>
       </dgm:t>
     </dgm:pt>
@@ -2201,16 +2181,12 @@
         <a:lstStyle/>
         <a:p>
           <a:r>
-            <a:rPr lang="de-DE" sz="1600">
+            <a:rPr lang="de-DE" sz="1600" dirty="0">
               <a:latin typeface="Calibri" panose="020F0502020204030204" pitchFamily="34" charset="0"/>
               <a:cs typeface="Calibri" panose="020F0502020204030204" pitchFamily="34" charset="0"/>
             </a:rPr>
             <a:t>Infos zum Game</a:t>
           </a:r>
-          <a:endParaRPr lang="de-DE" sz="1600" dirty="0">
-            <a:latin typeface="Calibri" panose="020F0502020204030204" pitchFamily="34" charset="0"/>
-            <a:cs typeface="Calibri" panose="020F0502020204030204" pitchFamily="34" charset="0"/>
-          </a:endParaRPr>
         </a:p>
       </dgm:t>
     </dgm:pt>
@@ -2287,16 +2263,12 @@
         <a:lstStyle/>
         <a:p>
           <a:r>
-            <a:rPr lang="de-DE" sz="1600">
+            <a:rPr lang="de-DE" sz="1600" dirty="0">
               <a:latin typeface="Calibri" panose="020F0502020204030204" pitchFamily="34" charset="0"/>
               <a:cs typeface="Calibri" panose="020F0502020204030204" pitchFamily="34" charset="0"/>
             </a:rPr>
             <a:t>Logout</a:t>
           </a:r>
-          <a:endParaRPr lang="de-DE" sz="1600" dirty="0">
-            <a:latin typeface="Calibri" panose="020F0502020204030204" pitchFamily="34" charset="0"/>
-            <a:cs typeface="Calibri" panose="020F0502020204030204" pitchFamily="34" charset="0"/>
-          </a:endParaRPr>
         </a:p>
       </dgm:t>
     </dgm:pt>
@@ -2319,6 +2291,205 @@
         <a:lstStyle/>
         <a:p>
           <a:endParaRPr lang="de-DE"/>
+        </a:p>
+      </dgm:t>
+    </dgm:pt>
+    <dgm:pt modelId="{15290987-4635-47F8-8073-3DE29EA855F2}">
+      <dgm:prSet phldrT="[Text]" custT="1"/>
+      <dgm:spPr/>
+      <dgm:t>
+        <a:bodyPr/>
+        <a:lstStyle/>
+        <a:p>
+          <a:r>
+            <a:rPr lang="de-DE" sz="1600" dirty="0">
+              <a:latin typeface="Calibri" panose="020F0502020204030204" pitchFamily="34" charset="0"/>
+              <a:cs typeface="Calibri" panose="020F0502020204030204" pitchFamily="34" charset="0"/>
+            </a:rPr>
+            <a:t>Playerlist</a:t>
+          </a:r>
+        </a:p>
+      </dgm:t>
+    </dgm:pt>
+    <dgm:pt modelId="{5FE46299-2F57-40B8-A16D-7986154B346F}" type="parTrans" cxnId="{321AF8F6-D088-416A-8B1B-A872A22ADAA7}">
+      <dgm:prSet/>
+      <dgm:spPr/>
+      <dgm:t>
+        <a:bodyPr/>
+        <a:lstStyle/>
+        <a:p>
+          <a:endParaRPr lang="de-CH"/>
+        </a:p>
+      </dgm:t>
+    </dgm:pt>
+    <dgm:pt modelId="{FEB9C89D-35B4-4D83-B347-1E3178BC273E}" type="sibTrans" cxnId="{321AF8F6-D088-416A-8B1B-A872A22ADAA7}">
+      <dgm:prSet/>
+      <dgm:spPr/>
+      <dgm:t>
+        <a:bodyPr/>
+        <a:lstStyle/>
+        <a:p>
+          <a:endParaRPr lang="de-CH"/>
+        </a:p>
+      </dgm:t>
+    </dgm:pt>
+    <dgm:pt modelId="{AB6D71AA-19E6-495F-BB70-514C1D1BA637}">
+      <dgm:prSet phldrT="[Text]" custT="1"/>
+      <dgm:spPr/>
+      <dgm:t>
+        <a:bodyPr/>
+        <a:lstStyle/>
+        <a:p>
+          <a:r>
+            <a:rPr lang="de-DE" sz="1600" dirty="0">
+              <a:latin typeface="Calibri" panose="020F0502020204030204" pitchFamily="34" charset="0"/>
+              <a:cs typeface="Calibri" panose="020F0502020204030204" pitchFamily="34" charset="0"/>
+            </a:rPr>
+            <a:t>Lobbylist</a:t>
+          </a:r>
+        </a:p>
+      </dgm:t>
+    </dgm:pt>
+    <dgm:pt modelId="{2091DCEC-53C5-462A-984B-2646BD2C1F25}" type="parTrans" cxnId="{03BF71E0-7994-4164-A4EA-0E86CA8D2173}">
+      <dgm:prSet/>
+      <dgm:spPr/>
+      <dgm:t>
+        <a:bodyPr/>
+        <a:lstStyle/>
+        <a:p>
+          <a:endParaRPr lang="de-CH"/>
+        </a:p>
+      </dgm:t>
+    </dgm:pt>
+    <dgm:pt modelId="{9C679376-2649-4D23-A7E5-29C56DF9926E}" type="sibTrans" cxnId="{03BF71E0-7994-4164-A4EA-0E86CA8D2173}">
+      <dgm:prSet/>
+      <dgm:spPr/>
+      <dgm:t>
+        <a:bodyPr/>
+        <a:lstStyle/>
+        <a:p>
+          <a:endParaRPr lang="de-CH"/>
+        </a:p>
+      </dgm:t>
+    </dgm:pt>
+    <dgm:pt modelId="{8B739DE1-E0C5-4F3C-9572-45AC5AC58CB4}">
+      <dgm:prSet phldrT="[Text]" custT="1"/>
+      <dgm:spPr/>
+      <dgm:t>
+        <a:bodyPr/>
+        <a:lstStyle/>
+        <a:p>
+          <a:r>
+            <a:rPr lang="de-DE" sz="1600" dirty="0">
+              <a:latin typeface="Calibri" panose="020F0502020204030204" pitchFamily="34" charset="0"/>
+              <a:cs typeface="Calibri" panose="020F0502020204030204" pitchFamily="34" charset="0"/>
+            </a:rPr>
+            <a:t>Soundsteuerung</a:t>
+          </a:r>
+        </a:p>
+      </dgm:t>
+    </dgm:pt>
+    <dgm:pt modelId="{71A4C4DF-2676-4DFD-ACC2-6F9492C19114}" type="parTrans" cxnId="{745B23C1-BEDC-414A-B19D-8DA070D0CD22}">
+      <dgm:prSet/>
+      <dgm:spPr/>
+      <dgm:t>
+        <a:bodyPr/>
+        <a:lstStyle/>
+        <a:p>
+          <a:endParaRPr lang="de-CH"/>
+        </a:p>
+      </dgm:t>
+    </dgm:pt>
+    <dgm:pt modelId="{2BA5723F-733F-4160-BFF7-88D7E3B884C0}" type="sibTrans" cxnId="{745B23C1-BEDC-414A-B19D-8DA070D0CD22}">
+      <dgm:prSet/>
+      <dgm:spPr/>
+      <dgm:t>
+        <a:bodyPr/>
+        <a:lstStyle/>
+        <a:p>
+          <a:endParaRPr lang="de-CH"/>
+        </a:p>
+      </dgm:t>
+    </dgm:pt>
+    <dgm:pt modelId="{8305AE0B-E172-4B4F-9BF0-DEA366137870}">
+      <dgm:prSet phldrT="[Text]" custT="1"/>
+      <dgm:spPr/>
+      <dgm:t>
+        <a:bodyPr/>
+        <a:lstStyle/>
+        <a:p>
+          <a:r>
+            <a:rPr lang="de-DE" sz="1600" dirty="0">
+              <a:latin typeface="Calibri" panose="020F0502020204030204" pitchFamily="34" charset="0"/>
+              <a:cs typeface="Calibri" panose="020F0502020204030204" pitchFamily="34" charset="0"/>
+            </a:rPr>
+            <a:t>Gameplay-Video</a:t>
+          </a:r>
+        </a:p>
+      </dgm:t>
+    </dgm:pt>
+    <dgm:pt modelId="{C6EA4612-7E97-4DC0-9E26-FC0512C034C1}" type="parTrans" cxnId="{6CF3D256-7516-4981-87B5-FE6D4FC27A3D}">
+      <dgm:prSet/>
+      <dgm:spPr/>
+      <dgm:t>
+        <a:bodyPr/>
+        <a:lstStyle/>
+        <a:p>
+          <a:endParaRPr lang="de-CH"/>
+        </a:p>
+      </dgm:t>
+    </dgm:pt>
+    <dgm:pt modelId="{828DE6B0-40FA-41F2-AD03-60BA54D5C0C4}" type="sibTrans" cxnId="{6CF3D256-7516-4981-87B5-FE6D4FC27A3D}">
+      <dgm:prSet/>
+      <dgm:spPr/>
+      <dgm:t>
+        <a:bodyPr/>
+        <a:lstStyle/>
+        <a:p>
+          <a:endParaRPr lang="de-CH"/>
+        </a:p>
+      </dgm:t>
+    </dgm:pt>
+    <dgm:pt modelId="{82A29E04-BFBC-4C0E-B0D1-7626D71B1811}">
+      <dgm:prSet phldrT="[Text]" custT="1"/>
+      <dgm:spPr/>
+      <dgm:t>
+        <a:bodyPr/>
+        <a:lstStyle/>
+        <a:p>
+          <a:r>
+            <a:rPr lang="de-DE" sz="1600" dirty="0" err="1">
+              <a:latin typeface="Calibri" panose="020F0502020204030204" pitchFamily="34" charset="0"/>
+              <a:cs typeface="Calibri" panose="020F0502020204030204" pitchFamily="34" charset="0"/>
+            </a:rPr>
+            <a:t>Cheaten</a:t>
+          </a:r>
+          <a:endParaRPr lang="de-DE" sz="1600" dirty="0">
+            <a:latin typeface="Calibri" panose="020F0502020204030204" pitchFamily="34" charset="0"/>
+            <a:cs typeface="Calibri" panose="020F0502020204030204" pitchFamily="34" charset="0"/>
+          </a:endParaRPr>
+        </a:p>
+      </dgm:t>
+    </dgm:pt>
+    <dgm:pt modelId="{BFB09DDA-A27F-4496-AAC8-A4A22537F5C2}" type="parTrans" cxnId="{71F8F90D-21BC-48FD-89DD-595B00E1CFEC}">
+      <dgm:prSet/>
+      <dgm:spPr/>
+      <dgm:t>
+        <a:bodyPr/>
+        <a:lstStyle/>
+        <a:p>
+          <a:endParaRPr lang="de-CH"/>
+        </a:p>
+      </dgm:t>
+    </dgm:pt>
+    <dgm:pt modelId="{9777A284-FA42-4B21-B375-C93F1ECB7877}" type="sibTrans" cxnId="{71F8F90D-21BC-48FD-89DD-595B00E1CFEC}">
+      <dgm:prSet/>
+      <dgm:spPr/>
+      <dgm:t>
+        <a:bodyPr/>
+        <a:lstStyle/>
+        <a:p>
+          <a:endParaRPr lang="de-CH"/>
         </a:p>
       </dgm:t>
     </dgm:pt>
@@ -2409,19 +2580,24 @@
   </dgm:ptLst>
   <dgm:cxnLst>
     <dgm:cxn modelId="{F905F20A-72C1-7C47-83B6-B86CEC6DF9E6}" srcId="{C2263C80-6B39-4390-A426-5BB2D2C97D88}" destId="{62A64569-0ED0-664B-A06A-4AB7AD335379}" srcOrd="3" destOrd="0" parTransId="{1B05B335-EFFB-F24B-A304-80D01EB0230F}" sibTransId="{C34AF51D-BAEA-994F-8246-D36DF92FBA3F}"/>
+    <dgm:cxn modelId="{71F8F90D-21BC-48FD-89DD-595B00E1CFEC}" srcId="{D2DD5270-FA56-4206-A038-A4A03737E170}" destId="{82A29E04-BFBC-4C0E-B0D1-7626D71B1811}" srcOrd="5" destOrd="0" parTransId="{BFB09DDA-A27F-4496-AAC8-A4A22537F5C2}" sibTransId="{9777A284-FA42-4B21-B375-C93F1ECB7877}"/>
+    <dgm:cxn modelId="{328C6B10-0199-4C78-9A4F-071EB256FEFD}" type="presOf" srcId="{15290987-4635-47F8-8073-3DE29EA855F2}" destId="{EC299A1D-5E47-48A4-B988-31D2B7355915}" srcOrd="0" destOrd="3" presId="urn:microsoft.com/office/officeart/2005/8/layout/hList1"/>
     <dgm:cxn modelId="{D1295B12-463D-B545-8501-2A75C6E94D1E}" type="presOf" srcId="{667DF842-791D-6A41-84DD-CCC80432DFEE}" destId="{19EAB99B-3F3C-4C08-9787-48351BC7F651}" srcOrd="0" destOrd="0" presId="urn:microsoft.com/office/officeart/2005/8/layout/hList1"/>
     <dgm:cxn modelId="{4BB09513-B182-49A5-96B7-21BF1ABAA00D}" srcId="{32567ED3-AF77-482E-BED1-867AB9B8BA42}" destId="{3927C055-55AE-4E40-A8D4-84CBE89BCC39}" srcOrd="0" destOrd="0" parTransId="{58A5F3E3-0E65-4C74-8A97-FDEDC821967A}" sibTransId="{E2DBF498-547F-4628-9632-FF1B47064A76}"/>
     <dgm:cxn modelId="{0E6B861B-6D46-4BF5-B3EF-6C5ABEBEA141}" srcId="{D2DD5270-FA56-4206-A038-A4A03737E170}" destId="{D1D5F571-25D9-49E1-AAA2-1F2320985DE4}" srcOrd="2" destOrd="0" parTransId="{4B894F84-BAA7-4505-840C-D11D75EFDD83}" sibTransId="{E89457F8-12E1-4891-9543-808EE6E0719D}"/>
     <dgm:cxn modelId="{2683F126-6731-7242-B230-AC198FD51288}" type="presOf" srcId="{BB8C8EF1-451B-4240-A4D6-D760797A5E4F}" destId="{EC299A1D-5E47-48A4-B988-31D2B7355915}" srcOrd="0" destOrd="2" presId="urn:microsoft.com/office/officeart/2005/8/layout/hList1"/>
     <dgm:cxn modelId="{B769CE2C-43F0-744D-92F4-CCA24A70A55B}" type="presOf" srcId="{62A64569-0ED0-664B-A06A-4AB7AD335379}" destId="{81C14F67-E933-49AE-BC5C-B2B56264D657}" srcOrd="0" destOrd="3" presId="urn:microsoft.com/office/officeart/2005/8/layout/hList1"/>
     <dgm:cxn modelId="{77AFA82E-E62E-644D-8B95-476FDAF6C7C2}" type="presOf" srcId="{B3F908F4-9D59-3C49-AB3D-E1F155B57374}" destId="{81C14F67-E933-49AE-BC5C-B2B56264D657}" srcOrd="0" destOrd="4" presId="urn:microsoft.com/office/officeart/2005/8/layout/hList1"/>
+    <dgm:cxn modelId="{E156242F-4992-4EB1-944F-577B6A8252B1}" type="presOf" srcId="{8B739DE1-E0C5-4F3C-9572-45AC5AC58CB4}" destId="{81C14F67-E933-49AE-BC5C-B2B56264D657}" srcOrd="0" destOrd="5" presId="urn:microsoft.com/office/officeart/2005/8/layout/hList1"/>
     <dgm:cxn modelId="{EB5D2230-A55C-DF4B-9783-54C57EEB3F77}" type="presOf" srcId="{3963C2DF-DA24-45B1-9705-8CD206DF65B3}" destId="{81C14F67-E933-49AE-BC5C-B2B56264D657}" srcOrd="0" destOrd="0" presId="urn:microsoft.com/office/officeart/2005/8/layout/hList1"/>
     <dgm:cxn modelId="{F5D7AC31-B8AB-6641-88D2-49E048941236}" srcId="{32567ED3-AF77-482E-BED1-867AB9B8BA42}" destId="{BB8C8EF1-451B-4240-A4D6-D760797A5E4F}" srcOrd="2" destOrd="0" parTransId="{BA27FE65-60A6-6948-8B1D-61467ECEA299}" sibTransId="{1D996D01-C140-094E-A371-F90F73C1C8DC}"/>
+    <dgm:cxn modelId="{D3D5ED35-8C24-4110-B9F3-29DB24D8C44F}" type="presOf" srcId="{82A29E04-BFBC-4C0E-B0D1-7626D71B1811}" destId="{19EAB99B-3F3C-4C08-9787-48351BC7F651}" srcOrd="0" destOrd="5" presId="urn:microsoft.com/office/officeart/2005/8/layout/hList1"/>
     <dgm:cxn modelId="{0E30DC37-0D14-4947-AC94-12E3EBFC342A}" srcId="{32567ED3-AF77-482E-BED1-867AB9B8BA42}" destId="{15A378D1-4A96-0C4F-975E-0242AEC89EEB}" srcOrd="1" destOrd="0" parTransId="{6DA0B8B0-5AB9-3648-8120-833784F0C866}" sibTransId="{067E1DF3-16A8-B747-A7F4-F2CCE53F4D3A}"/>
     <dgm:cxn modelId="{63C1D83A-0AB6-8644-B21A-DA8731BFDD14}" type="presOf" srcId="{D12E2D96-5D3C-A143-8007-0593E789036C}" destId="{19EAB99B-3F3C-4C08-9787-48351BC7F651}" srcOrd="0" destOrd="1" presId="urn:microsoft.com/office/officeart/2005/8/layout/hList1"/>
-    <dgm:cxn modelId="{69FEFB4C-C5A9-9540-9D62-7547F93F99E0}" srcId="{D2DD5270-FA56-4206-A038-A4A03737E170}" destId="{DDD3774F-59C9-7E4E-AB98-BE8CB62715CC}" srcOrd="3" destOrd="0" parTransId="{56B06C7D-B461-464C-9D5D-42AF8623F138}" sibTransId="{D79EB759-8317-3D4C-985E-426224F6370F}"/>
     <dgm:cxn modelId="{B184A764-0C47-A44D-A0F5-BFE53F28B12D}" type="presOf" srcId="{D6030C32-B695-F04D-AAC4-3200E6D9CA03}" destId="{19EAB99B-3F3C-4C08-9787-48351BC7F651}" srcOrd="0" destOrd="4" presId="urn:microsoft.com/office/officeart/2005/8/layout/hList1"/>
     <dgm:cxn modelId="{B5C6826B-1CBA-BC48-8AC8-CEDF9F6D8BD1}" type="presOf" srcId="{C2263C80-6B39-4390-A426-5BB2D2C97D88}" destId="{4A74C392-6404-4941-88D5-1E4B139ACF03}" srcOrd="0" destOrd="0" presId="urn:microsoft.com/office/officeart/2005/8/layout/hList1"/>
+    <dgm:cxn modelId="{69FEFB4C-C5A9-9540-9D62-7547F93F99E0}" srcId="{D2DD5270-FA56-4206-A038-A4A03737E170}" destId="{DDD3774F-59C9-7E4E-AB98-BE8CB62715CC}" srcOrd="3" destOrd="0" parTransId="{56B06C7D-B461-464C-9D5D-42AF8623F138}" sibTransId="{D79EB759-8317-3D4C-985E-426224F6370F}"/>
+    <dgm:cxn modelId="{6CF3D256-7516-4981-87B5-FE6D4FC27A3D}" srcId="{C2263C80-6B39-4390-A426-5BB2D2C97D88}" destId="{8305AE0B-E172-4B4F-9BF0-DEA366137870}" srcOrd="6" destOrd="0" parTransId="{C6EA4612-7E97-4DC0-9E26-FC0512C034C1}" sibTransId="{828DE6B0-40FA-41F2-AD03-60BA54D5C0C4}"/>
     <dgm:cxn modelId="{DEB6F085-AAB1-5F4C-B179-DECEB702B032}" type="presOf" srcId="{32567ED3-AF77-482E-BED1-867AB9B8BA42}" destId="{82754283-C103-4F4B-949A-ED587806CE44}" srcOrd="0" destOrd="0" presId="urn:microsoft.com/office/officeart/2005/8/layout/hList1"/>
     <dgm:cxn modelId="{237BD291-B93B-4AD5-A07F-CED237479EEE}" srcId="{C2263C80-6B39-4390-A426-5BB2D2C97D88}" destId="{0A8C4F56-3F13-4016-B8D4-B4C0D2E10464}" srcOrd="1" destOrd="0" parTransId="{5CB9CE90-895E-4F77-BF73-8ED3F8191D68}" sibTransId="{607DD266-8A5D-4A55-85B9-63EE6D1DE4C3}"/>
     <dgm:cxn modelId="{21210D9A-00BA-894F-8D5E-175B77E85F39}" type="presOf" srcId="{007544FA-B2AB-1B49-AF34-6D7FEC5B3B05}" destId="{81C14F67-E933-49AE-BC5C-B2B56264D657}" srcOrd="0" destOrd="2" presId="urn:microsoft.com/office/officeart/2005/8/layout/hList1"/>
@@ -2432,12 +2608,17 @@
     <dgm:cxn modelId="{346CB2B7-BDF1-C947-B110-D4C72568103A}" type="presOf" srcId="{D2DD5270-FA56-4206-A038-A4A03737E170}" destId="{0CC623B2-3A59-4916-AEC2-21E47CA2B7D6}" srcOrd="0" destOrd="0" presId="urn:microsoft.com/office/officeart/2005/8/layout/hList1"/>
     <dgm:cxn modelId="{DBF2FAB9-1DAC-BF49-AD9B-BB5E1706F365}" type="presOf" srcId="{D1D5F571-25D9-49E1-AAA2-1F2320985DE4}" destId="{19EAB99B-3F3C-4C08-9787-48351BC7F651}" srcOrd="0" destOrd="2" presId="urn:microsoft.com/office/officeart/2005/8/layout/hList1"/>
     <dgm:cxn modelId="{56A754BF-C9B2-4FD3-A51D-E106C61DE787}" srcId="{25601DF5-F830-41F9-9ACA-2AA909590390}" destId="{C2263C80-6B39-4390-A426-5BB2D2C97D88}" srcOrd="0" destOrd="0" parTransId="{677F90B3-7C7F-429B-9984-64033CCA83C0}" sibTransId="{06010DAA-E52E-4197-9CB1-1FF111DE3381}"/>
+    <dgm:cxn modelId="{745B23C1-BEDC-414A-B19D-8DA070D0CD22}" srcId="{C2263C80-6B39-4390-A426-5BB2D2C97D88}" destId="{8B739DE1-E0C5-4F3C-9572-45AC5AC58CB4}" srcOrd="5" destOrd="0" parTransId="{71A4C4DF-2676-4DFD-ACC2-6F9492C19114}" sibTransId="{2BA5723F-733F-4160-BFF7-88D7E3B884C0}"/>
     <dgm:cxn modelId="{62DC9CC8-0A0B-B240-9FE3-8AAB7FD6B3CE}" srcId="{C2263C80-6B39-4390-A426-5BB2D2C97D88}" destId="{007544FA-B2AB-1B49-AF34-6D7FEC5B3B05}" srcOrd="2" destOrd="0" parTransId="{CA21CFB8-669E-1A4D-AA63-EB7410ACDC0E}" sibTransId="{4B78DA50-0369-ED49-9CF5-6AF04AC00E2F}"/>
     <dgm:cxn modelId="{0D3DBED4-506F-EB41-8D83-EC08EB463A3A}" type="presOf" srcId="{15A378D1-4A96-0C4F-975E-0242AEC89EEB}" destId="{EC299A1D-5E47-48A4-B988-31D2B7355915}" srcOrd="0" destOrd="1" presId="urn:microsoft.com/office/officeart/2005/8/layout/hList1"/>
     <dgm:cxn modelId="{936C79D6-C77B-9141-BEE7-DE670B941208}" type="presOf" srcId="{25601DF5-F830-41F9-9ACA-2AA909590390}" destId="{B6776644-950A-4D54-87D2-0A223644CD04}" srcOrd="0" destOrd="0" presId="urn:microsoft.com/office/officeart/2005/8/layout/hList1"/>
     <dgm:cxn modelId="{E8F8D5D7-D512-4C00-8EA7-8E1443D4630E}" srcId="{C2263C80-6B39-4390-A426-5BB2D2C97D88}" destId="{3963C2DF-DA24-45B1-9705-8CD206DF65B3}" srcOrd="0" destOrd="0" parTransId="{00B1AE7C-55D4-42D7-8800-F11197DF668B}" sibTransId="{F9A172D8-B130-4FC5-8D1E-E6C0C6D4FB16}"/>
     <dgm:cxn modelId="{1E3B39DC-DF88-4C0D-A6C1-769460C7FC5C}" srcId="{25601DF5-F830-41F9-9ACA-2AA909590390}" destId="{D2DD5270-FA56-4206-A038-A4A03737E170}" srcOrd="2" destOrd="0" parTransId="{A54E3E2A-B9AF-4A9F-B0A9-3B9A5BB7473C}" sibTransId="{6426822D-E67E-4658-97A3-73C710EFD191}"/>
+    <dgm:cxn modelId="{03BF71E0-7994-4164-A4EA-0E86CA8D2173}" srcId="{32567ED3-AF77-482E-BED1-867AB9B8BA42}" destId="{AB6D71AA-19E6-495F-BB70-514C1D1BA637}" srcOrd="4" destOrd="0" parTransId="{2091DCEC-53C5-462A-984B-2646BD2C1F25}" sibTransId="{9C679376-2649-4D23-A7E5-29C56DF9926E}"/>
+    <dgm:cxn modelId="{C19369F2-3B72-4169-9E61-B4258D23F508}" type="presOf" srcId="{8305AE0B-E172-4B4F-9BF0-DEA366137870}" destId="{81C14F67-E933-49AE-BC5C-B2B56264D657}" srcOrd="0" destOrd="6" presId="urn:microsoft.com/office/officeart/2005/8/layout/hList1"/>
     <dgm:cxn modelId="{942B7CF3-CEF7-4570-9838-B9FFBD199464}" srcId="{25601DF5-F830-41F9-9ACA-2AA909590390}" destId="{32567ED3-AF77-482E-BED1-867AB9B8BA42}" srcOrd="1" destOrd="0" parTransId="{90B5C6E2-A4E7-4654-9CF5-3DEE8E71E031}" sibTransId="{50890DAE-0950-446F-9208-666AB98ECCF6}"/>
+    <dgm:cxn modelId="{CE781CF6-EA08-4A7B-83AE-761F67069F01}" type="presOf" srcId="{AB6D71AA-19E6-495F-BB70-514C1D1BA637}" destId="{EC299A1D-5E47-48A4-B988-31D2B7355915}" srcOrd="0" destOrd="4" presId="urn:microsoft.com/office/officeart/2005/8/layout/hList1"/>
+    <dgm:cxn modelId="{321AF8F6-D088-416A-8B1B-A872A22ADAA7}" srcId="{32567ED3-AF77-482E-BED1-867AB9B8BA42}" destId="{15290987-4635-47F8-8073-3DE29EA855F2}" srcOrd="3" destOrd="0" parTransId="{5FE46299-2F57-40B8-A16D-7986154B346F}" sibTransId="{FEB9C89D-35B4-4D83-B347-1E3178BC273E}"/>
     <dgm:cxn modelId="{8832CAF9-ADC7-B342-968D-95ECCF12E755}" srcId="{C2263C80-6B39-4390-A426-5BB2D2C97D88}" destId="{B3F908F4-9D59-3C49-AB3D-E1F155B57374}" srcOrd="4" destOrd="0" parTransId="{D6C118C8-48EC-534C-83DA-41A0DEA7F365}" sibTransId="{63B1301C-8C16-514E-8A02-26540747D372}"/>
     <dgm:cxn modelId="{F36C37FD-3E81-B34A-9E19-B083D62B9EA9}" srcId="{D2DD5270-FA56-4206-A038-A4A03737E170}" destId="{D12E2D96-5D3C-A143-8007-0593E789036C}" srcOrd="1" destOrd="0" parTransId="{4419D846-E8E7-7B43-B2B1-9F9E04A74559}" sibTransId="{90478356-3620-F14B-9264-3791FBF6DF9A}"/>
     <dgm:cxn modelId="{68DE05FF-67DE-3A41-B567-BB3A5AA399B5}" srcId="{D2DD5270-FA56-4206-A038-A4A03737E170}" destId="{667DF842-791D-6A41-84DD-CCC80432DFEE}" srcOrd="0" destOrd="0" parTransId="{2AB35F09-0D41-9E49-86D9-27F8CE4852A6}" sibTransId="{D4D05AEB-94EC-3940-87A6-5BD42BFFA73B}"/>
@@ -2485,7 +2666,7 @@
         <a:lstStyle/>
         <a:p>
           <a:r>
-            <a:rPr lang="de-DE">
+            <a:rPr lang="de-DE" dirty="0">
               <a:latin typeface="Calibri" panose="020F0502020204030204" pitchFamily="34" charset="0"/>
               <a:cs typeface="Calibri" panose="020F0502020204030204" pitchFamily="34" charset="0"/>
             </a:rPr>
@@ -2494,11 +2675,11 @@
         </a:p>
         <a:p>
           <a:r>
-            <a:rPr lang="de-DE">
+            <a:rPr lang="de-DE" dirty="0">
               <a:latin typeface="Calibri" panose="020F0502020204030204" pitchFamily="34" charset="0"/>
               <a:cs typeface="Calibri" panose="020F0502020204030204" pitchFamily="34" charset="0"/>
             </a:rPr>
-            <a:t>- Zeitbuffer</a:t>
+            <a:t>- Zeitpuffer</a:t>
           </a:r>
         </a:p>
       </dgm:t>
@@ -2537,19 +2718,22 @@
               <a:latin typeface="Calibri" panose="020F0502020204030204" pitchFamily="34" charset="0"/>
               <a:cs typeface="Calibri" panose="020F0502020204030204" pitchFamily="34" charset="0"/>
             </a:rPr>
-            <a:t>+ </a:t>
+            <a:t>- </a:t>
           </a:r>
           <a:r>
             <a:rPr lang="de-DE" dirty="0" err="1">
               <a:latin typeface="Calibri" panose="020F0502020204030204" pitchFamily="34" charset="0"/>
               <a:cs typeface="Calibri" panose="020F0502020204030204" pitchFamily="34" charset="0"/>
             </a:rPr>
-            <a:t>Junit</a:t>
+            <a:t>JUnit</a:t>
           </a:r>
-          <a:endParaRPr lang="de-DE" dirty="0">
-            <a:latin typeface="Calibri" panose="020F0502020204030204" pitchFamily="34" charset="0"/>
-            <a:cs typeface="Calibri" panose="020F0502020204030204" pitchFamily="34" charset="0"/>
-          </a:endParaRPr>
+          <a:r>
+            <a:rPr lang="de-DE" dirty="0">
+              <a:latin typeface="Calibri" panose="020F0502020204030204" pitchFamily="34" charset="0"/>
+              <a:cs typeface="Calibri" panose="020F0502020204030204" pitchFamily="34" charset="0"/>
+            </a:rPr>
+            <a:t> ist architekturabhängig</a:t>
+          </a:r>
         </a:p>
         <a:p>
           <a:r>
@@ -2619,7 +2803,7 @@
               <a:latin typeface="Calibri" panose="020F0502020204030204" pitchFamily="34" charset="0"/>
               <a:cs typeface="Calibri" panose="020F0502020204030204" pitchFamily="34" charset="0"/>
             </a:rPr>
-            <a:t>+ Prototyps &amp; GUI</a:t>
+            <a:t>+ Prototypen &amp; GUI</a:t>
           </a:r>
         </a:p>
         <a:p>
@@ -2628,7 +2812,7 @@
               <a:latin typeface="Calibri" panose="020F0502020204030204" pitchFamily="34" charset="0"/>
               <a:cs typeface="Calibri" panose="020F0502020204030204" pitchFamily="34" charset="0"/>
             </a:rPr>
-            <a:t>+ Client - Server </a:t>
+            <a:t>- Architektur</a:t>
           </a:r>
         </a:p>
         <a:p>
@@ -2637,7 +2821,7 @@
               <a:latin typeface="Calibri" panose="020F0502020204030204" pitchFamily="34" charset="0"/>
               <a:cs typeface="Calibri" panose="020F0502020204030204" pitchFamily="34" charset="0"/>
             </a:rPr>
-            <a:t>Architektur</a:t>
+            <a:t>+ Sorgfältig coden</a:t>
           </a:r>
         </a:p>
       </dgm:t>
@@ -2672,7 +2856,7 @@
         <a:lstStyle/>
         <a:p>
           <a:r>
-            <a:rPr lang="de-DE">
+            <a:rPr lang="de-DE" dirty="0">
               <a:latin typeface="Calibri" panose="020F0502020204030204" pitchFamily="34" charset="0"/>
               <a:cs typeface="Calibri" panose="020F0502020204030204" pitchFamily="34" charset="0"/>
             </a:rPr>
@@ -2681,12 +2865,46 @@
         </a:p>
         <a:p>
           <a:r>
-            <a:rPr lang="de-DE">
+            <a:rPr lang="de-DE" dirty="0">
               <a:latin typeface="Calibri" panose="020F0502020204030204" pitchFamily="34" charset="0"/>
               <a:cs typeface="Calibri" panose="020F0502020204030204" pitchFamily="34" charset="0"/>
             </a:rPr>
-            <a:t>+ Verteilen &amp; Übernehmen von Aufgaben</a:t>
+            <a:t>+ Aufgabenverteilung</a:t>
           </a:r>
+        </a:p>
+        <a:p>
+          <a:r>
+            <a:rPr lang="de-DE" dirty="0">
+              <a:latin typeface="Calibri" panose="020F0502020204030204" pitchFamily="34" charset="0"/>
+              <a:cs typeface="Calibri" panose="020F0502020204030204" pitchFamily="34" charset="0"/>
+            </a:rPr>
+            <a:t>+ </a:t>
+          </a:r>
+          <a:r>
+            <a:rPr lang="de-DE" dirty="0" err="1">
+              <a:latin typeface="Calibri" panose="020F0502020204030204" pitchFamily="34" charset="0"/>
+              <a:cs typeface="Calibri" panose="020F0502020204030204" pitchFamily="34" charset="0"/>
+            </a:rPr>
+            <a:t>Issues</a:t>
+          </a:r>
+          <a:r>
+            <a:rPr lang="de-DE" dirty="0">
+              <a:latin typeface="Calibri" panose="020F0502020204030204" pitchFamily="34" charset="0"/>
+              <a:cs typeface="Calibri" panose="020F0502020204030204" pitchFamily="34" charset="0"/>
+            </a:rPr>
+            <a:t> in </a:t>
+          </a:r>
+          <a:r>
+            <a:rPr lang="de-DE" dirty="0" err="1">
+              <a:latin typeface="Calibri" panose="020F0502020204030204" pitchFamily="34" charset="0"/>
+              <a:cs typeface="Calibri" panose="020F0502020204030204" pitchFamily="34" charset="0"/>
+            </a:rPr>
+            <a:t>GitLab</a:t>
+          </a:r>
+          <a:endParaRPr lang="de-DE" dirty="0">
+            <a:latin typeface="Calibri" panose="020F0502020204030204" pitchFamily="34" charset="0"/>
+            <a:cs typeface="Calibri" panose="020F0502020204030204" pitchFamily="34" charset="0"/>
+          </a:endParaRPr>
         </a:p>
       </dgm:t>
     </dgm:pt>
@@ -2777,21 +2995,43 @@
         <a:lstStyle/>
         <a:p>
           <a:r>
-            <a:rPr lang="de-DE">
+            <a:rPr lang="de-DE" dirty="0">
               <a:latin typeface="Calibri" panose="020F0502020204030204" pitchFamily="34" charset="0"/>
               <a:cs typeface="Calibri" panose="020F0502020204030204" pitchFamily="34" charset="0"/>
             </a:rPr>
-            <a:t>- Gegenseitig lesen</a:t>
+            <a:t>+ Lesen von Diary und </a:t>
           </a:r>
+          <a:r>
+            <a:rPr lang="de-DE" dirty="0" err="1">
+              <a:latin typeface="Calibri" panose="020F0502020204030204" pitchFamily="34" charset="0"/>
+              <a:cs typeface="Calibri" panose="020F0502020204030204" pitchFamily="34" charset="0"/>
+            </a:rPr>
+            <a:t>Commits</a:t>
+          </a:r>
+          <a:endParaRPr lang="de-DE" dirty="0">
+            <a:latin typeface="Calibri" panose="020F0502020204030204" pitchFamily="34" charset="0"/>
+            <a:cs typeface="Calibri" panose="020F0502020204030204" pitchFamily="34" charset="0"/>
+          </a:endParaRPr>
         </a:p>
         <a:p>
           <a:r>
-            <a:rPr lang="de-DE">
+            <a:rPr lang="de-DE" dirty="0">
               <a:latin typeface="Calibri" panose="020F0502020204030204" pitchFamily="34" charset="0"/>
               <a:cs typeface="Calibri" panose="020F0502020204030204" pitchFamily="34" charset="0"/>
             </a:rPr>
-            <a:t>- Früh starten</a:t>
+            <a:t>+ Pair </a:t>
           </a:r>
+          <a:r>
+            <a:rPr lang="de-DE" dirty="0" err="1">
+              <a:latin typeface="Calibri" panose="020F0502020204030204" pitchFamily="34" charset="0"/>
+              <a:cs typeface="Calibri" panose="020F0502020204030204" pitchFamily="34" charset="0"/>
+            </a:rPr>
+            <a:t>Programming</a:t>
+          </a:r>
+          <a:endParaRPr lang="de-DE" dirty="0">
+            <a:latin typeface="Calibri" panose="020F0502020204030204" pitchFamily="34" charset="0"/>
+            <a:cs typeface="Calibri" panose="020F0502020204030204" pitchFamily="34" charset="0"/>
+          </a:endParaRPr>
         </a:p>
       </dgm:t>
     </dgm:pt>
@@ -2923,9 +3163,9 @@
     <dgm:cxn modelId="{91C6C61A-B901-A94B-A948-88E96A7FD649}" type="presOf" srcId="{58A4CE31-89D7-4960-B794-FCC931506AE8}" destId="{8B1B1BBC-C24B-6646-8DDD-A10D0EEE555D}" srcOrd="0" destOrd="0" presId="urn:microsoft.com/office/officeart/2016/7/layout/RepeatingBendingProcessNew"/>
     <dgm:cxn modelId="{FE83422B-D933-6E40-B7F7-B18DE4C9319E}" type="presOf" srcId="{5AF6C592-FBD5-4B44-8411-A822379C5408}" destId="{E0637F89-11DF-E245-9887-D28D59E934E6}" srcOrd="0" destOrd="0" presId="urn:microsoft.com/office/officeart/2016/7/layout/RepeatingBendingProcessNew"/>
     <dgm:cxn modelId="{AED87F3B-120B-C84F-A2DD-9F0FDAC4BD1B}" type="presOf" srcId="{9E8763A7-0DA5-4F1A-A006-6721BBBDF474}" destId="{F8DB23B1-B6BD-664C-BBDC-E8391D52B4D7}" srcOrd="0" destOrd="0" presId="urn:microsoft.com/office/officeart/2016/7/layout/RepeatingBendingProcessNew"/>
-    <dgm:cxn modelId="{780A8A4C-89E8-784F-A2F8-9BE7A97634F4}" type="presOf" srcId="{0D291144-9BC4-4D56-913F-C54ACBA9DD55}" destId="{E63A4032-1696-484B-BBDD-856E19253FDB}" srcOrd="1" destOrd="0" presId="urn:microsoft.com/office/officeart/2016/7/layout/RepeatingBendingProcessNew"/>
     <dgm:cxn modelId="{7F7E3162-C433-9941-A832-C8D961E3A5A4}" type="presOf" srcId="{ED1F7831-1E81-44FA-BADA-B89C74D4EAD2}" destId="{A2A7A428-6D0A-FB47-8E40-741AE7BB6A10}" srcOrd="0" destOrd="0" presId="urn:microsoft.com/office/officeart/2016/7/layout/RepeatingBendingProcessNew"/>
     <dgm:cxn modelId="{DB9B4F63-4844-4A52-A5B3-8661969F15C1}" srcId="{9751AA1E-9926-4921-95AB-98F55E6D516A}" destId="{4842BE4D-C5D1-4DE1-B196-985D4950C43C}" srcOrd="1" destOrd="0" parTransId="{793F28E0-818C-4FED-A4C6-8BD134AA6D50}" sibTransId="{3BF18C67-2962-4A3B-BC3F-463CD99A55F4}"/>
+    <dgm:cxn modelId="{780A8A4C-89E8-784F-A2F8-9BE7A97634F4}" type="presOf" srcId="{0D291144-9BC4-4D56-913F-C54ACBA9DD55}" destId="{E63A4032-1696-484B-BBDD-856E19253FDB}" srcOrd="1" destOrd="0" presId="urn:microsoft.com/office/officeart/2016/7/layout/RepeatingBendingProcessNew"/>
     <dgm:cxn modelId="{A94C7E7F-F252-AB47-B5C4-5059A986B58A}" type="presOf" srcId="{4D6B4C43-6198-4547-A8A5-0DA87F13E502}" destId="{6E69EAB0-A5B1-7D46-97E1-CD14D3237875}" srcOrd="1" destOrd="0" presId="urn:microsoft.com/office/officeart/2016/7/layout/RepeatingBendingProcessNew"/>
     <dgm:cxn modelId="{891E2892-0DFC-0B40-82E9-85BB8E36AF6F}" type="presOf" srcId="{616933E6-AD4C-4F22-86E2-A4F89A564831}" destId="{A66699A4-B3E9-0248-8DC8-974F17034C6F}" srcOrd="0" destOrd="0" presId="urn:microsoft.com/office/officeart/2016/7/layout/RepeatingBendingProcessNew"/>
     <dgm:cxn modelId="{ECDFB494-5830-0D47-8763-C5FB1CD693C2}" type="presOf" srcId="{0D291144-9BC4-4D56-913F-C54ACBA9DD55}" destId="{9F90BCD2-6EBE-CE4F-AB1B-F1725DFFF76C}" srcOrd="0" destOrd="0" presId="urn:microsoft.com/office/officeart/2016/7/layout/RepeatingBendingProcessNew"/>
@@ -2984,7 +3224,7 @@
       <dsp:spPr>
         <a:xfrm>
           <a:off x="30533" y="0"/>
-          <a:ext cx="2928656" cy="339427"/>
+          <a:ext cx="2928656" cy="169713"/>
         </a:xfrm>
         <a:prstGeom prst="rect">
           <a:avLst/>
@@ -3043,21 +3283,17 @@
             <a:buNone/>
           </a:pPr>
           <a:r>
-            <a:rPr lang="de-DE" sz="1800" kern="1200">
+            <a:rPr lang="de-DE" sz="1800" kern="1200" dirty="0">
               <a:latin typeface="Calibri" panose="020F0502020204030204" pitchFamily="34" charset="0"/>
               <a:cs typeface="Calibri" panose="020F0502020204030204" pitchFamily="34" charset="0"/>
             </a:rPr>
-            <a:t>Per Button</a:t>
+            <a:t>Steuerung per Button</a:t>
           </a:r>
-          <a:endParaRPr lang="de-DE" sz="1800" kern="1200" dirty="0">
-            <a:latin typeface="Calibri" panose="020F0502020204030204" pitchFamily="34" charset="0"/>
-            <a:cs typeface="Calibri" panose="020F0502020204030204" pitchFamily="34" charset="0"/>
-          </a:endParaRPr>
         </a:p>
       </dsp:txBody>
       <dsp:txXfrm>
         <a:off x="30533" y="0"/>
-        <a:ext cx="2928656" cy="339427"/>
+        <a:ext cx="2928656" cy="169713"/>
       </dsp:txXfrm>
     </dsp:sp>
     <dsp:sp modelId="{81C14F67-E933-49AE-BC5C-B2B56264D657}">
@@ -3067,8 +3303,8 @@
       </dsp:nvSpPr>
       <dsp:spPr>
         <a:xfrm>
-          <a:off x="0" y="435665"/>
-          <a:ext cx="2928656" cy="1500142"/>
+          <a:off x="0" y="218426"/>
+          <a:ext cx="2928656" cy="2009340"/>
         </a:xfrm>
         <a:prstGeom prst="rect">
           <a:avLst/>
@@ -3154,16 +3390,12 @@
             <a:buChar char="•"/>
           </a:pPr>
           <a:r>
-            <a:rPr lang="de-DE" sz="1600" kern="1200">
+            <a:rPr lang="de-DE" sz="1600" kern="1200" dirty="0">
               <a:latin typeface="Calibri" panose="020F0502020204030204" pitchFamily="34" charset="0"/>
               <a:cs typeface="Calibri" panose="020F0502020204030204" pitchFamily="34" charset="0"/>
             </a:rPr>
             <a:t>Change Username</a:t>
           </a:r>
-          <a:endParaRPr lang="de-DE" sz="1600" kern="1200" dirty="0">
-            <a:latin typeface="Calibri" panose="020F0502020204030204" pitchFamily="34" charset="0"/>
-            <a:cs typeface="Calibri" panose="020F0502020204030204" pitchFamily="34" charset="0"/>
-          </a:endParaRPr>
         </a:p>
         <a:p>
           <a:pPr marL="171450" lvl="1" indent="-171450" algn="l" defTabSz="711200">
@@ -3179,16 +3411,12 @@
             <a:buChar char="•"/>
           </a:pPr>
           <a:r>
-            <a:rPr lang="de-DE" sz="1600" kern="1200">
+            <a:rPr lang="de-DE" sz="1600" kern="1200" dirty="0">
               <a:latin typeface="Calibri" panose="020F0502020204030204" pitchFamily="34" charset="0"/>
               <a:cs typeface="Calibri" panose="020F0502020204030204" pitchFamily="34" charset="0"/>
             </a:rPr>
             <a:t>Infos zum Game</a:t>
           </a:r>
-          <a:endParaRPr lang="de-DE" sz="1600" kern="1200" dirty="0">
-            <a:latin typeface="Calibri" panose="020F0502020204030204" pitchFamily="34" charset="0"/>
-            <a:cs typeface="Calibri" panose="020F0502020204030204" pitchFamily="34" charset="0"/>
-          </a:endParaRPr>
         </a:p>
         <a:p>
           <a:pPr marL="171450" lvl="1" indent="-171450" algn="l" defTabSz="711200">
@@ -3229,21 +3457,59 @@
             <a:buChar char="•"/>
           </a:pPr>
           <a:r>
-            <a:rPr lang="de-DE" sz="1600" kern="1200">
+            <a:rPr lang="de-DE" sz="1600" kern="1200" dirty="0">
               <a:latin typeface="Calibri" panose="020F0502020204030204" pitchFamily="34" charset="0"/>
               <a:cs typeface="Calibri" panose="020F0502020204030204" pitchFamily="34" charset="0"/>
             </a:rPr>
             <a:t>Logout</a:t>
           </a:r>
-          <a:endParaRPr lang="de-DE" sz="1600" kern="1200" dirty="0">
-            <a:latin typeface="Calibri" panose="020F0502020204030204" pitchFamily="34" charset="0"/>
-            <a:cs typeface="Calibri" panose="020F0502020204030204" pitchFamily="34" charset="0"/>
-          </a:endParaRPr>
+        </a:p>
+        <a:p>
+          <a:pPr marL="171450" lvl="1" indent="-171450" algn="l" defTabSz="711200">
+            <a:lnSpc>
+              <a:spcPct val="90000"/>
+            </a:lnSpc>
+            <a:spcBef>
+              <a:spcPct val="0"/>
+            </a:spcBef>
+            <a:spcAft>
+              <a:spcPct val="15000"/>
+            </a:spcAft>
+            <a:buChar char="•"/>
+          </a:pPr>
+          <a:r>
+            <a:rPr lang="de-DE" sz="1600" kern="1200" dirty="0">
+              <a:latin typeface="Calibri" panose="020F0502020204030204" pitchFamily="34" charset="0"/>
+              <a:cs typeface="Calibri" panose="020F0502020204030204" pitchFamily="34" charset="0"/>
+            </a:rPr>
+            <a:t>Soundsteuerung</a:t>
+          </a:r>
+        </a:p>
+        <a:p>
+          <a:pPr marL="171450" lvl="1" indent="-171450" algn="l" defTabSz="711200">
+            <a:lnSpc>
+              <a:spcPct val="90000"/>
+            </a:lnSpc>
+            <a:spcBef>
+              <a:spcPct val="0"/>
+            </a:spcBef>
+            <a:spcAft>
+              <a:spcPct val="15000"/>
+            </a:spcAft>
+            <a:buChar char="•"/>
+          </a:pPr>
+          <a:r>
+            <a:rPr lang="de-DE" sz="1600" kern="1200" dirty="0">
+              <a:latin typeface="Calibri" panose="020F0502020204030204" pitchFamily="34" charset="0"/>
+              <a:cs typeface="Calibri" panose="020F0502020204030204" pitchFamily="34" charset="0"/>
+            </a:rPr>
+            <a:t>Gameplay-Video</a:t>
+          </a:r>
         </a:p>
       </dsp:txBody>
       <dsp:txXfrm>
-        <a:off x="0" y="435665"/>
-        <a:ext cx="2928656" cy="1500142"/>
+        <a:off x="0" y="218426"/>
+        <a:ext cx="2928656" cy="2009340"/>
       </dsp:txXfrm>
     </dsp:sp>
     <dsp:sp modelId="{82754283-C103-4F4B-949A-ED587806CE44}">
@@ -3254,7 +3520,7 @@
       <dsp:spPr>
         <a:xfrm>
           <a:off x="3342257" y="0"/>
-          <a:ext cx="2928656" cy="339427"/>
+          <a:ext cx="2928656" cy="169713"/>
         </a:xfrm>
         <a:prstGeom prst="rect">
           <a:avLst/>
@@ -3313,21 +3579,17 @@
             <a:buNone/>
           </a:pPr>
           <a:r>
-            <a:rPr lang="de-DE" sz="1800" kern="1200">
+            <a:rPr lang="de-DE" sz="1800" kern="1200" dirty="0">
               <a:latin typeface="Calibri" panose="020F0502020204030204" pitchFamily="34" charset="0"/>
               <a:cs typeface="Calibri" panose="020F0502020204030204" pitchFamily="34" charset="0"/>
             </a:rPr>
-            <a:t>Visuell</a:t>
+            <a:t>GUI</a:t>
           </a:r>
-          <a:endParaRPr lang="de-DE" sz="1800" kern="1200" dirty="0">
-            <a:latin typeface="Calibri" panose="020F0502020204030204" pitchFamily="34" charset="0"/>
-            <a:cs typeface="Calibri" panose="020F0502020204030204" pitchFamily="34" charset="0"/>
-          </a:endParaRPr>
         </a:p>
       </dsp:txBody>
       <dsp:txXfrm>
         <a:off x="3342257" y="0"/>
-        <a:ext cx="2928656" cy="339427"/>
+        <a:ext cx="2928656" cy="169713"/>
       </dsp:txXfrm>
     </dsp:sp>
     <dsp:sp modelId="{EC299A1D-5E47-48A4-B988-31D2B7355915}">
@@ -3337,8 +3599,8 @@
       </dsp:nvSpPr>
       <dsp:spPr>
         <a:xfrm>
-          <a:off x="3342257" y="435665"/>
-          <a:ext cx="2928656" cy="1500142"/>
+          <a:off x="3342257" y="218426"/>
+          <a:ext cx="2928656" cy="2009340"/>
         </a:xfrm>
         <a:prstGeom prst="rect">
           <a:avLst/>
@@ -3424,16 +3686,12 @@
             <a:buChar char="•"/>
           </a:pPr>
           <a:r>
-            <a:rPr lang="de-DE" sz="1600" kern="1200">
+            <a:rPr lang="de-DE" sz="1600" kern="1200" dirty="0">
               <a:latin typeface="Calibri" panose="020F0502020204030204" pitchFamily="34" charset="0"/>
               <a:cs typeface="Calibri" panose="020F0502020204030204" pitchFamily="34" charset="0"/>
             </a:rPr>
             <a:t>Chat</a:t>
           </a:r>
-          <a:endParaRPr lang="de-DE" sz="1600" kern="1200" dirty="0">
-            <a:latin typeface="Calibri" panose="020F0502020204030204" pitchFamily="34" charset="0"/>
-            <a:cs typeface="Calibri" panose="020F0502020204030204" pitchFamily="34" charset="0"/>
-          </a:endParaRPr>
         </a:p>
         <a:p>
           <a:pPr marL="171450" lvl="1" indent="-171450" algn="l" defTabSz="711200">
@@ -3449,21 +3707,59 @@
             <a:buChar char="•"/>
           </a:pPr>
           <a:r>
-            <a:rPr lang="de-DE" sz="1600" kern="1200">
+            <a:rPr lang="de-DE" sz="1600" kern="1200" dirty="0">
               <a:latin typeface="Calibri" panose="020F0502020204030204" pitchFamily="34" charset="0"/>
               <a:cs typeface="Calibri" panose="020F0502020204030204" pitchFamily="34" charset="0"/>
             </a:rPr>
             <a:t>Highscore</a:t>
           </a:r>
-          <a:endParaRPr lang="de-DE" sz="1600" kern="1200" dirty="0">
-            <a:latin typeface="Calibri" panose="020F0502020204030204" pitchFamily="34" charset="0"/>
-            <a:cs typeface="Calibri" panose="020F0502020204030204" pitchFamily="34" charset="0"/>
-          </a:endParaRPr>
+        </a:p>
+        <a:p>
+          <a:pPr marL="171450" lvl="1" indent="-171450" algn="l" defTabSz="711200">
+            <a:lnSpc>
+              <a:spcPct val="90000"/>
+            </a:lnSpc>
+            <a:spcBef>
+              <a:spcPct val="0"/>
+            </a:spcBef>
+            <a:spcAft>
+              <a:spcPct val="15000"/>
+            </a:spcAft>
+            <a:buChar char="•"/>
+          </a:pPr>
+          <a:r>
+            <a:rPr lang="de-DE" sz="1600" kern="1200" dirty="0">
+              <a:latin typeface="Calibri" panose="020F0502020204030204" pitchFamily="34" charset="0"/>
+              <a:cs typeface="Calibri" panose="020F0502020204030204" pitchFamily="34" charset="0"/>
+            </a:rPr>
+            <a:t>Playerlist</a:t>
+          </a:r>
+        </a:p>
+        <a:p>
+          <a:pPr marL="171450" lvl="1" indent="-171450" algn="l" defTabSz="711200">
+            <a:lnSpc>
+              <a:spcPct val="90000"/>
+            </a:lnSpc>
+            <a:spcBef>
+              <a:spcPct val="0"/>
+            </a:spcBef>
+            <a:spcAft>
+              <a:spcPct val="15000"/>
+            </a:spcAft>
+            <a:buChar char="•"/>
+          </a:pPr>
+          <a:r>
+            <a:rPr lang="de-DE" sz="1600" kern="1200" dirty="0">
+              <a:latin typeface="Calibri" panose="020F0502020204030204" pitchFamily="34" charset="0"/>
+              <a:cs typeface="Calibri" panose="020F0502020204030204" pitchFamily="34" charset="0"/>
+            </a:rPr>
+            <a:t>Lobbylist</a:t>
+          </a:r>
         </a:p>
       </dsp:txBody>
       <dsp:txXfrm>
-        <a:off x="3342257" y="435665"/>
-        <a:ext cx="2928656" cy="1500142"/>
+        <a:off x="3342257" y="218426"/>
+        <a:ext cx="2928656" cy="2009340"/>
       </dsp:txXfrm>
     </dsp:sp>
     <dsp:sp modelId="{0CC623B2-3A59-4916-AEC2-21E47CA2B7D6}">
@@ -3473,8 +3769,8 @@
       </dsp:nvSpPr>
       <dsp:spPr>
         <a:xfrm>
-          <a:off x="6683343" y="11034"/>
-          <a:ext cx="2928656" cy="339427"/>
+          <a:off x="6683343" y="0"/>
+          <a:ext cx="2928656" cy="169713"/>
         </a:xfrm>
         <a:prstGeom prst="rect">
           <a:avLst/>
@@ -3533,21 +3829,17 @@
             <a:buNone/>
           </a:pPr>
           <a:r>
-            <a:rPr lang="de-DE" sz="1800" kern="1200">
+            <a:rPr lang="de-DE" sz="1800" kern="1200" dirty="0">
               <a:latin typeface="Calibri" panose="020F0502020204030204" pitchFamily="34" charset="0"/>
               <a:cs typeface="Calibri" panose="020F0502020204030204" pitchFamily="34" charset="0"/>
             </a:rPr>
-            <a:t>Tastatur</a:t>
+            <a:t> Steuerung per Tastatur</a:t>
           </a:r>
-          <a:endParaRPr lang="de-DE" sz="1800" kern="1200" dirty="0">
-            <a:latin typeface="Calibri" panose="020F0502020204030204" pitchFamily="34" charset="0"/>
-            <a:cs typeface="Calibri" panose="020F0502020204030204" pitchFamily="34" charset="0"/>
-          </a:endParaRPr>
         </a:p>
       </dsp:txBody>
       <dsp:txXfrm>
-        <a:off x="6683343" y="11034"/>
-        <a:ext cx="2928656" cy="339427"/>
+        <a:off x="6683343" y="0"/>
+        <a:ext cx="2928656" cy="169713"/>
       </dsp:txXfrm>
     </dsp:sp>
     <dsp:sp modelId="{19EAB99B-3F3C-4C08-9787-48351BC7F651}">
@@ -3557,8 +3849,8 @@
       </dsp:nvSpPr>
       <dsp:spPr>
         <a:xfrm>
-          <a:off x="6683343" y="435665"/>
-          <a:ext cx="2928656" cy="1500142"/>
+          <a:off x="6683343" y="218426"/>
+          <a:ext cx="2928656" cy="2009340"/>
         </a:xfrm>
         <a:prstGeom prst="rect">
           <a:avLst/>
@@ -3722,11 +4014,39 @@
             <a:buChar char="•"/>
           </a:pPr>
           <a:r>
-            <a:rPr lang="de-DE" sz="1600" kern="1200">
+            <a:rPr lang="de-DE" sz="1600" kern="1200" dirty="0" err="1">
               <a:latin typeface="Calibri" panose="020F0502020204030204" pitchFamily="34" charset="0"/>
               <a:cs typeface="Calibri" panose="020F0502020204030204" pitchFamily="34" charset="0"/>
             </a:rPr>
-            <a:t>Throw a Card</a:t>
+            <a:t>Throw</a:t>
+          </a:r>
+          <a:r>
+            <a:rPr lang="de-DE" sz="1600" kern="1200" dirty="0">
+              <a:latin typeface="Calibri" panose="020F0502020204030204" pitchFamily="34" charset="0"/>
+              <a:cs typeface="Calibri" panose="020F0502020204030204" pitchFamily="34" charset="0"/>
+            </a:rPr>
+            <a:t> a Card</a:t>
+          </a:r>
+        </a:p>
+        <a:p>
+          <a:pPr marL="171450" lvl="1" indent="-171450" algn="l" defTabSz="711200">
+            <a:lnSpc>
+              <a:spcPct val="90000"/>
+            </a:lnSpc>
+            <a:spcBef>
+              <a:spcPct val="0"/>
+            </a:spcBef>
+            <a:spcAft>
+              <a:spcPct val="15000"/>
+            </a:spcAft>
+            <a:buChar char="•"/>
+          </a:pPr>
+          <a:r>
+            <a:rPr lang="de-DE" sz="1600" kern="1200" dirty="0" err="1">
+              <a:latin typeface="Calibri" panose="020F0502020204030204" pitchFamily="34" charset="0"/>
+              <a:cs typeface="Calibri" panose="020F0502020204030204" pitchFamily="34" charset="0"/>
+            </a:rPr>
+            <a:t>Cheaten</a:t>
           </a:r>
           <a:endParaRPr lang="de-DE" sz="1600" kern="1200" dirty="0">
             <a:latin typeface="Calibri" panose="020F0502020204030204" pitchFamily="34" charset="0"/>
@@ -3735,8 +4055,8 @@
         </a:p>
       </dsp:txBody>
       <dsp:txXfrm>
-        <a:off x="6683343" y="435665"/>
-        <a:ext cx="2928656" cy="1500142"/>
+        <a:off x="6683343" y="218426"/>
+        <a:ext cx="2928656" cy="2009340"/>
       </dsp:txXfrm>
     </dsp:sp>
   </dsp:spTree>
@@ -3758,8 +4078,8 @@
       </dsp:nvSpPr>
       <dsp:spPr>
         <a:xfrm>
-          <a:off x="2026271" y="481982"/>
-          <a:ext cx="372543" cy="91440"/>
+          <a:off x="1997976" y="828412"/>
+          <a:ext cx="429133" cy="91440"/>
         </a:xfrm>
         <a:custGeom>
           <a:avLst/>
@@ -3773,7 +4093,7 @@
                 <a:pt x="0" y="45720"/>
               </a:moveTo>
               <a:lnTo>
-                <a:pt x="372543" y="45720"/>
+                <a:pt x="429133" y="45720"/>
               </a:lnTo>
             </a:path>
           </a:pathLst>
@@ -3827,8 +4147,8 @@
         </a:p>
       </dsp:txBody>
       <dsp:txXfrm>
-        <a:off x="2202464" y="525686"/>
-        <a:ext cx="20157" cy="4031"/>
+        <a:off x="2201050" y="871834"/>
+        <a:ext cx="22986" cy="4597"/>
       </dsp:txXfrm>
     </dsp:sp>
     <dsp:sp modelId="{F8DB23B1-B6BD-664C-BBDC-E8391D52B4D7}">
@@ -3838,8 +4158,8 @@
       </dsp:nvSpPr>
       <dsp:spPr>
         <a:xfrm>
-          <a:off x="275276" y="1863"/>
-          <a:ext cx="1752795" cy="1051677"/>
+          <a:off x="936" y="274480"/>
+          <a:ext cx="1998840" cy="1199304"/>
         </a:xfrm>
         <a:prstGeom prst="rect">
           <a:avLst/>
@@ -3897,7 +4217,7 @@
         </a:fontRef>
       </dsp:style>
       <dsp:txBody>
-        <a:bodyPr spcFirstLastPara="0" vert="horz" wrap="square" lIns="85888" tIns="90155" rIns="85888" bIns="90155" numCol="1" spcCol="1270" anchor="ctr" anchorCtr="0">
+        <a:bodyPr spcFirstLastPara="0" vert="horz" wrap="square" lIns="97945" tIns="102810" rIns="97945" bIns="102810" numCol="1" spcCol="1270" anchor="ctr" anchorCtr="0">
           <a:noAutofit/>
         </a:bodyPr>
         <a:lstStyle/>
@@ -3915,7 +4235,7 @@
             <a:buNone/>
           </a:pPr>
           <a:r>
-            <a:rPr lang="de-DE" sz="1400" kern="1200">
+            <a:rPr lang="de-DE" sz="1400" kern="1200" dirty="0">
               <a:latin typeface="Calibri" panose="020F0502020204030204" pitchFamily="34" charset="0"/>
               <a:cs typeface="Calibri" panose="020F0502020204030204" pitchFamily="34" charset="0"/>
             </a:rPr>
@@ -3936,17 +4256,17 @@
             <a:buNone/>
           </a:pPr>
           <a:r>
-            <a:rPr lang="de-DE" sz="1400" kern="1200">
+            <a:rPr lang="de-DE" sz="1400" kern="1200" dirty="0">
               <a:latin typeface="Calibri" panose="020F0502020204030204" pitchFamily="34" charset="0"/>
               <a:cs typeface="Calibri" panose="020F0502020204030204" pitchFamily="34" charset="0"/>
             </a:rPr>
-            <a:t>- Zeitbuffer</a:t>
+            <a:t>- Zeitpuffer</a:t>
           </a:r>
         </a:p>
       </dsp:txBody>
       <dsp:txXfrm>
-        <a:off x="275276" y="1863"/>
-        <a:ext cx="1752795" cy="1051677"/>
+        <a:off x="936" y="274480"/>
+        <a:ext cx="1998840" cy="1199304"/>
       </dsp:txXfrm>
     </dsp:sp>
     <dsp:sp modelId="{706D5F0D-EE0F-7043-BF5E-A584B37A8B9D}">
@@ -3956,8 +4276,8 @@
       </dsp:nvSpPr>
       <dsp:spPr>
         <a:xfrm>
-          <a:off x="1151674" y="1051741"/>
-          <a:ext cx="2155938" cy="372543"/>
+          <a:off x="1000356" y="1471985"/>
+          <a:ext cx="2458573" cy="429133"/>
         </a:xfrm>
         <a:custGeom>
           <a:avLst/>
@@ -3968,16 +4288,16 @@
           <a:pathLst>
             <a:path>
               <a:moveTo>
-                <a:pt x="2155938" y="0"/>
+                <a:pt x="2458573" y="0"/>
               </a:moveTo>
               <a:lnTo>
-                <a:pt x="2155938" y="203371"/>
+                <a:pt x="2458573" y="231666"/>
               </a:lnTo>
               <a:lnTo>
-                <a:pt x="0" y="203371"/>
+                <a:pt x="0" y="231666"/>
               </a:lnTo>
               <a:lnTo>
-                <a:pt x="0" y="372543"/>
+                <a:pt x="0" y="429133"/>
               </a:lnTo>
             </a:path>
           </a:pathLst>
@@ -4031,8 +4351,8 @@
         </a:p>
       </dsp:txBody>
       <dsp:txXfrm>
-        <a:off x="2174810" y="1235996"/>
-        <a:ext cx="109665" cy="4031"/>
+        <a:off x="2167113" y="1684253"/>
+        <a:ext cx="125059" cy="4597"/>
       </dsp:txXfrm>
     </dsp:sp>
     <dsp:sp modelId="{8655B1E3-4EA0-5A4E-A531-E967873CAC06}">
@@ -4042,8 +4362,8 @@
       </dsp:nvSpPr>
       <dsp:spPr>
         <a:xfrm>
-          <a:off x="2431215" y="1863"/>
-          <a:ext cx="1752795" cy="1051677"/>
+          <a:off x="2459510" y="274480"/>
+          <a:ext cx="1998840" cy="1199304"/>
         </a:xfrm>
         <a:prstGeom prst="rect">
           <a:avLst/>
@@ -4101,7 +4421,7 @@
         </a:fontRef>
       </dsp:style>
       <dsp:txBody>
-        <a:bodyPr spcFirstLastPara="0" vert="horz" wrap="square" lIns="85888" tIns="90155" rIns="85888" bIns="90155" numCol="1" spcCol="1270" anchor="ctr" anchorCtr="0">
+        <a:bodyPr spcFirstLastPara="0" vert="horz" wrap="square" lIns="97945" tIns="102810" rIns="97945" bIns="102810" numCol="1" spcCol="1270" anchor="ctr" anchorCtr="0">
           <a:noAutofit/>
         </a:bodyPr>
         <a:lstStyle/>
@@ -4123,19 +4443,22 @@
               <a:latin typeface="Calibri" panose="020F0502020204030204" pitchFamily="34" charset="0"/>
               <a:cs typeface="Calibri" panose="020F0502020204030204" pitchFamily="34" charset="0"/>
             </a:rPr>
-            <a:t>+ </a:t>
+            <a:t>- </a:t>
           </a:r>
           <a:r>
             <a:rPr lang="de-DE" sz="1400" kern="1200" dirty="0" err="1">
               <a:latin typeface="Calibri" panose="020F0502020204030204" pitchFamily="34" charset="0"/>
               <a:cs typeface="Calibri" panose="020F0502020204030204" pitchFamily="34" charset="0"/>
             </a:rPr>
-            <a:t>Junit</a:t>
+            <a:t>JUnit</a:t>
           </a:r>
-          <a:endParaRPr lang="de-DE" sz="1400" kern="1200" dirty="0">
-            <a:latin typeface="Calibri" panose="020F0502020204030204" pitchFamily="34" charset="0"/>
-            <a:cs typeface="Calibri" panose="020F0502020204030204" pitchFamily="34" charset="0"/>
-          </a:endParaRPr>
+          <a:r>
+            <a:rPr lang="de-DE" sz="1400" kern="1200" dirty="0">
+              <a:latin typeface="Calibri" panose="020F0502020204030204" pitchFamily="34" charset="0"/>
+              <a:cs typeface="Calibri" panose="020F0502020204030204" pitchFamily="34" charset="0"/>
+            </a:rPr>
+            <a:t> ist architekturabhängig</a:t>
+          </a:r>
         </a:p>
         <a:p>
           <a:pPr marL="0" lvl="0" indent="0" algn="ctr" defTabSz="622300">
@@ -4195,8 +4518,8 @@
         </a:p>
       </dsp:txBody>
       <dsp:txXfrm>
-        <a:off x="2431215" y="1863"/>
-        <a:ext cx="1752795" cy="1051677"/>
+        <a:off x="2459510" y="274480"/>
+        <a:ext cx="1998840" cy="1199304"/>
       </dsp:txXfrm>
     </dsp:sp>
     <dsp:sp modelId="{A66699A4-B3E9-0248-8DC8-974F17034C6F}">
@@ -4206,8 +4529,8 @@
       </dsp:nvSpPr>
       <dsp:spPr>
         <a:xfrm>
-          <a:off x="2026271" y="1936803"/>
-          <a:ext cx="372543" cy="91440"/>
+          <a:off x="1997976" y="2487450"/>
+          <a:ext cx="429133" cy="91440"/>
         </a:xfrm>
         <a:custGeom>
           <a:avLst/>
@@ -4221,7 +4544,7 @@
                 <a:pt x="0" y="45720"/>
               </a:moveTo>
               <a:lnTo>
-                <a:pt x="372543" y="45720"/>
+                <a:pt x="429133" y="45720"/>
               </a:lnTo>
             </a:path>
           </a:pathLst>
@@ -4275,8 +4598,8 @@
         </a:p>
       </dsp:txBody>
       <dsp:txXfrm>
-        <a:off x="2202464" y="1980507"/>
-        <a:ext cx="20157" cy="4031"/>
+        <a:off x="2201050" y="2530871"/>
+        <a:ext cx="22986" cy="4597"/>
       </dsp:txXfrm>
     </dsp:sp>
     <dsp:sp modelId="{8B1B1BBC-C24B-6646-8DDD-A10D0EEE555D}">
@@ -4286,8 +4609,8 @@
       </dsp:nvSpPr>
       <dsp:spPr>
         <a:xfrm>
-          <a:off x="275276" y="1456684"/>
-          <a:ext cx="1752795" cy="1051677"/>
+          <a:off x="936" y="1933518"/>
+          <a:ext cx="1998840" cy="1199304"/>
         </a:xfrm>
         <a:prstGeom prst="rect">
           <a:avLst/>
@@ -4345,7 +4668,7 @@
         </a:fontRef>
       </dsp:style>
       <dsp:txBody>
-        <a:bodyPr spcFirstLastPara="0" vert="horz" wrap="square" lIns="85888" tIns="90155" rIns="85888" bIns="90155" numCol="1" spcCol="1270" anchor="ctr" anchorCtr="0">
+        <a:bodyPr spcFirstLastPara="0" vert="horz" wrap="square" lIns="97945" tIns="102810" rIns="97945" bIns="102810" numCol="1" spcCol="1270" anchor="ctr" anchorCtr="0">
           <a:noAutofit/>
         </a:bodyPr>
         <a:lstStyle/>
@@ -4367,7 +4690,7 @@
               <a:latin typeface="Calibri" panose="020F0502020204030204" pitchFamily="34" charset="0"/>
               <a:cs typeface="Calibri" panose="020F0502020204030204" pitchFamily="34" charset="0"/>
             </a:rPr>
-            <a:t>+ Prototyps &amp; GUI</a:t>
+            <a:t>+ Prototypen &amp; GUI</a:t>
           </a:r>
         </a:p>
         <a:p>
@@ -4388,7 +4711,7 @@
               <a:latin typeface="Calibri" panose="020F0502020204030204" pitchFamily="34" charset="0"/>
               <a:cs typeface="Calibri" panose="020F0502020204030204" pitchFamily="34" charset="0"/>
             </a:rPr>
-            <a:t>+ Client - Server </a:t>
+            <a:t>- Architektur</a:t>
           </a:r>
         </a:p>
         <a:p>
@@ -4409,13 +4732,13 @@
               <a:latin typeface="Calibri" panose="020F0502020204030204" pitchFamily="34" charset="0"/>
               <a:cs typeface="Calibri" panose="020F0502020204030204" pitchFamily="34" charset="0"/>
             </a:rPr>
-            <a:t>Architektur</a:t>
+            <a:t>+ Sorgfältig coden</a:t>
           </a:r>
         </a:p>
       </dsp:txBody>
       <dsp:txXfrm>
-        <a:off x="275276" y="1456684"/>
-        <a:ext cx="1752795" cy="1051677"/>
+        <a:off x="936" y="1933518"/>
+        <a:ext cx="1998840" cy="1199304"/>
       </dsp:txXfrm>
     </dsp:sp>
     <dsp:sp modelId="{F2D4E107-259B-3748-8A6F-4020C8EF763F}">
@@ -4425,8 +4748,8 @@
       </dsp:nvSpPr>
       <dsp:spPr>
         <a:xfrm>
-          <a:off x="1151674" y="2506561"/>
-          <a:ext cx="2155938" cy="372543"/>
+          <a:off x="1000356" y="3131022"/>
+          <a:ext cx="2458573" cy="429133"/>
         </a:xfrm>
         <a:custGeom>
           <a:avLst/>
@@ -4437,16 +4760,16 @@
           <a:pathLst>
             <a:path>
               <a:moveTo>
-                <a:pt x="2155938" y="0"/>
+                <a:pt x="2458573" y="0"/>
               </a:moveTo>
               <a:lnTo>
-                <a:pt x="2155938" y="203371"/>
+                <a:pt x="2458573" y="231666"/>
               </a:lnTo>
               <a:lnTo>
-                <a:pt x="0" y="203371"/>
+                <a:pt x="0" y="231666"/>
               </a:lnTo>
               <a:lnTo>
-                <a:pt x="0" y="372543"/>
+                <a:pt x="0" y="429133"/>
               </a:lnTo>
             </a:path>
           </a:pathLst>
@@ -4500,8 +4823,8 @@
         </a:p>
       </dsp:txBody>
       <dsp:txXfrm>
-        <a:off x="2174810" y="2690817"/>
-        <a:ext cx="109665" cy="4031"/>
+        <a:off x="2167113" y="3343290"/>
+        <a:ext cx="125059" cy="4597"/>
       </dsp:txXfrm>
     </dsp:sp>
     <dsp:sp modelId="{94E74EDD-442B-434A-98BA-B80DADDE2888}">
@@ -4511,8 +4834,8 @@
       </dsp:nvSpPr>
       <dsp:spPr>
         <a:xfrm>
-          <a:off x="2431215" y="1456684"/>
-          <a:ext cx="1752795" cy="1051677"/>
+          <a:off x="2459510" y="1933518"/>
+          <a:ext cx="1998840" cy="1199304"/>
         </a:xfrm>
         <a:prstGeom prst="rect">
           <a:avLst/>
@@ -4570,7 +4893,7 @@
         </a:fontRef>
       </dsp:style>
       <dsp:txBody>
-        <a:bodyPr spcFirstLastPara="0" vert="horz" wrap="square" lIns="85888" tIns="90155" rIns="85888" bIns="90155" numCol="1" spcCol="1270" anchor="ctr" anchorCtr="0">
+        <a:bodyPr spcFirstLastPara="0" vert="horz" wrap="square" lIns="97945" tIns="102810" rIns="97945" bIns="102810" numCol="1" spcCol="1270" anchor="ctr" anchorCtr="0">
           <a:noAutofit/>
         </a:bodyPr>
         <a:lstStyle/>
@@ -4588,7 +4911,7 @@
             <a:buNone/>
           </a:pPr>
           <a:r>
-            <a:rPr lang="de-DE" sz="1400" kern="1200">
+            <a:rPr lang="de-DE" sz="1400" kern="1200" dirty="0">
               <a:latin typeface="Calibri" panose="020F0502020204030204" pitchFamily="34" charset="0"/>
               <a:cs typeface="Calibri" panose="020F0502020204030204" pitchFamily="34" charset="0"/>
             </a:rPr>
@@ -4609,17 +4932,63 @@
             <a:buNone/>
           </a:pPr>
           <a:r>
-            <a:rPr lang="de-DE" sz="1400" kern="1200">
+            <a:rPr lang="de-DE" sz="1400" kern="1200" dirty="0">
               <a:latin typeface="Calibri" panose="020F0502020204030204" pitchFamily="34" charset="0"/>
               <a:cs typeface="Calibri" panose="020F0502020204030204" pitchFamily="34" charset="0"/>
             </a:rPr>
-            <a:t>+ Verteilen &amp; Übernehmen von Aufgaben</a:t>
+            <a:t>+ Aufgabenverteilung</a:t>
           </a:r>
+        </a:p>
+        <a:p>
+          <a:pPr marL="0" lvl="0" indent="0" algn="ctr" defTabSz="622300">
+            <a:lnSpc>
+              <a:spcPct val="90000"/>
+            </a:lnSpc>
+            <a:spcBef>
+              <a:spcPct val="0"/>
+            </a:spcBef>
+            <a:spcAft>
+              <a:spcPct val="35000"/>
+            </a:spcAft>
+            <a:buNone/>
+          </a:pPr>
+          <a:r>
+            <a:rPr lang="de-DE" sz="1400" kern="1200" dirty="0">
+              <a:latin typeface="Calibri" panose="020F0502020204030204" pitchFamily="34" charset="0"/>
+              <a:cs typeface="Calibri" panose="020F0502020204030204" pitchFamily="34" charset="0"/>
+            </a:rPr>
+            <a:t>+ </a:t>
+          </a:r>
+          <a:r>
+            <a:rPr lang="de-DE" sz="1400" kern="1200" dirty="0" err="1">
+              <a:latin typeface="Calibri" panose="020F0502020204030204" pitchFamily="34" charset="0"/>
+              <a:cs typeface="Calibri" panose="020F0502020204030204" pitchFamily="34" charset="0"/>
+            </a:rPr>
+            <a:t>Issues</a:t>
+          </a:r>
+          <a:r>
+            <a:rPr lang="de-DE" sz="1400" kern="1200" dirty="0">
+              <a:latin typeface="Calibri" panose="020F0502020204030204" pitchFamily="34" charset="0"/>
+              <a:cs typeface="Calibri" panose="020F0502020204030204" pitchFamily="34" charset="0"/>
+            </a:rPr>
+            <a:t> in </a:t>
+          </a:r>
+          <a:r>
+            <a:rPr lang="de-DE" sz="1400" kern="1200" dirty="0" err="1">
+              <a:latin typeface="Calibri" panose="020F0502020204030204" pitchFamily="34" charset="0"/>
+              <a:cs typeface="Calibri" panose="020F0502020204030204" pitchFamily="34" charset="0"/>
+            </a:rPr>
+            <a:t>GitLab</a:t>
+          </a:r>
+          <a:endParaRPr lang="de-DE" sz="1400" kern="1200" dirty="0">
+            <a:latin typeface="Calibri" panose="020F0502020204030204" pitchFamily="34" charset="0"/>
+            <a:cs typeface="Calibri" panose="020F0502020204030204" pitchFamily="34" charset="0"/>
+          </a:endParaRPr>
         </a:p>
       </dsp:txBody>
       <dsp:txXfrm>
-        <a:off x="2431215" y="1456684"/>
-        <a:ext cx="1752795" cy="1051677"/>
+        <a:off x="2459510" y="1933518"/>
+        <a:ext cx="1998840" cy="1199304"/>
       </dsp:txXfrm>
     </dsp:sp>
     <dsp:sp modelId="{314215C8-041F-6348-9D23-AD0BB0AB6487}">
@@ -4629,8 +4998,8 @@
       </dsp:nvSpPr>
       <dsp:spPr>
         <a:xfrm>
-          <a:off x="2026271" y="3391623"/>
-          <a:ext cx="372543" cy="91440"/>
+          <a:off x="1997976" y="4146488"/>
+          <a:ext cx="429133" cy="91440"/>
         </a:xfrm>
         <a:custGeom>
           <a:avLst/>
@@ -4644,7 +5013,7 @@
                 <a:pt x="0" y="45720"/>
               </a:moveTo>
               <a:lnTo>
-                <a:pt x="372543" y="45720"/>
+                <a:pt x="429133" y="45720"/>
               </a:lnTo>
             </a:path>
           </a:pathLst>
@@ -4698,8 +5067,8 @@
         </a:p>
       </dsp:txBody>
       <dsp:txXfrm>
-        <a:off x="2202464" y="3435327"/>
-        <a:ext cx="20157" cy="4031"/>
+        <a:off x="2201050" y="4189909"/>
+        <a:ext cx="22986" cy="4597"/>
       </dsp:txXfrm>
     </dsp:sp>
     <dsp:sp modelId="{E0637F89-11DF-E245-9887-D28D59E934E6}">
@@ -4709,8 +5078,8 @@
       </dsp:nvSpPr>
       <dsp:spPr>
         <a:xfrm>
-          <a:off x="275276" y="2911504"/>
-          <a:ext cx="1752795" cy="1051677"/>
+          <a:off x="936" y="3592555"/>
+          <a:ext cx="1998840" cy="1199304"/>
         </a:xfrm>
         <a:prstGeom prst="rect">
           <a:avLst/>
@@ -4768,7 +5137,7 @@
         </a:fontRef>
       </dsp:style>
       <dsp:txBody>
-        <a:bodyPr spcFirstLastPara="0" vert="horz" wrap="square" lIns="85888" tIns="90155" rIns="85888" bIns="90155" numCol="1" spcCol="1270" anchor="ctr" anchorCtr="0">
+        <a:bodyPr spcFirstLastPara="0" vert="horz" wrap="square" lIns="97945" tIns="102810" rIns="97945" bIns="102810" numCol="1" spcCol="1270" anchor="ctr" anchorCtr="0">
           <a:noAutofit/>
         </a:bodyPr>
         <a:lstStyle/>
@@ -4837,8 +5206,8 @@
         </a:p>
       </dsp:txBody>
       <dsp:txXfrm>
-        <a:off x="275276" y="2911504"/>
-        <a:ext cx="1752795" cy="1051677"/>
+        <a:off x="936" y="3592555"/>
+        <a:ext cx="1998840" cy="1199304"/>
       </dsp:txXfrm>
     </dsp:sp>
     <dsp:sp modelId="{A2A7A428-6D0A-FB47-8E40-741AE7BB6A10}">
@@ -4848,8 +5217,8 @@
       </dsp:nvSpPr>
       <dsp:spPr>
         <a:xfrm>
-          <a:off x="2431215" y="2911504"/>
-          <a:ext cx="1752795" cy="1051677"/>
+          <a:off x="2459510" y="3592555"/>
+          <a:ext cx="1998840" cy="1199304"/>
         </a:xfrm>
         <a:prstGeom prst="rect">
           <a:avLst/>
@@ -4907,7 +5276,7 @@
         </a:fontRef>
       </dsp:style>
       <dsp:txBody>
-        <a:bodyPr spcFirstLastPara="0" vert="horz" wrap="square" lIns="85888" tIns="90155" rIns="85888" bIns="90155" numCol="1" spcCol="1270" anchor="ctr" anchorCtr="0">
+        <a:bodyPr spcFirstLastPara="0" vert="horz" wrap="square" lIns="97945" tIns="102810" rIns="97945" bIns="102810" numCol="1" spcCol="1270" anchor="ctr" anchorCtr="0">
           <a:noAutofit/>
         </a:bodyPr>
         <a:lstStyle/>
@@ -4925,12 +5294,23 @@
             <a:buNone/>
           </a:pPr>
           <a:r>
-            <a:rPr lang="de-DE" sz="1400" kern="1200">
+            <a:rPr lang="de-DE" sz="1400" kern="1200" dirty="0">
               <a:latin typeface="Calibri" panose="020F0502020204030204" pitchFamily="34" charset="0"/>
               <a:cs typeface="Calibri" panose="020F0502020204030204" pitchFamily="34" charset="0"/>
             </a:rPr>
-            <a:t>- Gegenseitig lesen</a:t>
+            <a:t>+ Lesen von Diary und </a:t>
           </a:r>
+          <a:r>
+            <a:rPr lang="de-DE" sz="1400" kern="1200" dirty="0" err="1">
+              <a:latin typeface="Calibri" panose="020F0502020204030204" pitchFamily="34" charset="0"/>
+              <a:cs typeface="Calibri" panose="020F0502020204030204" pitchFamily="34" charset="0"/>
+            </a:rPr>
+            <a:t>Commits</a:t>
+          </a:r>
+          <a:endParaRPr lang="de-DE" sz="1400" kern="1200" dirty="0">
+            <a:latin typeface="Calibri" panose="020F0502020204030204" pitchFamily="34" charset="0"/>
+            <a:cs typeface="Calibri" panose="020F0502020204030204" pitchFamily="34" charset="0"/>
+          </a:endParaRPr>
         </a:p>
         <a:p>
           <a:pPr marL="0" lvl="0" indent="0" algn="ctr" defTabSz="622300">
@@ -4946,17 +5326,28 @@
             <a:buNone/>
           </a:pPr>
           <a:r>
-            <a:rPr lang="de-DE" sz="1400" kern="1200">
+            <a:rPr lang="de-DE" sz="1400" kern="1200" dirty="0">
               <a:latin typeface="Calibri" panose="020F0502020204030204" pitchFamily="34" charset="0"/>
               <a:cs typeface="Calibri" panose="020F0502020204030204" pitchFamily="34" charset="0"/>
             </a:rPr>
-            <a:t>- Früh starten</a:t>
+            <a:t>+ Pair </a:t>
           </a:r>
+          <a:r>
+            <a:rPr lang="de-DE" sz="1400" kern="1200" dirty="0" err="1">
+              <a:latin typeface="Calibri" panose="020F0502020204030204" pitchFamily="34" charset="0"/>
+              <a:cs typeface="Calibri" panose="020F0502020204030204" pitchFamily="34" charset="0"/>
+            </a:rPr>
+            <a:t>Programming</a:t>
+          </a:r>
+          <a:endParaRPr lang="de-DE" sz="1400" kern="1200" dirty="0">
+            <a:latin typeface="Calibri" panose="020F0502020204030204" pitchFamily="34" charset="0"/>
+            <a:cs typeface="Calibri" panose="020F0502020204030204" pitchFamily="34" charset="0"/>
+          </a:endParaRPr>
         </a:p>
       </dsp:txBody>
       <dsp:txXfrm>
-        <a:off x="2431215" y="2911504"/>
-        <a:ext cx="1752795" cy="1051677"/>
+        <a:off x="2459510" y="3592555"/>
+        <a:ext cx="1998840" cy="1199304"/>
       </dsp:txXfrm>
     </dsp:sp>
   </dsp:spTree>
@@ -7490,7 +7881,7 @@
           <a:noFill/>
           <a:extLst>
             <a:ext uri="{909E8E84-426E-40dd-AFC4-6F175D3DCCD1}">
-              <a14:hiddenFill xmlns="" xmlns:a14="http://schemas.microsoft.com/office/drawing/2010/main">
+              <a14:hiddenFill xmlns:a14="http://schemas.microsoft.com/office/drawing/2010/main" xmlns="">
                 <a:solidFill>
                   <a:srgbClr val="FFFFFF"/>
                 </a:solidFill>
@@ -7550,7 +7941,7 @@
             </a:ln>
             <a:extLst>
               <a:ext uri="{91240B29-F687-4f45-9708-019B960494DF}">
-                <a14:hiddenLine xmlns="" xmlns:a14="http://schemas.microsoft.com/office/drawing/2010/main" w="9525">
+                <a14:hiddenLine xmlns:a14="http://schemas.microsoft.com/office/drawing/2010/main" xmlns="" w="9525">
                   <a:solidFill>
                     <a:srgbClr val="000000"/>
                   </a:solidFill>
@@ -7640,7 +8031,7 @@
             </a:ln>
             <a:extLst>
               <a:ext uri="{91240B29-F687-4f45-9708-019B960494DF}">
-                <a14:hiddenLine xmlns="" xmlns:a14="http://schemas.microsoft.com/office/drawing/2010/main" w="9525">
+                <a14:hiddenLine xmlns:a14="http://schemas.microsoft.com/office/drawing/2010/main" xmlns="" w="9525">
                   <a:solidFill>
                     <a:srgbClr val="000000"/>
                   </a:solidFill>
@@ -7730,7 +8121,7 @@
             </a:ln>
             <a:extLst>
               <a:ext uri="{91240B29-F687-4f45-9708-019B960494DF}">
-                <a14:hiddenLine xmlns="" xmlns:a14="http://schemas.microsoft.com/office/drawing/2010/main" w="9525">
+                <a14:hiddenLine xmlns:a14="http://schemas.microsoft.com/office/drawing/2010/main" xmlns="" w="9525">
                   <a:solidFill>
                     <a:srgbClr val="000000"/>
                   </a:solidFill>
@@ -7764,7 +8155,7 @@
             </a:ln>
             <a:extLst>
               <a:ext uri="{91240B29-F687-4f45-9708-019B960494DF}">
-                <a14:hiddenLine xmlns="" xmlns:a14="http://schemas.microsoft.com/office/drawing/2010/main" w="9525">
+                <a14:hiddenLine xmlns:a14="http://schemas.microsoft.com/office/drawing/2010/main" xmlns="" w="9525">
                   <a:solidFill>
                     <a:srgbClr val="000000"/>
                   </a:solidFill>
@@ -7854,7 +8245,7 @@
             </a:ln>
             <a:extLst>
               <a:ext uri="{91240B29-F687-4f45-9708-019B960494DF}">
-                <a14:hiddenLine xmlns="" xmlns:a14="http://schemas.microsoft.com/office/drawing/2010/main" w="9525">
+                <a14:hiddenLine xmlns:a14="http://schemas.microsoft.com/office/drawing/2010/main" xmlns="" w="9525">
                   <a:solidFill>
                     <a:srgbClr val="000000"/>
                   </a:solidFill>
@@ -7916,7 +8307,7 @@
             </a:ln>
             <a:extLst>
               <a:ext uri="{91240B29-F687-4f45-9708-019B960494DF}">
-                <a14:hiddenLine xmlns="" xmlns:a14="http://schemas.microsoft.com/office/drawing/2010/main" w="9525">
+                <a14:hiddenLine xmlns:a14="http://schemas.microsoft.com/office/drawing/2010/main" xmlns="" w="9525">
                   <a:solidFill>
                     <a:srgbClr val="000000"/>
                   </a:solidFill>
@@ -7978,7 +8369,7 @@
             </a:ln>
             <a:extLst>
               <a:ext uri="{91240B29-F687-4f45-9708-019B960494DF}">
-                <a14:hiddenLine xmlns="" xmlns:a14="http://schemas.microsoft.com/office/drawing/2010/main" w="9525">
+                <a14:hiddenLine xmlns:a14="http://schemas.microsoft.com/office/drawing/2010/main" xmlns="" w="9525">
                   <a:solidFill>
                     <a:srgbClr val="000000"/>
                   </a:solidFill>
@@ -8068,7 +8459,7 @@
             </a:ln>
             <a:extLst>
               <a:ext uri="{91240B29-F687-4f45-9708-019B960494DF}">
-                <a14:hiddenLine xmlns="" xmlns:a14="http://schemas.microsoft.com/office/drawing/2010/main" w="9525">
+                <a14:hiddenLine xmlns:a14="http://schemas.microsoft.com/office/drawing/2010/main" xmlns="" w="9525">
                   <a:solidFill>
                     <a:srgbClr val="000000"/>
                   </a:solidFill>
@@ -8130,7 +8521,7 @@
             </a:ln>
             <a:extLst>
               <a:ext uri="{91240B29-F687-4f45-9708-019B960494DF}">
-                <a14:hiddenLine xmlns="" xmlns:a14="http://schemas.microsoft.com/office/drawing/2010/main" w="9525">
+                <a14:hiddenLine xmlns:a14="http://schemas.microsoft.com/office/drawing/2010/main" xmlns="" w="9525">
                   <a:solidFill>
                     <a:srgbClr val="000000"/>
                   </a:solidFill>
@@ -8192,7 +8583,7 @@
             </a:ln>
             <a:extLst>
               <a:ext uri="{91240B29-F687-4f45-9708-019B960494DF}">
-                <a14:hiddenLine xmlns="" xmlns:a14="http://schemas.microsoft.com/office/drawing/2010/main" w="9525">
+                <a14:hiddenLine xmlns:a14="http://schemas.microsoft.com/office/drawing/2010/main" xmlns="" w="9525">
                   <a:solidFill>
                     <a:srgbClr val="000000"/>
                   </a:solidFill>
@@ -8282,7 +8673,7 @@
             </a:ln>
             <a:extLst>
               <a:ext uri="{91240B29-F687-4f45-9708-019B960494DF}">
-                <a14:hiddenLine xmlns="" xmlns:a14="http://schemas.microsoft.com/office/drawing/2010/main" w="9525">
+                <a14:hiddenLine xmlns:a14="http://schemas.microsoft.com/office/drawing/2010/main" xmlns="" w="9525">
                   <a:solidFill>
                     <a:srgbClr val="000000"/>
                   </a:solidFill>
@@ -8372,7 +8763,7 @@
             </a:ln>
             <a:extLst>
               <a:ext uri="{91240B29-F687-4f45-9708-019B960494DF}">
-                <a14:hiddenLine xmlns="" xmlns:a14="http://schemas.microsoft.com/office/drawing/2010/main" w="9525">
+                <a14:hiddenLine xmlns:a14="http://schemas.microsoft.com/office/drawing/2010/main" xmlns="" w="9525">
                   <a:solidFill>
                     <a:srgbClr val="000000"/>
                   </a:solidFill>
@@ -8434,7 +8825,7 @@
             </a:ln>
             <a:extLst>
               <a:ext uri="{91240B29-F687-4f45-9708-019B960494DF}">
-                <a14:hiddenLine xmlns="" xmlns:a14="http://schemas.microsoft.com/office/drawing/2010/main" w="9525">
+                <a14:hiddenLine xmlns:a14="http://schemas.microsoft.com/office/drawing/2010/main" xmlns="" w="9525">
                   <a:solidFill>
                     <a:srgbClr val="000000"/>
                   </a:solidFill>
@@ -8544,7 +8935,7 @@
             </a:ln>
             <a:extLst>
               <a:ext uri="{91240B29-F687-4f45-9708-019B960494DF}">
-                <a14:hiddenLine xmlns="" xmlns:a14="http://schemas.microsoft.com/office/drawing/2010/main" w="9525">
+                <a14:hiddenLine xmlns:a14="http://schemas.microsoft.com/office/drawing/2010/main" xmlns="" w="9525">
                   <a:solidFill>
                     <a:srgbClr val="000000"/>
                   </a:solidFill>
@@ -8606,7 +8997,7 @@
             </a:ln>
             <a:extLst>
               <a:ext uri="{91240B29-F687-4f45-9708-019B960494DF}">
-                <a14:hiddenLine xmlns="" xmlns:a14="http://schemas.microsoft.com/office/drawing/2010/main" w="9525">
+                <a14:hiddenLine xmlns:a14="http://schemas.microsoft.com/office/drawing/2010/main" xmlns="" w="9525">
                   <a:solidFill>
                     <a:srgbClr val="000000"/>
                   </a:solidFill>
@@ -8696,7 +9087,7 @@
             </a:ln>
             <a:extLst>
               <a:ext uri="{91240B29-F687-4f45-9708-019B960494DF}">
-                <a14:hiddenLine xmlns="" xmlns:a14="http://schemas.microsoft.com/office/drawing/2010/main" w="9525">
+                <a14:hiddenLine xmlns:a14="http://schemas.microsoft.com/office/drawing/2010/main" xmlns="" w="9525">
                   <a:solidFill>
                     <a:srgbClr val="000000"/>
                   </a:solidFill>
@@ -8786,7 +9177,7 @@
             </a:ln>
             <a:extLst>
               <a:ext uri="{91240B29-F687-4f45-9708-019B960494DF}">
-                <a14:hiddenLine xmlns="" xmlns:a14="http://schemas.microsoft.com/office/drawing/2010/main" w="9525">
+                <a14:hiddenLine xmlns:a14="http://schemas.microsoft.com/office/drawing/2010/main" xmlns="" w="9525">
                   <a:solidFill>
                     <a:srgbClr val="000000"/>
                   </a:solidFill>
@@ -8848,7 +9239,7 @@
             </a:ln>
             <a:extLst>
               <a:ext uri="{91240B29-F687-4f45-9708-019B960494DF}">
-                <a14:hiddenLine xmlns="" xmlns:a14="http://schemas.microsoft.com/office/drawing/2010/main" w="9525">
+                <a14:hiddenLine xmlns:a14="http://schemas.microsoft.com/office/drawing/2010/main" xmlns="" w="9525">
                   <a:solidFill>
                     <a:srgbClr val="000000"/>
                   </a:solidFill>
@@ -8938,7 +9329,7 @@
             </a:ln>
             <a:extLst>
               <a:ext uri="{91240B29-F687-4f45-9708-019B960494DF}">
-                <a14:hiddenLine xmlns="" xmlns:a14="http://schemas.microsoft.com/office/drawing/2010/main" w="9525">
+                <a14:hiddenLine xmlns:a14="http://schemas.microsoft.com/office/drawing/2010/main" xmlns="" w="9525">
                   <a:solidFill>
                     <a:srgbClr val="000000"/>
                   </a:solidFill>
@@ -9028,7 +9419,7 @@
             </a:ln>
             <a:extLst>
               <a:ext uri="{91240B29-F687-4f45-9708-019B960494DF}">
-                <a14:hiddenLine xmlns="" xmlns:a14="http://schemas.microsoft.com/office/drawing/2010/main" w="9525">
+                <a14:hiddenLine xmlns:a14="http://schemas.microsoft.com/office/drawing/2010/main" xmlns="" w="9525">
                   <a:solidFill>
                     <a:srgbClr val="000000"/>
                   </a:solidFill>
@@ -9084,7 +9475,7 @@
             </a:ln>
             <a:extLst>
               <a:ext uri="{91240B29-F687-4f45-9708-019B960494DF}">
-                <a14:hiddenLine xmlns="" xmlns:a14="http://schemas.microsoft.com/office/drawing/2010/main" w="9525">
+                <a14:hiddenLine xmlns:a14="http://schemas.microsoft.com/office/drawing/2010/main" xmlns="" w="9525">
                   <a:solidFill>
                     <a:srgbClr val="000000"/>
                   </a:solidFill>
@@ -9174,7 +9565,7 @@
             </a:ln>
             <a:extLst>
               <a:ext uri="{91240B29-F687-4f45-9708-019B960494DF}">
-                <a14:hiddenLine xmlns="" xmlns:a14="http://schemas.microsoft.com/office/drawing/2010/main" w="9525">
+                <a14:hiddenLine xmlns:a14="http://schemas.microsoft.com/office/drawing/2010/main" xmlns="" w="9525">
                   <a:solidFill>
                     <a:srgbClr val="000000"/>
                   </a:solidFill>
@@ -9230,7 +9621,7 @@
             </a:ln>
             <a:extLst>
               <a:ext uri="{91240B29-F687-4f45-9708-019B960494DF}">
-                <a14:hiddenLine xmlns="" xmlns:a14="http://schemas.microsoft.com/office/drawing/2010/main" w="9525">
+                <a14:hiddenLine xmlns:a14="http://schemas.microsoft.com/office/drawing/2010/main" xmlns="" w="9525">
                   <a:solidFill>
                     <a:srgbClr val="000000"/>
                   </a:solidFill>
@@ -9320,7 +9711,7 @@
             </a:ln>
             <a:extLst>
               <a:ext uri="{91240B29-F687-4f45-9708-019B960494DF}">
-                <a14:hiddenLine xmlns="" xmlns:a14="http://schemas.microsoft.com/office/drawing/2010/main" w="9525">
+                <a14:hiddenLine xmlns:a14="http://schemas.microsoft.com/office/drawing/2010/main" xmlns="" w="9525">
                   <a:solidFill>
                     <a:srgbClr val="000000"/>
                   </a:solidFill>
@@ -9388,7 +9779,7 @@
             </a:ln>
             <a:extLst>
               <a:ext uri="{91240B29-F687-4f45-9708-019B960494DF}">
-                <a14:hiddenLine xmlns="" xmlns:a14="http://schemas.microsoft.com/office/drawing/2010/main" w="9525">
+                <a14:hiddenLine xmlns:a14="http://schemas.microsoft.com/office/drawing/2010/main" xmlns="" w="9525">
                   <a:solidFill>
                     <a:srgbClr val="000000"/>
                   </a:solidFill>
@@ -9478,7 +9869,7 @@
             </a:ln>
             <a:extLst>
               <a:ext uri="{91240B29-F687-4f45-9708-019B960494DF}">
-                <a14:hiddenLine xmlns="" xmlns:a14="http://schemas.microsoft.com/office/drawing/2010/main" w="9525">
+                <a14:hiddenLine xmlns:a14="http://schemas.microsoft.com/office/drawing/2010/main" xmlns="" w="9525">
                   <a:solidFill>
                     <a:srgbClr val="000000"/>
                   </a:solidFill>
@@ -9546,7 +9937,7 @@
             </a:ln>
             <a:extLst>
               <a:ext uri="{91240B29-F687-4f45-9708-019B960494DF}">
-                <a14:hiddenLine xmlns="" xmlns:a14="http://schemas.microsoft.com/office/drawing/2010/main" w="9525">
+                <a14:hiddenLine xmlns:a14="http://schemas.microsoft.com/office/drawing/2010/main" xmlns="" w="9525">
                   <a:solidFill>
                     <a:srgbClr val="000000"/>
                   </a:solidFill>
@@ -9636,7 +10027,7 @@
             </a:ln>
             <a:extLst>
               <a:ext uri="{91240B29-F687-4f45-9708-019B960494DF}">
-                <a14:hiddenLine xmlns="" xmlns:a14="http://schemas.microsoft.com/office/drawing/2010/main" w="9525">
+                <a14:hiddenLine xmlns:a14="http://schemas.microsoft.com/office/drawing/2010/main" xmlns="" w="9525">
                   <a:solidFill>
                     <a:srgbClr val="000000"/>
                   </a:solidFill>
@@ -9670,7 +10061,7 @@
             </a:ln>
             <a:extLst>
               <a:ext uri="{91240B29-F687-4f45-9708-019B960494DF}">
-                <a14:hiddenLine xmlns="" xmlns:a14="http://schemas.microsoft.com/office/drawing/2010/main" w="9525">
+                <a14:hiddenLine xmlns:a14="http://schemas.microsoft.com/office/drawing/2010/main" xmlns="" w="9525">
                   <a:solidFill>
                     <a:srgbClr val="000000"/>
                   </a:solidFill>
@@ -9760,7 +10151,7 @@
             </a:ln>
             <a:extLst>
               <a:ext uri="{91240B29-F687-4f45-9708-019B960494DF}">
-                <a14:hiddenLine xmlns="" xmlns:a14="http://schemas.microsoft.com/office/drawing/2010/main" w="9525">
+                <a14:hiddenLine xmlns:a14="http://schemas.microsoft.com/office/drawing/2010/main" xmlns="" w="9525">
                   <a:solidFill>
                     <a:srgbClr val="000000"/>
                   </a:solidFill>
@@ -9822,7 +10213,7 @@
             </a:ln>
             <a:extLst>
               <a:ext uri="{91240B29-F687-4f45-9708-019B960494DF}">
-                <a14:hiddenLine xmlns="" xmlns:a14="http://schemas.microsoft.com/office/drawing/2010/main" w="9525">
+                <a14:hiddenLine xmlns:a14="http://schemas.microsoft.com/office/drawing/2010/main" xmlns="" w="9525">
                   <a:solidFill>
                     <a:srgbClr val="000000"/>
                   </a:solidFill>
@@ -9884,7 +10275,7 @@
             </a:ln>
             <a:extLst>
               <a:ext uri="{91240B29-F687-4f45-9708-019B960494DF}">
-                <a14:hiddenLine xmlns="" xmlns:a14="http://schemas.microsoft.com/office/drawing/2010/main" w="9525">
+                <a14:hiddenLine xmlns:a14="http://schemas.microsoft.com/office/drawing/2010/main" xmlns="" w="9525">
                   <a:solidFill>
                     <a:srgbClr val="000000"/>
                   </a:solidFill>
@@ -9974,7 +10365,7 @@
             </a:ln>
             <a:extLst>
               <a:ext uri="{91240B29-F687-4f45-9708-019B960494DF}">
-                <a14:hiddenLine xmlns="" xmlns:a14="http://schemas.microsoft.com/office/drawing/2010/main" w="9525">
+                <a14:hiddenLine xmlns:a14="http://schemas.microsoft.com/office/drawing/2010/main" xmlns="" w="9525">
                   <a:solidFill>
                     <a:srgbClr val="000000"/>
                   </a:solidFill>
@@ -10042,7 +10433,7 @@
             </a:ln>
             <a:extLst>
               <a:ext uri="{91240B29-F687-4f45-9708-019B960494DF}">
-                <a14:hiddenLine xmlns="" xmlns:a14="http://schemas.microsoft.com/office/drawing/2010/main" w="9525">
+                <a14:hiddenLine xmlns:a14="http://schemas.microsoft.com/office/drawing/2010/main" xmlns="" w="9525">
                   <a:solidFill>
                     <a:srgbClr val="000000"/>
                   </a:solidFill>
@@ -10104,7 +10495,7 @@
             </a:ln>
             <a:extLst>
               <a:ext uri="{91240B29-F687-4f45-9708-019B960494DF}">
-                <a14:hiddenLine xmlns="" xmlns:a14="http://schemas.microsoft.com/office/drawing/2010/main" w="9525">
+                <a14:hiddenLine xmlns:a14="http://schemas.microsoft.com/office/drawing/2010/main" xmlns="" w="9525">
                   <a:solidFill>
                     <a:srgbClr val="000000"/>
                   </a:solidFill>
@@ -10194,7 +10585,7 @@
             </a:ln>
             <a:extLst>
               <a:ext uri="{91240B29-F687-4f45-9708-019B960494DF}">
-                <a14:hiddenLine xmlns="" xmlns:a14="http://schemas.microsoft.com/office/drawing/2010/main" w="9525">
+                <a14:hiddenLine xmlns:a14="http://schemas.microsoft.com/office/drawing/2010/main" xmlns="" w="9525">
                   <a:solidFill>
                     <a:srgbClr val="000000"/>
                   </a:solidFill>
@@ -10256,7 +10647,7 @@
             </a:ln>
             <a:extLst>
               <a:ext uri="{91240B29-F687-4f45-9708-019B960494DF}">
-                <a14:hiddenLine xmlns="" xmlns:a14="http://schemas.microsoft.com/office/drawing/2010/main" w="9525">
+                <a14:hiddenLine xmlns:a14="http://schemas.microsoft.com/office/drawing/2010/main" xmlns="" w="9525">
                   <a:solidFill>
                     <a:srgbClr val="000000"/>
                   </a:solidFill>
@@ -10346,7 +10737,7 @@
             </a:ln>
             <a:extLst>
               <a:ext uri="{91240B29-F687-4f45-9708-019B960494DF}">
-                <a14:hiddenLine xmlns="" xmlns:a14="http://schemas.microsoft.com/office/drawing/2010/main" w="9525">
+                <a14:hiddenLine xmlns:a14="http://schemas.microsoft.com/office/drawing/2010/main" xmlns="" w="9525">
                   <a:solidFill>
                     <a:srgbClr val="000000"/>
                   </a:solidFill>
@@ -10408,7 +10799,7 @@
             </a:ln>
             <a:extLst>
               <a:ext uri="{91240B29-F687-4f45-9708-019B960494DF}">
-                <a14:hiddenLine xmlns="" xmlns:a14="http://schemas.microsoft.com/office/drawing/2010/main" w="9525">
+                <a14:hiddenLine xmlns:a14="http://schemas.microsoft.com/office/drawing/2010/main" xmlns="" w="9525">
                   <a:solidFill>
                     <a:srgbClr val="000000"/>
                   </a:solidFill>
@@ -10498,7 +10889,7 @@
             </a:ln>
             <a:extLst>
               <a:ext uri="{91240B29-F687-4f45-9708-019B960494DF}">
-                <a14:hiddenLine xmlns="" xmlns:a14="http://schemas.microsoft.com/office/drawing/2010/main" w="9525">
+                <a14:hiddenLine xmlns:a14="http://schemas.microsoft.com/office/drawing/2010/main" xmlns="" w="9525">
                   <a:solidFill>
                     <a:srgbClr val="000000"/>
                   </a:solidFill>
@@ -10532,7 +10923,7 @@
             </a:ln>
             <a:extLst>
               <a:ext uri="{91240B29-F687-4f45-9708-019B960494DF}">
-                <a14:hiddenLine xmlns="" xmlns:a14="http://schemas.microsoft.com/office/drawing/2010/main" w="9525">
+                <a14:hiddenLine xmlns:a14="http://schemas.microsoft.com/office/drawing/2010/main" xmlns="" w="9525">
                   <a:solidFill>
                     <a:srgbClr val="000000"/>
                   </a:solidFill>
@@ -10597,7 +10988,7 @@
             </a:ln>
             <a:extLst>
               <a:ext uri="{91240B29-F687-4f45-9708-019B960494DF}">
-                <a14:hiddenLine xmlns="" xmlns:a14="http://schemas.microsoft.com/office/drawing/2010/main" w="9525">
+                <a14:hiddenLine xmlns:a14="http://schemas.microsoft.com/office/drawing/2010/main" xmlns="" w="9525">
                   <a:solidFill>
                     <a:srgbClr val="000000"/>
                   </a:solidFill>
@@ -10687,7 +11078,7 @@
             </a:ln>
             <a:extLst>
               <a:ext uri="{91240B29-F687-4f45-9708-019B960494DF}">
-                <a14:hiddenLine xmlns="" xmlns:a14="http://schemas.microsoft.com/office/drawing/2010/main" w="9525">
+                <a14:hiddenLine xmlns:a14="http://schemas.microsoft.com/office/drawing/2010/main" xmlns="" w="9525">
                   <a:solidFill>
                     <a:srgbClr val="000000"/>
                   </a:solidFill>
@@ -10749,7 +11140,7 @@
             </a:ln>
             <a:extLst>
               <a:ext uri="{91240B29-F687-4f45-9708-019B960494DF}">
-                <a14:hiddenLine xmlns="" xmlns:a14="http://schemas.microsoft.com/office/drawing/2010/main" w="9525">
+                <a14:hiddenLine xmlns:a14="http://schemas.microsoft.com/office/drawing/2010/main" xmlns="" w="9525">
                   <a:solidFill>
                     <a:srgbClr val="000000"/>
                   </a:solidFill>
@@ -10839,7 +11230,7 @@
             </a:ln>
             <a:extLst>
               <a:ext uri="{91240B29-F687-4f45-9708-019B960494DF}">
-                <a14:hiddenLine xmlns="" xmlns:a14="http://schemas.microsoft.com/office/drawing/2010/main" w="9525">
+                <a14:hiddenLine xmlns:a14="http://schemas.microsoft.com/office/drawing/2010/main" xmlns="" w="9525">
                   <a:solidFill>
                     <a:srgbClr val="000000"/>
                   </a:solidFill>
@@ -10929,7 +11320,7 @@
             </a:ln>
             <a:extLst>
               <a:ext uri="{91240B29-F687-4f45-9708-019B960494DF}">
-                <a14:hiddenLine xmlns="" xmlns:a14="http://schemas.microsoft.com/office/drawing/2010/main" w="9525">
+                <a14:hiddenLine xmlns:a14="http://schemas.microsoft.com/office/drawing/2010/main" xmlns="" w="9525">
                   <a:solidFill>
                     <a:srgbClr val="000000"/>
                   </a:solidFill>
@@ -10994,7 +11385,7 @@
             </a:ln>
             <a:extLst>
               <a:ext uri="{91240B29-F687-4f45-9708-019B960494DF}">
-                <a14:hiddenLine xmlns="" xmlns:a14="http://schemas.microsoft.com/office/drawing/2010/main" w="9525">
+                <a14:hiddenLine xmlns:a14="http://schemas.microsoft.com/office/drawing/2010/main" xmlns="" w="9525">
                   <a:solidFill>
                     <a:srgbClr val="000000"/>
                   </a:solidFill>
@@ -11056,7 +11447,7 @@
             </a:ln>
             <a:extLst>
               <a:ext uri="{91240B29-F687-4f45-9708-019B960494DF}">
-                <a14:hiddenLine xmlns="" xmlns:a14="http://schemas.microsoft.com/office/drawing/2010/main" w="9525">
+                <a14:hiddenLine xmlns:a14="http://schemas.microsoft.com/office/drawing/2010/main" xmlns="" w="9525">
                   <a:solidFill>
                     <a:srgbClr val="000000"/>
                   </a:solidFill>
@@ -11146,7 +11537,7 @@
             </a:ln>
             <a:extLst>
               <a:ext uri="{91240B29-F687-4f45-9708-019B960494DF}">
-                <a14:hiddenLine xmlns="" xmlns:a14="http://schemas.microsoft.com/office/drawing/2010/main" w="9525">
+                <a14:hiddenLine xmlns:a14="http://schemas.microsoft.com/office/drawing/2010/main" xmlns="" w="9525">
                   <a:solidFill>
                     <a:srgbClr val="000000"/>
                   </a:solidFill>
@@ -11236,7 +11627,7 @@
             </a:ln>
             <a:extLst>
               <a:ext uri="{91240B29-F687-4f45-9708-019B960494DF}">
-                <a14:hiddenLine xmlns="" xmlns:a14="http://schemas.microsoft.com/office/drawing/2010/main" w="9525">
+                <a14:hiddenLine xmlns:a14="http://schemas.microsoft.com/office/drawing/2010/main" xmlns="" w="9525">
                   <a:solidFill>
                     <a:srgbClr val="000000"/>
                   </a:solidFill>
@@ -11298,7 +11689,7 @@
             </a:ln>
             <a:extLst>
               <a:ext uri="{91240B29-F687-4f45-9708-019B960494DF}">
-                <a14:hiddenLine xmlns="" xmlns:a14="http://schemas.microsoft.com/office/drawing/2010/main" w="9525">
+                <a14:hiddenLine xmlns:a14="http://schemas.microsoft.com/office/drawing/2010/main" xmlns="" w="9525">
                   <a:solidFill>
                     <a:srgbClr val="000000"/>
                   </a:solidFill>
@@ -11418,7 +11809,7 @@
             </a:ln>
             <a:extLst>
               <a:ext uri="{91240B29-F687-4f45-9708-019B960494DF}">
-                <a14:hiddenLine xmlns="" xmlns:a14="http://schemas.microsoft.com/office/drawing/2010/main" w="9525">
+                <a14:hiddenLine xmlns:a14="http://schemas.microsoft.com/office/drawing/2010/main" xmlns="" w="9525">
                   <a:solidFill>
                     <a:srgbClr val="000000"/>
                   </a:solidFill>
@@ -11486,7 +11877,7 @@
             </a:ln>
             <a:extLst>
               <a:ext uri="{91240B29-F687-4f45-9708-019B960494DF}">
-                <a14:hiddenLine xmlns="" xmlns:a14="http://schemas.microsoft.com/office/drawing/2010/main" w="9525">
+                <a14:hiddenLine xmlns:a14="http://schemas.microsoft.com/office/drawing/2010/main" xmlns="" w="9525">
                   <a:solidFill>
                     <a:srgbClr val="000000"/>
                   </a:solidFill>
@@ -11576,7 +11967,7 @@
             </a:ln>
             <a:extLst>
               <a:ext uri="{91240B29-F687-4f45-9708-019B960494DF}">
-                <a14:hiddenLine xmlns="" xmlns:a14="http://schemas.microsoft.com/office/drawing/2010/main" w="9525">
+                <a14:hiddenLine xmlns:a14="http://schemas.microsoft.com/office/drawing/2010/main" xmlns="" w="9525">
                   <a:solidFill>
                     <a:srgbClr val="000000"/>
                   </a:solidFill>
@@ -11716,7 +12107,7 @@
           <a:p>
             <a:fld id="{9AB3A824-1A51-4B26-AD58-A6D8E14F6C04}" type="datetimeFigureOut">
               <a:rPr lang="en-US" smtClean="0"/>
-              <a:t>5/2/20</a:t>
+              <a:t>5/13/2020</a:t>
             </a:fld>
             <a:endParaRPr lang="en-US" dirty="0"/>
           </a:p>
@@ -11988,7 +12379,7 @@
           <a:p>
             <a:fld id="{3CBC1C18-307B-4F68-A007-B5B542270E8D}" type="datetimeFigureOut">
               <a:rPr lang="en-US" smtClean="0"/>
-              <a:t>5/2/20</a:t>
+              <a:t>5/13/2020</a:t>
             </a:fld>
             <a:endParaRPr lang="en-US" dirty="0"/>
           </a:p>
@@ -12191,7 +12582,7 @@
           <a:p>
             <a:fld id="{3CBC1C18-307B-4F68-A007-B5B542270E8D}" type="datetimeFigureOut">
               <a:rPr lang="en-US" smtClean="0"/>
-              <a:t>5/2/20</a:t>
+              <a:t>5/13/2020</a:t>
             </a:fld>
             <a:endParaRPr lang="en-US" dirty="0"/>
           </a:p>
@@ -12461,7 +12852,7 @@
           <a:p>
             <a:fld id="{3CBC1C18-307B-4F68-A007-B5B542270E8D}" type="datetimeFigureOut">
               <a:rPr lang="en-US" smtClean="0"/>
-              <a:t>5/2/20</a:t>
+              <a:t>5/13/2020</a:t>
             </a:fld>
             <a:endParaRPr lang="en-US" dirty="0"/>
           </a:p>
@@ -12902,7 +13293,7 @@
           <a:p>
             <a:fld id="{3CBC1C18-307B-4F68-A007-B5B542270E8D}" type="datetimeFigureOut">
               <a:rPr lang="en-US" smtClean="0"/>
-              <a:t>5/2/20</a:t>
+              <a:t>5/13/2020</a:t>
             </a:fld>
             <a:endParaRPr lang="en-US" dirty="0"/>
           </a:p>
@@ -13455,7 +13846,7 @@
           <a:p>
             <a:fld id="{3CBC1C18-307B-4F68-A007-B5B542270E8D}" type="datetimeFigureOut">
               <a:rPr lang="en-US" smtClean="0"/>
-              <a:t>5/2/20</a:t>
+              <a:t>5/13/2020</a:t>
             </a:fld>
             <a:endParaRPr lang="en-US" dirty="0"/>
           </a:p>
@@ -14182,7 +14573,7 @@
           <a:p>
             <a:fld id="{3CBC1C18-307B-4F68-A007-B5B542270E8D}" type="datetimeFigureOut">
               <a:rPr lang="en-US" smtClean="0"/>
-              <a:t>5/2/20</a:t>
+              <a:t>5/13/2020</a:t>
             </a:fld>
             <a:endParaRPr lang="en-US" dirty="0"/>
           </a:p>
@@ -14359,7 +14750,7 @@
           <a:p>
             <a:fld id="{D857E33E-8B18-4087-B112-809917729534}" type="datetimeFigureOut">
               <a:rPr lang="en-US" smtClean="0"/>
-              <a:t>5/2/20</a:t>
+              <a:t>5/13/2020</a:t>
             </a:fld>
             <a:endParaRPr lang="en-US" dirty="0"/>
           </a:p>
@@ -14544,7 +14935,7 @@
           <a:p>
             <a:fld id="{D3FFE419-2371-464F-8239-3959401C3561}" type="datetimeFigureOut">
               <a:rPr lang="en-US" smtClean="0"/>
-              <a:t>5/2/20</a:t>
+              <a:t>5/13/2020</a:t>
             </a:fld>
             <a:endParaRPr lang="en-US" dirty="0"/>
           </a:p>
@@ -14754,7 +15145,7 @@
           <a:p>
             <a:fld id="{B8F4533B-A850-4A2F-8185-7CB3D8266C51}" type="datetime1">
               <a:rPr lang="en-US" smtClean="0"/>
-              <a:t>5/2/20</a:t>
+              <a:t>5/13/2020</a:t>
             </a:fld>
             <a:endParaRPr lang="en-US" dirty="0"/>
           </a:p>
@@ -14928,7 +15319,7 @@
           <a:p>
             <a:fld id="{97D162C4-EDD9-4389-A98B-B87ECEA2A816}" type="datetimeFigureOut">
               <a:rPr lang="en-US" smtClean="0"/>
-              <a:t>5/2/20</a:t>
+              <a:t>5/13/2020</a:t>
             </a:fld>
             <a:endParaRPr lang="en-US" dirty="0"/>
           </a:p>
@@ -15183,7 +15574,7 @@
           <a:p>
             <a:fld id="{3E5059C3-6A89-4494-99FF-5A4D6FFD50EB}" type="datetimeFigureOut">
               <a:rPr lang="en-US" smtClean="0"/>
-              <a:t>5/2/20</a:t>
+              <a:t>5/13/2020</a:t>
             </a:fld>
             <a:endParaRPr lang="en-US" dirty="0"/>
           </a:p>
@@ -15420,7 +15811,7 @@
           <a:p>
             <a:fld id="{CA954B2F-12DE-47F5-8894-472B206D2E1E}" type="datetimeFigureOut">
               <a:rPr lang="en-US" smtClean="0"/>
-              <a:t>5/2/20</a:t>
+              <a:t>5/13/2020</a:t>
             </a:fld>
             <a:endParaRPr lang="en-US" dirty="0"/>
           </a:p>
@@ -15806,7 +16197,7 @@
           <a:p>
             <a:fld id="{3CBC1C18-307B-4F68-A007-B5B542270E8D}" type="datetimeFigureOut">
               <a:rPr lang="en-US" smtClean="0"/>
-              <a:t>5/2/20</a:t>
+              <a:t>5/13/2020</a:t>
             </a:fld>
             <a:endParaRPr lang="en-US" dirty="0"/>
           </a:p>
@@ -15931,7 +16322,7 @@
           <a:p>
             <a:fld id="{1FAF3416-4057-4DAA-829D-4CA07428D088}" type="datetimeFigureOut">
               <a:rPr lang="en-US" smtClean="0"/>
-              <a:t>5/2/20</a:t>
+              <a:t>5/13/2020</a:t>
             </a:fld>
             <a:endParaRPr lang="en-US" dirty="0"/>
           </a:p>
@@ -16031,7 +16422,7 @@
           <a:p>
             <a:fld id="{921D9284-D300-4297-87F7-E791DCC15DB1}" type="datetimeFigureOut">
               <a:rPr lang="en-US" smtClean="0"/>
-              <a:t>5/2/20</a:t>
+              <a:t>5/13/2020</a:t>
             </a:fld>
             <a:endParaRPr lang="en-US" dirty="0"/>
           </a:p>
@@ -16285,7 +16676,7 @@
           <a:p>
             <a:fld id="{37D525BB-DA17-4BA0-B3C8-3AC3ABC827E6}" type="datetimeFigureOut">
               <a:rPr lang="en-US" smtClean="0"/>
-              <a:t>5/2/20</a:t>
+              <a:t>5/13/2020</a:t>
             </a:fld>
             <a:endParaRPr lang="en-US" dirty="0"/>
           </a:p>
@@ -16570,7 +16961,7 @@
           <a:p>
             <a:fld id="{B16C4C9A-3960-41CF-A4E9-2A8FB932454B}" type="datetimeFigureOut">
               <a:rPr lang="en-US" smtClean="0"/>
-              <a:t>5/2/20</a:t>
+              <a:t>5/13/2020</a:t>
             </a:fld>
             <a:endParaRPr lang="en-US" dirty="0"/>
           </a:p>
@@ -16691,7 +17082,7 @@
           <a:noFill/>
           <a:extLst>
             <a:ext uri="{909E8E84-426E-40dd-AFC4-6F175D3DCCD1}">
-              <a14:hiddenFill xmlns="" xmlns:a14="http://schemas.microsoft.com/office/drawing/2010/main">
+              <a14:hiddenFill xmlns:a14="http://schemas.microsoft.com/office/drawing/2010/main" xmlns="">
                 <a:solidFill>
                   <a:srgbClr val="FFFFFF"/>
                 </a:solidFill>
@@ -16765,7 +17156,7 @@
               </a:ln>
               <a:extLst>
                 <a:ext uri="{91240B29-F687-4f45-9708-019B960494DF}">
-                  <a14:hiddenLine xmlns="" xmlns:a14="http://schemas.microsoft.com/office/drawing/2010/main" w="9525">
+                  <a14:hiddenLine xmlns:a14="http://schemas.microsoft.com/office/drawing/2010/main" xmlns="" w="9525">
                     <a:solidFill>
                       <a:srgbClr val="000000"/>
                     </a:solidFill>
@@ -16855,7 +17246,7 @@
               </a:ln>
               <a:extLst>
                 <a:ext uri="{91240B29-F687-4f45-9708-019B960494DF}">
-                  <a14:hiddenLine xmlns="" xmlns:a14="http://schemas.microsoft.com/office/drawing/2010/main" w="9525">
+                  <a14:hiddenLine xmlns:a14="http://schemas.microsoft.com/office/drawing/2010/main" xmlns="" w="9525">
                     <a:solidFill>
                       <a:srgbClr val="000000"/>
                     </a:solidFill>
@@ -16945,7 +17336,7 @@
               </a:ln>
               <a:extLst>
                 <a:ext uri="{91240B29-F687-4f45-9708-019B960494DF}">
-                  <a14:hiddenLine xmlns="" xmlns:a14="http://schemas.microsoft.com/office/drawing/2010/main" w="9525">
+                  <a14:hiddenLine xmlns:a14="http://schemas.microsoft.com/office/drawing/2010/main" xmlns="" w="9525">
                     <a:solidFill>
                       <a:srgbClr val="000000"/>
                     </a:solidFill>
@@ -17007,7 +17398,7 @@
               </a:ln>
               <a:extLst>
                 <a:ext uri="{91240B29-F687-4f45-9708-019B960494DF}">
-                  <a14:hiddenLine xmlns="" xmlns:a14="http://schemas.microsoft.com/office/drawing/2010/main" w="9525">
+                  <a14:hiddenLine xmlns:a14="http://schemas.microsoft.com/office/drawing/2010/main" xmlns="" w="9525">
                     <a:solidFill>
                       <a:srgbClr val="000000"/>
                     </a:solidFill>
@@ -17097,7 +17488,7 @@
               </a:ln>
               <a:extLst>
                 <a:ext uri="{91240B29-F687-4f45-9708-019B960494DF}">
-                  <a14:hiddenLine xmlns="" xmlns:a14="http://schemas.microsoft.com/office/drawing/2010/main" w="9525">
+                  <a14:hiddenLine xmlns:a14="http://schemas.microsoft.com/office/drawing/2010/main" xmlns="" w="9525">
                     <a:solidFill>
                       <a:srgbClr val="000000"/>
                     </a:solidFill>
@@ -17159,7 +17550,7 @@
               </a:ln>
               <a:extLst>
                 <a:ext uri="{91240B29-F687-4f45-9708-019B960494DF}">
-                  <a14:hiddenLine xmlns="" xmlns:a14="http://schemas.microsoft.com/office/drawing/2010/main" w="9525">
+                  <a14:hiddenLine xmlns:a14="http://schemas.microsoft.com/office/drawing/2010/main" xmlns="" w="9525">
                     <a:solidFill>
                       <a:srgbClr val="000000"/>
                     </a:solidFill>
@@ -17221,7 +17612,7 @@
               </a:ln>
               <a:extLst>
                 <a:ext uri="{91240B29-F687-4f45-9708-019B960494DF}">
-                  <a14:hiddenLine xmlns="" xmlns:a14="http://schemas.microsoft.com/office/drawing/2010/main" w="9525">
+                  <a14:hiddenLine xmlns:a14="http://schemas.microsoft.com/office/drawing/2010/main" xmlns="" w="9525">
                     <a:solidFill>
                       <a:srgbClr val="000000"/>
                     </a:solidFill>
@@ -17311,7 +17702,7 @@
               </a:ln>
               <a:extLst>
                 <a:ext uri="{91240B29-F687-4f45-9708-019B960494DF}">
-                  <a14:hiddenLine xmlns="" xmlns:a14="http://schemas.microsoft.com/office/drawing/2010/main" w="9525">
+                  <a14:hiddenLine xmlns:a14="http://schemas.microsoft.com/office/drawing/2010/main" xmlns="" w="9525">
                     <a:solidFill>
                       <a:srgbClr val="000000"/>
                     </a:solidFill>
@@ -17401,7 +17792,7 @@
               </a:ln>
               <a:extLst>
                 <a:ext uri="{91240B29-F687-4f45-9708-019B960494DF}">
-                  <a14:hiddenLine xmlns="" xmlns:a14="http://schemas.microsoft.com/office/drawing/2010/main" w="9525">
+                  <a14:hiddenLine xmlns:a14="http://schemas.microsoft.com/office/drawing/2010/main" xmlns="" w="9525">
                     <a:solidFill>
                       <a:srgbClr val="000000"/>
                     </a:solidFill>
@@ -17463,7 +17854,7 @@
               </a:ln>
               <a:extLst>
                 <a:ext uri="{91240B29-F687-4f45-9708-019B960494DF}">
-                  <a14:hiddenLine xmlns="" xmlns:a14="http://schemas.microsoft.com/office/drawing/2010/main" w="9525">
+                  <a14:hiddenLine xmlns:a14="http://schemas.microsoft.com/office/drawing/2010/main" xmlns="" w="9525">
                     <a:solidFill>
                       <a:srgbClr val="000000"/>
                     </a:solidFill>
@@ -17573,7 +17964,7 @@
               </a:ln>
               <a:extLst>
                 <a:ext uri="{91240B29-F687-4f45-9708-019B960494DF}">
-                  <a14:hiddenLine xmlns="" xmlns:a14="http://schemas.microsoft.com/office/drawing/2010/main" w="9525">
+                  <a14:hiddenLine xmlns:a14="http://schemas.microsoft.com/office/drawing/2010/main" xmlns="" w="9525">
                     <a:solidFill>
                       <a:srgbClr val="000000"/>
                     </a:solidFill>
@@ -17657,7 +18048,7 @@
               </a:ln>
               <a:extLst>
                 <a:ext uri="{91240B29-F687-4f45-9708-019B960494DF}">
-                  <a14:hiddenLine xmlns="" xmlns:a14="http://schemas.microsoft.com/office/drawing/2010/main" w="9525">
+                  <a14:hiddenLine xmlns:a14="http://schemas.microsoft.com/office/drawing/2010/main" xmlns="" w="9525">
                     <a:solidFill>
                       <a:srgbClr val="000000"/>
                     </a:solidFill>
@@ -17719,7 +18110,7 @@
               </a:ln>
               <a:extLst>
                 <a:ext uri="{91240B29-F687-4f45-9708-019B960494DF}">
-                  <a14:hiddenLine xmlns="" xmlns:a14="http://schemas.microsoft.com/office/drawing/2010/main" w="9525">
+                  <a14:hiddenLine xmlns:a14="http://schemas.microsoft.com/office/drawing/2010/main" xmlns="" w="9525">
                     <a:solidFill>
                       <a:srgbClr val="000000"/>
                     </a:solidFill>
@@ -17781,7 +18172,7 @@
               </a:ln>
               <a:extLst>
                 <a:ext uri="{91240B29-F687-4f45-9708-019B960494DF}">
-                  <a14:hiddenLine xmlns="" xmlns:a14="http://schemas.microsoft.com/office/drawing/2010/main" w="9525">
+                  <a14:hiddenLine xmlns:a14="http://schemas.microsoft.com/office/drawing/2010/main" xmlns="" w="9525">
                     <a:solidFill>
                       <a:srgbClr val="000000"/>
                     </a:solidFill>
@@ -17871,7 +18262,7 @@
               </a:ln>
               <a:extLst>
                 <a:ext uri="{91240B29-F687-4f45-9708-019B960494DF}">
-                  <a14:hiddenLine xmlns="" xmlns:a14="http://schemas.microsoft.com/office/drawing/2010/main" w="9525">
+                  <a14:hiddenLine xmlns:a14="http://schemas.microsoft.com/office/drawing/2010/main" xmlns="" w="9525">
                     <a:solidFill>
                       <a:srgbClr val="000000"/>
                     </a:solidFill>
@@ -17905,7 +18296,7 @@
               </a:ln>
               <a:extLst>
                 <a:ext uri="{91240B29-F687-4f45-9708-019B960494DF}">
-                  <a14:hiddenLine xmlns="" xmlns:a14="http://schemas.microsoft.com/office/drawing/2010/main" w="9525">
+                  <a14:hiddenLine xmlns:a14="http://schemas.microsoft.com/office/drawing/2010/main" xmlns="" w="9525">
                     <a:solidFill>
                       <a:srgbClr val="000000"/>
                     </a:solidFill>
@@ -17970,7 +18361,7 @@
               </a:ln>
               <a:extLst>
                 <a:ext uri="{91240B29-F687-4f45-9708-019B960494DF}">
-                  <a14:hiddenLine xmlns="" xmlns:a14="http://schemas.microsoft.com/office/drawing/2010/main" w="9525">
+                  <a14:hiddenLine xmlns:a14="http://schemas.microsoft.com/office/drawing/2010/main" xmlns="" w="9525">
                     <a:solidFill>
                       <a:srgbClr val="000000"/>
                     </a:solidFill>
@@ -18060,7 +18451,7 @@
               </a:ln>
               <a:extLst>
                 <a:ext uri="{91240B29-F687-4f45-9708-019B960494DF}">
-                  <a14:hiddenLine xmlns="" xmlns:a14="http://schemas.microsoft.com/office/drawing/2010/main" w="9525">
+                  <a14:hiddenLine xmlns:a14="http://schemas.microsoft.com/office/drawing/2010/main" xmlns="" w="9525">
                     <a:solidFill>
                       <a:srgbClr val="000000"/>
                     </a:solidFill>
@@ -18122,7 +18513,7 @@
               </a:ln>
               <a:extLst>
                 <a:ext uri="{91240B29-F687-4f45-9708-019B960494DF}">
-                  <a14:hiddenLine xmlns="" xmlns:a14="http://schemas.microsoft.com/office/drawing/2010/main" w="9525">
+                  <a14:hiddenLine xmlns:a14="http://schemas.microsoft.com/office/drawing/2010/main" xmlns="" w="9525">
                     <a:solidFill>
                       <a:srgbClr val="000000"/>
                     </a:solidFill>
@@ -18212,7 +18603,7 @@
               </a:ln>
               <a:extLst>
                 <a:ext uri="{91240B29-F687-4f45-9708-019B960494DF}">
-                  <a14:hiddenLine xmlns="" xmlns:a14="http://schemas.microsoft.com/office/drawing/2010/main" w="9525">
+                  <a14:hiddenLine xmlns:a14="http://schemas.microsoft.com/office/drawing/2010/main" xmlns="" w="9525">
                     <a:solidFill>
                       <a:srgbClr val="000000"/>
                     </a:solidFill>
@@ -18277,7 +18668,7 @@
               </a:ln>
               <a:extLst>
                 <a:ext uri="{91240B29-F687-4f45-9708-019B960494DF}">
-                  <a14:hiddenLine xmlns="" xmlns:a14="http://schemas.microsoft.com/office/drawing/2010/main" w="9525">
+                  <a14:hiddenLine xmlns:a14="http://schemas.microsoft.com/office/drawing/2010/main" xmlns="" w="9525">
                     <a:solidFill>
                       <a:srgbClr val="000000"/>
                     </a:solidFill>
@@ -18339,7 +18730,7 @@
               </a:ln>
               <a:extLst>
                 <a:ext uri="{91240B29-F687-4f45-9708-019B960494DF}">
-                  <a14:hiddenLine xmlns="" xmlns:a14="http://schemas.microsoft.com/office/drawing/2010/main" w="9525">
+                  <a14:hiddenLine xmlns:a14="http://schemas.microsoft.com/office/drawing/2010/main" xmlns="" w="9525">
                     <a:solidFill>
                       <a:srgbClr val="000000"/>
                     </a:solidFill>
@@ -18429,7 +18820,7 @@
               </a:ln>
               <a:extLst>
                 <a:ext uri="{91240B29-F687-4f45-9708-019B960494DF}">
-                  <a14:hiddenLine xmlns="" xmlns:a14="http://schemas.microsoft.com/office/drawing/2010/main" w="9525">
+                  <a14:hiddenLine xmlns:a14="http://schemas.microsoft.com/office/drawing/2010/main" xmlns="" w="9525">
                     <a:solidFill>
                       <a:srgbClr val="000000"/>
                     </a:solidFill>
@@ -18519,7 +18910,7 @@
               </a:ln>
               <a:extLst>
                 <a:ext uri="{91240B29-F687-4f45-9708-019B960494DF}">
-                  <a14:hiddenLine xmlns="" xmlns:a14="http://schemas.microsoft.com/office/drawing/2010/main" w="9525">
+                  <a14:hiddenLine xmlns:a14="http://schemas.microsoft.com/office/drawing/2010/main" xmlns="" w="9525">
                     <a:solidFill>
                       <a:srgbClr val="000000"/>
                     </a:solidFill>
@@ -18584,7 +18975,7 @@
               </a:ln>
               <a:extLst>
                 <a:ext uri="{91240B29-F687-4f45-9708-019B960494DF}">
-                  <a14:hiddenLine xmlns="" xmlns:a14="http://schemas.microsoft.com/office/drawing/2010/main" w="9525">
+                  <a14:hiddenLine xmlns:a14="http://schemas.microsoft.com/office/drawing/2010/main" xmlns="" w="9525">
                     <a:solidFill>
                       <a:srgbClr val="000000"/>
                     </a:solidFill>
@@ -18704,7 +19095,7 @@
               </a:ln>
               <a:extLst>
                 <a:ext uri="{91240B29-F687-4f45-9708-019B960494DF}">
-                  <a14:hiddenLine xmlns="" xmlns:a14="http://schemas.microsoft.com/office/drawing/2010/main" w="9525">
+                  <a14:hiddenLine xmlns:a14="http://schemas.microsoft.com/office/drawing/2010/main" xmlns="" w="9525">
                     <a:solidFill>
                       <a:srgbClr val="000000"/>
                     </a:solidFill>
@@ -18802,7 +19193,7 @@
               </a:ln>
               <a:extLst>
                 <a:ext uri="{91240B29-F687-4f45-9708-019B960494DF}">
-                  <a14:hiddenLine xmlns="" xmlns:a14="http://schemas.microsoft.com/office/drawing/2010/main" w="9525">
+                  <a14:hiddenLine xmlns:a14="http://schemas.microsoft.com/office/drawing/2010/main" xmlns="" w="9525">
                     <a:solidFill>
                       <a:srgbClr val="000000"/>
                     </a:solidFill>
@@ -18917,7 +19308,7 @@
               </a:ln>
               <a:extLst>
                 <a:ext uri="{91240B29-F687-4f45-9708-019B960494DF}">
-                  <a14:hiddenLine xmlns="" xmlns:a14="http://schemas.microsoft.com/office/drawing/2010/main" w="9525">
+                  <a14:hiddenLine xmlns:a14="http://schemas.microsoft.com/office/drawing/2010/main" xmlns="" w="9525">
                     <a:solidFill>
                       <a:srgbClr val="000000"/>
                     </a:solidFill>
@@ -19007,7 +19398,7 @@
               </a:ln>
               <a:extLst>
                 <a:ext uri="{91240B29-F687-4f45-9708-019B960494DF}">
-                  <a14:hiddenLine xmlns="" xmlns:a14="http://schemas.microsoft.com/office/drawing/2010/main" w="9525">
+                  <a14:hiddenLine xmlns:a14="http://schemas.microsoft.com/office/drawing/2010/main" xmlns="" w="9525">
                     <a:solidFill>
                       <a:srgbClr val="000000"/>
                     </a:solidFill>
@@ -19072,7 +19463,7 @@
               </a:ln>
               <a:extLst>
                 <a:ext uri="{91240B29-F687-4f45-9708-019B960494DF}">
-                  <a14:hiddenLine xmlns="" xmlns:a14="http://schemas.microsoft.com/office/drawing/2010/main" w="9525">
+                  <a14:hiddenLine xmlns:a14="http://schemas.microsoft.com/office/drawing/2010/main" xmlns="" w="9525">
                     <a:solidFill>
                       <a:srgbClr val="000000"/>
                     </a:solidFill>
@@ -19162,7 +19553,7 @@
               </a:ln>
               <a:extLst>
                 <a:ext uri="{91240B29-F687-4f45-9708-019B960494DF}">
-                  <a14:hiddenLine xmlns="" xmlns:a14="http://schemas.microsoft.com/office/drawing/2010/main" w="9525">
+                  <a14:hiddenLine xmlns:a14="http://schemas.microsoft.com/office/drawing/2010/main" xmlns="" w="9525">
                     <a:solidFill>
                       <a:srgbClr val="000000"/>
                     </a:solidFill>
@@ -19230,7 +19621,7 @@
               </a:ln>
               <a:extLst>
                 <a:ext uri="{91240B29-F687-4f45-9708-019B960494DF}">
-                  <a14:hiddenLine xmlns="" xmlns:a14="http://schemas.microsoft.com/office/drawing/2010/main" w="9525">
+                  <a14:hiddenLine xmlns:a14="http://schemas.microsoft.com/office/drawing/2010/main" xmlns="" w="9525">
                     <a:solidFill>
                       <a:srgbClr val="000000"/>
                     </a:solidFill>
@@ -19320,7 +19711,7 @@
               </a:ln>
               <a:extLst>
                 <a:ext uri="{91240B29-F687-4f45-9708-019B960494DF}">
-                  <a14:hiddenLine xmlns="" xmlns:a14="http://schemas.microsoft.com/office/drawing/2010/main" w="9525">
+                  <a14:hiddenLine xmlns:a14="http://schemas.microsoft.com/office/drawing/2010/main" xmlns="" w="9525">
                     <a:solidFill>
                       <a:srgbClr val="000000"/>
                     </a:solidFill>
@@ -19388,7 +19779,7 @@
               </a:ln>
               <a:extLst>
                 <a:ext uri="{91240B29-F687-4f45-9708-019B960494DF}">
-                  <a14:hiddenLine xmlns="" xmlns:a14="http://schemas.microsoft.com/office/drawing/2010/main" w="9525">
+                  <a14:hiddenLine xmlns:a14="http://schemas.microsoft.com/office/drawing/2010/main" xmlns="" w="9525">
                     <a:solidFill>
                       <a:srgbClr val="000000"/>
                     </a:solidFill>
@@ -19478,7 +19869,7 @@
               </a:ln>
               <a:extLst>
                 <a:ext uri="{91240B29-F687-4f45-9708-019B960494DF}">
-                  <a14:hiddenLine xmlns="" xmlns:a14="http://schemas.microsoft.com/office/drawing/2010/main" w="9525">
+                  <a14:hiddenLine xmlns:a14="http://schemas.microsoft.com/office/drawing/2010/main" xmlns="" w="9525">
                     <a:solidFill>
                       <a:srgbClr val="000000"/>
                     </a:solidFill>
@@ -19512,7 +19903,7 @@
               </a:ln>
               <a:extLst>
                 <a:ext uri="{91240B29-F687-4f45-9708-019B960494DF}">
-                  <a14:hiddenLine xmlns="" xmlns:a14="http://schemas.microsoft.com/office/drawing/2010/main" w="9525">
+                  <a14:hiddenLine xmlns:a14="http://schemas.microsoft.com/office/drawing/2010/main" xmlns="" w="9525">
                     <a:solidFill>
                       <a:srgbClr val="000000"/>
                     </a:solidFill>
@@ -19652,7 +20043,7 @@
           <a:p>
             <a:fld id="{3CBC1C18-307B-4F68-A007-B5B542270E8D}" type="datetimeFigureOut">
               <a:rPr lang="en-US" smtClean="0"/>
-              <a:t>5/2/20</a:t>
+              <a:t>5/13/2020</a:t>
             </a:fld>
             <a:endParaRPr lang="en-US" dirty="0"/>
           </a:p>
@@ -20341,6 +20732,189 @@
 <file path=ppt/slides/slide10.xml><?xml version="1.0" encoding="utf-8"?>
 <p:sld xmlns:a="http://schemas.openxmlformats.org/drawingml/2006/main" xmlns:r="http://schemas.openxmlformats.org/officeDocument/2006/relationships" xmlns:p="http://schemas.openxmlformats.org/presentationml/2006/main">
   <p:cSld>
+    <p:spTree>
+      <p:nvGrpSpPr>
+        <p:cNvPr id="1" name=""/>
+        <p:cNvGrpSpPr/>
+        <p:nvPr/>
+      </p:nvGrpSpPr>
+      <p:grpSpPr>
+        <a:xfrm>
+          <a:off x="0" y="0"/>
+          <a:ext cx="0" cy="0"/>
+          <a:chOff x="0" y="0"/>
+          <a:chExt cx="0" cy="0"/>
+        </a:xfrm>
+      </p:grpSpPr>
+      <p:sp>
+        <p:nvSpPr>
+          <p:cNvPr id="2" name="Titel 1">
+            <a:extLst>
+              <a:ext uri="{FF2B5EF4-FFF2-40B4-BE49-F238E27FC236}">
+                <a16:creationId xmlns:a16="http://schemas.microsoft.com/office/drawing/2014/main" id="{17F000E3-792F-014A-9E3F-B3FFF803F07B}"/>
+              </a:ext>
+            </a:extLst>
+          </p:cNvPr>
+          <p:cNvSpPr>
+            <a:spLocks noGrp="1"/>
+          </p:cNvSpPr>
+          <p:nvPr>
+            <p:ph type="title"/>
+          </p:nvPr>
+        </p:nvSpPr>
+        <p:spPr/>
+        <p:txBody>
+          <a:bodyPr/>
+          <a:lstStyle/>
+          <a:p>
+            <a:r>
+              <a:rPr lang="de-DE" dirty="0" err="1"/>
+              <a:t>dokumentation</a:t>
+            </a:r>
+            <a:endParaRPr lang="de-DE" dirty="0"/>
+          </a:p>
+        </p:txBody>
+      </p:sp>
+      <p:sp>
+        <p:nvSpPr>
+          <p:cNvPr id="4" name="Rechteck: abgerundete Ecken 10">
+            <a:extLst>
+              <a:ext uri="{FF2B5EF4-FFF2-40B4-BE49-F238E27FC236}">
+                <a16:creationId xmlns:a16="http://schemas.microsoft.com/office/drawing/2014/main" id="{3ACCC952-847A-6D42-8F4D-E94A91C13FEF}"/>
+              </a:ext>
+            </a:extLst>
+          </p:cNvPr>
+          <p:cNvSpPr/>
+          <p:nvPr/>
+        </p:nvSpPr>
+        <p:spPr>
+          <a:xfrm>
+            <a:off x="1190625" y="2314800"/>
+            <a:ext cx="2729734" cy="590254"/>
+          </a:xfrm>
+          <a:prstGeom prst="roundRect">
+            <a:avLst/>
+          </a:prstGeom>
+          <a:solidFill>
+            <a:schemeClr val="accent1"/>
+          </a:solidFill>
+          <a:ln>
+            <a:noFill/>
+          </a:ln>
+        </p:spPr>
+        <p:style>
+          <a:lnRef idx="0">
+            <a:scrgbClr r="0" g="0" b="0"/>
+          </a:lnRef>
+          <a:fillRef idx="0">
+            <a:scrgbClr r="0" g="0" b="0"/>
+          </a:fillRef>
+          <a:effectRef idx="0">
+            <a:scrgbClr r="0" g="0" b="0"/>
+          </a:effectRef>
+          <a:fontRef idx="minor">
+            <a:schemeClr val="lt1"/>
+          </a:fontRef>
+        </p:style>
+        <p:txBody>
+          <a:bodyPr rtlCol="0" anchor="ctr"/>
+          <a:lstStyle/>
+          <a:p>
+            <a:pPr algn="ctr"/>
+            <a:r>
+              <a:rPr lang="de-CH" sz="2000" dirty="0">
+                <a:latin typeface="Calibri" panose="020F0502020204030204" pitchFamily="34" charset="0"/>
+                <a:cs typeface="Calibri" panose="020F0502020204030204" pitchFamily="34" charset="0"/>
+              </a:rPr>
+              <a:t>Das Netzwerkprotokoll</a:t>
+            </a:r>
+          </a:p>
+        </p:txBody>
+      </p:sp>
+      <p:pic>
+        <p:nvPicPr>
+          <p:cNvPr id="5" name="Grafik 4" descr="Geöffnetes Buch">
+            <a:extLst>
+              <a:ext uri="{FF2B5EF4-FFF2-40B4-BE49-F238E27FC236}">
+                <a16:creationId xmlns:a16="http://schemas.microsoft.com/office/drawing/2014/main" id="{3E0A1C6A-E543-F247-8EA5-9AF3833A98DC}"/>
+              </a:ext>
+            </a:extLst>
+          </p:cNvPr>
+          <p:cNvPicPr>
+            <a:picLocks noChangeAspect="1"/>
+          </p:cNvPicPr>
+          <p:nvPr/>
+        </p:nvPicPr>
+        <p:blipFill>
+          <a:blip r:embed="rId2">
+            <a:extLst>
+              <a:ext uri="{28A0092B-C50C-407E-A947-70E740481C1C}">
+                <a14:useLocalDpi xmlns:a14="http://schemas.microsoft.com/office/drawing/2010/main" val="0"/>
+              </a:ext>
+              <a:ext uri="{96DAC541-7B7A-43D3-8B79-37D633B846F1}">
+                <asvg:svgBlip xmlns:asvg="http://schemas.microsoft.com/office/drawing/2016/SVG/main" r:embed="rId3"/>
+              </a:ext>
+            </a:extLst>
+          </a:blip>
+          <a:stretch>
+            <a:fillRect/>
+          </a:stretch>
+        </p:blipFill>
+        <p:spPr>
+          <a:xfrm>
+            <a:off x="1623773" y="3135600"/>
+            <a:ext cx="914400" cy="914400"/>
+          </a:xfrm>
+          <a:prstGeom prst="rect">
+            <a:avLst/>
+          </a:prstGeom>
+        </p:spPr>
+      </p:pic>
+      <p:pic>
+        <p:nvPicPr>
+          <p:cNvPr id="9" name="Grafik 8">
+            <a:extLst>
+              <a:ext uri="{FF2B5EF4-FFF2-40B4-BE49-F238E27FC236}">
+                <a16:creationId xmlns:a16="http://schemas.microsoft.com/office/drawing/2014/main" id="{E037E8E8-5726-BC41-8B73-89DFBEB41131}"/>
+              </a:ext>
+            </a:extLst>
+          </p:cNvPr>
+          <p:cNvPicPr>
+            <a:picLocks noChangeAspect="1"/>
+          </p:cNvPicPr>
+          <p:nvPr/>
+        </p:nvPicPr>
+        <p:blipFill>
+          <a:blip r:embed="rId4"/>
+          <a:srcRect/>
+          <a:stretch/>
+        </p:blipFill>
+        <p:spPr>
+          <a:xfrm>
+            <a:off x="4938711" y="1570246"/>
+            <a:ext cx="6108700" cy="4045108"/>
+          </a:xfrm>
+          <a:prstGeom prst="rect">
+            <a:avLst/>
+          </a:prstGeom>
+        </p:spPr>
+      </p:pic>
+    </p:spTree>
+    <p:extLst>
+      <p:ext uri="{BB962C8B-B14F-4D97-AF65-F5344CB8AC3E}">
+        <p14:creationId xmlns:p14="http://schemas.microsoft.com/office/powerpoint/2010/main" val="2444585762"/>
+      </p:ext>
+    </p:extLst>
+  </p:cSld>
+  <p:clrMapOvr>
+    <a:masterClrMapping/>
+  </p:clrMapOvr>
+</p:sld>
+</file>
+
+<file path=ppt/slides/slide11.xml><?xml version="1.0" encoding="utf-8"?>
+<p:sld xmlns:a="http://schemas.openxmlformats.org/drawingml/2006/main" xmlns:r="http://schemas.openxmlformats.org/officeDocument/2006/relationships" xmlns:p="http://schemas.openxmlformats.org/presentationml/2006/main">
+  <p:cSld>
     <p:bg>
       <p:bgPr>
         <a:blipFill>
@@ -20487,7 +21061,7 @@
           <a:noFill/>
           <a:extLst>
             <a:ext uri="{909E8E84-426E-40dd-AFC4-6F175D3DCCD1}">
-              <a14:hiddenFill xmlns:a14="http://schemas.microsoft.com/office/drawing/2010/main" xmlns:p14="http://schemas.microsoft.com/office/powerpoint/2010/main" xmlns:a16="http://schemas.microsoft.com/office/drawing/2014/main" xmlns="">
+              <a14:hiddenFill xmlns="" xmlns:a16="http://schemas.microsoft.com/office/drawing/2014/main" xmlns:p14="http://schemas.microsoft.com/office/powerpoint/2010/main" xmlns:a14="http://schemas.microsoft.com/office/drawing/2010/main">
                 <a:solidFill>
                   <a:srgbClr val="FFFFFF"/>
                 </a:solidFill>
@@ -20719,7 +21293,7 @@
             </a:ln>
             <a:extLst>
               <a:ext uri="{91240B29-F687-4f45-9708-019B960494DF}">
-                <a14:hiddenLine xmlns:a14="http://schemas.microsoft.com/office/drawing/2010/main" xmlns:p14="http://schemas.microsoft.com/office/powerpoint/2010/main" xmlns:a16="http://schemas.microsoft.com/office/drawing/2014/main" xmlns="" w="9525">
+                <a14:hiddenLine xmlns="" xmlns:a16="http://schemas.microsoft.com/office/drawing/2014/main" xmlns:p14="http://schemas.microsoft.com/office/powerpoint/2010/main" xmlns:a14="http://schemas.microsoft.com/office/drawing/2010/main" w="9525">
                   <a:solidFill>
                     <a:srgbClr val="000000"/>
                   </a:solidFill>
@@ -20824,7 +21398,7 @@
             </a:ln>
             <a:extLst>
               <a:ext uri="{91240B29-F687-4f45-9708-019B960494DF}">
-                <a14:hiddenLine xmlns:a14="http://schemas.microsoft.com/office/drawing/2010/main" xmlns:p14="http://schemas.microsoft.com/office/powerpoint/2010/main" xmlns:a16="http://schemas.microsoft.com/office/drawing/2014/main" xmlns="" w="9525">
+                <a14:hiddenLine xmlns="" xmlns:a16="http://schemas.microsoft.com/office/drawing/2014/main" xmlns:p14="http://schemas.microsoft.com/office/powerpoint/2010/main" xmlns:a14="http://schemas.microsoft.com/office/drawing/2010/main" w="9525">
                   <a:solidFill>
                     <a:srgbClr val="000000"/>
                   </a:solidFill>
@@ -20929,7 +21503,7 @@
             </a:ln>
             <a:extLst>
               <a:ext uri="{91240B29-F687-4f45-9708-019B960494DF}">
-                <a14:hiddenLine xmlns:a14="http://schemas.microsoft.com/office/drawing/2010/main" xmlns:p14="http://schemas.microsoft.com/office/powerpoint/2010/main" xmlns:a16="http://schemas.microsoft.com/office/drawing/2014/main" xmlns="" w="9525">
+                <a14:hiddenLine xmlns="" xmlns:a16="http://schemas.microsoft.com/office/drawing/2014/main" xmlns:p14="http://schemas.microsoft.com/office/powerpoint/2010/main" xmlns:a14="http://schemas.microsoft.com/office/drawing/2010/main" w="9525">
                   <a:solidFill>
                     <a:srgbClr val="000000"/>
                   </a:solidFill>
@@ -21006,7 +21580,7 @@
             </a:ln>
             <a:extLst>
               <a:ext uri="{91240B29-F687-4f45-9708-019B960494DF}">
-                <a14:hiddenLine xmlns:a14="http://schemas.microsoft.com/office/drawing/2010/main" xmlns:p14="http://schemas.microsoft.com/office/powerpoint/2010/main" xmlns:a16="http://schemas.microsoft.com/office/drawing/2014/main" xmlns="" w="9525">
+                <a14:hiddenLine xmlns="" xmlns:a16="http://schemas.microsoft.com/office/drawing/2014/main" xmlns:p14="http://schemas.microsoft.com/office/powerpoint/2010/main" xmlns:a14="http://schemas.microsoft.com/office/drawing/2010/main" w="9525">
                   <a:solidFill>
                     <a:srgbClr val="000000"/>
                   </a:solidFill>
@@ -21111,7 +21685,7 @@
             </a:ln>
             <a:extLst>
               <a:ext uri="{91240B29-F687-4f45-9708-019B960494DF}">
-                <a14:hiddenLine xmlns:a14="http://schemas.microsoft.com/office/drawing/2010/main" xmlns:p14="http://schemas.microsoft.com/office/powerpoint/2010/main" xmlns:a16="http://schemas.microsoft.com/office/drawing/2014/main" xmlns="" w="9525">
+                <a14:hiddenLine xmlns="" xmlns:a16="http://schemas.microsoft.com/office/drawing/2014/main" xmlns:p14="http://schemas.microsoft.com/office/powerpoint/2010/main" xmlns:a14="http://schemas.microsoft.com/office/drawing/2010/main" w="9525">
                   <a:solidFill>
                     <a:srgbClr val="000000"/>
                   </a:solidFill>
@@ -21188,7 +21762,7 @@
             </a:ln>
             <a:extLst>
               <a:ext uri="{91240B29-F687-4f45-9708-019B960494DF}">
-                <a14:hiddenLine xmlns:a14="http://schemas.microsoft.com/office/drawing/2010/main" xmlns:p14="http://schemas.microsoft.com/office/powerpoint/2010/main" xmlns:a16="http://schemas.microsoft.com/office/drawing/2014/main" xmlns="" w="9525">
+                <a14:hiddenLine xmlns="" xmlns:a16="http://schemas.microsoft.com/office/drawing/2014/main" xmlns:p14="http://schemas.microsoft.com/office/powerpoint/2010/main" xmlns:a14="http://schemas.microsoft.com/office/drawing/2010/main" w="9525">
                   <a:solidFill>
                     <a:srgbClr val="000000"/>
                   </a:solidFill>
@@ -21265,7 +21839,7 @@
             </a:ln>
             <a:extLst>
               <a:ext uri="{91240B29-F687-4f45-9708-019B960494DF}">
-                <a14:hiddenLine xmlns:a14="http://schemas.microsoft.com/office/drawing/2010/main" xmlns:p14="http://schemas.microsoft.com/office/powerpoint/2010/main" xmlns:a16="http://schemas.microsoft.com/office/drawing/2014/main" xmlns="" w="9525">
+                <a14:hiddenLine xmlns="" xmlns:a16="http://schemas.microsoft.com/office/drawing/2014/main" xmlns:p14="http://schemas.microsoft.com/office/powerpoint/2010/main" xmlns:a14="http://schemas.microsoft.com/office/drawing/2010/main" w="9525">
                   <a:solidFill>
                     <a:srgbClr val="000000"/>
                   </a:solidFill>
@@ -21370,7 +21944,7 @@
             </a:ln>
             <a:extLst>
               <a:ext uri="{91240B29-F687-4f45-9708-019B960494DF}">
-                <a14:hiddenLine xmlns:a14="http://schemas.microsoft.com/office/drawing/2010/main" xmlns:p14="http://schemas.microsoft.com/office/powerpoint/2010/main" xmlns:a16="http://schemas.microsoft.com/office/drawing/2014/main" xmlns="" w="9525">
+                <a14:hiddenLine xmlns="" xmlns:a16="http://schemas.microsoft.com/office/drawing/2014/main" xmlns:p14="http://schemas.microsoft.com/office/powerpoint/2010/main" xmlns:a14="http://schemas.microsoft.com/office/drawing/2010/main" w="9525">
                   <a:solidFill>
                     <a:srgbClr val="000000"/>
                   </a:solidFill>
@@ -21475,7 +22049,7 @@
             </a:ln>
             <a:extLst>
               <a:ext uri="{91240B29-F687-4f45-9708-019B960494DF}">
-                <a14:hiddenLine xmlns:a14="http://schemas.microsoft.com/office/drawing/2010/main" xmlns:p14="http://schemas.microsoft.com/office/powerpoint/2010/main" xmlns:a16="http://schemas.microsoft.com/office/drawing/2014/main" xmlns="" w="9525">
+                <a14:hiddenLine xmlns="" xmlns:a16="http://schemas.microsoft.com/office/drawing/2014/main" xmlns:p14="http://schemas.microsoft.com/office/powerpoint/2010/main" xmlns:a14="http://schemas.microsoft.com/office/drawing/2010/main" w="9525">
                   <a:solidFill>
                     <a:srgbClr val="000000"/>
                   </a:solidFill>
@@ -21552,7 +22126,7 @@
             </a:ln>
             <a:extLst>
               <a:ext uri="{91240B29-F687-4f45-9708-019B960494DF}">
-                <a14:hiddenLine xmlns:a14="http://schemas.microsoft.com/office/drawing/2010/main" xmlns:p14="http://schemas.microsoft.com/office/powerpoint/2010/main" xmlns:a16="http://schemas.microsoft.com/office/drawing/2014/main" xmlns="" w="9525">
+                <a14:hiddenLine xmlns="" xmlns:a16="http://schemas.microsoft.com/office/drawing/2014/main" xmlns:p14="http://schemas.microsoft.com/office/powerpoint/2010/main" xmlns:a14="http://schemas.microsoft.com/office/drawing/2010/main" w="9525">
                   <a:solidFill>
                     <a:srgbClr val="000000"/>
                   </a:solidFill>
@@ -21677,7 +22251,7 @@
             </a:ln>
             <a:extLst>
               <a:ext uri="{91240B29-F687-4f45-9708-019B960494DF}">
-                <a14:hiddenLine xmlns:a14="http://schemas.microsoft.com/office/drawing/2010/main" xmlns:p14="http://schemas.microsoft.com/office/powerpoint/2010/main" xmlns:a16="http://schemas.microsoft.com/office/drawing/2014/main" xmlns="" w="9525">
+                <a14:hiddenLine xmlns="" xmlns:a16="http://schemas.microsoft.com/office/drawing/2014/main" xmlns:p14="http://schemas.microsoft.com/office/powerpoint/2010/main" xmlns:a14="http://schemas.microsoft.com/office/drawing/2010/main" w="9525">
                   <a:solidFill>
                     <a:srgbClr val="000000"/>
                   </a:solidFill>
@@ -21791,7 +22365,7 @@
             </a:ln>
             <a:extLst>
               <a:ext uri="{91240B29-F687-4f45-9708-019B960494DF}">
-                <a14:hiddenLine xmlns:a14="http://schemas.microsoft.com/office/drawing/2010/main" xmlns:p14="http://schemas.microsoft.com/office/powerpoint/2010/main" xmlns:a16="http://schemas.microsoft.com/office/drawing/2014/main" xmlns="" w="9525">
+                <a14:hiddenLine xmlns="" xmlns:a16="http://schemas.microsoft.com/office/drawing/2014/main" xmlns:p14="http://schemas.microsoft.com/office/powerpoint/2010/main" xmlns:a14="http://schemas.microsoft.com/office/drawing/2010/main" w="9525">
                   <a:solidFill>
                     <a:srgbClr val="000000"/>
                   </a:solidFill>
@@ -21868,7 +22442,7 @@
             </a:ln>
             <a:extLst>
               <a:ext uri="{91240B29-F687-4f45-9708-019B960494DF}">
-                <a14:hiddenLine xmlns:a14="http://schemas.microsoft.com/office/drawing/2010/main" xmlns:p14="http://schemas.microsoft.com/office/powerpoint/2010/main" xmlns:a16="http://schemas.microsoft.com/office/drawing/2014/main" xmlns="" w="9525">
+                <a14:hiddenLine xmlns="" xmlns:a16="http://schemas.microsoft.com/office/drawing/2014/main" xmlns:p14="http://schemas.microsoft.com/office/powerpoint/2010/main" xmlns:a14="http://schemas.microsoft.com/office/drawing/2010/main" w="9525">
                   <a:solidFill>
                     <a:srgbClr val="000000"/>
                   </a:solidFill>
@@ -21945,7 +22519,7 @@
             </a:ln>
             <a:extLst>
               <a:ext uri="{91240B29-F687-4f45-9708-019B960494DF}">
-                <a14:hiddenLine xmlns:a14="http://schemas.microsoft.com/office/drawing/2010/main" xmlns:p14="http://schemas.microsoft.com/office/powerpoint/2010/main" xmlns:a16="http://schemas.microsoft.com/office/drawing/2014/main" xmlns="" w="9525">
+                <a14:hiddenLine xmlns="" xmlns:a16="http://schemas.microsoft.com/office/drawing/2014/main" xmlns:p14="http://schemas.microsoft.com/office/powerpoint/2010/main" xmlns:a14="http://schemas.microsoft.com/office/drawing/2010/main" w="9525">
                   <a:solidFill>
                     <a:srgbClr val="000000"/>
                   </a:solidFill>
@@ -22050,7 +22624,7 @@
             </a:ln>
             <a:extLst>
               <a:ext uri="{91240B29-F687-4f45-9708-019B960494DF}">
-                <a14:hiddenLine xmlns:a14="http://schemas.microsoft.com/office/drawing/2010/main" xmlns:p14="http://schemas.microsoft.com/office/powerpoint/2010/main" xmlns:a16="http://schemas.microsoft.com/office/drawing/2014/main" xmlns="" w="9525">
+                <a14:hiddenLine xmlns="" xmlns:a16="http://schemas.microsoft.com/office/drawing/2014/main" xmlns:p14="http://schemas.microsoft.com/office/powerpoint/2010/main" xmlns:a14="http://schemas.microsoft.com/office/drawing/2010/main" w="9525">
                   <a:solidFill>
                     <a:srgbClr val="000000"/>
                   </a:solidFill>
@@ -22099,7 +22673,7 @@
             </a:ln>
             <a:extLst>
               <a:ext uri="{91240B29-F687-4f45-9708-019B960494DF}">
-                <a14:hiddenLine xmlns:a14="http://schemas.microsoft.com/office/drawing/2010/main" xmlns:p14="http://schemas.microsoft.com/office/powerpoint/2010/main" xmlns:a16="http://schemas.microsoft.com/office/drawing/2014/main" xmlns="" w="9525">
+                <a14:hiddenLine xmlns="" xmlns:a16="http://schemas.microsoft.com/office/drawing/2014/main" xmlns:p14="http://schemas.microsoft.com/office/powerpoint/2010/main" xmlns:a14="http://schemas.microsoft.com/office/drawing/2010/main" w="9525">
                   <a:solidFill>
                     <a:srgbClr val="000000"/>
                   </a:solidFill>
@@ -22179,7 +22753,7 @@
             </a:ln>
             <a:extLst>
               <a:ext uri="{91240B29-F687-4f45-9708-019B960494DF}">
-                <a14:hiddenLine xmlns:a14="http://schemas.microsoft.com/office/drawing/2010/main" xmlns:p14="http://schemas.microsoft.com/office/powerpoint/2010/main" xmlns:a16="http://schemas.microsoft.com/office/drawing/2014/main" xmlns="" w="9525">
+                <a14:hiddenLine xmlns="" xmlns:a16="http://schemas.microsoft.com/office/drawing/2014/main" xmlns:p14="http://schemas.microsoft.com/office/powerpoint/2010/main" xmlns:a14="http://schemas.microsoft.com/office/drawing/2010/main" w="9525">
                   <a:solidFill>
                     <a:srgbClr val="000000"/>
                   </a:solidFill>
@@ -22284,7 +22858,7 @@
             </a:ln>
             <a:extLst>
               <a:ext uri="{91240B29-F687-4f45-9708-019B960494DF}">
-                <a14:hiddenLine xmlns:a14="http://schemas.microsoft.com/office/drawing/2010/main" xmlns:p14="http://schemas.microsoft.com/office/powerpoint/2010/main" xmlns:a16="http://schemas.microsoft.com/office/drawing/2014/main" xmlns="" w="9525">
+                <a14:hiddenLine xmlns="" xmlns:a16="http://schemas.microsoft.com/office/drawing/2014/main" xmlns:p14="http://schemas.microsoft.com/office/powerpoint/2010/main" xmlns:a14="http://schemas.microsoft.com/office/drawing/2010/main" w="9525">
                   <a:solidFill>
                     <a:srgbClr val="000000"/>
                   </a:solidFill>
@@ -22361,7 +22935,7 @@
             </a:ln>
             <a:extLst>
               <a:ext uri="{91240B29-F687-4f45-9708-019B960494DF}">
-                <a14:hiddenLine xmlns:a14="http://schemas.microsoft.com/office/drawing/2010/main" xmlns:p14="http://schemas.microsoft.com/office/powerpoint/2010/main" xmlns:a16="http://schemas.microsoft.com/office/drawing/2014/main" xmlns="" w="9525">
+                <a14:hiddenLine xmlns="" xmlns:a16="http://schemas.microsoft.com/office/drawing/2014/main" xmlns:p14="http://schemas.microsoft.com/office/powerpoint/2010/main" xmlns:a14="http://schemas.microsoft.com/office/drawing/2010/main" w="9525">
                   <a:solidFill>
                     <a:srgbClr val="000000"/>
                   </a:solidFill>
@@ -22466,7 +23040,7 @@
             </a:ln>
             <a:extLst>
               <a:ext uri="{91240B29-F687-4f45-9708-019B960494DF}">
-                <a14:hiddenLine xmlns:a14="http://schemas.microsoft.com/office/drawing/2010/main" xmlns:p14="http://schemas.microsoft.com/office/powerpoint/2010/main" xmlns:a16="http://schemas.microsoft.com/office/drawing/2014/main" xmlns="" w="9525">
+                <a14:hiddenLine xmlns="" xmlns:a16="http://schemas.microsoft.com/office/drawing/2014/main" xmlns:p14="http://schemas.microsoft.com/office/powerpoint/2010/main" xmlns:a14="http://schemas.microsoft.com/office/drawing/2010/main" w="9525">
                   <a:solidFill>
                     <a:srgbClr val="000000"/>
                   </a:solidFill>
@@ -22546,7 +23120,7 @@
             </a:ln>
             <a:extLst>
               <a:ext uri="{91240B29-F687-4f45-9708-019B960494DF}">
-                <a14:hiddenLine xmlns:a14="http://schemas.microsoft.com/office/drawing/2010/main" xmlns:p14="http://schemas.microsoft.com/office/powerpoint/2010/main" xmlns:a16="http://schemas.microsoft.com/office/drawing/2014/main" xmlns="" w="9525">
+                <a14:hiddenLine xmlns="" xmlns:a16="http://schemas.microsoft.com/office/drawing/2014/main" xmlns:p14="http://schemas.microsoft.com/office/powerpoint/2010/main" xmlns:a14="http://schemas.microsoft.com/office/drawing/2010/main" w="9525">
                   <a:solidFill>
                     <a:srgbClr val="000000"/>
                   </a:solidFill>
@@ -22623,7 +23197,7 @@
             </a:ln>
             <a:extLst>
               <a:ext uri="{91240B29-F687-4f45-9708-019B960494DF}">
-                <a14:hiddenLine xmlns:a14="http://schemas.microsoft.com/office/drawing/2010/main" xmlns:p14="http://schemas.microsoft.com/office/powerpoint/2010/main" xmlns:a16="http://schemas.microsoft.com/office/drawing/2014/main" xmlns="" w="9525">
+                <a14:hiddenLine xmlns="" xmlns:a16="http://schemas.microsoft.com/office/drawing/2014/main" xmlns:p14="http://schemas.microsoft.com/office/powerpoint/2010/main" xmlns:a14="http://schemas.microsoft.com/office/drawing/2010/main" w="9525">
                   <a:solidFill>
                     <a:srgbClr val="000000"/>
                   </a:solidFill>
@@ -22728,7 +23302,7 @@
             </a:ln>
             <a:extLst>
               <a:ext uri="{91240B29-F687-4f45-9708-019B960494DF}">
-                <a14:hiddenLine xmlns:a14="http://schemas.microsoft.com/office/drawing/2010/main" xmlns:p14="http://schemas.microsoft.com/office/powerpoint/2010/main" xmlns:a16="http://schemas.microsoft.com/office/drawing/2014/main" xmlns="" w="9525">
+                <a14:hiddenLine xmlns="" xmlns:a16="http://schemas.microsoft.com/office/drawing/2014/main" xmlns:p14="http://schemas.microsoft.com/office/powerpoint/2010/main" xmlns:a14="http://schemas.microsoft.com/office/drawing/2010/main" w="9525">
                   <a:solidFill>
                     <a:srgbClr val="000000"/>
                   </a:solidFill>
@@ -22833,7 +23407,7 @@
             </a:ln>
             <a:extLst>
               <a:ext uri="{91240B29-F687-4f45-9708-019B960494DF}">
-                <a14:hiddenLine xmlns:a14="http://schemas.microsoft.com/office/drawing/2010/main" xmlns:p14="http://schemas.microsoft.com/office/powerpoint/2010/main" xmlns:a16="http://schemas.microsoft.com/office/drawing/2014/main" xmlns="" w="9525">
+                <a14:hiddenLine xmlns="" xmlns:a16="http://schemas.microsoft.com/office/drawing/2014/main" xmlns:p14="http://schemas.microsoft.com/office/powerpoint/2010/main" xmlns:a14="http://schemas.microsoft.com/office/drawing/2010/main" w="9525">
                   <a:solidFill>
                     <a:srgbClr val="000000"/>
                   </a:solidFill>
@@ -22913,7 +23487,7 @@
             </a:ln>
             <a:extLst>
               <a:ext uri="{91240B29-F687-4f45-9708-019B960494DF}">
-                <a14:hiddenLine xmlns:a14="http://schemas.microsoft.com/office/drawing/2010/main" xmlns:p14="http://schemas.microsoft.com/office/powerpoint/2010/main" xmlns:a16="http://schemas.microsoft.com/office/drawing/2014/main" xmlns="" w="9525">
+                <a14:hiddenLine xmlns="" xmlns:a16="http://schemas.microsoft.com/office/drawing/2014/main" xmlns:p14="http://schemas.microsoft.com/office/powerpoint/2010/main" xmlns:a14="http://schemas.microsoft.com/office/drawing/2010/main" w="9525">
                   <a:solidFill>
                     <a:srgbClr val="000000"/>
                   </a:solidFill>
@@ -23048,7 +23622,7 @@
             </a:ln>
             <a:extLst>
               <a:ext uri="{91240B29-F687-4f45-9708-019B960494DF}">
-                <a14:hiddenLine xmlns:a14="http://schemas.microsoft.com/office/drawing/2010/main" xmlns:p14="http://schemas.microsoft.com/office/powerpoint/2010/main" xmlns:a16="http://schemas.microsoft.com/office/drawing/2014/main" xmlns="" w="9525">
+                <a14:hiddenLine xmlns="" xmlns:a16="http://schemas.microsoft.com/office/drawing/2014/main" xmlns:p14="http://schemas.microsoft.com/office/powerpoint/2010/main" xmlns:a14="http://schemas.microsoft.com/office/drawing/2010/main" w="9525">
                   <a:solidFill>
                     <a:srgbClr val="000000"/>
                   </a:solidFill>
@@ -23061,192 +23635,6 @@
           </p:spPr>
         </p:sp>
       </p:grpSp>
-      <p:sp>
-        <p:nvSpPr>
-          <p:cNvPr id="2" name="Textfeld 1"/>
-          <p:cNvSpPr txBox="1"/>
-          <p:nvPr/>
-        </p:nvSpPr>
-        <p:spPr>
-          <a:xfrm>
-            <a:off x="580119" y="2074283"/>
-            <a:ext cx="2171700" cy="369332"/>
-          </a:xfrm>
-          <a:prstGeom prst="rect">
-            <a:avLst/>
-          </a:prstGeom>
-          <a:noFill/>
-        </p:spPr>
-        <p:txBody>
-          <a:bodyPr wrap="square" rtlCol="0">
-            <a:spAutoFit/>
-          </a:bodyPr>
-          <a:lstStyle/>
-          <a:p>
-            <a:pPr>
-              <a:spcAft>
-                <a:spcPts val="600"/>
-              </a:spcAft>
-            </a:pPr>
-            <a:r>
-              <a:rPr lang="de-CH" dirty="0">
-                <a:latin typeface="Calibri" panose="020F0502020204030204" pitchFamily="34" charset="0"/>
-                <a:cs typeface="Calibri" panose="020F0502020204030204" pitchFamily="34" charset="0"/>
-              </a:rPr>
-              <a:t>Projektplan:</a:t>
-            </a:r>
-          </a:p>
-        </p:txBody>
-      </p:sp>
-      <p:sp>
-        <p:nvSpPr>
-          <p:cNvPr id="11" name="Textfeld 10"/>
-          <p:cNvSpPr txBox="1"/>
-          <p:nvPr/>
-        </p:nvSpPr>
-        <p:spPr>
-          <a:xfrm>
-            <a:off x="2690860" y="2049943"/>
-            <a:ext cx="2171700" cy="369332"/>
-          </a:xfrm>
-          <a:prstGeom prst="rect">
-            <a:avLst/>
-          </a:prstGeom>
-          <a:noFill/>
-        </p:spPr>
-        <p:txBody>
-          <a:bodyPr wrap="square" rtlCol="0">
-            <a:spAutoFit/>
-          </a:bodyPr>
-          <a:lstStyle/>
-          <a:p>
-            <a:pPr>
-              <a:spcAft>
-                <a:spcPts val="600"/>
-              </a:spcAft>
-            </a:pPr>
-            <a:r>
-              <a:rPr lang="de-CH" dirty="0">
-                <a:latin typeface="Calibri" panose="020F0502020204030204" pitchFamily="34" charset="0"/>
-                <a:cs typeface="Calibri" panose="020F0502020204030204" pitchFamily="34" charset="0"/>
-              </a:rPr>
-              <a:t>Programmieren: </a:t>
-            </a:r>
-          </a:p>
-        </p:txBody>
-      </p:sp>
-      <p:sp>
-        <p:nvSpPr>
-          <p:cNvPr id="12" name="Textfeld 11"/>
-          <p:cNvSpPr txBox="1"/>
-          <p:nvPr/>
-        </p:nvSpPr>
-        <p:spPr>
-          <a:xfrm>
-            <a:off x="2766220" y="4926248"/>
-            <a:ext cx="2171700" cy="369332"/>
-          </a:xfrm>
-          <a:prstGeom prst="rect">
-            <a:avLst/>
-          </a:prstGeom>
-          <a:noFill/>
-        </p:spPr>
-        <p:txBody>
-          <a:bodyPr wrap="square" rtlCol="0">
-            <a:spAutoFit/>
-          </a:bodyPr>
-          <a:lstStyle/>
-          <a:p>
-            <a:pPr>
-              <a:spcAft>
-                <a:spcPts val="600"/>
-              </a:spcAft>
-            </a:pPr>
-            <a:r>
-              <a:rPr lang="de-CH" dirty="0">
-                <a:latin typeface="Calibri" panose="020F0502020204030204" pitchFamily="34" charset="0"/>
-                <a:cs typeface="Calibri" panose="020F0502020204030204" pitchFamily="34" charset="0"/>
-              </a:rPr>
-              <a:t>Gruppenarbeit:</a:t>
-            </a:r>
-          </a:p>
-        </p:txBody>
-      </p:sp>
-      <p:sp>
-        <p:nvSpPr>
-          <p:cNvPr id="14" name="Textfeld 13"/>
-          <p:cNvSpPr txBox="1"/>
-          <p:nvPr/>
-        </p:nvSpPr>
-        <p:spPr>
-          <a:xfrm>
-            <a:off x="683090" y="4886148"/>
-            <a:ext cx="699699" cy="369332"/>
-          </a:xfrm>
-          <a:prstGeom prst="rect">
-            <a:avLst/>
-          </a:prstGeom>
-          <a:noFill/>
-        </p:spPr>
-        <p:txBody>
-          <a:bodyPr wrap="square" rtlCol="0">
-            <a:spAutoFit/>
-          </a:bodyPr>
-          <a:lstStyle/>
-          <a:p>
-            <a:pPr>
-              <a:spcAft>
-                <a:spcPts val="600"/>
-              </a:spcAft>
-            </a:pPr>
-            <a:r>
-              <a:rPr lang="de-CH" dirty="0" err="1"/>
-              <a:t>Git</a:t>
-            </a:r>
-            <a:r>
-              <a:rPr lang="de-CH" dirty="0"/>
-              <a:t>:</a:t>
-            </a:r>
-          </a:p>
-        </p:txBody>
-      </p:sp>
-      <p:sp>
-        <p:nvSpPr>
-          <p:cNvPr id="15" name="Textfeld 14"/>
-          <p:cNvSpPr txBox="1"/>
-          <p:nvPr/>
-        </p:nvSpPr>
-        <p:spPr>
-          <a:xfrm>
-            <a:off x="2766220" y="3439828"/>
-            <a:ext cx="2171700" cy="369332"/>
-          </a:xfrm>
-          <a:prstGeom prst="rect">
-            <a:avLst/>
-          </a:prstGeom>
-          <a:noFill/>
-        </p:spPr>
-        <p:txBody>
-          <a:bodyPr wrap="square" rtlCol="0">
-            <a:spAutoFit/>
-          </a:bodyPr>
-          <a:lstStyle/>
-          <a:p>
-            <a:pPr>
-              <a:spcAft>
-                <a:spcPts val="600"/>
-              </a:spcAft>
-            </a:pPr>
-            <a:r>
-              <a:rPr lang="de-CH" dirty="0">
-                <a:latin typeface="Calibri" panose="020F0502020204030204" pitchFamily="34" charset="0"/>
-                <a:cs typeface="Calibri" panose="020F0502020204030204" pitchFamily="34" charset="0"/>
-              </a:rPr>
-              <a:t>Dokumentation: </a:t>
-            </a:r>
-          </a:p>
-        </p:txBody>
-      </p:sp>
       <p:graphicFrame>
         <p:nvGraphicFramePr>
           <p:cNvPr id="5" name="Diagramm 4"/>
@@ -23254,14 +23642,14 @@
           <p:nvPr>
             <p:extLst>
               <p:ext uri="{D42A27DB-BD31-4B8C-83A1-F6EECF244321}">
-                <p14:modId xmlns:p14="http://schemas.microsoft.com/office/powerpoint/2010/main" val="3126932719"/>
+                <p14:modId xmlns:p14="http://schemas.microsoft.com/office/powerpoint/2010/main" val="2498574000"/>
               </p:ext>
             </p:extLst>
           </p:nvPr>
         </p:nvGraphicFramePr>
         <p:xfrm>
-          <a:off x="333375" y="2351087"/>
-          <a:ext cx="4459287" cy="3965046"/>
+          <a:off x="481342" y="1233018"/>
+          <a:ext cx="4459287" cy="5066341"/>
         </p:xfrm>
         <a:graphic>
           <a:graphicData uri="http://schemas.openxmlformats.org/drawingml/2006/diagram">
@@ -23269,6 +23657,213 @@
           </a:graphicData>
         </a:graphic>
       </p:graphicFrame>
+      <p:grpSp>
+        <p:nvGrpSpPr>
+          <p:cNvPr id="3" name="Gruppieren 2">
+            <a:extLst>
+              <a:ext uri="{FF2B5EF4-FFF2-40B4-BE49-F238E27FC236}">
+                <a16:creationId xmlns:a16="http://schemas.microsoft.com/office/drawing/2014/main" id="{94E05261-2910-412C-BD94-6283474E1438}"/>
+              </a:ext>
+            </a:extLst>
+          </p:cNvPr>
+          <p:cNvGrpSpPr/>
+          <p:nvPr/>
+        </p:nvGrpSpPr>
+        <p:grpSpPr>
+          <a:xfrm>
+            <a:off x="409822" y="1201923"/>
+            <a:ext cx="4601668" cy="3683750"/>
+            <a:chOff x="409822" y="1769480"/>
+            <a:chExt cx="4601668" cy="3683750"/>
+          </a:xfrm>
+        </p:grpSpPr>
+        <p:sp>
+          <p:nvSpPr>
+            <p:cNvPr id="2" name="Textfeld 1"/>
+            <p:cNvSpPr txBox="1"/>
+            <p:nvPr/>
+          </p:nvSpPr>
+          <p:spPr>
+            <a:xfrm>
+              <a:off x="411958" y="1769480"/>
+              <a:ext cx="2171700" cy="369332"/>
+            </a:xfrm>
+            <a:prstGeom prst="rect">
+              <a:avLst/>
+            </a:prstGeom>
+            <a:noFill/>
+          </p:spPr>
+          <p:txBody>
+            <a:bodyPr wrap="square" rtlCol="0">
+              <a:spAutoFit/>
+            </a:bodyPr>
+            <a:lstStyle/>
+            <a:p>
+              <a:pPr>
+                <a:spcAft>
+                  <a:spcPts val="600"/>
+                </a:spcAft>
+              </a:pPr>
+              <a:r>
+                <a:rPr lang="de-CH" dirty="0">
+                  <a:latin typeface="Calibri" panose="020F0502020204030204" pitchFamily="34" charset="0"/>
+                  <a:cs typeface="Calibri" panose="020F0502020204030204" pitchFamily="34" charset="0"/>
+                </a:rPr>
+                <a:t>Projektplan:</a:t>
+              </a:r>
+            </a:p>
+          </p:txBody>
+        </p:sp>
+        <p:sp>
+          <p:nvSpPr>
+            <p:cNvPr id="11" name="Textfeld 10"/>
+            <p:cNvSpPr txBox="1"/>
+            <p:nvPr/>
+          </p:nvSpPr>
+          <p:spPr>
+            <a:xfrm>
+              <a:off x="2838001" y="1776674"/>
+              <a:ext cx="2171700" cy="369332"/>
+            </a:xfrm>
+            <a:prstGeom prst="rect">
+              <a:avLst/>
+            </a:prstGeom>
+            <a:noFill/>
+          </p:spPr>
+          <p:txBody>
+            <a:bodyPr wrap="square" rtlCol="0">
+              <a:spAutoFit/>
+            </a:bodyPr>
+            <a:lstStyle/>
+            <a:p>
+              <a:pPr>
+                <a:spcAft>
+                  <a:spcPts val="600"/>
+                </a:spcAft>
+              </a:pPr>
+              <a:r>
+                <a:rPr lang="de-CH" dirty="0">
+                  <a:latin typeface="Calibri" panose="020F0502020204030204" pitchFamily="34" charset="0"/>
+                  <a:cs typeface="Calibri" panose="020F0502020204030204" pitchFamily="34" charset="0"/>
+                </a:rPr>
+                <a:t>Programmieren: </a:t>
+              </a:r>
+            </a:p>
+          </p:txBody>
+        </p:sp>
+        <p:sp>
+          <p:nvSpPr>
+            <p:cNvPr id="12" name="Textfeld 11"/>
+            <p:cNvSpPr txBox="1"/>
+            <p:nvPr/>
+          </p:nvSpPr>
+          <p:spPr>
+            <a:xfrm>
+              <a:off x="2829280" y="5083898"/>
+              <a:ext cx="2171700" cy="369332"/>
+            </a:xfrm>
+            <a:prstGeom prst="rect">
+              <a:avLst/>
+            </a:prstGeom>
+            <a:noFill/>
+          </p:spPr>
+          <p:txBody>
+            <a:bodyPr wrap="square" rtlCol="0">
+              <a:spAutoFit/>
+            </a:bodyPr>
+            <a:lstStyle/>
+            <a:p>
+              <a:pPr>
+                <a:spcAft>
+                  <a:spcPts val="600"/>
+                </a:spcAft>
+              </a:pPr>
+              <a:r>
+                <a:rPr lang="de-CH" dirty="0">
+                  <a:latin typeface="Calibri" panose="020F0502020204030204" pitchFamily="34" charset="0"/>
+                  <a:cs typeface="Calibri" panose="020F0502020204030204" pitchFamily="34" charset="0"/>
+                </a:rPr>
+                <a:t>Gruppenarbeit:</a:t>
+              </a:r>
+            </a:p>
+          </p:txBody>
+        </p:sp>
+        <p:sp>
+          <p:nvSpPr>
+            <p:cNvPr id="14" name="Textfeld 13"/>
+            <p:cNvSpPr txBox="1"/>
+            <p:nvPr/>
+          </p:nvSpPr>
+          <p:spPr>
+            <a:xfrm>
+              <a:off x="409822" y="5064818"/>
+              <a:ext cx="699699" cy="369332"/>
+            </a:xfrm>
+            <a:prstGeom prst="rect">
+              <a:avLst/>
+            </a:prstGeom>
+            <a:noFill/>
+          </p:spPr>
+          <p:txBody>
+            <a:bodyPr wrap="square" rtlCol="0">
+              <a:spAutoFit/>
+            </a:bodyPr>
+            <a:lstStyle/>
+            <a:p>
+              <a:pPr>
+                <a:spcAft>
+                  <a:spcPts val="600"/>
+                </a:spcAft>
+              </a:pPr>
+              <a:r>
+                <a:rPr lang="de-CH" dirty="0" err="1"/>
+                <a:t>Git</a:t>
+              </a:r>
+              <a:r>
+                <a:rPr lang="de-CH" dirty="0"/>
+                <a:t>:</a:t>
+              </a:r>
+            </a:p>
+          </p:txBody>
+        </p:sp>
+        <p:sp>
+          <p:nvSpPr>
+            <p:cNvPr id="15" name="Textfeld 14"/>
+            <p:cNvSpPr txBox="1"/>
+            <p:nvPr/>
+          </p:nvSpPr>
+          <p:spPr>
+            <a:xfrm>
+              <a:off x="2839790" y="3429318"/>
+              <a:ext cx="2171700" cy="369332"/>
+            </a:xfrm>
+            <a:prstGeom prst="rect">
+              <a:avLst/>
+            </a:prstGeom>
+            <a:noFill/>
+          </p:spPr>
+          <p:txBody>
+            <a:bodyPr wrap="square" rtlCol="0">
+              <a:spAutoFit/>
+            </a:bodyPr>
+            <a:lstStyle/>
+            <a:p>
+              <a:pPr>
+                <a:spcAft>
+                  <a:spcPts val="600"/>
+                </a:spcAft>
+              </a:pPr>
+              <a:r>
+                <a:rPr lang="de-CH" dirty="0">
+                  <a:latin typeface="Calibri" panose="020F0502020204030204" pitchFamily="34" charset="0"/>
+                  <a:cs typeface="Calibri" panose="020F0502020204030204" pitchFamily="34" charset="0"/>
+                </a:rPr>
+                <a:t>Dokumentation: </a:t>
+              </a:r>
+            </a:p>
+          </p:txBody>
+        </p:sp>
+      </p:grpSp>
     </p:spTree>
     <p:extLst>
       <p:ext uri="{BB962C8B-B14F-4D97-AF65-F5344CB8AC3E}">
@@ -23282,7 +23877,7 @@
 </p:sld>
 </file>
 
-<file path=ppt/slides/slide11.xml><?xml version="1.0" encoding="utf-8"?>
+<file path=ppt/slides/slide12.xml><?xml version="1.0" encoding="utf-8"?>
 <p:sld xmlns:a="http://schemas.openxmlformats.org/drawingml/2006/main" xmlns:r="http://schemas.openxmlformats.org/officeDocument/2006/relationships" xmlns:p="http://schemas.openxmlformats.org/presentationml/2006/main">
   <p:cSld>
     <p:spTree>
@@ -23347,7 +23942,7 @@
 </p:sld>
 </file>
 
-<file path=ppt/slides/slide12.xml><?xml version="1.0" encoding="utf-8"?>
+<file path=ppt/slides/slide13.xml><?xml version="1.0" encoding="utf-8"?>
 <p:sld xmlns:a="http://schemas.openxmlformats.org/drawingml/2006/main" xmlns:r="http://schemas.openxmlformats.org/officeDocument/2006/relationships" xmlns:p="http://schemas.openxmlformats.org/presentationml/2006/main">
   <p:cSld>
     <p:spTree>
@@ -23487,21 +24082,19 @@
           <a:p>
             <a:r>
               <a:rPr lang="de-DE" dirty="0"/>
-              <a:t>Auf der Basis von </a:t>
-            </a:r>
-            <a:r>
-              <a:rPr lang="de-DE" dirty="0" err="1"/>
-              <a:t>Blackjack</a:t>
-            </a:r>
-            <a:r>
-              <a:rPr lang="de-DE" dirty="0"/>
-              <a:t> </a:t>
+              <a:t>Inspiriert durch Blackjack </a:t>
             </a:r>
           </a:p>
           <a:p>
             <a:r>
               <a:rPr lang="de-DE" dirty="0"/>
               <a:t>Die Karten haben Motive des Bachelorstudiums</a:t>
+            </a:r>
+          </a:p>
+          <a:p>
+            <a:r>
+              <a:rPr lang="de-CH" dirty="0"/>
+              <a:t>Jede Karte gibt eine Anzahl Plus- oder Minuspunkte</a:t>
             </a:r>
           </a:p>
           <a:p>
@@ -23527,7 +24120,7 @@
             <a:pPr lvl="1"/>
             <a:r>
               <a:rPr lang="de-CH" dirty="0"/>
-              <a:t>Runde aussetzen </a:t>
+              <a:t>Ausscheiden aus dem Match</a:t>
             </a:r>
           </a:p>
           <a:p>
@@ -23838,15 +24431,33 @@
                                   </p:childTnLst>
                                 </p:cTn>
                               </p:par>
+                            </p:childTnLst>
+                          </p:cTn>
+                        </p:par>
+                      </p:childTnLst>
+                    </p:cTn>
+                  </p:par>
+                  <p:par>
+                    <p:cTn id="23" fill="hold">
+                      <p:stCondLst>
+                        <p:cond delay="indefinite"/>
+                      </p:stCondLst>
+                      <p:childTnLst>
+                        <p:par>
+                          <p:cTn id="24" fill="hold">
+                            <p:stCondLst>
+                              <p:cond delay="0"/>
+                            </p:stCondLst>
+                            <p:childTnLst>
                               <p:par>
-                                <p:cTn id="23" presetID="1" presetClass="entr" presetSubtype="0" fill="hold" nodeType="withEffect">
+                                <p:cTn id="25" presetID="1" presetClass="entr" presetSubtype="0" fill="hold" nodeType="clickEffect">
                                   <p:stCondLst>
                                     <p:cond delay="0"/>
                                   </p:stCondLst>
                                   <p:childTnLst>
                                     <p:set>
                                       <p:cBhvr>
-                                        <p:cTn id="24" dur="1" fill="hold">
+                                        <p:cTn id="26" dur="1" fill="hold">
                                           <p:stCondLst>
                                             <p:cond delay="0"/>
                                           </p:stCondLst>
@@ -23870,14 +24481,14 @@
                                 </p:cTn>
                               </p:par>
                               <p:par>
-                                <p:cTn id="25" presetID="1" presetClass="entr" presetSubtype="0" fill="hold" nodeType="withEffect">
+                                <p:cTn id="27" presetID="1" presetClass="entr" presetSubtype="0" fill="hold" nodeType="withEffect">
                                   <p:stCondLst>
                                     <p:cond delay="0"/>
                                   </p:stCondLst>
                                   <p:childTnLst>
                                     <p:set>
                                       <p:cBhvr>
-                                        <p:cTn id="26" dur="1" fill="hold">
+                                        <p:cTn id="28" dur="1" fill="hold">
                                           <p:stCondLst>
                                             <p:cond delay="0"/>
                                           </p:stCondLst>
@@ -23886,6 +24497,37 @@
                                           <p:spTgt spid="3">
                                             <p:txEl>
                                               <p:pRg st="6" end="6"/>
+                                            </p:txEl>
+                                          </p:spTgt>
+                                        </p:tgtEl>
+                                        <p:attrNameLst>
+                                          <p:attrName>style.visibility</p:attrName>
+                                        </p:attrNameLst>
+                                      </p:cBhvr>
+                                      <p:to>
+                                        <p:strVal val="visible"/>
+                                      </p:to>
+                                    </p:set>
+                                  </p:childTnLst>
+                                </p:cTn>
+                              </p:par>
+                              <p:par>
+                                <p:cTn id="29" presetID="1" presetClass="entr" presetSubtype="0" fill="hold" nodeType="withEffect">
+                                  <p:stCondLst>
+                                    <p:cond delay="0"/>
+                                  </p:stCondLst>
+                                  <p:childTnLst>
+                                    <p:set>
+                                      <p:cBhvr>
+                                        <p:cTn id="30" dur="1" fill="hold">
+                                          <p:stCondLst>
+                                            <p:cond delay="0"/>
+                                          </p:stCondLst>
+                                        </p:cTn>
+                                        <p:tgtEl>
+                                          <p:spTgt spid="3">
+                                            <p:txEl>
+                                              <p:pRg st="7" end="7"/>
                                             </p:txEl>
                                           </p:spTgt>
                                         </p:tgtEl>
@@ -23977,7 +24619,7 @@
           <a:p>
             <a:r>
               <a:rPr lang="de-CH" dirty="0"/>
-              <a:t>Ziel: Derjenige, der zuerst die Zahl 180 hat, bekommt 360 </a:t>
+              <a:t>Ziel: Derjenige, der zuerst 180 Punkte hat, bekommt 360 </a:t>
             </a:r>
             <a:r>
               <a:rPr lang="de-CH" dirty="0" err="1"/>
@@ -23999,11 +24641,15 @@
           <a:p>
             <a:r>
               <a:rPr lang="de-CH" dirty="0"/>
-              <a:t>Alle anderen: Punkte = </a:t>
+              <a:t>Alle anderen: </a:t>
             </a:r>
             <a:r>
               <a:rPr lang="de-CH" dirty="0" err="1"/>
               <a:t>Coins</a:t>
+            </a:r>
+            <a:r>
+              <a:rPr lang="de-CH" dirty="0"/>
+              <a:t> = Punkte - 50</a:t>
             </a:r>
             <a:endParaRPr lang="de-DE" dirty="0"/>
           </a:p>
@@ -24453,14 +25099,14 @@
           <p:nvPr>
             <p:extLst>
               <p:ext uri="{D42A27DB-BD31-4B8C-83A1-F6EECF244321}">
-                <p14:modId xmlns:p14="http://schemas.microsoft.com/office/powerpoint/2010/main" val="442917513"/>
+                <p14:modId xmlns:p14="http://schemas.microsoft.com/office/powerpoint/2010/main" val="425775799"/>
               </p:ext>
             </p:extLst>
           </p:nvPr>
         </p:nvGraphicFramePr>
         <p:xfrm>
-          <a:off x="1257086" y="4252233"/>
-          <a:ext cx="9612000" cy="1960416"/>
+          <a:off x="1257086" y="4252232"/>
+          <a:ext cx="9612000" cy="2227767"/>
         </p:xfrm>
         <a:graphic>
           <a:graphicData uri="http://schemas.openxmlformats.org/drawingml/2006/diagram">
@@ -24645,7 +25291,7 @@
         </p:spPr>
         <p:txBody>
           <a:bodyPr>
-            <a:normAutofit/>
+            <a:normAutofit lnSpcReduction="10000"/>
           </a:bodyPr>
           <a:lstStyle/>
           <a:p>
@@ -24707,6 +25353,25 @@
               <a:t>SceneBuilder</a:t>
             </a:r>
             <a:endParaRPr lang="de-DE" dirty="0"/>
+          </a:p>
+          <a:p>
+            <a:pPr lvl="1"/>
+            <a:r>
+              <a:rPr lang="de-DE" dirty="0" err="1"/>
+              <a:t>Texmaker</a:t>
+            </a:r>
+            <a:r>
+              <a:rPr lang="de-DE" dirty="0"/>
+              <a:t> (</a:t>
+            </a:r>
+            <a:r>
+              <a:rPr lang="de-DE" dirty="0" err="1"/>
+              <a:t>LaTeX</a:t>
+            </a:r>
+            <a:r>
+              <a:rPr lang="de-DE" dirty="0"/>
+              <a:t>) für das Project Diary</a:t>
+            </a:r>
           </a:p>
         </p:txBody>
       </p:sp>
@@ -24891,7 +25556,7 @@
           <p:nvPr>
             <p:extLst>
               <p:ext uri="{D42A27DB-BD31-4B8C-83A1-F6EECF244321}">
-                <p14:modId xmlns:p14="http://schemas.microsoft.com/office/powerpoint/2010/main" val="3241747060"/>
+                <p14:modId xmlns:p14="http://schemas.microsoft.com/office/powerpoint/2010/main" val="3235484120"/>
               </p:ext>
             </p:extLst>
           </p:nvPr>
@@ -25003,7 +25668,7 @@
                       </a:pPr>
                       <a:r>
                         <a:rPr lang="de-CH" dirty="0"/>
-                        <a:t>50 % der Logik Klassen</a:t>
+                        <a:t>50 % der Logik-Klassen</a:t>
                       </a:r>
                     </a:p>
                     <a:p>
@@ -25035,7 +25700,7 @@
                       </a:pPr>
                       <a:r>
                         <a:rPr lang="de-CH" dirty="0"/>
-                        <a:t>60 % der Klassen</a:t>
+                        <a:t>0 % der Logik-Klassen</a:t>
                       </a:r>
                     </a:p>
                     <a:p>
@@ -25045,13 +25710,8 @@
                       </a:pPr>
                       <a:r>
                         <a:rPr lang="de-CH" dirty="0"/>
-                        <a:t>70 % Code </a:t>
+                        <a:t>0 % Code Coverage</a:t>
                       </a:r>
-                      <a:r>
-                        <a:rPr lang="de-CH" dirty="0" err="1"/>
-                        <a:t>Coverage</a:t>
-                      </a:r>
-                      <a:endParaRPr lang="de-CH" dirty="0"/>
                     </a:p>
                   </a:txBody>
                   <a:tcPr/>
@@ -25135,14 +25795,14 @@
           <p:nvPr>
             <p:extLst>
               <p:ext uri="{D42A27DB-BD31-4B8C-83A1-F6EECF244321}">
-                <p14:modId xmlns:p14="http://schemas.microsoft.com/office/powerpoint/2010/main" val="571282680"/>
+                <p14:modId xmlns:p14="http://schemas.microsoft.com/office/powerpoint/2010/main" val="1120229814"/>
               </p:ext>
             </p:extLst>
           </p:nvPr>
         </p:nvGraphicFramePr>
         <p:xfrm>
           <a:off x="1084687" y="3987413"/>
-          <a:ext cx="5009724" cy="1764170"/>
+          <a:ext cx="5009724" cy="1387872"/>
         </p:xfrm>
         <a:graphic>
           <a:graphicData uri="http://schemas.openxmlformats.org/drawingml/2006/table">
@@ -25182,35 +25842,6 @@
                   </a:ext>
                 </a:extLst>
               </a:tr>
-              <a:tr h="473472">
-                <a:tc>
-                  <a:txBody>
-                    <a:bodyPr/>
-                    <a:lstStyle/>
-                    <a:p>
-                      <a:pPr marL="285750" indent="-285750">
-                        <a:buFont typeface="Arial" panose="020B0604020202020204" pitchFamily="34" charset="0"/>
-                        <a:buChar char="•"/>
-                      </a:pPr>
-                      <a:r>
-                        <a:rPr lang="de-CH" dirty="0"/>
-                        <a:t>Unterschiedliche Code </a:t>
-                      </a:r>
-                      <a:r>
-                        <a:rPr lang="de-CH" dirty="0" err="1"/>
-                        <a:t>Coverage</a:t>
-                      </a:r>
-                      <a:endParaRPr lang="de-CH" dirty="0"/>
-                    </a:p>
-                  </a:txBody>
-                  <a:tcPr/>
-                </a:tc>
-                <a:extLst>
-                  <a:ext uri="{0D108BD9-81ED-4DB2-BD59-A6C34878D82A}">
-                    <a16:rowId xmlns:a16="http://schemas.microsoft.com/office/drawing/2014/main" val="767070048"/>
-                  </a:ext>
-                </a:extLst>
-              </a:tr>
               <a:tr h="817226">
                 <a:tc>
                   <a:txBody>
@@ -25223,7 +25854,15 @@
                       </a:pPr>
                       <a:r>
                         <a:rPr lang="de-CH" dirty="0"/>
-                        <a:t>Eine erwartete Zunahme</a:t>
+                        <a:t>Eine erwartete Zunahme von Kommentaren und </a:t>
+                      </a:r>
+                      <a:r>
+                        <a:rPr lang="de-CH" dirty="0" err="1"/>
+                        <a:t>Logging</a:t>
+                      </a:r>
+                      <a:r>
+                        <a:rPr lang="de-CH" dirty="0"/>
+                        <a:t> Statements</a:t>
                       </a:r>
                     </a:p>
                     <a:p>

</xml_diff>